<commit_message>
Presentación ERS AGNEX Actualizada el 16/05/2019 18:24
</commit_message>
<xml_diff>
--- a/ERS/Presentación_ERS_AGNEX.pptx
+++ b/ERS/Presentación_ERS_AGNEX.pptx
@@ -5,10 +5,10 @@
     <p:sldMasterId id="2147483648" r:id="rId1"/>
   </p:sldMasterIdLst>
   <p:notesMasterIdLst>
-    <p:notesMasterId r:id="rId23"/>
+    <p:notesMasterId r:id="rId25"/>
   </p:notesMasterIdLst>
   <p:handoutMasterIdLst>
-    <p:handoutMasterId r:id="rId24"/>
+    <p:handoutMasterId r:id="rId26"/>
   </p:handoutMasterIdLst>
   <p:sldIdLst>
     <p:sldId id="257" r:id="rId2"/>
@@ -20,18 +20,20 @@
     <p:sldId id="290" r:id="rId8"/>
     <p:sldId id="291" r:id="rId9"/>
     <p:sldId id="292" r:id="rId10"/>
-    <p:sldId id="277" r:id="rId11"/>
-    <p:sldId id="278" r:id="rId12"/>
-    <p:sldId id="280" r:id="rId13"/>
-    <p:sldId id="287" r:id="rId14"/>
-    <p:sldId id="288" r:id="rId15"/>
-    <p:sldId id="279" r:id="rId16"/>
-    <p:sldId id="281" r:id="rId17"/>
-    <p:sldId id="282" r:id="rId18"/>
-    <p:sldId id="283" r:id="rId19"/>
-    <p:sldId id="286" r:id="rId20"/>
-    <p:sldId id="285" r:id="rId21"/>
-    <p:sldId id="273" r:id="rId22"/>
+    <p:sldId id="293" r:id="rId11"/>
+    <p:sldId id="294" r:id="rId12"/>
+    <p:sldId id="277" r:id="rId13"/>
+    <p:sldId id="278" r:id="rId14"/>
+    <p:sldId id="280" r:id="rId15"/>
+    <p:sldId id="287" r:id="rId16"/>
+    <p:sldId id="288" r:id="rId17"/>
+    <p:sldId id="279" r:id="rId18"/>
+    <p:sldId id="281" r:id="rId19"/>
+    <p:sldId id="282" r:id="rId20"/>
+    <p:sldId id="283" r:id="rId21"/>
+    <p:sldId id="286" r:id="rId22"/>
+    <p:sldId id="285" r:id="rId23"/>
+    <p:sldId id="273" r:id="rId24"/>
   </p:sldIdLst>
   <p:sldSz cx="9144000" cy="6858000" type="screen4x3"/>
   <p:notesSz cx="6797675" cy="9926638"/>
@@ -2434,7 +2436,7 @@
     </p:spTree>
     <p:extLst>
       <p:ext uri="{BB962C8B-B14F-4D97-AF65-F5344CB8AC3E}">
-        <p14:creationId xmlns:p14="http://schemas.microsoft.com/office/powerpoint/2010/main" val="3720071132"/>
+        <p14:creationId xmlns:p14="http://schemas.microsoft.com/office/powerpoint/2010/main" val="3169042822"/>
       </p:ext>
     </p:extLst>
   </p:cSld>
@@ -2524,7 +2526,7 @@
     </p:spTree>
     <p:extLst>
       <p:ext uri="{BB962C8B-B14F-4D97-AF65-F5344CB8AC3E}">
-        <p14:creationId xmlns:p14="http://schemas.microsoft.com/office/powerpoint/2010/main" val="2699803437"/>
+        <p14:creationId xmlns:p14="http://schemas.microsoft.com/office/powerpoint/2010/main" val="1754063111"/>
       </p:ext>
     </p:extLst>
   </p:cSld>
@@ -2614,7 +2616,7 @@
     </p:spTree>
     <p:extLst>
       <p:ext uri="{BB962C8B-B14F-4D97-AF65-F5344CB8AC3E}">
-        <p14:creationId xmlns:p14="http://schemas.microsoft.com/office/powerpoint/2010/main" val="1973086602"/>
+        <p14:creationId xmlns:p14="http://schemas.microsoft.com/office/powerpoint/2010/main" val="3720071132"/>
       </p:ext>
     </p:extLst>
   </p:cSld>
@@ -2704,7 +2706,7 @@
     </p:spTree>
     <p:extLst>
       <p:ext uri="{BB962C8B-B14F-4D97-AF65-F5344CB8AC3E}">
-        <p14:creationId xmlns:p14="http://schemas.microsoft.com/office/powerpoint/2010/main" val="3862837611"/>
+        <p14:creationId xmlns:p14="http://schemas.microsoft.com/office/powerpoint/2010/main" val="2699803437"/>
       </p:ext>
     </p:extLst>
   </p:cSld>
@@ -2794,7 +2796,7 @@
     </p:spTree>
     <p:extLst>
       <p:ext uri="{BB962C8B-B14F-4D97-AF65-F5344CB8AC3E}">
-        <p14:creationId xmlns:p14="http://schemas.microsoft.com/office/powerpoint/2010/main" val="830747306"/>
+        <p14:creationId xmlns:p14="http://schemas.microsoft.com/office/powerpoint/2010/main" val="1973086602"/>
       </p:ext>
     </p:extLst>
   </p:cSld>
@@ -2884,7 +2886,7 @@
     </p:spTree>
     <p:extLst>
       <p:ext uri="{BB962C8B-B14F-4D97-AF65-F5344CB8AC3E}">
-        <p14:creationId xmlns:p14="http://schemas.microsoft.com/office/powerpoint/2010/main" val="1354645389"/>
+        <p14:creationId xmlns:p14="http://schemas.microsoft.com/office/powerpoint/2010/main" val="3862837611"/>
       </p:ext>
     </p:extLst>
   </p:cSld>
@@ -2974,7 +2976,7 @@
     </p:spTree>
     <p:extLst>
       <p:ext uri="{BB962C8B-B14F-4D97-AF65-F5344CB8AC3E}">
-        <p14:creationId xmlns:p14="http://schemas.microsoft.com/office/powerpoint/2010/main" val="1930275283"/>
+        <p14:creationId xmlns:p14="http://schemas.microsoft.com/office/powerpoint/2010/main" val="830747306"/>
       </p:ext>
     </p:extLst>
   </p:cSld>
@@ -3064,7 +3066,7 @@
     </p:spTree>
     <p:extLst>
       <p:ext uri="{BB962C8B-B14F-4D97-AF65-F5344CB8AC3E}">
-        <p14:creationId xmlns:p14="http://schemas.microsoft.com/office/powerpoint/2010/main" val="4157666328"/>
+        <p14:creationId xmlns:p14="http://schemas.microsoft.com/office/powerpoint/2010/main" val="1354645389"/>
       </p:ext>
     </p:extLst>
   </p:cSld>
@@ -3154,7 +3156,7 @@
     </p:spTree>
     <p:extLst>
       <p:ext uri="{BB962C8B-B14F-4D97-AF65-F5344CB8AC3E}">
-        <p14:creationId xmlns:p14="http://schemas.microsoft.com/office/powerpoint/2010/main" val="3481284551"/>
+        <p14:creationId xmlns:p14="http://schemas.microsoft.com/office/powerpoint/2010/main" val="1930275283"/>
       </p:ext>
     </p:extLst>
   </p:cSld>
@@ -3244,7 +3246,7 @@
     </p:spTree>
     <p:extLst>
       <p:ext uri="{BB962C8B-B14F-4D97-AF65-F5344CB8AC3E}">
-        <p14:creationId xmlns:p14="http://schemas.microsoft.com/office/powerpoint/2010/main" val="1307019660"/>
+        <p14:creationId xmlns:p14="http://schemas.microsoft.com/office/powerpoint/2010/main" val="4157666328"/>
       </p:ext>
     </p:extLst>
   </p:cSld>
@@ -3335,6 +3337,186 @@
     <p:extLst>
       <p:ext uri="{BB962C8B-B14F-4D97-AF65-F5344CB8AC3E}">
         <p14:creationId xmlns:p14="http://schemas.microsoft.com/office/powerpoint/2010/main" val="3099491471"/>
+      </p:ext>
+    </p:extLst>
+  </p:cSld>
+  <p:clrMapOvr>
+    <a:masterClrMapping/>
+  </p:clrMapOvr>
+</p:notes>
+</file>
+
+<file path=ppt/notesSlides/notesSlide20.xml><?xml version="1.0" encoding="utf-8"?>
+<p:notes xmlns:a="http://schemas.openxmlformats.org/drawingml/2006/main" xmlns:r="http://schemas.openxmlformats.org/officeDocument/2006/relationships" xmlns:p="http://schemas.openxmlformats.org/presentationml/2006/main">
+  <p:cSld>
+    <p:spTree>
+      <p:nvGrpSpPr>
+        <p:cNvPr id="1" name=""/>
+        <p:cNvGrpSpPr/>
+        <p:nvPr/>
+      </p:nvGrpSpPr>
+      <p:grpSpPr>
+        <a:xfrm>
+          <a:off x="0" y="0"/>
+          <a:ext cx="0" cy="0"/>
+          <a:chOff x="0" y="0"/>
+          <a:chExt cx="0" cy="0"/>
+        </a:xfrm>
+      </p:grpSpPr>
+      <p:sp>
+        <p:nvSpPr>
+          <p:cNvPr id="2" name="Marcador de imagen de diapositiva 1"/>
+          <p:cNvSpPr>
+            <a:spLocks noGrp="1" noRot="1" noChangeAspect="1"/>
+          </p:cNvSpPr>
+          <p:nvPr>
+            <p:ph type="sldImg"/>
+          </p:nvPr>
+        </p:nvSpPr>
+        <p:spPr/>
+      </p:sp>
+      <p:sp>
+        <p:nvSpPr>
+          <p:cNvPr id="3" name="Marcador de notas 2"/>
+          <p:cNvSpPr>
+            <a:spLocks noGrp="1"/>
+          </p:cNvSpPr>
+          <p:nvPr>
+            <p:ph type="body" idx="1"/>
+          </p:nvPr>
+        </p:nvSpPr>
+        <p:spPr/>
+        <p:txBody>
+          <a:bodyPr/>
+          <a:lstStyle/>
+          <a:p>
+            <a:endParaRPr lang="es-ES" dirty="0"/>
+          </a:p>
+        </p:txBody>
+      </p:sp>
+      <p:sp>
+        <p:nvSpPr>
+          <p:cNvPr id="4" name="Marcador de número de diapositiva 3"/>
+          <p:cNvSpPr>
+            <a:spLocks noGrp="1"/>
+          </p:cNvSpPr>
+          <p:nvPr>
+            <p:ph type="sldNum" sz="quarter" idx="10"/>
+          </p:nvPr>
+        </p:nvSpPr>
+        <p:spPr/>
+        <p:txBody>
+          <a:bodyPr/>
+          <a:lstStyle/>
+          <a:p>
+            <a:pPr>
+              <a:defRPr/>
+            </a:pPr>
+            <a:fld id="{1F63AF9B-48B2-024E-8F3E-F33D3D6E84DD}" type="slidenum">
+              <a:rPr lang="es-ES" smtClean="0"/>
+              <a:pPr>
+                <a:defRPr/>
+              </a:pPr>
+              <a:t>21</a:t>
+            </a:fld>
+            <a:endParaRPr lang="es-ES"/>
+          </a:p>
+        </p:txBody>
+      </p:sp>
+    </p:spTree>
+    <p:extLst>
+      <p:ext uri="{BB962C8B-B14F-4D97-AF65-F5344CB8AC3E}">
+        <p14:creationId xmlns:p14="http://schemas.microsoft.com/office/powerpoint/2010/main" val="3481284551"/>
+      </p:ext>
+    </p:extLst>
+  </p:cSld>
+  <p:clrMapOvr>
+    <a:masterClrMapping/>
+  </p:clrMapOvr>
+</p:notes>
+</file>
+
+<file path=ppt/notesSlides/notesSlide21.xml><?xml version="1.0" encoding="utf-8"?>
+<p:notes xmlns:a="http://schemas.openxmlformats.org/drawingml/2006/main" xmlns:r="http://schemas.openxmlformats.org/officeDocument/2006/relationships" xmlns:p="http://schemas.openxmlformats.org/presentationml/2006/main">
+  <p:cSld>
+    <p:spTree>
+      <p:nvGrpSpPr>
+        <p:cNvPr id="1" name=""/>
+        <p:cNvGrpSpPr/>
+        <p:nvPr/>
+      </p:nvGrpSpPr>
+      <p:grpSpPr>
+        <a:xfrm>
+          <a:off x="0" y="0"/>
+          <a:ext cx="0" cy="0"/>
+          <a:chOff x="0" y="0"/>
+          <a:chExt cx="0" cy="0"/>
+        </a:xfrm>
+      </p:grpSpPr>
+      <p:sp>
+        <p:nvSpPr>
+          <p:cNvPr id="2" name="Marcador de imagen de diapositiva 1"/>
+          <p:cNvSpPr>
+            <a:spLocks noGrp="1" noRot="1" noChangeAspect="1"/>
+          </p:cNvSpPr>
+          <p:nvPr>
+            <p:ph type="sldImg"/>
+          </p:nvPr>
+        </p:nvSpPr>
+        <p:spPr/>
+      </p:sp>
+      <p:sp>
+        <p:nvSpPr>
+          <p:cNvPr id="3" name="Marcador de notas 2"/>
+          <p:cNvSpPr>
+            <a:spLocks noGrp="1"/>
+          </p:cNvSpPr>
+          <p:nvPr>
+            <p:ph type="body" idx="1"/>
+          </p:nvPr>
+        </p:nvSpPr>
+        <p:spPr/>
+        <p:txBody>
+          <a:bodyPr/>
+          <a:lstStyle/>
+          <a:p>
+            <a:endParaRPr lang="es-ES" dirty="0"/>
+          </a:p>
+        </p:txBody>
+      </p:sp>
+      <p:sp>
+        <p:nvSpPr>
+          <p:cNvPr id="4" name="Marcador de número de diapositiva 3"/>
+          <p:cNvSpPr>
+            <a:spLocks noGrp="1"/>
+          </p:cNvSpPr>
+          <p:nvPr>
+            <p:ph type="sldNum" sz="quarter" idx="10"/>
+          </p:nvPr>
+        </p:nvSpPr>
+        <p:spPr/>
+        <p:txBody>
+          <a:bodyPr/>
+          <a:lstStyle/>
+          <a:p>
+            <a:pPr>
+              <a:defRPr/>
+            </a:pPr>
+            <a:fld id="{1F63AF9B-48B2-024E-8F3E-F33D3D6E84DD}" type="slidenum">
+              <a:rPr lang="es-ES" smtClean="0"/>
+              <a:pPr>
+                <a:defRPr/>
+              </a:pPr>
+              <a:t>22</a:t>
+            </a:fld>
+            <a:endParaRPr lang="es-ES"/>
+          </a:p>
+        </p:txBody>
+      </p:sp>
+    </p:spTree>
+    <p:extLst>
+      <p:ext uri="{BB962C8B-B14F-4D97-AF65-F5344CB8AC3E}">
+        <p14:creationId xmlns:p14="http://schemas.microsoft.com/office/powerpoint/2010/main" val="1307019660"/>
       </p:ext>
     </p:extLst>
   </p:cSld>
@@ -3964,7 +4146,7 @@
     </p:spTree>
     <p:extLst>
       <p:ext uri="{BB962C8B-B14F-4D97-AF65-F5344CB8AC3E}">
-        <p14:creationId xmlns:p14="http://schemas.microsoft.com/office/powerpoint/2010/main" val="1754063111"/>
+        <p14:creationId xmlns:p14="http://schemas.microsoft.com/office/powerpoint/2010/main" val="3620948975"/>
       </p:ext>
     </p:extLst>
   </p:cSld>
@@ -9702,7 +9884,7 @@
                   <a:schemeClr val="tx2"/>
                 </a:solidFill>
               </a:rPr>
-              <a:t>Diagrama</a:t>
+              <a:t>Diseño</a:t>
             </a:r>
             <a:r>
               <a:rPr lang="en-US" altLang="es-ES" sz="2800" b="1" dirty="0" smtClean="0">
@@ -9710,7 +9892,7 @@
                   <a:schemeClr val="tx2"/>
                 </a:solidFill>
               </a:rPr>
-              <a:t> de </a:t>
+              <a:t> </a:t>
             </a:r>
             <a:r>
               <a:rPr lang="en-US" altLang="es-ES" sz="2800" b="1" dirty="0" err="1" smtClean="0">
@@ -9718,7 +9900,7 @@
                   <a:schemeClr val="tx2"/>
                 </a:solidFill>
               </a:rPr>
-              <a:t>Casos</a:t>
+              <a:t>Lógico</a:t>
             </a:r>
             <a:r>
               <a:rPr lang="en-US" altLang="es-ES" sz="2800" b="1" dirty="0" smtClean="0">
@@ -9726,23 +9908,7 @@
                   <a:schemeClr val="tx2"/>
                 </a:solidFill>
               </a:rPr>
-              <a:t> de </a:t>
-            </a:r>
-            <a:r>
-              <a:rPr lang="en-US" altLang="es-ES" sz="2800" b="1" dirty="0" err="1" smtClean="0">
-                <a:solidFill>
-                  <a:schemeClr val="tx2"/>
-                </a:solidFill>
-              </a:rPr>
-              <a:t>Uso</a:t>
-            </a:r>
-            <a:r>
-              <a:rPr lang="en-US" altLang="es-ES" sz="2800" b="1" dirty="0" smtClean="0">
-                <a:solidFill>
-                  <a:schemeClr val="tx2"/>
-                </a:solidFill>
-              </a:rPr>
-              <a:t>.</a:t>
+              <a:t> BBDD.</a:t>
             </a:r>
             <a:endParaRPr lang="en-US" altLang="es-ES" sz="2800" b="1" dirty="0">
               <a:solidFill>
@@ -9754,10 +9920,8 @@
       </p:sp>
       <p:pic>
         <p:nvPicPr>
-          <p:cNvPr id="2" name="Imagen 1"/>
-          <p:cNvPicPr>
-            <a:picLocks noChangeAspect="1"/>
-          </p:cNvPicPr>
+          <p:cNvPr id="4" name="Imagen 3"/>
+          <p:cNvPicPr/>
           <p:nvPr/>
         </p:nvPicPr>
         <p:blipFill>
@@ -9768,8 +9932,8 @@
         </p:blipFill>
         <p:spPr>
           <a:xfrm>
-            <a:off x="1475657" y="740462"/>
-            <a:ext cx="6696744" cy="5762702"/>
+            <a:off x="1259632" y="692696"/>
+            <a:ext cx="6645910" cy="5815965"/>
           </a:xfrm>
           <a:prstGeom prst="rect">
             <a:avLst/>
@@ -9779,7 +9943,7 @@
     </p:spTree>
     <p:extLst>
       <p:ext uri="{BB962C8B-B14F-4D97-AF65-F5344CB8AC3E}">
-        <p14:creationId xmlns:p14="http://schemas.microsoft.com/office/powerpoint/2010/main" val="129587967"/>
+        <p14:creationId xmlns:p14="http://schemas.microsoft.com/office/powerpoint/2010/main" val="919069728"/>
       </p:ext>
     </p:extLst>
   </p:cSld>
@@ -10002,7 +10166,7 @@
               <a:buNone/>
             </a:pPr>
             <a:r>
-              <a:rPr lang="en-US" altLang="es-ES" sz="2400" b="1" dirty="0" smtClean="0">
+              <a:rPr lang="en-US" altLang="es-ES" sz="2800" b="1" dirty="0" smtClean="0">
                 <a:solidFill>
                   <a:schemeClr val="tx2"/>
                 </a:solidFill>
@@ -10010,54 +10174,38 @@
               <a:t>ERS. </a:t>
             </a:r>
             <a:r>
-              <a:rPr lang="en-US" altLang="es-ES" sz="2400" b="1" dirty="0" err="1" smtClean="0">
+              <a:rPr lang="en-US" altLang="es-ES" sz="2800" b="1" dirty="0" err="1" smtClean="0">
                 <a:solidFill>
                   <a:schemeClr val="tx2"/>
                 </a:solidFill>
               </a:rPr>
-              <a:t>Prototipo</a:t>
+              <a:t>Diseño</a:t>
             </a:r>
             <a:r>
-              <a:rPr lang="en-US" altLang="es-ES" sz="2400" b="1" dirty="0" smtClean="0">
+              <a:rPr lang="en-US" altLang="es-ES" sz="2800" b="1" dirty="0" smtClean="0">
                 <a:solidFill>
                   <a:schemeClr val="tx2"/>
                 </a:solidFill>
               </a:rPr>
-              <a:t> de </a:t>
+              <a:t> </a:t>
             </a:r>
             <a:r>
-              <a:rPr lang="en-US" altLang="es-ES" sz="2400" b="1" dirty="0" err="1" smtClean="0">
+              <a:rPr lang="en-US" altLang="es-ES" sz="2800" b="1" dirty="0" err="1" smtClean="0">
                 <a:solidFill>
                   <a:schemeClr val="tx2"/>
                 </a:solidFill>
               </a:rPr>
-              <a:t>Interfaz</a:t>
+              <a:t>Físico</a:t>
             </a:r>
             <a:r>
-              <a:rPr lang="en-US" altLang="es-ES" sz="2400" b="1" dirty="0" smtClean="0">
+              <a:rPr lang="en-US" altLang="es-ES" sz="2800" b="1" dirty="0" smtClean="0">
                 <a:solidFill>
                   <a:schemeClr val="tx2"/>
                 </a:solidFill>
               </a:rPr>
-              <a:t> de </a:t>
+              <a:t> BBDD.</a:t>
             </a:r>
-            <a:r>
-              <a:rPr lang="en-US" altLang="es-ES" sz="2400" b="1" dirty="0" err="1" smtClean="0">
-                <a:solidFill>
-                  <a:schemeClr val="tx2"/>
-                </a:solidFill>
-              </a:rPr>
-              <a:t>Usuario</a:t>
-            </a:r>
-            <a:r>
-              <a:rPr lang="en-US" altLang="es-ES" sz="2400" b="1" dirty="0" smtClean="0">
-                <a:solidFill>
-                  <a:schemeClr val="tx2"/>
-                </a:solidFill>
-              </a:rPr>
-              <a:t>.</a:t>
-            </a:r>
-            <a:endParaRPr lang="en-US" altLang="es-ES" sz="2400" b="1" dirty="0">
+            <a:endParaRPr lang="en-US" altLang="es-ES" sz="2800" b="1" dirty="0">
               <a:solidFill>
                 <a:schemeClr val="tx2"/>
               </a:solidFill>
@@ -10067,28 +10215,20 @@
       </p:sp>
       <p:pic>
         <p:nvPicPr>
-          <p:cNvPr id="11" name="Imagen 10"/>
-          <p:cNvPicPr>
-            <a:picLocks noChangeAspect="1"/>
-          </p:cNvPicPr>
+          <p:cNvPr id="5" name="Imagen 4"/>
+          <p:cNvPicPr/>
           <p:nvPr/>
         </p:nvPicPr>
         <p:blipFill>
-          <a:blip r:embed="rId3">
-            <a:extLst>
-              <a:ext uri="{28A0092B-C50C-407E-A947-70E740481C1C}">
-                <a14:useLocalDpi xmlns:a14="http://schemas.microsoft.com/office/drawing/2010/main" val="0"/>
-              </a:ext>
-            </a:extLst>
-          </a:blip>
+          <a:blip r:embed="rId3"/>
           <a:stretch>
             <a:fillRect/>
           </a:stretch>
         </p:blipFill>
         <p:spPr>
           <a:xfrm>
-            <a:off x="762000" y="738336"/>
-            <a:ext cx="7620000" cy="5715000"/>
+            <a:off x="683568" y="836712"/>
+            <a:ext cx="8208912" cy="5472608"/>
           </a:xfrm>
           <a:prstGeom prst="rect">
             <a:avLst/>
@@ -10098,7 +10238,7 @@
     </p:spTree>
     <p:extLst>
       <p:ext uri="{BB962C8B-B14F-4D97-AF65-F5344CB8AC3E}">
-        <p14:creationId xmlns:p14="http://schemas.microsoft.com/office/powerpoint/2010/main" val="1042426213"/>
+        <p14:creationId xmlns:p14="http://schemas.microsoft.com/office/powerpoint/2010/main" val="687583492"/>
       </p:ext>
     </p:extLst>
   </p:cSld>
@@ -10321,7 +10461,7 @@
               <a:buNone/>
             </a:pPr>
             <a:r>
-              <a:rPr lang="en-US" altLang="es-ES" sz="2400" b="1" dirty="0" smtClean="0">
+              <a:rPr lang="en-US" altLang="es-ES" sz="2800" b="1" dirty="0" smtClean="0">
                 <a:solidFill>
                   <a:schemeClr val="tx2"/>
                 </a:solidFill>
@@ -10329,15 +10469,15 @@
               <a:t>ERS. </a:t>
             </a:r>
             <a:r>
-              <a:rPr lang="en-US" altLang="es-ES" sz="2400" b="1" dirty="0" err="1" smtClean="0">
+              <a:rPr lang="en-US" altLang="es-ES" sz="2800" b="1" dirty="0" err="1" smtClean="0">
                 <a:solidFill>
                   <a:schemeClr val="tx2"/>
                 </a:solidFill>
               </a:rPr>
-              <a:t>Prototipo</a:t>
+              <a:t>Diagrama</a:t>
             </a:r>
             <a:r>
-              <a:rPr lang="en-US" altLang="es-ES" sz="2400" b="1" dirty="0" smtClean="0">
+              <a:rPr lang="en-US" altLang="es-ES" sz="2800" b="1" dirty="0" smtClean="0">
                 <a:solidFill>
                   <a:schemeClr val="tx2"/>
                 </a:solidFill>
@@ -10345,15 +10485,15 @@
               <a:t> de </a:t>
             </a:r>
             <a:r>
-              <a:rPr lang="en-US" altLang="es-ES" sz="2400" b="1" dirty="0" err="1" smtClean="0">
+              <a:rPr lang="en-US" altLang="es-ES" sz="2800" b="1" dirty="0" err="1" smtClean="0">
                 <a:solidFill>
                   <a:schemeClr val="tx2"/>
                 </a:solidFill>
               </a:rPr>
-              <a:t>Interfaz</a:t>
+              <a:t>Casos</a:t>
             </a:r>
             <a:r>
-              <a:rPr lang="en-US" altLang="es-ES" sz="2400" b="1" dirty="0" smtClean="0">
+              <a:rPr lang="en-US" altLang="es-ES" sz="2800" b="1" dirty="0" smtClean="0">
                 <a:solidFill>
                   <a:schemeClr val="tx2"/>
                 </a:solidFill>
@@ -10361,22 +10501,22 @@
               <a:t> de </a:t>
             </a:r>
             <a:r>
-              <a:rPr lang="en-US" altLang="es-ES" sz="2400" b="1" dirty="0" err="1" smtClean="0">
+              <a:rPr lang="en-US" altLang="es-ES" sz="2800" b="1" dirty="0" err="1" smtClean="0">
                 <a:solidFill>
                   <a:schemeClr val="tx2"/>
                 </a:solidFill>
               </a:rPr>
-              <a:t>Usuario</a:t>
+              <a:t>Uso</a:t>
             </a:r>
             <a:r>
-              <a:rPr lang="en-US" altLang="es-ES" sz="2400" b="1" dirty="0" smtClean="0">
+              <a:rPr lang="en-US" altLang="es-ES" sz="2800" b="1" dirty="0" smtClean="0">
                 <a:solidFill>
                   <a:schemeClr val="tx2"/>
                 </a:solidFill>
               </a:rPr>
               <a:t>.</a:t>
             </a:r>
-            <a:endParaRPr lang="en-US" altLang="es-ES" sz="2400" b="1" dirty="0">
+            <a:endParaRPr lang="en-US" altLang="es-ES" sz="2800" b="1" dirty="0">
               <a:solidFill>
                 <a:schemeClr val="tx2"/>
               </a:solidFill>
@@ -10393,21 +10533,15 @@
           <p:nvPr/>
         </p:nvPicPr>
         <p:blipFill>
-          <a:blip r:embed="rId3">
-            <a:extLst>
-              <a:ext uri="{28A0092B-C50C-407E-A947-70E740481C1C}">
-                <a14:useLocalDpi xmlns:a14="http://schemas.microsoft.com/office/drawing/2010/main" val="0"/>
-              </a:ext>
-            </a:extLst>
-          </a:blip>
+          <a:blip r:embed="rId3"/>
           <a:stretch>
             <a:fillRect/>
           </a:stretch>
         </p:blipFill>
         <p:spPr>
           <a:xfrm>
-            <a:off x="762000" y="738336"/>
-            <a:ext cx="7620000" cy="5715000"/>
+            <a:off x="1475657" y="740462"/>
+            <a:ext cx="6696744" cy="5762702"/>
           </a:xfrm>
           <a:prstGeom prst="rect">
             <a:avLst/>
@@ -10417,7 +10551,7 @@
     </p:spTree>
     <p:extLst>
       <p:ext uri="{BB962C8B-B14F-4D97-AF65-F5344CB8AC3E}">
-        <p14:creationId xmlns:p14="http://schemas.microsoft.com/office/powerpoint/2010/main" val="2588123239"/>
+        <p14:creationId xmlns:p14="http://schemas.microsoft.com/office/powerpoint/2010/main" val="129587967"/>
       </p:ext>
     </p:extLst>
   </p:cSld>
@@ -10705,7 +10839,7 @@
       </p:sp>
       <p:pic>
         <p:nvPicPr>
-          <p:cNvPr id="3" name="Imagen 2"/>
+          <p:cNvPr id="11" name="Imagen 10"/>
           <p:cNvPicPr>
             <a:picLocks noChangeAspect="1"/>
           </p:cNvPicPr>
@@ -10736,7 +10870,7 @@
     </p:spTree>
     <p:extLst>
       <p:ext uri="{BB962C8B-B14F-4D97-AF65-F5344CB8AC3E}">
-        <p14:creationId xmlns:p14="http://schemas.microsoft.com/office/powerpoint/2010/main" val="4243829467"/>
+        <p14:creationId xmlns:p14="http://schemas.microsoft.com/office/powerpoint/2010/main" val="1042426213"/>
       </p:ext>
     </p:extLst>
   </p:cSld>
@@ -11055,6 +11189,644 @@
     </p:spTree>
     <p:extLst>
       <p:ext uri="{BB962C8B-B14F-4D97-AF65-F5344CB8AC3E}">
+        <p14:creationId xmlns:p14="http://schemas.microsoft.com/office/powerpoint/2010/main" val="2588123239"/>
+      </p:ext>
+    </p:extLst>
+  </p:cSld>
+  <p:clrMapOvr>
+    <a:masterClrMapping/>
+  </p:clrMapOvr>
+  <p:timing>
+    <p:tnLst>
+      <p:par>
+        <p:cTn id="1" dur="indefinite" restart="never" nodeType="tmRoot"/>
+      </p:par>
+    </p:tnLst>
+  </p:timing>
+</p:sld>
+</file>
+
+<file path=ppt/slides/slide15.xml><?xml version="1.0" encoding="utf-8"?>
+<p:sld xmlns:a="http://schemas.openxmlformats.org/drawingml/2006/main" xmlns:r="http://schemas.openxmlformats.org/officeDocument/2006/relationships" xmlns:p="http://schemas.openxmlformats.org/presentationml/2006/main">
+  <p:cSld>
+    <p:spTree>
+      <p:nvGrpSpPr>
+        <p:cNvPr id="1" name=""/>
+        <p:cNvGrpSpPr/>
+        <p:nvPr/>
+      </p:nvGrpSpPr>
+      <p:grpSpPr>
+        <a:xfrm>
+          <a:off x="0" y="0"/>
+          <a:ext cx="0" cy="0"/>
+          <a:chOff x="0" y="0"/>
+          <a:chExt cx="0" cy="0"/>
+        </a:xfrm>
+      </p:grpSpPr>
+      <p:sp>
+        <p:nvSpPr>
+          <p:cNvPr id="16385" name="Rectangle 14">
+            <a:extLst>
+              <a:ext uri="{FF2B5EF4-FFF2-40B4-BE49-F238E27FC236}">
+                <a16:creationId xmlns:a16="http://schemas.microsoft.com/office/drawing/2014/main" xmlns="" id="{3665E0D4-68DF-7A4B-92E0-B652D965824C}"/>
+              </a:ext>
+            </a:extLst>
+          </p:cNvPr>
+          <p:cNvSpPr>
+            <a:spLocks noChangeArrowheads="1"/>
+          </p:cNvSpPr>
+          <p:nvPr/>
+        </p:nvSpPr>
+        <p:spPr bwMode="auto">
+          <a:xfrm>
+            <a:off x="2627313" y="198438"/>
+            <a:ext cx="5400675" cy="566737"/>
+          </a:xfrm>
+          <a:prstGeom prst="rect">
+            <a:avLst/>
+          </a:prstGeom>
+          <a:noFill/>
+          <a:ln>
+            <a:noFill/>
+          </a:ln>
+          <a:effectLst/>
+          <a:extLst>
+            <a:ext uri="{909E8E84-426E-40DD-AFC4-6F175D3DCCD1}">
+              <a14:hiddenFill xmlns:a14="http://schemas.microsoft.com/office/drawing/2010/main">
+                <a:solidFill>
+                  <a:schemeClr val="bg1"/>
+                </a:solidFill>
+              </a14:hiddenFill>
+            </a:ext>
+            <a:ext uri="{91240B29-F687-4F45-9708-019B960494DF}">
+              <a14:hiddenLine xmlns:a14="http://schemas.microsoft.com/office/drawing/2010/main" w="12700">
+                <a:solidFill>
+                  <a:schemeClr val="tx1"/>
+                </a:solidFill>
+                <a:miter lim="800000"/>
+                <a:headEnd/>
+                <a:tailEnd/>
+              </a14:hiddenLine>
+            </a:ext>
+            <a:ext uri="{AF507438-7753-43E0-B8FC-AC1667EBCBE1}">
+              <a14:hiddenEffects xmlns:a14="http://schemas.microsoft.com/office/drawing/2010/main">
+                <a:effectLst>
+                  <a:outerShdw dist="107763" dir="2700000" algn="ctr" rotWithShape="0">
+                    <a:srgbClr val="DBFFB8"/>
+                  </a:outerShdw>
+                </a:effectLst>
+              </a14:hiddenEffects>
+            </a:ext>
+          </a:extLst>
+        </p:spPr>
+        <p:txBody>
+          <a:bodyPr wrap="none" lIns="45720" tIns="44450" rIns="45720" bIns="44450" anchor="ctr"/>
+          <a:lstStyle>
+            <a:lvl1pPr>
+              <a:spcBef>
+                <a:spcPct val="20000"/>
+              </a:spcBef>
+              <a:buChar char="•"/>
+              <a:defRPr sz="3200">
+                <a:solidFill>
+                  <a:schemeClr val="tx1"/>
+                </a:solidFill>
+                <a:latin typeface="Arial" panose="020B0604020202020204" pitchFamily="34" charset="0"/>
+              </a:defRPr>
+            </a:lvl1pPr>
+            <a:lvl2pPr marL="742950" indent="-285750">
+              <a:spcBef>
+                <a:spcPct val="20000"/>
+              </a:spcBef>
+              <a:buChar char="–"/>
+              <a:defRPr sz="2800">
+                <a:solidFill>
+                  <a:schemeClr val="tx1"/>
+                </a:solidFill>
+                <a:latin typeface="Arial" panose="020B0604020202020204" pitchFamily="34" charset="0"/>
+              </a:defRPr>
+            </a:lvl2pPr>
+            <a:lvl3pPr marL="1143000" indent="-228600">
+              <a:spcBef>
+                <a:spcPct val="20000"/>
+              </a:spcBef>
+              <a:buChar char="•"/>
+              <a:defRPr sz="2400">
+                <a:solidFill>
+                  <a:schemeClr val="tx1"/>
+                </a:solidFill>
+                <a:latin typeface="Arial" panose="020B0604020202020204" pitchFamily="34" charset="0"/>
+              </a:defRPr>
+            </a:lvl3pPr>
+            <a:lvl4pPr marL="1600200" indent="-228600">
+              <a:spcBef>
+                <a:spcPct val="20000"/>
+              </a:spcBef>
+              <a:buChar char="–"/>
+              <a:defRPr sz="2000">
+                <a:solidFill>
+                  <a:schemeClr val="tx1"/>
+                </a:solidFill>
+                <a:latin typeface="Arial" panose="020B0604020202020204" pitchFamily="34" charset="0"/>
+              </a:defRPr>
+            </a:lvl4pPr>
+            <a:lvl5pPr marL="2057400" indent="-228600">
+              <a:spcBef>
+                <a:spcPct val="20000"/>
+              </a:spcBef>
+              <a:buChar char="»"/>
+              <a:defRPr sz="2000">
+                <a:solidFill>
+                  <a:schemeClr val="tx1"/>
+                </a:solidFill>
+                <a:latin typeface="Arial" panose="020B0604020202020204" pitchFamily="34" charset="0"/>
+              </a:defRPr>
+            </a:lvl5pPr>
+            <a:lvl6pPr marL="2514600" indent="-228600" eaLnBrk="0" fontAlgn="base" hangingPunct="0">
+              <a:spcBef>
+                <a:spcPct val="20000"/>
+              </a:spcBef>
+              <a:spcAft>
+                <a:spcPct val="0"/>
+              </a:spcAft>
+              <a:buChar char="»"/>
+              <a:defRPr sz="2000">
+                <a:solidFill>
+                  <a:schemeClr val="tx1"/>
+                </a:solidFill>
+                <a:latin typeface="Arial" panose="020B0604020202020204" pitchFamily="34" charset="0"/>
+              </a:defRPr>
+            </a:lvl6pPr>
+            <a:lvl7pPr marL="2971800" indent="-228600" eaLnBrk="0" fontAlgn="base" hangingPunct="0">
+              <a:spcBef>
+                <a:spcPct val="20000"/>
+              </a:spcBef>
+              <a:spcAft>
+                <a:spcPct val="0"/>
+              </a:spcAft>
+              <a:buChar char="»"/>
+              <a:defRPr sz="2000">
+                <a:solidFill>
+                  <a:schemeClr val="tx1"/>
+                </a:solidFill>
+                <a:latin typeface="Arial" panose="020B0604020202020204" pitchFamily="34" charset="0"/>
+              </a:defRPr>
+            </a:lvl7pPr>
+            <a:lvl8pPr marL="3429000" indent="-228600" eaLnBrk="0" fontAlgn="base" hangingPunct="0">
+              <a:spcBef>
+                <a:spcPct val="20000"/>
+              </a:spcBef>
+              <a:spcAft>
+                <a:spcPct val="0"/>
+              </a:spcAft>
+              <a:buChar char="»"/>
+              <a:defRPr sz="2000">
+                <a:solidFill>
+                  <a:schemeClr val="tx1"/>
+                </a:solidFill>
+                <a:latin typeface="Arial" panose="020B0604020202020204" pitchFamily="34" charset="0"/>
+              </a:defRPr>
+            </a:lvl8pPr>
+            <a:lvl9pPr marL="3886200" indent="-228600" eaLnBrk="0" fontAlgn="base" hangingPunct="0">
+              <a:spcBef>
+                <a:spcPct val="20000"/>
+              </a:spcBef>
+              <a:spcAft>
+                <a:spcPct val="0"/>
+              </a:spcAft>
+              <a:buChar char="»"/>
+              <a:defRPr sz="2000">
+                <a:solidFill>
+                  <a:schemeClr val="tx1"/>
+                </a:solidFill>
+                <a:latin typeface="Arial" panose="020B0604020202020204" pitchFamily="34" charset="0"/>
+              </a:defRPr>
+            </a:lvl9pPr>
+          </a:lstStyle>
+          <a:p>
+            <a:pPr algn="ctr" eaLnBrk="1" hangingPunct="1">
+              <a:spcBef>
+                <a:spcPct val="0"/>
+              </a:spcBef>
+              <a:buFontTx/>
+              <a:buNone/>
+            </a:pPr>
+            <a:r>
+              <a:rPr lang="en-US" altLang="es-ES" sz="2400" b="1" dirty="0" smtClean="0">
+                <a:solidFill>
+                  <a:schemeClr val="tx2"/>
+                </a:solidFill>
+              </a:rPr>
+              <a:t>ERS. </a:t>
+            </a:r>
+            <a:r>
+              <a:rPr lang="en-US" altLang="es-ES" sz="2400" b="1" dirty="0" err="1" smtClean="0">
+                <a:solidFill>
+                  <a:schemeClr val="tx2"/>
+                </a:solidFill>
+              </a:rPr>
+              <a:t>Prototipo</a:t>
+            </a:r>
+            <a:r>
+              <a:rPr lang="en-US" altLang="es-ES" sz="2400" b="1" dirty="0" smtClean="0">
+                <a:solidFill>
+                  <a:schemeClr val="tx2"/>
+                </a:solidFill>
+              </a:rPr>
+              <a:t> de </a:t>
+            </a:r>
+            <a:r>
+              <a:rPr lang="en-US" altLang="es-ES" sz="2400" b="1" dirty="0" err="1" smtClean="0">
+                <a:solidFill>
+                  <a:schemeClr val="tx2"/>
+                </a:solidFill>
+              </a:rPr>
+              <a:t>Interfaz</a:t>
+            </a:r>
+            <a:r>
+              <a:rPr lang="en-US" altLang="es-ES" sz="2400" b="1" dirty="0" smtClean="0">
+                <a:solidFill>
+                  <a:schemeClr val="tx2"/>
+                </a:solidFill>
+              </a:rPr>
+              <a:t> de </a:t>
+            </a:r>
+            <a:r>
+              <a:rPr lang="en-US" altLang="es-ES" sz="2400" b="1" dirty="0" err="1" smtClean="0">
+                <a:solidFill>
+                  <a:schemeClr val="tx2"/>
+                </a:solidFill>
+              </a:rPr>
+              <a:t>Usuario</a:t>
+            </a:r>
+            <a:r>
+              <a:rPr lang="en-US" altLang="es-ES" sz="2400" b="1" dirty="0" smtClean="0">
+                <a:solidFill>
+                  <a:schemeClr val="tx2"/>
+                </a:solidFill>
+              </a:rPr>
+              <a:t>.</a:t>
+            </a:r>
+            <a:endParaRPr lang="en-US" altLang="es-ES" sz="2400" b="1" dirty="0">
+              <a:solidFill>
+                <a:schemeClr val="tx2"/>
+              </a:solidFill>
+            </a:endParaRPr>
+          </a:p>
+        </p:txBody>
+      </p:sp>
+      <p:pic>
+        <p:nvPicPr>
+          <p:cNvPr id="3" name="Imagen 2"/>
+          <p:cNvPicPr>
+            <a:picLocks noChangeAspect="1"/>
+          </p:cNvPicPr>
+          <p:nvPr/>
+        </p:nvPicPr>
+        <p:blipFill>
+          <a:blip r:embed="rId3">
+            <a:extLst>
+              <a:ext uri="{28A0092B-C50C-407E-A947-70E740481C1C}">
+                <a14:useLocalDpi xmlns:a14="http://schemas.microsoft.com/office/drawing/2010/main" val="0"/>
+              </a:ext>
+            </a:extLst>
+          </a:blip>
+          <a:stretch>
+            <a:fillRect/>
+          </a:stretch>
+        </p:blipFill>
+        <p:spPr>
+          <a:xfrm>
+            <a:off x="762000" y="738336"/>
+            <a:ext cx="7620000" cy="5715000"/>
+          </a:xfrm>
+          <a:prstGeom prst="rect">
+            <a:avLst/>
+          </a:prstGeom>
+        </p:spPr>
+      </p:pic>
+    </p:spTree>
+    <p:extLst>
+      <p:ext uri="{BB962C8B-B14F-4D97-AF65-F5344CB8AC3E}">
+        <p14:creationId xmlns:p14="http://schemas.microsoft.com/office/powerpoint/2010/main" val="4243829467"/>
+      </p:ext>
+    </p:extLst>
+  </p:cSld>
+  <p:clrMapOvr>
+    <a:masterClrMapping/>
+  </p:clrMapOvr>
+  <p:timing>
+    <p:tnLst>
+      <p:par>
+        <p:cTn id="1" dur="indefinite" restart="never" nodeType="tmRoot"/>
+      </p:par>
+    </p:tnLst>
+  </p:timing>
+</p:sld>
+</file>
+
+<file path=ppt/slides/slide16.xml><?xml version="1.0" encoding="utf-8"?>
+<p:sld xmlns:a="http://schemas.openxmlformats.org/drawingml/2006/main" xmlns:r="http://schemas.openxmlformats.org/officeDocument/2006/relationships" xmlns:p="http://schemas.openxmlformats.org/presentationml/2006/main">
+  <p:cSld>
+    <p:spTree>
+      <p:nvGrpSpPr>
+        <p:cNvPr id="1" name=""/>
+        <p:cNvGrpSpPr/>
+        <p:nvPr/>
+      </p:nvGrpSpPr>
+      <p:grpSpPr>
+        <a:xfrm>
+          <a:off x="0" y="0"/>
+          <a:ext cx="0" cy="0"/>
+          <a:chOff x="0" y="0"/>
+          <a:chExt cx="0" cy="0"/>
+        </a:xfrm>
+      </p:grpSpPr>
+      <p:sp>
+        <p:nvSpPr>
+          <p:cNvPr id="16385" name="Rectangle 14">
+            <a:extLst>
+              <a:ext uri="{FF2B5EF4-FFF2-40B4-BE49-F238E27FC236}">
+                <a16:creationId xmlns:a16="http://schemas.microsoft.com/office/drawing/2014/main" xmlns="" id="{3665E0D4-68DF-7A4B-92E0-B652D965824C}"/>
+              </a:ext>
+            </a:extLst>
+          </p:cNvPr>
+          <p:cNvSpPr>
+            <a:spLocks noChangeArrowheads="1"/>
+          </p:cNvSpPr>
+          <p:nvPr/>
+        </p:nvSpPr>
+        <p:spPr bwMode="auto">
+          <a:xfrm>
+            <a:off x="2627313" y="198438"/>
+            <a:ext cx="5400675" cy="566737"/>
+          </a:xfrm>
+          <a:prstGeom prst="rect">
+            <a:avLst/>
+          </a:prstGeom>
+          <a:noFill/>
+          <a:ln>
+            <a:noFill/>
+          </a:ln>
+          <a:effectLst/>
+          <a:extLst>
+            <a:ext uri="{909E8E84-426E-40DD-AFC4-6F175D3DCCD1}">
+              <a14:hiddenFill xmlns:a14="http://schemas.microsoft.com/office/drawing/2010/main">
+                <a:solidFill>
+                  <a:schemeClr val="bg1"/>
+                </a:solidFill>
+              </a14:hiddenFill>
+            </a:ext>
+            <a:ext uri="{91240B29-F687-4F45-9708-019B960494DF}">
+              <a14:hiddenLine xmlns:a14="http://schemas.microsoft.com/office/drawing/2010/main" w="12700">
+                <a:solidFill>
+                  <a:schemeClr val="tx1"/>
+                </a:solidFill>
+                <a:miter lim="800000"/>
+                <a:headEnd/>
+                <a:tailEnd/>
+              </a14:hiddenLine>
+            </a:ext>
+            <a:ext uri="{AF507438-7753-43E0-B8FC-AC1667EBCBE1}">
+              <a14:hiddenEffects xmlns:a14="http://schemas.microsoft.com/office/drawing/2010/main">
+                <a:effectLst>
+                  <a:outerShdw dist="107763" dir="2700000" algn="ctr" rotWithShape="0">
+                    <a:srgbClr val="DBFFB8"/>
+                  </a:outerShdw>
+                </a:effectLst>
+              </a14:hiddenEffects>
+            </a:ext>
+          </a:extLst>
+        </p:spPr>
+        <p:txBody>
+          <a:bodyPr wrap="none" lIns="45720" tIns="44450" rIns="45720" bIns="44450" anchor="ctr"/>
+          <a:lstStyle>
+            <a:lvl1pPr>
+              <a:spcBef>
+                <a:spcPct val="20000"/>
+              </a:spcBef>
+              <a:buChar char="•"/>
+              <a:defRPr sz="3200">
+                <a:solidFill>
+                  <a:schemeClr val="tx1"/>
+                </a:solidFill>
+                <a:latin typeface="Arial" panose="020B0604020202020204" pitchFamily="34" charset="0"/>
+              </a:defRPr>
+            </a:lvl1pPr>
+            <a:lvl2pPr marL="742950" indent="-285750">
+              <a:spcBef>
+                <a:spcPct val="20000"/>
+              </a:spcBef>
+              <a:buChar char="–"/>
+              <a:defRPr sz="2800">
+                <a:solidFill>
+                  <a:schemeClr val="tx1"/>
+                </a:solidFill>
+                <a:latin typeface="Arial" panose="020B0604020202020204" pitchFamily="34" charset="0"/>
+              </a:defRPr>
+            </a:lvl2pPr>
+            <a:lvl3pPr marL="1143000" indent="-228600">
+              <a:spcBef>
+                <a:spcPct val="20000"/>
+              </a:spcBef>
+              <a:buChar char="•"/>
+              <a:defRPr sz="2400">
+                <a:solidFill>
+                  <a:schemeClr val="tx1"/>
+                </a:solidFill>
+                <a:latin typeface="Arial" panose="020B0604020202020204" pitchFamily="34" charset="0"/>
+              </a:defRPr>
+            </a:lvl3pPr>
+            <a:lvl4pPr marL="1600200" indent="-228600">
+              <a:spcBef>
+                <a:spcPct val="20000"/>
+              </a:spcBef>
+              <a:buChar char="–"/>
+              <a:defRPr sz="2000">
+                <a:solidFill>
+                  <a:schemeClr val="tx1"/>
+                </a:solidFill>
+                <a:latin typeface="Arial" panose="020B0604020202020204" pitchFamily="34" charset="0"/>
+              </a:defRPr>
+            </a:lvl4pPr>
+            <a:lvl5pPr marL="2057400" indent="-228600">
+              <a:spcBef>
+                <a:spcPct val="20000"/>
+              </a:spcBef>
+              <a:buChar char="»"/>
+              <a:defRPr sz="2000">
+                <a:solidFill>
+                  <a:schemeClr val="tx1"/>
+                </a:solidFill>
+                <a:latin typeface="Arial" panose="020B0604020202020204" pitchFamily="34" charset="0"/>
+              </a:defRPr>
+            </a:lvl5pPr>
+            <a:lvl6pPr marL="2514600" indent="-228600" eaLnBrk="0" fontAlgn="base" hangingPunct="0">
+              <a:spcBef>
+                <a:spcPct val="20000"/>
+              </a:spcBef>
+              <a:spcAft>
+                <a:spcPct val="0"/>
+              </a:spcAft>
+              <a:buChar char="»"/>
+              <a:defRPr sz="2000">
+                <a:solidFill>
+                  <a:schemeClr val="tx1"/>
+                </a:solidFill>
+                <a:latin typeface="Arial" panose="020B0604020202020204" pitchFamily="34" charset="0"/>
+              </a:defRPr>
+            </a:lvl6pPr>
+            <a:lvl7pPr marL="2971800" indent="-228600" eaLnBrk="0" fontAlgn="base" hangingPunct="0">
+              <a:spcBef>
+                <a:spcPct val="20000"/>
+              </a:spcBef>
+              <a:spcAft>
+                <a:spcPct val="0"/>
+              </a:spcAft>
+              <a:buChar char="»"/>
+              <a:defRPr sz="2000">
+                <a:solidFill>
+                  <a:schemeClr val="tx1"/>
+                </a:solidFill>
+                <a:latin typeface="Arial" panose="020B0604020202020204" pitchFamily="34" charset="0"/>
+              </a:defRPr>
+            </a:lvl7pPr>
+            <a:lvl8pPr marL="3429000" indent="-228600" eaLnBrk="0" fontAlgn="base" hangingPunct="0">
+              <a:spcBef>
+                <a:spcPct val="20000"/>
+              </a:spcBef>
+              <a:spcAft>
+                <a:spcPct val="0"/>
+              </a:spcAft>
+              <a:buChar char="»"/>
+              <a:defRPr sz="2000">
+                <a:solidFill>
+                  <a:schemeClr val="tx1"/>
+                </a:solidFill>
+                <a:latin typeface="Arial" panose="020B0604020202020204" pitchFamily="34" charset="0"/>
+              </a:defRPr>
+            </a:lvl8pPr>
+            <a:lvl9pPr marL="3886200" indent="-228600" eaLnBrk="0" fontAlgn="base" hangingPunct="0">
+              <a:spcBef>
+                <a:spcPct val="20000"/>
+              </a:spcBef>
+              <a:spcAft>
+                <a:spcPct val="0"/>
+              </a:spcAft>
+              <a:buChar char="»"/>
+              <a:defRPr sz="2000">
+                <a:solidFill>
+                  <a:schemeClr val="tx1"/>
+                </a:solidFill>
+                <a:latin typeface="Arial" panose="020B0604020202020204" pitchFamily="34" charset="0"/>
+              </a:defRPr>
+            </a:lvl9pPr>
+          </a:lstStyle>
+          <a:p>
+            <a:pPr algn="ctr" eaLnBrk="1" hangingPunct="1">
+              <a:spcBef>
+                <a:spcPct val="0"/>
+              </a:spcBef>
+              <a:buFontTx/>
+              <a:buNone/>
+            </a:pPr>
+            <a:r>
+              <a:rPr lang="en-US" altLang="es-ES" sz="2400" b="1" dirty="0" smtClean="0">
+                <a:solidFill>
+                  <a:schemeClr val="tx2"/>
+                </a:solidFill>
+              </a:rPr>
+              <a:t>ERS. </a:t>
+            </a:r>
+            <a:r>
+              <a:rPr lang="en-US" altLang="es-ES" sz="2400" b="1" dirty="0" err="1" smtClean="0">
+                <a:solidFill>
+                  <a:schemeClr val="tx2"/>
+                </a:solidFill>
+              </a:rPr>
+              <a:t>Prototipo</a:t>
+            </a:r>
+            <a:r>
+              <a:rPr lang="en-US" altLang="es-ES" sz="2400" b="1" dirty="0" smtClean="0">
+                <a:solidFill>
+                  <a:schemeClr val="tx2"/>
+                </a:solidFill>
+              </a:rPr>
+              <a:t> de </a:t>
+            </a:r>
+            <a:r>
+              <a:rPr lang="en-US" altLang="es-ES" sz="2400" b="1" dirty="0" err="1" smtClean="0">
+                <a:solidFill>
+                  <a:schemeClr val="tx2"/>
+                </a:solidFill>
+              </a:rPr>
+              <a:t>Interfaz</a:t>
+            </a:r>
+            <a:r>
+              <a:rPr lang="en-US" altLang="es-ES" sz="2400" b="1" dirty="0" smtClean="0">
+                <a:solidFill>
+                  <a:schemeClr val="tx2"/>
+                </a:solidFill>
+              </a:rPr>
+              <a:t> de </a:t>
+            </a:r>
+            <a:r>
+              <a:rPr lang="en-US" altLang="es-ES" sz="2400" b="1" dirty="0" err="1" smtClean="0">
+                <a:solidFill>
+                  <a:schemeClr val="tx2"/>
+                </a:solidFill>
+              </a:rPr>
+              <a:t>Usuario</a:t>
+            </a:r>
+            <a:r>
+              <a:rPr lang="en-US" altLang="es-ES" sz="2400" b="1" dirty="0" smtClean="0">
+                <a:solidFill>
+                  <a:schemeClr val="tx2"/>
+                </a:solidFill>
+              </a:rPr>
+              <a:t>.</a:t>
+            </a:r>
+            <a:endParaRPr lang="en-US" altLang="es-ES" sz="2400" b="1" dirty="0">
+              <a:solidFill>
+                <a:schemeClr val="tx2"/>
+              </a:solidFill>
+            </a:endParaRPr>
+          </a:p>
+        </p:txBody>
+      </p:sp>
+      <p:pic>
+        <p:nvPicPr>
+          <p:cNvPr id="2" name="Imagen 1"/>
+          <p:cNvPicPr>
+            <a:picLocks noChangeAspect="1"/>
+          </p:cNvPicPr>
+          <p:nvPr/>
+        </p:nvPicPr>
+        <p:blipFill>
+          <a:blip r:embed="rId3">
+            <a:extLst>
+              <a:ext uri="{28A0092B-C50C-407E-A947-70E740481C1C}">
+                <a14:useLocalDpi xmlns:a14="http://schemas.microsoft.com/office/drawing/2010/main" val="0"/>
+              </a:ext>
+            </a:extLst>
+          </a:blip>
+          <a:stretch>
+            <a:fillRect/>
+          </a:stretch>
+        </p:blipFill>
+        <p:spPr>
+          <a:xfrm>
+            <a:off x="762000" y="738336"/>
+            <a:ext cx="7620000" cy="5715000"/>
+          </a:xfrm>
+          <a:prstGeom prst="rect">
+            <a:avLst/>
+          </a:prstGeom>
+        </p:spPr>
+      </p:pic>
+    </p:spTree>
+    <p:extLst>
+      <p:ext uri="{BB962C8B-B14F-4D97-AF65-F5344CB8AC3E}">
         <p14:creationId xmlns:p14="http://schemas.microsoft.com/office/powerpoint/2010/main" val="1575046325"/>
       </p:ext>
     </p:extLst>
@@ -11072,7 +11844,7 @@
 </p:sld>
 </file>
 
-<file path=ppt/slides/slide15.xml><?xml version="1.0" encoding="utf-8"?>
+<file path=ppt/slides/slide17.xml><?xml version="1.0" encoding="utf-8"?>
 <p:sld xmlns:a="http://schemas.openxmlformats.org/drawingml/2006/main" xmlns:r="http://schemas.openxmlformats.org/officeDocument/2006/relationships" xmlns:p="http://schemas.openxmlformats.org/presentationml/2006/main">
   <p:cSld>
     <p:spTree>
@@ -11391,7 +12163,7 @@
 </p:sld>
 </file>
 
-<file path=ppt/slides/slide16.xml><?xml version="1.0" encoding="utf-8"?>
+<file path=ppt/slides/slide18.xml><?xml version="1.0" encoding="utf-8"?>
 <p:sld xmlns:a="http://schemas.openxmlformats.org/drawingml/2006/main" xmlns:r="http://schemas.openxmlformats.org/officeDocument/2006/relationships" xmlns:p="http://schemas.openxmlformats.org/presentationml/2006/main">
   <p:cSld>
     <p:spTree>
@@ -11710,7 +12482,7 @@
 </p:sld>
 </file>
 
-<file path=ppt/slides/slide17.xml><?xml version="1.0" encoding="utf-8"?>
+<file path=ppt/slides/slide19.xml><?xml version="1.0" encoding="utf-8"?>
 <p:sld xmlns:a="http://schemas.openxmlformats.org/drawingml/2006/main" xmlns:r="http://schemas.openxmlformats.org/officeDocument/2006/relationships" xmlns:p="http://schemas.openxmlformats.org/presentationml/2006/main">
   <p:cSld>
     <p:spTree>
@@ -12013,644 +12785,6 @@
     <p:extLst>
       <p:ext uri="{BB962C8B-B14F-4D97-AF65-F5344CB8AC3E}">
         <p14:creationId xmlns:p14="http://schemas.microsoft.com/office/powerpoint/2010/main" val="331935773"/>
-      </p:ext>
-    </p:extLst>
-  </p:cSld>
-  <p:clrMapOvr>
-    <a:masterClrMapping/>
-  </p:clrMapOvr>
-  <p:timing>
-    <p:tnLst>
-      <p:par>
-        <p:cTn id="1" dur="indefinite" restart="never" nodeType="tmRoot"/>
-      </p:par>
-    </p:tnLst>
-  </p:timing>
-</p:sld>
-</file>
-
-<file path=ppt/slides/slide18.xml><?xml version="1.0" encoding="utf-8"?>
-<p:sld xmlns:a="http://schemas.openxmlformats.org/drawingml/2006/main" xmlns:r="http://schemas.openxmlformats.org/officeDocument/2006/relationships" xmlns:p="http://schemas.openxmlformats.org/presentationml/2006/main">
-  <p:cSld>
-    <p:spTree>
-      <p:nvGrpSpPr>
-        <p:cNvPr id="1" name=""/>
-        <p:cNvGrpSpPr/>
-        <p:nvPr/>
-      </p:nvGrpSpPr>
-      <p:grpSpPr>
-        <a:xfrm>
-          <a:off x="0" y="0"/>
-          <a:ext cx="0" cy="0"/>
-          <a:chOff x="0" y="0"/>
-          <a:chExt cx="0" cy="0"/>
-        </a:xfrm>
-      </p:grpSpPr>
-      <p:pic>
-        <p:nvPicPr>
-          <p:cNvPr id="3" name="Imagen 2"/>
-          <p:cNvPicPr>
-            <a:picLocks noChangeAspect="1"/>
-          </p:cNvPicPr>
-          <p:nvPr/>
-        </p:nvPicPr>
-        <p:blipFill>
-          <a:blip r:embed="rId3">
-            <a:extLst>
-              <a:ext uri="{28A0092B-C50C-407E-A947-70E740481C1C}">
-                <a14:useLocalDpi xmlns:a14="http://schemas.microsoft.com/office/drawing/2010/main" val="0"/>
-              </a:ext>
-            </a:extLst>
-          </a:blip>
-          <a:stretch>
-            <a:fillRect/>
-          </a:stretch>
-        </p:blipFill>
-        <p:spPr>
-          <a:xfrm>
-            <a:off x="762000" y="764704"/>
-            <a:ext cx="7620000" cy="5715000"/>
-          </a:xfrm>
-          <a:prstGeom prst="rect">
-            <a:avLst/>
-          </a:prstGeom>
-        </p:spPr>
-      </p:pic>
-      <p:sp>
-        <p:nvSpPr>
-          <p:cNvPr id="5" name="Rectangle 14">
-            <a:extLst>
-              <a:ext uri="{FF2B5EF4-FFF2-40B4-BE49-F238E27FC236}">
-                <a16:creationId xmlns:a16="http://schemas.microsoft.com/office/drawing/2014/main" xmlns="" id="{3665E0D4-68DF-7A4B-92E0-B652D965824C}"/>
-              </a:ext>
-            </a:extLst>
-          </p:cNvPr>
-          <p:cNvSpPr>
-            <a:spLocks noChangeArrowheads="1"/>
-          </p:cNvSpPr>
-          <p:nvPr/>
-        </p:nvSpPr>
-        <p:spPr bwMode="auto">
-          <a:xfrm>
-            <a:off x="2627313" y="198438"/>
-            <a:ext cx="5400675" cy="566737"/>
-          </a:xfrm>
-          <a:prstGeom prst="rect">
-            <a:avLst/>
-          </a:prstGeom>
-          <a:noFill/>
-          <a:ln>
-            <a:noFill/>
-          </a:ln>
-          <a:effectLst/>
-          <a:extLst>
-            <a:ext uri="{909E8E84-426E-40DD-AFC4-6F175D3DCCD1}">
-              <a14:hiddenFill xmlns:a14="http://schemas.microsoft.com/office/drawing/2010/main">
-                <a:solidFill>
-                  <a:schemeClr val="bg1"/>
-                </a:solidFill>
-              </a14:hiddenFill>
-            </a:ext>
-            <a:ext uri="{91240B29-F687-4F45-9708-019B960494DF}">
-              <a14:hiddenLine xmlns:a14="http://schemas.microsoft.com/office/drawing/2010/main" w="12700">
-                <a:solidFill>
-                  <a:schemeClr val="tx1"/>
-                </a:solidFill>
-                <a:miter lim="800000"/>
-                <a:headEnd/>
-                <a:tailEnd/>
-              </a14:hiddenLine>
-            </a:ext>
-            <a:ext uri="{AF507438-7753-43E0-B8FC-AC1667EBCBE1}">
-              <a14:hiddenEffects xmlns:a14="http://schemas.microsoft.com/office/drawing/2010/main">
-                <a:effectLst>
-                  <a:outerShdw dist="107763" dir="2700000" algn="ctr" rotWithShape="0">
-                    <a:srgbClr val="DBFFB8"/>
-                  </a:outerShdw>
-                </a:effectLst>
-              </a14:hiddenEffects>
-            </a:ext>
-          </a:extLst>
-        </p:spPr>
-        <p:txBody>
-          <a:bodyPr wrap="none" lIns="45720" tIns="44450" rIns="45720" bIns="44450" anchor="ctr"/>
-          <a:lstStyle>
-            <a:lvl1pPr>
-              <a:spcBef>
-                <a:spcPct val="20000"/>
-              </a:spcBef>
-              <a:buChar char="•"/>
-              <a:defRPr sz="3200">
-                <a:solidFill>
-                  <a:schemeClr val="tx1"/>
-                </a:solidFill>
-                <a:latin typeface="Arial" panose="020B0604020202020204" pitchFamily="34" charset="0"/>
-              </a:defRPr>
-            </a:lvl1pPr>
-            <a:lvl2pPr marL="742950" indent="-285750">
-              <a:spcBef>
-                <a:spcPct val="20000"/>
-              </a:spcBef>
-              <a:buChar char="–"/>
-              <a:defRPr sz="2800">
-                <a:solidFill>
-                  <a:schemeClr val="tx1"/>
-                </a:solidFill>
-                <a:latin typeface="Arial" panose="020B0604020202020204" pitchFamily="34" charset="0"/>
-              </a:defRPr>
-            </a:lvl2pPr>
-            <a:lvl3pPr marL="1143000" indent="-228600">
-              <a:spcBef>
-                <a:spcPct val="20000"/>
-              </a:spcBef>
-              <a:buChar char="•"/>
-              <a:defRPr sz="2400">
-                <a:solidFill>
-                  <a:schemeClr val="tx1"/>
-                </a:solidFill>
-                <a:latin typeface="Arial" panose="020B0604020202020204" pitchFamily="34" charset="0"/>
-              </a:defRPr>
-            </a:lvl3pPr>
-            <a:lvl4pPr marL="1600200" indent="-228600">
-              <a:spcBef>
-                <a:spcPct val="20000"/>
-              </a:spcBef>
-              <a:buChar char="–"/>
-              <a:defRPr sz="2000">
-                <a:solidFill>
-                  <a:schemeClr val="tx1"/>
-                </a:solidFill>
-                <a:latin typeface="Arial" panose="020B0604020202020204" pitchFamily="34" charset="0"/>
-              </a:defRPr>
-            </a:lvl4pPr>
-            <a:lvl5pPr marL="2057400" indent="-228600">
-              <a:spcBef>
-                <a:spcPct val="20000"/>
-              </a:spcBef>
-              <a:buChar char="»"/>
-              <a:defRPr sz="2000">
-                <a:solidFill>
-                  <a:schemeClr val="tx1"/>
-                </a:solidFill>
-                <a:latin typeface="Arial" panose="020B0604020202020204" pitchFamily="34" charset="0"/>
-              </a:defRPr>
-            </a:lvl5pPr>
-            <a:lvl6pPr marL="2514600" indent="-228600" eaLnBrk="0" fontAlgn="base" hangingPunct="0">
-              <a:spcBef>
-                <a:spcPct val="20000"/>
-              </a:spcBef>
-              <a:spcAft>
-                <a:spcPct val="0"/>
-              </a:spcAft>
-              <a:buChar char="»"/>
-              <a:defRPr sz="2000">
-                <a:solidFill>
-                  <a:schemeClr val="tx1"/>
-                </a:solidFill>
-                <a:latin typeface="Arial" panose="020B0604020202020204" pitchFamily="34" charset="0"/>
-              </a:defRPr>
-            </a:lvl6pPr>
-            <a:lvl7pPr marL="2971800" indent="-228600" eaLnBrk="0" fontAlgn="base" hangingPunct="0">
-              <a:spcBef>
-                <a:spcPct val="20000"/>
-              </a:spcBef>
-              <a:spcAft>
-                <a:spcPct val="0"/>
-              </a:spcAft>
-              <a:buChar char="»"/>
-              <a:defRPr sz="2000">
-                <a:solidFill>
-                  <a:schemeClr val="tx1"/>
-                </a:solidFill>
-                <a:latin typeface="Arial" panose="020B0604020202020204" pitchFamily="34" charset="0"/>
-              </a:defRPr>
-            </a:lvl7pPr>
-            <a:lvl8pPr marL="3429000" indent="-228600" eaLnBrk="0" fontAlgn="base" hangingPunct="0">
-              <a:spcBef>
-                <a:spcPct val="20000"/>
-              </a:spcBef>
-              <a:spcAft>
-                <a:spcPct val="0"/>
-              </a:spcAft>
-              <a:buChar char="»"/>
-              <a:defRPr sz="2000">
-                <a:solidFill>
-                  <a:schemeClr val="tx1"/>
-                </a:solidFill>
-                <a:latin typeface="Arial" panose="020B0604020202020204" pitchFamily="34" charset="0"/>
-              </a:defRPr>
-            </a:lvl8pPr>
-            <a:lvl9pPr marL="3886200" indent="-228600" eaLnBrk="0" fontAlgn="base" hangingPunct="0">
-              <a:spcBef>
-                <a:spcPct val="20000"/>
-              </a:spcBef>
-              <a:spcAft>
-                <a:spcPct val="0"/>
-              </a:spcAft>
-              <a:buChar char="»"/>
-              <a:defRPr sz="2000">
-                <a:solidFill>
-                  <a:schemeClr val="tx1"/>
-                </a:solidFill>
-                <a:latin typeface="Arial" panose="020B0604020202020204" pitchFamily="34" charset="0"/>
-              </a:defRPr>
-            </a:lvl9pPr>
-          </a:lstStyle>
-          <a:p>
-            <a:pPr algn="ctr" eaLnBrk="1" hangingPunct="1">
-              <a:spcBef>
-                <a:spcPct val="0"/>
-              </a:spcBef>
-              <a:buFontTx/>
-              <a:buNone/>
-            </a:pPr>
-            <a:r>
-              <a:rPr lang="en-US" altLang="es-ES" sz="2400" b="1" dirty="0" smtClean="0">
-                <a:solidFill>
-                  <a:schemeClr val="tx2"/>
-                </a:solidFill>
-              </a:rPr>
-              <a:t>ERS. </a:t>
-            </a:r>
-            <a:r>
-              <a:rPr lang="en-US" altLang="es-ES" sz="2400" b="1" dirty="0" err="1" smtClean="0">
-                <a:solidFill>
-                  <a:schemeClr val="tx2"/>
-                </a:solidFill>
-              </a:rPr>
-              <a:t>Prototipo</a:t>
-            </a:r>
-            <a:r>
-              <a:rPr lang="en-US" altLang="es-ES" sz="2400" b="1" dirty="0" smtClean="0">
-                <a:solidFill>
-                  <a:schemeClr val="tx2"/>
-                </a:solidFill>
-              </a:rPr>
-              <a:t> de </a:t>
-            </a:r>
-            <a:r>
-              <a:rPr lang="en-US" altLang="es-ES" sz="2400" b="1" dirty="0" err="1" smtClean="0">
-                <a:solidFill>
-                  <a:schemeClr val="tx2"/>
-                </a:solidFill>
-              </a:rPr>
-              <a:t>Interfaz</a:t>
-            </a:r>
-            <a:r>
-              <a:rPr lang="en-US" altLang="es-ES" sz="2400" b="1" dirty="0" smtClean="0">
-                <a:solidFill>
-                  <a:schemeClr val="tx2"/>
-                </a:solidFill>
-              </a:rPr>
-              <a:t> de </a:t>
-            </a:r>
-            <a:r>
-              <a:rPr lang="en-US" altLang="es-ES" sz="2400" b="1" dirty="0" err="1" smtClean="0">
-                <a:solidFill>
-                  <a:schemeClr val="tx2"/>
-                </a:solidFill>
-              </a:rPr>
-              <a:t>Usuario</a:t>
-            </a:r>
-            <a:r>
-              <a:rPr lang="en-US" altLang="es-ES" sz="2400" b="1" dirty="0" smtClean="0">
-                <a:solidFill>
-                  <a:schemeClr val="tx2"/>
-                </a:solidFill>
-              </a:rPr>
-              <a:t>.</a:t>
-            </a:r>
-            <a:endParaRPr lang="en-US" altLang="es-ES" sz="2400" b="1" dirty="0">
-              <a:solidFill>
-                <a:schemeClr val="tx2"/>
-              </a:solidFill>
-            </a:endParaRPr>
-          </a:p>
-        </p:txBody>
-      </p:sp>
-    </p:spTree>
-    <p:extLst>
-      <p:ext uri="{BB962C8B-B14F-4D97-AF65-F5344CB8AC3E}">
-        <p14:creationId xmlns:p14="http://schemas.microsoft.com/office/powerpoint/2010/main" val="4215215818"/>
-      </p:ext>
-    </p:extLst>
-  </p:cSld>
-  <p:clrMapOvr>
-    <a:masterClrMapping/>
-  </p:clrMapOvr>
-  <p:timing>
-    <p:tnLst>
-      <p:par>
-        <p:cTn id="1" dur="indefinite" restart="never" nodeType="tmRoot"/>
-      </p:par>
-    </p:tnLst>
-  </p:timing>
-</p:sld>
-</file>
-
-<file path=ppt/slides/slide19.xml><?xml version="1.0" encoding="utf-8"?>
-<p:sld xmlns:a="http://schemas.openxmlformats.org/drawingml/2006/main" xmlns:r="http://schemas.openxmlformats.org/officeDocument/2006/relationships" xmlns:p="http://schemas.openxmlformats.org/presentationml/2006/main">
-  <p:cSld>
-    <p:spTree>
-      <p:nvGrpSpPr>
-        <p:cNvPr id="1" name=""/>
-        <p:cNvGrpSpPr/>
-        <p:nvPr/>
-      </p:nvGrpSpPr>
-      <p:grpSpPr>
-        <a:xfrm>
-          <a:off x="0" y="0"/>
-          <a:ext cx="0" cy="0"/>
-          <a:chOff x="0" y="0"/>
-          <a:chExt cx="0" cy="0"/>
-        </a:xfrm>
-      </p:grpSpPr>
-      <p:sp>
-        <p:nvSpPr>
-          <p:cNvPr id="5" name="Rectangle 14">
-            <a:extLst>
-              <a:ext uri="{FF2B5EF4-FFF2-40B4-BE49-F238E27FC236}">
-                <a16:creationId xmlns:a16="http://schemas.microsoft.com/office/drawing/2014/main" xmlns="" id="{3665E0D4-68DF-7A4B-92E0-B652D965824C}"/>
-              </a:ext>
-            </a:extLst>
-          </p:cNvPr>
-          <p:cNvSpPr>
-            <a:spLocks noChangeArrowheads="1"/>
-          </p:cNvSpPr>
-          <p:nvPr/>
-        </p:nvSpPr>
-        <p:spPr bwMode="auto">
-          <a:xfrm>
-            <a:off x="2627313" y="198438"/>
-            <a:ext cx="5400675" cy="566737"/>
-          </a:xfrm>
-          <a:prstGeom prst="rect">
-            <a:avLst/>
-          </a:prstGeom>
-          <a:noFill/>
-          <a:ln>
-            <a:noFill/>
-          </a:ln>
-          <a:effectLst/>
-          <a:extLst>
-            <a:ext uri="{909E8E84-426E-40DD-AFC4-6F175D3DCCD1}">
-              <a14:hiddenFill xmlns:a14="http://schemas.microsoft.com/office/drawing/2010/main">
-                <a:solidFill>
-                  <a:schemeClr val="bg1"/>
-                </a:solidFill>
-              </a14:hiddenFill>
-            </a:ext>
-            <a:ext uri="{91240B29-F687-4F45-9708-019B960494DF}">
-              <a14:hiddenLine xmlns:a14="http://schemas.microsoft.com/office/drawing/2010/main" w="12700">
-                <a:solidFill>
-                  <a:schemeClr val="tx1"/>
-                </a:solidFill>
-                <a:miter lim="800000"/>
-                <a:headEnd/>
-                <a:tailEnd/>
-              </a14:hiddenLine>
-            </a:ext>
-            <a:ext uri="{AF507438-7753-43E0-B8FC-AC1667EBCBE1}">
-              <a14:hiddenEffects xmlns:a14="http://schemas.microsoft.com/office/drawing/2010/main">
-                <a:effectLst>
-                  <a:outerShdw dist="107763" dir="2700000" algn="ctr" rotWithShape="0">
-                    <a:srgbClr val="DBFFB8"/>
-                  </a:outerShdw>
-                </a:effectLst>
-              </a14:hiddenEffects>
-            </a:ext>
-          </a:extLst>
-        </p:spPr>
-        <p:txBody>
-          <a:bodyPr wrap="none" lIns="45720" tIns="44450" rIns="45720" bIns="44450" anchor="ctr"/>
-          <a:lstStyle>
-            <a:lvl1pPr>
-              <a:spcBef>
-                <a:spcPct val="20000"/>
-              </a:spcBef>
-              <a:buChar char="•"/>
-              <a:defRPr sz="3200">
-                <a:solidFill>
-                  <a:schemeClr val="tx1"/>
-                </a:solidFill>
-                <a:latin typeface="Arial" panose="020B0604020202020204" pitchFamily="34" charset="0"/>
-              </a:defRPr>
-            </a:lvl1pPr>
-            <a:lvl2pPr marL="742950" indent="-285750">
-              <a:spcBef>
-                <a:spcPct val="20000"/>
-              </a:spcBef>
-              <a:buChar char="–"/>
-              <a:defRPr sz="2800">
-                <a:solidFill>
-                  <a:schemeClr val="tx1"/>
-                </a:solidFill>
-                <a:latin typeface="Arial" panose="020B0604020202020204" pitchFamily="34" charset="0"/>
-              </a:defRPr>
-            </a:lvl2pPr>
-            <a:lvl3pPr marL="1143000" indent="-228600">
-              <a:spcBef>
-                <a:spcPct val="20000"/>
-              </a:spcBef>
-              <a:buChar char="•"/>
-              <a:defRPr sz="2400">
-                <a:solidFill>
-                  <a:schemeClr val="tx1"/>
-                </a:solidFill>
-                <a:latin typeface="Arial" panose="020B0604020202020204" pitchFamily="34" charset="0"/>
-              </a:defRPr>
-            </a:lvl3pPr>
-            <a:lvl4pPr marL="1600200" indent="-228600">
-              <a:spcBef>
-                <a:spcPct val="20000"/>
-              </a:spcBef>
-              <a:buChar char="–"/>
-              <a:defRPr sz="2000">
-                <a:solidFill>
-                  <a:schemeClr val="tx1"/>
-                </a:solidFill>
-                <a:latin typeface="Arial" panose="020B0604020202020204" pitchFamily="34" charset="0"/>
-              </a:defRPr>
-            </a:lvl4pPr>
-            <a:lvl5pPr marL="2057400" indent="-228600">
-              <a:spcBef>
-                <a:spcPct val="20000"/>
-              </a:spcBef>
-              <a:buChar char="»"/>
-              <a:defRPr sz="2000">
-                <a:solidFill>
-                  <a:schemeClr val="tx1"/>
-                </a:solidFill>
-                <a:latin typeface="Arial" panose="020B0604020202020204" pitchFamily="34" charset="0"/>
-              </a:defRPr>
-            </a:lvl5pPr>
-            <a:lvl6pPr marL="2514600" indent="-228600" eaLnBrk="0" fontAlgn="base" hangingPunct="0">
-              <a:spcBef>
-                <a:spcPct val="20000"/>
-              </a:spcBef>
-              <a:spcAft>
-                <a:spcPct val="0"/>
-              </a:spcAft>
-              <a:buChar char="»"/>
-              <a:defRPr sz="2000">
-                <a:solidFill>
-                  <a:schemeClr val="tx1"/>
-                </a:solidFill>
-                <a:latin typeface="Arial" panose="020B0604020202020204" pitchFamily="34" charset="0"/>
-              </a:defRPr>
-            </a:lvl6pPr>
-            <a:lvl7pPr marL="2971800" indent="-228600" eaLnBrk="0" fontAlgn="base" hangingPunct="0">
-              <a:spcBef>
-                <a:spcPct val="20000"/>
-              </a:spcBef>
-              <a:spcAft>
-                <a:spcPct val="0"/>
-              </a:spcAft>
-              <a:buChar char="»"/>
-              <a:defRPr sz="2000">
-                <a:solidFill>
-                  <a:schemeClr val="tx1"/>
-                </a:solidFill>
-                <a:latin typeface="Arial" panose="020B0604020202020204" pitchFamily="34" charset="0"/>
-              </a:defRPr>
-            </a:lvl7pPr>
-            <a:lvl8pPr marL="3429000" indent="-228600" eaLnBrk="0" fontAlgn="base" hangingPunct="0">
-              <a:spcBef>
-                <a:spcPct val="20000"/>
-              </a:spcBef>
-              <a:spcAft>
-                <a:spcPct val="0"/>
-              </a:spcAft>
-              <a:buChar char="»"/>
-              <a:defRPr sz="2000">
-                <a:solidFill>
-                  <a:schemeClr val="tx1"/>
-                </a:solidFill>
-                <a:latin typeface="Arial" panose="020B0604020202020204" pitchFamily="34" charset="0"/>
-              </a:defRPr>
-            </a:lvl8pPr>
-            <a:lvl9pPr marL="3886200" indent="-228600" eaLnBrk="0" fontAlgn="base" hangingPunct="0">
-              <a:spcBef>
-                <a:spcPct val="20000"/>
-              </a:spcBef>
-              <a:spcAft>
-                <a:spcPct val="0"/>
-              </a:spcAft>
-              <a:buChar char="»"/>
-              <a:defRPr sz="2000">
-                <a:solidFill>
-                  <a:schemeClr val="tx1"/>
-                </a:solidFill>
-                <a:latin typeface="Arial" panose="020B0604020202020204" pitchFamily="34" charset="0"/>
-              </a:defRPr>
-            </a:lvl9pPr>
-          </a:lstStyle>
-          <a:p>
-            <a:pPr algn="ctr" eaLnBrk="1" hangingPunct="1">
-              <a:spcBef>
-                <a:spcPct val="0"/>
-              </a:spcBef>
-              <a:buFontTx/>
-              <a:buNone/>
-            </a:pPr>
-            <a:r>
-              <a:rPr lang="en-US" altLang="es-ES" sz="2400" b="1" dirty="0" smtClean="0">
-                <a:solidFill>
-                  <a:schemeClr val="tx2"/>
-                </a:solidFill>
-              </a:rPr>
-              <a:t>ERS. </a:t>
-            </a:r>
-            <a:r>
-              <a:rPr lang="en-US" altLang="es-ES" sz="2400" b="1" dirty="0" err="1" smtClean="0">
-                <a:solidFill>
-                  <a:schemeClr val="tx2"/>
-                </a:solidFill>
-              </a:rPr>
-              <a:t>Prototipo</a:t>
-            </a:r>
-            <a:r>
-              <a:rPr lang="en-US" altLang="es-ES" sz="2400" b="1" dirty="0" smtClean="0">
-                <a:solidFill>
-                  <a:schemeClr val="tx2"/>
-                </a:solidFill>
-              </a:rPr>
-              <a:t> de </a:t>
-            </a:r>
-            <a:r>
-              <a:rPr lang="en-US" altLang="es-ES" sz="2400" b="1" dirty="0" err="1" smtClean="0">
-                <a:solidFill>
-                  <a:schemeClr val="tx2"/>
-                </a:solidFill>
-              </a:rPr>
-              <a:t>Interfaz</a:t>
-            </a:r>
-            <a:r>
-              <a:rPr lang="en-US" altLang="es-ES" sz="2400" b="1" dirty="0" smtClean="0">
-                <a:solidFill>
-                  <a:schemeClr val="tx2"/>
-                </a:solidFill>
-              </a:rPr>
-              <a:t> de </a:t>
-            </a:r>
-            <a:r>
-              <a:rPr lang="en-US" altLang="es-ES" sz="2400" b="1" dirty="0" err="1" smtClean="0">
-                <a:solidFill>
-                  <a:schemeClr val="tx2"/>
-                </a:solidFill>
-              </a:rPr>
-              <a:t>Usuario</a:t>
-            </a:r>
-            <a:r>
-              <a:rPr lang="en-US" altLang="es-ES" sz="2400" b="1" dirty="0" smtClean="0">
-                <a:solidFill>
-                  <a:schemeClr val="tx2"/>
-                </a:solidFill>
-              </a:rPr>
-              <a:t>.</a:t>
-            </a:r>
-            <a:endParaRPr lang="en-US" altLang="es-ES" sz="2400" b="1" dirty="0">
-              <a:solidFill>
-                <a:schemeClr val="tx2"/>
-              </a:solidFill>
-            </a:endParaRPr>
-          </a:p>
-        </p:txBody>
-      </p:sp>
-      <p:pic>
-        <p:nvPicPr>
-          <p:cNvPr id="2" name="Imagen 1"/>
-          <p:cNvPicPr>
-            <a:picLocks noChangeAspect="1"/>
-          </p:cNvPicPr>
-          <p:nvPr/>
-        </p:nvPicPr>
-        <p:blipFill>
-          <a:blip r:embed="rId3">
-            <a:extLst>
-              <a:ext uri="{28A0092B-C50C-407E-A947-70E740481C1C}">
-                <a14:useLocalDpi xmlns:a14="http://schemas.microsoft.com/office/drawing/2010/main" val="0"/>
-              </a:ext>
-            </a:extLst>
-          </a:blip>
-          <a:stretch>
-            <a:fillRect/>
-          </a:stretch>
-        </p:blipFill>
-        <p:spPr>
-          <a:xfrm>
-            <a:off x="762000" y="738336"/>
-            <a:ext cx="7620000" cy="5715000"/>
-          </a:xfrm>
-          <a:prstGeom prst="rect">
-            <a:avLst/>
-          </a:prstGeom>
-        </p:spPr>
-      </p:pic>
-    </p:spTree>
-    <p:extLst>
-      <p:ext uri="{BB962C8B-B14F-4D97-AF65-F5344CB8AC3E}">
-        <p14:creationId xmlns:p14="http://schemas.microsoft.com/office/powerpoint/2010/main" val="3711488642"/>
       </p:ext>
     </p:extLst>
   </p:cSld>
@@ -14098,6 +14232,644 @@
           <a:chExt cx="0" cy="0"/>
         </a:xfrm>
       </p:grpSpPr>
+      <p:pic>
+        <p:nvPicPr>
+          <p:cNvPr id="3" name="Imagen 2"/>
+          <p:cNvPicPr>
+            <a:picLocks noChangeAspect="1"/>
+          </p:cNvPicPr>
+          <p:nvPr/>
+        </p:nvPicPr>
+        <p:blipFill>
+          <a:blip r:embed="rId3">
+            <a:extLst>
+              <a:ext uri="{28A0092B-C50C-407E-A947-70E740481C1C}">
+                <a14:useLocalDpi xmlns:a14="http://schemas.microsoft.com/office/drawing/2010/main" val="0"/>
+              </a:ext>
+            </a:extLst>
+          </a:blip>
+          <a:stretch>
+            <a:fillRect/>
+          </a:stretch>
+        </p:blipFill>
+        <p:spPr>
+          <a:xfrm>
+            <a:off x="762000" y="764704"/>
+            <a:ext cx="7620000" cy="5715000"/>
+          </a:xfrm>
+          <a:prstGeom prst="rect">
+            <a:avLst/>
+          </a:prstGeom>
+        </p:spPr>
+      </p:pic>
+      <p:sp>
+        <p:nvSpPr>
+          <p:cNvPr id="5" name="Rectangle 14">
+            <a:extLst>
+              <a:ext uri="{FF2B5EF4-FFF2-40B4-BE49-F238E27FC236}">
+                <a16:creationId xmlns:a16="http://schemas.microsoft.com/office/drawing/2014/main" xmlns="" id="{3665E0D4-68DF-7A4B-92E0-B652D965824C}"/>
+              </a:ext>
+            </a:extLst>
+          </p:cNvPr>
+          <p:cNvSpPr>
+            <a:spLocks noChangeArrowheads="1"/>
+          </p:cNvSpPr>
+          <p:nvPr/>
+        </p:nvSpPr>
+        <p:spPr bwMode="auto">
+          <a:xfrm>
+            <a:off x="2627313" y="198438"/>
+            <a:ext cx="5400675" cy="566737"/>
+          </a:xfrm>
+          <a:prstGeom prst="rect">
+            <a:avLst/>
+          </a:prstGeom>
+          <a:noFill/>
+          <a:ln>
+            <a:noFill/>
+          </a:ln>
+          <a:effectLst/>
+          <a:extLst>
+            <a:ext uri="{909E8E84-426E-40DD-AFC4-6F175D3DCCD1}">
+              <a14:hiddenFill xmlns:a14="http://schemas.microsoft.com/office/drawing/2010/main">
+                <a:solidFill>
+                  <a:schemeClr val="bg1"/>
+                </a:solidFill>
+              </a14:hiddenFill>
+            </a:ext>
+            <a:ext uri="{91240B29-F687-4F45-9708-019B960494DF}">
+              <a14:hiddenLine xmlns:a14="http://schemas.microsoft.com/office/drawing/2010/main" w="12700">
+                <a:solidFill>
+                  <a:schemeClr val="tx1"/>
+                </a:solidFill>
+                <a:miter lim="800000"/>
+                <a:headEnd/>
+                <a:tailEnd/>
+              </a14:hiddenLine>
+            </a:ext>
+            <a:ext uri="{AF507438-7753-43E0-B8FC-AC1667EBCBE1}">
+              <a14:hiddenEffects xmlns:a14="http://schemas.microsoft.com/office/drawing/2010/main">
+                <a:effectLst>
+                  <a:outerShdw dist="107763" dir="2700000" algn="ctr" rotWithShape="0">
+                    <a:srgbClr val="DBFFB8"/>
+                  </a:outerShdw>
+                </a:effectLst>
+              </a14:hiddenEffects>
+            </a:ext>
+          </a:extLst>
+        </p:spPr>
+        <p:txBody>
+          <a:bodyPr wrap="none" lIns="45720" tIns="44450" rIns="45720" bIns="44450" anchor="ctr"/>
+          <a:lstStyle>
+            <a:lvl1pPr>
+              <a:spcBef>
+                <a:spcPct val="20000"/>
+              </a:spcBef>
+              <a:buChar char="•"/>
+              <a:defRPr sz="3200">
+                <a:solidFill>
+                  <a:schemeClr val="tx1"/>
+                </a:solidFill>
+                <a:latin typeface="Arial" panose="020B0604020202020204" pitchFamily="34" charset="0"/>
+              </a:defRPr>
+            </a:lvl1pPr>
+            <a:lvl2pPr marL="742950" indent="-285750">
+              <a:spcBef>
+                <a:spcPct val="20000"/>
+              </a:spcBef>
+              <a:buChar char="–"/>
+              <a:defRPr sz="2800">
+                <a:solidFill>
+                  <a:schemeClr val="tx1"/>
+                </a:solidFill>
+                <a:latin typeface="Arial" panose="020B0604020202020204" pitchFamily="34" charset="0"/>
+              </a:defRPr>
+            </a:lvl2pPr>
+            <a:lvl3pPr marL="1143000" indent="-228600">
+              <a:spcBef>
+                <a:spcPct val="20000"/>
+              </a:spcBef>
+              <a:buChar char="•"/>
+              <a:defRPr sz="2400">
+                <a:solidFill>
+                  <a:schemeClr val="tx1"/>
+                </a:solidFill>
+                <a:latin typeface="Arial" panose="020B0604020202020204" pitchFamily="34" charset="0"/>
+              </a:defRPr>
+            </a:lvl3pPr>
+            <a:lvl4pPr marL="1600200" indent="-228600">
+              <a:spcBef>
+                <a:spcPct val="20000"/>
+              </a:spcBef>
+              <a:buChar char="–"/>
+              <a:defRPr sz="2000">
+                <a:solidFill>
+                  <a:schemeClr val="tx1"/>
+                </a:solidFill>
+                <a:latin typeface="Arial" panose="020B0604020202020204" pitchFamily="34" charset="0"/>
+              </a:defRPr>
+            </a:lvl4pPr>
+            <a:lvl5pPr marL="2057400" indent="-228600">
+              <a:spcBef>
+                <a:spcPct val="20000"/>
+              </a:spcBef>
+              <a:buChar char="»"/>
+              <a:defRPr sz="2000">
+                <a:solidFill>
+                  <a:schemeClr val="tx1"/>
+                </a:solidFill>
+                <a:latin typeface="Arial" panose="020B0604020202020204" pitchFamily="34" charset="0"/>
+              </a:defRPr>
+            </a:lvl5pPr>
+            <a:lvl6pPr marL="2514600" indent="-228600" eaLnBrk="0" fontAlgn="base" hangingPunct="0">
+              <a:spcBef>
+                <a:spcPct val="20000"/>
+              </a:spcBef>
+              <a:spcAft>
+                <a:spcPct val="0"/>
+              </a:spcAft>
+              <a:buChar char="»"/>
+              <a:defRPr sz="2000">
+                <a:solidFill>
+                  <a:schemeClr val="tx1"/>
+                </a:solidFill>
+                <a:latin typeface="Arial" panose="020B0604020202020204" pitchFamily="34" charset="0"/>
+              </a:defRPr>
+            </a:lvl6pPr>
+            <a:lvl7pPr marL="2971800" indent="-228600" eaLnBrk="0" fontAlgn="base" hangingPunct="0">
+              <a:spcBef>
+                <a:spcPct val="20000"/>
+              </a:spcBef>
+              <a:spcAft>
+                <a:spcPct val="0"/>
+              </a:spcAft>
+              <a:buChar char="»"/>
+              <a:defRPr sz="2000">
+                <a:solidFill>
+                  <a:schemeClr val="tx1"/>
+                </a:solidFill>
+                <a:latin typeface="Arial" panose="020B0604020202020204" pitchFamily="34" charset="0"/>
+              </a:defRPr>
+            </a:lvl7pPr>
+            <a:lvl8pPr marL="3429000" indent="-228600" eaLnBrk="0" fontAlgn="base" hangingPunct="0">
+              <a:spcBef>
+                <a:spcPct val="20000"/>
+              </a:spcBef>
+              <a:spcAft>
+                <a:spcPct val="0"/>
+              </a:spcAft>
+              <a:buChar char="»"/>
+              <a:defRPr sz="2000">
+                <a:solidFill>
+                  <a:schemeClr val="tx1"/>
+                </a:solidFill>
+                <a:latin typeface="Arial" panose="020B0604020202020204" pitchFamily="34" charset="0"/>
+              </a:defRPr>
+            </a:lvl8pPr>
+            <a:lvl9pPr marL="3886200" indent="-228600" eaLnBrk="0" fontAlgn="base" hangingPunct="0">
+              <a:spcBef>
+                <a:spcPct val="20000"/>
+              </a:spcBef>
+              <a:spcAft>
+                <a:spcPct val="0"/>
+              </a:spcAft>
+              <a:buChar char="»"/>
+              <a:defRPr sz="2000">
+                <a:solidFill>
+                  <a:schemeClr val="tx1"/>
+                </a:solidFill>
+                <a:latin typeface="Arial" panose="020B0604020202020204" pitchFamily="34" charset="0"/>
+              </a:defRPr>
+            </a:lvl9pPr>
+          </a:lstStyle>
+          <a:p>
+            <a:pPr algn="ctr" eaLnBrk="1" hangingPunct="1">
+              <a:spcBef>
+                <a:spcPct val="0"/>
+              </a:spcBef>
+              <a:buFontTx/>
+              <a:buNone/>
+            </a:pPr>
+            <a:r>
+              <a:rPr lang="en-US" altLang="es-ES" sz="2400" b="1" dirty="0" smtClean="0">
+                <a:solidFill>
+                  <a:schemeClr val="tx2"/>
+                </a:solidFill>
+              </a:rPr>
+              <a:t>ERS. </a:t>
+            </a:r>
+            <a:r>
+              <a:rPr lang="en-US" altLang="es-ES" sz="2400" b="1" dirty="0" err="1" smtClean="0">
+                <a:solidFill>
+                  <a:schemeClr val="tx2"/>
+                </a:solidFill>
+              </a:rPr>
+              <a:t>Prototipo</a:t>
+            </a:r>
+            <a:r>
+              <a:rPr lang="en-US" altLang="es-ES" sz="2400" b="1" dirty="0" smtClean="0">
+                <a:solidFill>
+                  <a:schemeClr val="tx2"/>
+                </a:solidFill>
+              </a:rPr>
+              <a:t> de </a:t>
+            </a:r>
+            <a:r>
+              <a:rPr lang="en-US" altLang="es-ES" sz="2400" b="1" dirty="0" err="1" smtClean="0">
+                <a:solidFill>
+                  <a:schemeClr val="tx2"/>
+                </a:solidFill>
+              </a:rPr>
+              <a:t>Interfaz</a:t>
+            </a:r>
+            <a:r>
+              <a:rPr lang="en-US" altLang="es-ES" sz="2400" b="1" dirty="0" smtClean="0">
+                <a:solidFill>
+                  <a:schemeClr val="tx2"/>
+                </a:solidFill>
+              </a:rPr>
+              <a:t> de </a:t>
+            </a:r>
+            <a:r>
+              <a:rPr lang="en-US" altLang="es-ES" sz="2400" b="1" dirty="0" err="1" smtClean="0">
+                <a:solidFill>
+                  <a:schemeClr val="tx2"/>
+                </a:solidFill>
+              </a:rPr>
+              <a:t>Usuario</a:t>
+            </a:r>
+            <a:r>
+              <a:rPr lang="en-US" altLang="es-ES" sz="2400" b="1" dirty="0" smtClean="0">
+                <a:solidFill>
+                  <a:schemeClr val="tx2"/>
+                </a:solidFill>
+              </a:rPr>
+              <a:t>.</a:t>
+            </a:r>
+            <a:endParaRPr lang="en-US" altLang="es-ES" sz="2400" b="1" dirty="0">
+              <a:solidFill>
+                <a:schemeClr val="tx2"/>
+              </a:solidFill>
+            </a:endParaRPr>
+          </a:p>
+        </p:txBody>
+      </p:sp>
+    </p:spTree>
+    <p:extLst>
+      <p:ext uri="{BB962C8B-B14F-4D97-AF65-F5344CB8AC3E}">
+        <p14:creationId xmlns:p14="http://schemas.microsoft.com/office/powerpoint/2010/main" val="4215215818"/>
+      </p:ext>
+    </p:extLst>
+  </p:cSld>
+  <p:clrMapOvr>
+    <a:masterClrMapping/>
+  </p:clrMapOvr>
+  <p:timing>
+    <p:tnLst>
+      <p:par>
+        <p:cTn id="1" dur="indefinite" restart="never" nodeType="tmRoot"/>
+      </p:par>
+    </p:tnLst>
+  </p:timing>
+</p:sld>
+</file>
+
+<file path=ppt/slides/slide21.xml><?xml version="1.0" encoding="utf-8"?>
+<p:sld xmlns:a="http://schemas.openxmlformats.org/drawingml/2006/main" xmlns:r="http://schemas.openxmlformats.org/officeDocument/2006/relationships" xmlns:p="http://schemas.openxmlformats.org/presentationml/2006/main">
+  <p:cSld>
+    <p:spTree>
+      <p:nvGrpSpPr>
+        <p:cNvPr id="1" name=""/>
+        <p:cNvGrpSpPr/>
+        <p:nvPr/>
+      </p:nvGrpSpPr>
+      <p:grpSpPr>
+        <a:xfrm>
+          <a:off x="0" y="0"/>
+          <a:ext cx="0" cy="0"/>
+          <a:chOff x="0" y="0"/>
+          <a:chExt cx="0" cy="0"/>
+        </a:xfrm>
+      </p:grpSpPr>
+      <p:sp>
+        <p:nvSpPr>
+          <p:cNvPr id="5" name="Rectangle 14">
+            <a:extLst>
+              <a:ext uri="{FF2B5EF4-FFF2-40B4-BE49-F238E27FC236}">
+                <a16:creationId xmlns:a16="http://schemas.microsoft.com/office/drawing/2014/main" xmlns="" id="{3665E0D4-68DF-7A4B-92E0-B652D965824C}"/>
+              </a:ext>
+            </a:extLst>
+          </p:cNvPr>
+          <p:cNvSpPr>
+            <a:spLocks noChangeArrowheads="1"/>
+          </p:cNvSpPr>
+          <p:nvPr/>
+        </p:nvSpPr>
+        <p:spPr bwMode="auto">
+          <a:xfrm>
+            <a:off x="2627313" y="198438"/>
+            <a:ext cx="5400675" cy="566737"/>
+          </a:xfrm>
+          <a:prstGeom prst="rect">
+            <a:avLst/>
+          </a:prstGeom>
+          <a:noFill/>
+          <a:ln>
+            <a:noFill/>
+          </a:ln>
+          <a:effectLst/>
+          <a:extLst>
+            <a:ext uri="{909E8E84-426E-40DD-AFC4-6F175D3DCCD1}">
+              <a14:hiddenFill xmlns:a14="http://schemas.microsoft.com/office/drawing/2010/main">
+                <a:solidFill>
+                  <a:schemeClr val="bg1"/>
+                </a:solidFill>
+              </a14:hiddenFill>
+            </a:ext>
+            <a:ext uri="{91240B29-F687-4F45-9708-019B960494DF}">
+              <a14:hiddenLine xmlns:a14="http://schemas.microsoft.com/office/drawing/2010/main" w="12700">
+                <a:solidFill>
+                  <a:schemeClr val="tx1"/>
+                </a:solidFill>
+                <a:miter lim="800000"/>
+                <a:headEnd/>
+                <a:tailEnd/>
+              </a14:hiddenLine>
+            </a:ext>
+            <a:ext uri="{AF507438-7753-43E0-B8FC-AC1667EBCBE1}">
+              <a14:hiddenEffects xmlns:a14="http://schemas.microsoft.com/office/drawing/2010/main">
+                <a:effectLst>
+                  <a:outerShdw dist="107763" dir="2700000" algn="ctr" rotWithShape="0">
+                    <a:srgbClr val="DBFFB8"/>
+                  </a:outerShdw>
+                </a:effectLst>
+              </a14:hiddenEffects>
+            </a:ext>
+          </a:extLst>
+        </p:spPr>
+        <p:txBody>
+          <a:bodyPr wrap="none" lIns="45720" tIns="44450" rIns="45720" bIns="44450" anchor="ctr"/>
+          <a:lstStyle>
+            <a:lvl1pPr>
+              <a:spcBef>
+                <a:spcPct val="20000"/>
+              </a:spcBef>
+              <a:buChar char="•"/>
+              <a:defRPr sz="3200">
+                <a:solidFill>
+                  <a:schemeClr val="tx1"/>
+                </a:solidFill>
+                <a:latin typeface="Arial" panose="020B0604020202020204" pitchFamily="34" charset="0"/>
+              </a:defRPr>
+            </a:lvl1pPr>
+            <a:lvl2pPr marL="742950" indent="-285750">
+              <a:spcBef>
+                <a:spcPct val="20000"/>
+              </a:spcBef>
+              <a:buChar char="–"/>
+              <a:defRPr sz="2800">
+                <a:solidFill>
+                  <a:schemeClr val="tx1"/>
+                </a:solidFill>
+                <a:latin typeface="Arial" panose="020B0604020202020204" pitchFamily="34" charset="0"/>
+              </a:defRPr>
+            </a:lvl2pPr>
+            <a:lvl3pPr marL="1143000" indent="-228600">
+              <a:spcBef>
+                <a:spcPct val="20000"/>
+              </a:spcBef>
+              <a:buChar char="•"/>
+              <a:defRPr sz="2400">
+                <a:solidFill>
+                  <a:schemeClr val="tx1"/>
+                </a:solidFill>
+                <a:latin typeface="Arial" panose="020B0604020202020204" pitchFamily="34" charset="0"/>
+              </a:defRPr>
+            </a:lvl3pPr>
+            <a:lvl4pPr marL="1600200" indent="-228600">
+              <a:spcBef>
+                <a:spcPct val="20000"/>
+              </a:spcBef>
+              <a:buChar char="–"/>
+              <a:defRPr sz="2000">
+                <a:solidFill>
+                  <a:schemeClr val="tx1"/>
+                </a:solidFill>
+                <a:latin typeface="Arial" panose="020B0604020202020204" pitchFamily="34" charset="0"/>
+              </a:defRPr>
+            </a:lvl4pPr>
+            <a:lvl5pPr marL="2057400" indent="-228600">
+              <a:spcBef>
+                <a:spcPct val="20000"/>
+              </a:spcBef>
+              <a:buChar char="»"/>
+              <a:defRPr sz="2000">
+                <a:solidFill>
+                  <a:schemeClr val="tx1"/>
+                </a:solidFill>
+                <a:latin typeface="Arial" panose="020B0604020202020204" pitchFamily="34" charset="0"/>
+              </a:defRPr>
+            </a:lvl5pPr>
+            <a:lvl6pPr marL="2514600" indent="-228600" eaLnBrk="0" fontAlgn="base" hangingPunct="0">
+              <a:spcBef>
+                <a:spcPct val="20000"/>
+              </a:spcBef>
+              <a:spcAft>
+                <a:spcPct val="0"/>
+              </a:spcAft>
+              <a:buChar char="»"/>
+              <a:defRPr sz="2000">
+                <a:solidFill>
+                  <a:schemeClr val="tx1"/>
+                </a:solidFill>
+                <a:latin typeface="Arial" panose="020B0604020202020204" pitchFamily="34" charset="0"/>
+              </a:defRPr>
+            </a:lvl6pPr>
+            <a:lvl7pPr marL="2971800" indent="-228600" eaLnBrk="0" fontAlgn="base" hangingPunct="0">
+              <a:spcBef>
+                <a:spcPct val="20000"/>
+              </a:spcBef>
+              <a:spcAft>
+                <a:spcPct val="0"/>
+              </a:spcAft>
+              <a:buChar char="»"/>
+              <a:defRPr sz="2000">
+                <a:solidFill>
+                  <a:schemeClr val="tx1"/>
+                </a:solidFill>
+                <a:latin typeface="Arial" panose="020B0604020202020204" pitchFamily="34" charset="0"/>
+              </a:defRPr>
+            </a:lvl7pPr>
+            <a:lvl8pPr marL="3429000" indent="-228600" eaLnBrk="0" fontAlgn="base" hangingPunct="0">
+              <a:spcBef>
+                <a:spcPct val="20000"/>
+              </a:spcBef>
+              <a:spcAft>
+                <a:spcPct val="0"/>
+              </a:spcAft>
+              <a:buChar char="»"/>
+              <a:defRPr sz="2000">
+                <a:solidFill>
+                  <a:schemeClr val="tx1"/>
+                </a:solidFill>
+                <a:latin typeface="Arial" panose="020B0604020202020204" pitchFamily="34" charset="0"/>
+              </a:defRPr>
+            </a:lvl8pPr>
+            <a:lvl9pPr marL="3886200" indent="-228600" eaLnBrk="0" fontAlgn="base" hangingPunct="0">
+              <a:spcBef>
+                <a:spcPct val="20000"/>
+              </a:spcBef>
+              <a:spcAft>
+                <a:spcPct val="0"/>
+              </a:spcAft>
+              <a:buChar char="»"/>
+              <a:defRPr sz="2000">
+                <a:solidFill>
+                  <a:schemeClr val="tx1"/>
+                </a:solidFill>
+                <a:latin typeface="Arial" panose="020B0604020202020204" pitchFamily="34" charset="0"/>
+              </a:defRPr>
+            </a:lvl9pPr>
+          </a:lstStyle>
+          <a:p>
+            <a:pPr algn="ctr" eaLnBrk="1" hangingPunct="1">
+              <a:spcBef>
+                <a:spcPct val="0"/>
+              </a:spcBef>
+              <a:buFontTx/>
+              <a:buNone/>
+            </a:pPr>
+            <a:r>
+              <a:rPr lang="en-US" altLang="es-ES" sz="2400" b="1" dirty="0" smtClean="0">
+                <a:solidFill>
+                  <a:schemeClr val="tx2"/>
+                </a:solidFill>
+              </a:rPr>
+              <a:t>ERS. </a:t>
+            </a:r>
+            <a:r>
+              <a:rPr lang="en-US" altLang="es-ES" sz="2400" b="1" dirty="0" err="1" smtClean="0">
+                <a:solidFill>
+                  <a:schemeClr val="tx2"/>
+                </a:solidFill>
+              </a:rPr>
+              <a:t>Prototipo</a:t>
+            </a:r>
+            <a:r>
+              <a:rPr lang="en-US" altLang="es-ES" sz="2400" b="1" dirty="0" smtClean="0">
+                <a:solidFill>
+                  <a:schemeClr val="tx2"/>
+                </a:solidFill>
+              </a:rPr>
+              <a:t> de </a:t>
+            </a:r>
+            <a:r>
+              <a:rPr lang="en-US" altLang="es-ES" sz="2400" b="1" dirty="0" err="1" smtClean="0">
+                <a:solidFill>
+                  <a:schemeClr val="tx2"/>
+                </a:solidFill>
+              </a:rPr>
+              <a:t>Interfaz</a:t>
+            </a:r>
+            <a:r>
+              <a:rPr lang="en-US" altLang="es-ES" sz="2400" b="1" dirty="0" smtClean="0">
+                <a:solidFill>
+                  <a:schemeClr val="tx2"/>
+                </a:solidFill>
+              </a:rPr>
+              <a:t> de </a:t>
+            </a:r>
+            <a:r>
+              <a:rPr lang="en-US" altLang="es-ES" sz="2400" b="1" dirty="0" err="1" smtClean="0">
+                <a:solidFill>
+                  <a:schemeClr val="tx2"/>
+                </a:solidFill>
+              </a:rPr>
+              <a:t>Usuario</a:t>
+            </a:r>
+            <a:r>
+              <a:rPr lang="en-US" altLang="es-ES" sz="2400" b="1" dirty="0" smtClean="0">
+                <a:solidFill>
+                  <a:schemeClr val="tx2"/>
+                </a:solidFill>
+              </a:rPr>
+              <a:t>.</a:t>
+            </a:r>
+            <a:endParaRPr lang="en-US" altLang="es-ES" sz="2400" b="1" dirty="0">
+              <a:solidFill>
+                <a:schemeClr val="tx2"/>
+              </a:solidFill>
+            </a:endParaRPr>
+          </a:p>
+        </p:txBody>
+      </p:sp>
+      <p:pic>
+        <p:nvPicPr>
+          <p:cNvPr id="2" name="Imagen 1"/>
+          <p:cNvPicPr>
+            <a:picLocks noChangeAspect="1"/>
+          </p:cNvPicPr>
+          <p:nvPr/>
+        </p:nvPicPr>
+        <p:blipFill>
+          <a:blip r:embed="rId3">
+            <a:extLst>
+              <a:ext uri="{28A0092B-C50C-407E-A947-70E740481C1C}">
+                <a14:useLocalDpi xmlns:a14="http://schemas.microsoft.com/office/drawing/2010/main" val="0"/>
+              </a:ext>
+            </a:extLst>
+          </a:blip>
+          <a:stretch>
+            <a:fillRect/>
+          </a:stretch>
+        </p:blipFill>
+        <p:spPr>
+          <a:xfrm>
+            <a:off x="762000" y="738336"/>
+            <a:ext cx="7620000" cy="5715000"/>
+          </a:xfrm>
+          <a:prstGeom prst="rect">
+            <a:avLst/>
+          </a:prstGeom>
+        </p:spPr>
+      </p:pic>
+    </p:spTree>
+    <p:extLst>
+      <p:ext uri="{BB962C8B-B14F-4D97-AF65-F5344CB8AC3E}">
+        <p14:creationId xmlns:p14="http://schemas.microsoft.com/office/powerpoint/2010/main" val="3711488642"/>
+      </p:ext>
+    </p:extLst>
+  </p:cSld>
+  <p:clrMapOvr>
+    <a:masterClrMapping/>
+  </p:clrMapOvr>
+  <p:timing>
+    <p:tnLst>
+      <p:par>
+        <p:cTn id="1" dur="indefinite" restart="never" nodeType="tmRoot"/>
+      </p:par>
+    </p:tnLst>
+  </p:timing>
+</p:sld>
+</file>
+
+<file path=ppt/slides/slide22.xml><?xml version="1.0" encoding="utf-8"?>
+<p:sld xmlns:a="http://schemas.openxmlformats.org/drawingml/2006/main" xmlns:r="http://schemas.openxmlformats.org/officeDocument/2006/relationships" xmlns:p="http://schemas.openxmlformats.org/presentationml/2006/main">
+  <p:cSld>
+    <p:spTree>
+      <p:nvGrpSpPr>
+        <p:cNvPr id="1" name=""/>
+        <p:cNvGrpSpPr/>
+        <p:nvPr/>
+      </p:nvGrpSpPr>
+      <p:grpSpPr>
+        <a:xfrm>
+          <a:off x="0" y="0"/>
+          <a:ext cx="0" cy="0"/>
+          <a:chOff x="0" y="0"/>
+          <a:chExt cx="0" cy="0"/>
+        </a:xfrm>
+      </p:grpSpPr>
       <p:sp>
         <p:nvSpPr>
           <p:cNvPr id="16385" name="Rectangle 14">
@@ -14322,7 +15094,7 @@
 </p:sld>
 </file>
 
-<file path=ppt/slides/slide21.xml><?xml version="1.0" encoding="utf-8"?>
+<file path=ppt/slides/slide23.xml><?xml version="1.0" encoding="utf-8"?>
 <p:sld xmlns:a="http://schemas.openxmlformats.org/drawingml/2006/main" xmlns:r="http://schemas.openxmlformats.org/officeDocument/2006/relationships" xmlns:p="http://schemas.openxmlformats.org/presentationml/2006/main">
   <p:cSld>
     <p:spTree>
@@ -16633,7 +17405,7 @@
       </p:sp>
       <p:pic>
         <p:nvPicPr>
-          <p:cNvPr id="2" name="Imagen 1"/>
+          <p:cNvPr id="3" name="Imagen 2"/>
           <p:cNvPicPr>
             <a:picLocks noChangeAspect="1"/>
           </p:cNvPicPr>
@@ -16647,8 +17419,8 @@
         </p:blipFill>
         <p:spPr>
           <a:xfrm>
-            <a:off x="1977689" y="690791"/>
-            <a:ext cx="4826560" cy="5894530"/>
+            <a:off x="2267744" y="605588"/>
+            <a:ext cx="5052218" cy="6190499"/>
           </a:xfrm>
           <a:prstGeom prst="rect">
             <a:avLst/>

</xml_diff>

<commit_message>
Presentacion ERS AGNEX Powerpoint Actualizado el 16/05/2019 19:29
</commit_message>
<xml_diff>
--- a/ERS/Presentación_ERS_AGNEX.pptx
+++ b/ERS/Presentación_ERS_AGNEX.pptx
@@ -1318,7 +1318,7 @@
           <p:cNvPr id="4098" name="Rectangle 2">
             <a:extLst>
               <a:ext uri="{FF2B5EF4-FFF2-40B4-BE49-F238E27FC236}">
-                <a16:creationId xmlns:a16="http://schemas.microsoft.com/office/drawing/2014/main" xmlns="" id="{7301BB8C-2DAA-A145-A2E1-B3649391EB9D}"/>
+                <a16:creationId xmlns="" xmlns:a16="http://schemas.microsoft.com/office/drawing/2014/main" id="{7301BB8C-2DAA-A145-A2E1-B3649391EB9D}"/>
               </a:ext>
             </a:extLst>
           </p:cNvPr>
@@ -1397,7 +1397,7 @@
           <p:cNvPr id="4099" name="Rectangle 3">
             <a:extLst>
               <a:ext uri="{FF2B5EF4-FFF2-40B4-BE49-F238E27FC236}">
-                <a16:creationId xmlns:a16="http://schemas.microsoft.com/office/drawing/2014/main" xmlns="" id="{72CDE936-7795-C144-AA9F-F05C2D88ED26}"/>
+                <a16:creationId xmlns="" xmlns:a16="http://schemas.microsoft.com/office/drawing/2014/main" id="{72CDE936-7795-C144-AA9F-F05C2D88ED26}"/>
               </a:ext>
             </a:extLst>
           </p:cNvPr>
@@ -1476,7 +1476,7 @@
           <p:cNvPr id="4100" name="Rectangle 4">
             <a:extLst>
               <a:ext uri="{FF2B5EF4-FFF2-40B4-BE49-F238E27FC236}">
-                <a16:creationId xmlns:a16="http://schemas.microsoft.com/office/drawing/2014/main" xmlns="" id="{9AB55F1A-30B5-BC47-9796-90A499593F42}"/>
+                <a16:creationId xmlns="" xmlns:a16="http://schemas.microsoft.com/office/drawing/2014/main" id="{9AB55F1A-30B5-BC47-9796-90A499593F42}"/>
               </a:ext>
             </a:extLst>
           </p:cNvPr>
@@ -1555,7 +1555,7 @@
           <p:cNvPr id="4101" name="Rectangle 5">
             <a:extLst>
               <a:ext uri="{FF2B5EF4-FFF2-40B4-BE49-F238E27FC236}">
-                <a16:creationId xmlns:a16="http://schemas.microsoft.com/office/drawing/2014/main" xmlns="" id="{80B3278C-0CD4-4444-96FD-21D07B4629DB}"/>
+                <a16:creationId xmlns="" xmlns:a16="http://schemas.microsoft.com/office/drawing/2014/main" id="{80B3278C-0CD4-4444-96FD-21D07B4629DB}"/>
               </a:ext>
             </a:extLst>
           </p:cNvPr>
@@ -1675,7 +1675,7 @@
           <p:cNvPr id="2" name="Marcador de encabezado 1">
             <a:extLst>
               <a:ext uri="{FF2B5EF4-FFF2-40B4-BE49-F238E27FC236}">
-                <a16:creationId xmlns:a16="http://schemas.microsoft.com/office/drawing/2014/main" xmlns="" id="{190B05B0-4CD7-8548-B284-31056CA4D3C6}"/>
+                <a16:creationId xmlns="" xmlns:a16="http://schemas.microsoft.com/office/drawing/2014/main" id="{190B05B0-4CD7-8548-B284-31056CA4D3C6}"/>
               </a:ext>
             </a:extLst>
           </p:cNvPr>
@@ -1715,7 +1715,7 @@
           <p:cNvPr id="3" name="Marcador de fecha 2">
             <a:extLst>
               <a:ext uri="{FF2B5EF4-FFF2-40B4-BE49-F238E27FC236}">
-                <a16:creationId xmlns:a16="http://schemas.microsoft.com/office/drawing/2014/main" xmlns="" id="{7A4EB724-2211-3A4B-939D-AE5040DB6E11}"/>
+                <a16:creationId xmlns="" xmlns:a16="http://schemas.microsoft.com/office/drawing/2014/main" id="{7A4EB724-2211-3A4B-939D-AE5040DB6E11}"/>
               </a:ext>
             </a:extLst>
           </p:cNvPr>
@@ -1762,7 +1762,7 @@
           <p:cNvPr id="4" name="Marcador de imagen de diapositiva 3">
             <a:extLst>
               <a:ext uri="{FF2B5EF4-FFF2-40B4-BE49-F238E27FC236}">
-                <a16:creationId xmlns:a16="http://schemas.microsoft.com/office/drawing/2014/main" xmlns="" id="{22BB66D7-F3E6-C442-94E8-C510FB352E0F}"/>
+                <a16:creationId xmlns="" xmlns:a16="http://schemas.microsoft.com/office/drawing/2014/main" id="{22BB66D7-F3E6-C442-94E8-C510FB352E0F}"/>
               </a:ext>
             </a:extLst>
           </p:cNvPr>
@@ -1802,7 +1802,7 @@
           <p:cNvPr id="5" name="Marcador de notas 4">
             <a:extLst>
               <a:ext uri="{FF2B5EF4-FFF2-40B4-BE49-F238E27FC236}">
-                <a16:creationId xmlns:a16="http://schemas.microsoft.com/office/drawing/2014/main" xmlns="" id="{A351D1A5-7E45-9F4C-B5F9-050AF4E79E01}"/>
+                <a16:creationId xmlns="" xmlns:a16="http://schemas.microsoft.com/office/drawing/2014/main" id="{A351D1A5-7E45-9F4C-B5F9-050AF4E79E01}"/>
               </a:ext>
             </a:extLst>
           </p:cNvPr>
@@ -1867,7 +1867,7 @@
           <p:cNvPr id="6" name="Marcador de pie de página 5">
             <a:extLst>
               <a:ext uri="{FF2B5EF4-FFF2-40B4-BE49-F238E27FC236}">
-                <a16:creationId xmlns:a16="http://schemas.microsoft.com/office/drawing/2014/main" xmlns="" id="{CDDA647B-9900-A042-837C-C5F3F92D9812}"/>
+                <a16:creationId xmlns="" xmlns:a16="http://schemas.microsoft.com/office/drawing/2014/main" id="{CDDA647B-9900-A042-837C-C5F3F92D9812}"/>
               </a:ext>
             </a:extLst>
           </p:cNvPr>
@@ -1907,7 +1907,7 @@
           <p:cNvPr id="7" name="Marcador de número de diapositiva 6">
             <a:extLst>
               <a:ext uri="{FF2B5EF4-FFF2-40B4-BE49-F238E27FC236}">
-                <a16:creationId xmlns:a16="http://schemas.microsoft.com/office/drawing/2014/main" xmlns="" id="{0038CB9D-584B-684A-BCE7-8A280ECEC657}"/>
+                <a16:creationId xmlns="" xmlns:a16="http://schemas.microsoft.com/office/drawing/2014/main" id="{0038CB9D-584B-684A-BCE7-8A280ECEC657}"/>
               </a:ext>
             </a:extLst>
           </p:cNvPr>
@@ -2104,7 +2104,7 @@
           <p:cNvPr id="34817" name="Marcador de imagen de diapositiva 1">
             <a:extLst>
               <a:ext uri="{FF2B5EF4-FFF2-40B4-BE49-F238E27FC236}">
-                <a16:creationId xmlns:a16="http://schemas.microsoft.com/office/drawing/2014/main" xmlns="" id="{88E98E05-8FFB-EB42-9121-DD91BA564333}"/>
+                <a16:creationId xmlns="" xmlns:a16="http://schemas.microsoft.com/office/drawing/2014/main" id="{88E98E05-8FFB-EB42-9121-DD91BA564333}"/>
               </a:ext>
             </a:extLst>
           </p:cNvPr>
@@ -2141,7 +2141,7 @@
           <p:cNvPr id="34818" name="Marcador de notas 2">
             <a:extLst>
               <a:ext uri="{FF2B5EF4-FFF2-40B4-BE49-F238E27FC236}">
-                <a16:creationId xmlns:a16="http://schemas.microsoft.com/office/drawing/2014/main" xmlns="" id="{55AB1F2A-96D9-5D4E-BB02-59C8DC05CBE4}"/>
+                <a16:creationId xmlns="" xmlns:a16="http://schemas.microsoft.com/office/drawing/2014/main" id="{55AB1F2A-96D9-5D4E-BB02-59C8DC05CBE4}"/>
               </a:ext>
             </a:extLst>
           </p:cNvPr>
@@ -2196,7 +2196,7 @@
           <p:cNvPr id="34819" name="Marcador de número de diapositiva 3">
             <a:extLst>
               <a:ext uri="{FF2B5EF4-FFF2-40B4-BE49-F238E27FC236}">
-                <a16:creationId xmlns:a16="http://schemas.microsoft.com/office/drawing/2014/main" xmlns="" id="{157EE0C8-B05F-AA41-A446-5E3DE14108EB}"/>
+                <a16:creationId xmlns="" xmlns:a16="http://schemas.microsoft.com/office/drawing/2014/main" id="{157EE0C8-B05F-AA41-A446-5E3DE14108EB}"/>
               </a:ext>
             </a:extLst>
           </p:cNvPr>
@@ -4269,7 +4269,7 @@
           <p:cNvPr id="4" name="Rectangle 4">
             <a:extLst>
               <a:ext uri="{FF2B5EF4-FFF2-40B4-BE49-F238E27FC236}">
-                <a16:creationId xmlns:a16="http://schemas.microsoft.com/office/drawing/2014/main" xmlns="" id="{CBFFC4FF-25B6-2F41-87F3-D1F3AFF4FBEB}"/>
+                <a16:creationId xmlns="" xmlns:a16="http://schemas.microsoft.com/office/drawing/2014/main" id="{CBFFC4FF-25B6-2F41-87F3-D1F3AFF4FBEB}"/>
               </a:ext>
             </a:extLst>
           </p:cNvPr>
@@ -4303,7 +4303,7 @@
           <p:cNvPr id="5" name="Rectangle 5">
             <a:extLst>
               <a:ext uri="{FF2B5EF4-FFF2-40B4-BE49-F238E27FC236}">
-                <a16:creationId xmlns:a16="http://schemas.microsoft.com/office/drawing/2014/main" xmlns="" id="{4C096F85-2FFD-E94B-89F6-2FAB4BAEEE87}"/>
+                <a16:creationId xmlns="" xmlns:a16="http://schemas.microsoft.com/office/drawing/2014/main" id="{4C096F85-2FFD-E94B-89F6-2FAB4BAEEE87}"/>
               </a:ext>
             </a:extLst>
           </p:cNvPr>
@@ -4337,7 +4337,7 @@
           <p:cNvPr id="6" name="Rectangle 6">
             <a:extLst>
               <a:ext uri="{FF2B5EF4-FFF2-40B4-BE49-F238E27FC236}">
-                <a16:creationId xmlns:a16="http://schemas.microsoft.com/office/drawing/2014/main" xmlns="" id="{2796106F-EEB2-E64A-9116-AAFF62318609}"/>
+                <a16:creationId xmlns="" xmlns:a16="http://schemas.microsoft.com/office/drawing/2014/main" id="{2796106F-EEB2-E64A-9116-AAFF62318609}"/>
               </a:ext>
             </a:extLst>
           </p:cNvPr>
@@ -4481,7 +4481,7 @@
           <p:cNvPr id="4" name="Rectangle 4">
             <a:extLst>
               <a:ext uri="{FF2B5EF4-FFF2-40B4-BE49-F238E27FC236}">
-                <a16:creationId xmlns:a16="http://schemas.microsoft.com/office/drawing/2014/main" xmlns="" id="{6A32BADE-F659-5046-B660-D70E5FD5A453}"/>
+                <a16:creationId xmlns="" xmlns:a16="http://schemas.microsoft.com/office/drawing/2014/main" id="{6A32BADE-F659-5046-B660-D70E5FD5A453}"/>
               </a:ext>
             </a:extLst>
           </p:cNvPr>
@@ -4515,7 +4515,7 @@
           <p:cNvPr id="5" name="Rectangle 5">
             <a:extLst>
               <a:ext uri="{FF2B5EF4-FFF2-40B4-BE49-F238E27FC236}">
-                <a16:creationId xmlns:a16="http://schemas.microsoft.com/office/drawing/2014/main" xmlns="" id="{C6C00947-C3E3-7C43-8F5C-5E0C4CED7300}"/>
+                <a16:creationId xmlns="" xmlns:a16="http://schemas.microsoft.com/office/drawing/2014/main" id="{C6C00947-C3E3-7C43-8F5C-5E0C4CED7300}"/>
               </a:ext>
             </a:extLst>
           </p:cNvPr>
@@ -4549,7 +4549,7 @@
           <p:cNvPr id="6" name="Rectangle 6">
             <a:extLst>
               <a:ext uri="{FF2B5EF4-FFF2-40B4-BE49-F238E27FC236}">
-                <a16:creationId xmlns:a16="http://schemas.microsoft.com/office/drawing/2014/main" xmlns="" id="{9E78E138-D322-AA42-82D7-FC195069F600}"/>
+                <a16:creationId xmlns="" xmlns:a16="http://schemas.microsoft.com/office/drawing/2014/main" id="{9E78E138-D322-AA42-82D7-FC195069F600}"/>
               </a:ext>
             </a:extLst>
           </p:cNvPr>
@@ -4703,7 +4703,7 @@
           <p:cNvPr id="4" name="Rectangle 4">
             <a:extLst>
               <a:ext uri="{FF2B5EF4-FFF2-40B4-BE49-F238E27FC236}">
-                <a16:creationId xmlns:a16="http://schemas.microsoft.com/office/drawing/2014/main" xmlns="" id="{2606C2FE-DFA7-A346-9F08-F601AFC337E9}"/>
+                <a16:creationId xmlns="" xmlns:a16="http://schemas.microsoft.com/office/drawing/2014/main" id="{2606C2FE-DFA7-A346-9F08-F601AFC337E9}"/>
               </a:ext>
             </a:extLst>
           </p:cNvPr>
@@ -4737,7 +4737,7 @@
           <p:cNvPr id="5" name="Rectangle 5">
             <a:extLst>
               <a:ext uri="{FF2B5EF4-FFF2-40B4-BE49-F238E27FC236}">
-                <a16:creationId xmlns:a16="http://schemas.microsoft.com/office/drawing/2014/main" xmlns="" id="{68BD24F8-D24B-B142-862C-4F4ED088CAE0}"/>
+                <a16:creationId xmlns="" xmlns:a16="http://schemas.microsoft.com/office/drawing/2014/main" id="{68BD24F8-D24B-B142-862C-4F4ED088CAE0}"/>
               </a:ext>
             </a:extLst>
           </p:cNvPr>
@@ -4771,7 +4771,7 @@
           <p:cNvPr id="6" name="Rectangle 6">
             <a:extLst>
               <a:ext uri="{FF2B5EF4-FFF2-40B4-BE49-F238E27FC236}">
-                <a16:creationId xmlns:a16="http://schemas.microsoft.com/office/drawing/2014/main" xmlns="" id="{DCFFF4C2-EBEB-D74F-9371-02B5A65CD036}"/>
+                <a16:creationId xmlns="" xmlns:a16="http://schemas.microsoft.com/office/drawing/2014/main" id="{DCFFF4C2-EBEB-D74F-9371-02B5A65CD036}"/>
               </a:ext>
             </a:extLst>
           </p:cNvPr>
@@ -4915,7 +4915,7 @@
           <p:cNvPr id="4" name="Rectangle 4">
             <a:extLst>
               <a:ext uri="{FF2B5EF4-FFF2-40B4-BE49-F238E27FC236}">
-                <a16:creationId xmlns:a16="http://schemas.microsoft.com/office/drawing/2014/main" xmlns="" id="{4F77C46A-12C9-8F4B-B36B-A58EA1012DC9}"/>
+                <a16:creationId xmlns="" xmlns:a16="http://schemas.microsoft.com/office/drawing/2014/main" id="{4F77C46A-12C9-8F4B-B36B-A58EA1012DC9}"/>
               </a:ext>
             </a:extLst>
           </p:cNvPr>
@@ -4949,7 +4949,7 @@
           <p:cNvPr id="5" name="Rectangle 5">
             <a:extLst>
               <a:ext uri="{FF2B5EF4-FFF2-40B4-BE49-F238E27FC236}">
-                <a16:creationId xmlns:a16="http://schemas.microsoft.com/office/drawing/2014/main" xmlns="" id="{204124B9-9C00-EF48-B916-2993DE755BBC}"/>
+                <a16:creationId xmlns="" xmlns:a16="http://schemas.microsoft.com/office/drawing/2014/main" id="{204124B9-9C00-EF48-B916-2993DE755BBC}"/>
               </a:ext>
             </a:extLst>
           </p:cNvPr>
@@ -4983,7 +4983,7 @@
           <p:cNvPr id="6" name="Rectangle 6">
             <a:extLst>
               <a:ext uri="{FF2B5EF4-FFF2-40B4-BE49-F238E27FC236}">
-                <a16:creationId xmlns:a16="http://schemas.microsoft.com/office/drawing/2014/main" xmlns="" id="{41557751-8E1D-244A-BE57-51574A96609F}"/>
+                <a16:creationId xmlns="" xmlns:a16="http://schemas.microsoft.com/office/drawing/2014/main" id="{41557751-8E1D-244A-BE57-51574A96609F}"/>
               </a:ext>
             </a:extLst>
           </p:cNvPr>
@@ -5150,7 +5150,7 @@
           <p:cNvPr id="4" name="Rectangle 4">
             <a:extLst>
               <a:ext uri="{FF2B5EF4-FFF2-40B4-BE49-F238E27FC236}">
-                <a16:creationId xmlns:a16="http://schemas.microsoft.com/office/drawing/2014/main" xmlns="" id="{16D5654B-BF22-544B-8EDB-DF8E226254B8}"/>
+                <a16:creationId xmlns="" xmlns:a16="http://schemas.microsoft.com/office/drawing/2014/main" id="{16D5654B-BF22-544B-8EDB-DF8E226254B8}"/>
               </a:ext>
             </a:extLst>
           </p:cNvPr>
@@ -5184,7 +5184,7 @@
           <p:cNvPr id="5" name="Rectangle 5">
             <a:extLst>
               <a:ext uri="{FF2B5EF4-FFF2-40B4-BE49-F238E27FC236}">
-                <a16:creationId xmlns:a16="http://schemas.microsoft.com/office/drawing/2014/main" xmlns="" id="{3F604BB5-E7A1-454E-83DD-045E2E5708A4}"/>
+                <a16:creationId xmlns="" xmlns:a16="http://schemas.microsoft.com/office/drawing/2014/main" id="{3F604BB5-E7A1-454E-83DD-045E2E5708A4}"/>
               </a:ext>
             </a:extLst>
           </p:cNvPr>
@@ -5218,7 +5218,7 @@
           <p:cNvPr id="6" name="Rectangle 6">
             <a:extLst>
               <a:ext uri="{FF2B5EF4-FFF2-40B4-BE49-F238E27FC236}">
-                <a16:creationId xmlns:a16="http://schemas.microsoft.com/office/drawing/2014/main" xmlns="" id="{EE8833F8-39E2-A946-A2E8-E1684A2E68BC}"/>
+                <a16:creationId xmlns="" xmlns:a16="http://schemas.microsoft.com/office/drawing/2014/main" id="{EE8833F8-39E2-A946-A2E8-E1684A2E68BC}"/>
               </a:ext>
             </a:extLst>
           </p:cNvPr>
@@ -5479,7 +5479,7 @@
           <p:cNvPr id="5" name="Rectangle 4">
             <a:extLst>
               <a:ext uri="{FF2B5EF4-FFF2-40B4-BE49-F238E27FC236}">
-                <a16:creationId xmlns:a16="http://schemas.microsoft.com/office/drawing/2014/main" xmlns="" id="{939112DA-065D-444A-B3DF-04650F72011D}"/>
+                <a16:creationId xmlns="" xmlns:a16="http://schemas.microsoft.com/office/drawing/2014/main" id="{939112DA-065D-444A-B3DF-04650F72011D}"/>
               </a:ext>
             </a:extLst>
           </p:cNvPr>
@@ -5513,7 +5513,7 @@
           <p:cNvPr id="6" name="Rectangle 5">
             <a:extLst>
               <a:ext uri="{FF2B5EF4-FFF2-40B4-BE49-F238E27FC236}">
-                <a16:creationId xmlns:a16="http://schemas.microsoft.com/office/drawing/2014/main" xmlns="" id="{290B047B-8D59-A14E-8B66-9459A41AA2F3}"/>
+                <a16:creationId xmlns="" xmlns:a16="http://schemas.microsoft.com/office/drawing/2014/main" id="{290B047B-8D59-A14E-8B66-9459A41AA2F3}"/>
               </a:ext>
             </a:extLst>
           </p:cNvPr>
@@ -5547,7 +5547,7 @@
           <p:cNvPr id="7" name="Rectangle 6">
             <a:extLst>
               <a:ext uri="{FF2B5EF4-FFF2-40B4-BE49-F238E27FC236}">
-                <a16:creationId xmlns:a16="http://schemas.microsoft.com/office/drawing/2014/main" xmlns="" id="{E126F9E9-9A18-884B-9A8E-31F84B8639C6}"/>
+                <a16:creationId xmlns="" xmlns:a16="http://schemas.microsoft.com/office/drawing/2014/main" id="{E126F9E9-9A18-884B-9A8E-31F84B8639C6}"/>
               </a:ext>
             </a:extLst>
           </p:cNvPr>
@@ -5942,7 +5942,7 @@
           <p:cNvPr id="7" name="Rectangle 4">
             <a:extLst>
               <a:ext uri="{FF2B5EF4-FFF2-40B4-BE49-F238E27FC236}">
-                <a16:creationId xmlns:a16="http://schemas.microsoft.com/office/drawing/2014/main" xmlns="" id="{95C4813C-4E1A-F043-B218-C7959682FFE9}"/>
+                <a16:creationId xmlns="" xmlns:a16="http://schemas.microsoft.com/office/drawing/2014/main" id="{95C4813C-4E1A-F043-B218-C7959682FFE9}"/>
               </a:ext>
             </a:extLst>
           </p:cNvPr>
@@ -5976,7 +5976,7 @@
           <p:cNvPr id="8" name="Rectangle 5">
             <a:extLst>
               <a:ext uri="{FF2B5EF4-FFF2-40B4-BE49-F238E27FC236}">
-                <a16:creationId xmlns:a16="http://schemas.microsoft.com/office/drawing/2014/main" xmlns="" id="{E34CED14-F450-6840-BF80-ECBF681228EA}"/>
+                <a16:creationId xmlns="" xmlns:a16="http://schemas.microsoft.com/office/drawing/2014/main" id="{E34CED14-F450-6840-BF80-ECBF681228EA}"/>
               </a:ext>
             </a:extLst>
           </p:cNvPr>
@@ -6010,7 +6010,7 @@
           <p:cNvPr id="9" name="Rectangle 6">
             <a:extLst>
               <a:ext uri="{FF2B5EF4-FFF2-40B4-BE49-F238E27FC236}">
-                <a16:creationId xmlns:a16="http://schemas.microsoft.com/office/drawing/2014/main" xmlns="" id="{7B65E33D-F19F-084E-8228-4BBA25779346}"/>
+                <a16:creationId xmlns="" xmlns:a16="http://schemas.microsoft.com/office/drawing/2014/main" id="{7B65E33D-F19F-084E-8228-4BBA25779346}"/>
               </a:ext>
             </a:extLst>
           </p:cNvPr>
@@ -6103,7 +6103,7 @@
           <p:cNvPr id="3" name="Rectangle 4">
             <a:extLst>
               <a:ext uri="{FF2B5EF4-FFF2-40B4-BE49-F238E27FC236}">
-                <a16:creationId xmlns:a16="http://schemas.microsoft.com/office/drawing/2014/main" xmlns="" id="{F4BC7895-DFEB-4F44-8BC9-BDFF081AF1DD}"/>
+                <a16:creationId xmlns="" xmlns:a16="http://schemas.microsoft.com/office/drawing/2014/main" id="{F4BC7895-DFEB-4F44-8BC9-BDFF081AF1DD}"/>
               </a:ext>
             </a:extLst>
           </p:cNvPr>
@@ -6137,7 +6137,7 @@
           <p:cNvPr id="4" name="Rectangle 5">
             <a:extLst>
               <a:ext uri="{FF2B5EF4-FFF2-40B4-BE49-F238E27FC236}">
-                <a16:creationId xmlns:a16="http://schemas.microsoft.com/office/drawing/2014/main" xmlns="" id="{D39CDA88-E4EE-534A-AA5B-C6D2E7BBC062}"/>
+                <a16:creationId xmlns="" xmlns:a16="http://schemas.microsoft.com/office/drawing/2014/main" id="{D39CDA88-E4EE-534A-AA5B-C6D2E7BBC062}"/>
               </a:ext>
             </a:extLst>
           </p:cNvPr>
@@ -6171,7 +6171,7 @@
           <p:cNvPr id="5" name="Rectangle 6">
             <a:extLst>
               <a:ext uri="{FF2B5EF4-FFF2-40B4-BE49-F238E27FC236}">
-                <a16:creationId xmlns:a16="http://schemas.microsoft.com/office/drawing/2014/main" xmlns="" id="{C9051539-E274-CE43-BB74-3FEEF9E9ADA1}"/>
+                <a16:creationId xmlns="" xmlns:a16="http://schemas.microsoft.com/office/drawing/2014/main" id="{C9051539-E274-CE43-BB74-3FEEF9E9ADA1}"/>
               </a:ext>
             </a:extLst>
           </p:cNvPr>
@@ -6242,7 +6242,7 @@
           <p:cNvPr id="2" name="Group 22">
             <a:extLst>
               <a:ext uri="{FF2B5EF4-FFF2-40B4-BE49-F238E27FC236}">
-                <a16:creationId xmlns:a16="http://schemas.microsoft.com/office/drawing/2014/main" xmlns="" id="{8E84F22A-9706-1E48-B2F1-46BDBDC069B0}"/>
+                <a16:creationId xmlns="" xmlns:a16="http://schemas.microsoft.com/office/drawing/2014/main" id="{8E84F22A-9706-1E48-B2F1-46BDBDC069B0}"/>
               </a:ext>
             </a:extLst>
           </p:cNvPr>
@@ -6264,7 +6264,7 @@
             <p:cNvPr id="3" name="Freeform 8" descr="5%">
               <a:extLst>
                 <a:ext uri="{FF2B5EF4-FFF2-40B4-BE49-F238E27FC236}">
-                  <a16:creationId xmlns:a16="http://schemas.microsoft.com/office/drawing/2014/main" xmlns="" id="{B7039347-F769-F148-A923-1B0BE0ECB77E}"/>
+                  <a16:creationId xmlns="" xmlns:a16="http://schemas.microsoft.com/office/drawing/2014/main" id="{B7039347-F769-F148-A923-1B0BE0ECB77E}"/>
                 </a:ext>
               </a:extLst>
             </p:cNvPr>
@@ -6383,7 +6383,7 @@
             <p:cNvPr id="4" name="Freeform 9" descr="5%">
               <a:extLst>
                 <a:ext uri="{FF2B5EF4-FFF2-40B4-BE49-F238E27FC236}">
-                  <a16:creationId xmlns:a16="http://schemas.microsoft.com/office/drawing/2014/main" xmlns="" id="{6F999DAB-C9D8-8C48-88BC-EB0ACC950367}"/>
+                  <a16:creationId xmlns="" xmlns:a16="http://schemas.microsoft.com/office/drawing/2014/main" id="{6F999DAB-C9D8-8C48-88BC-EB0ACC950367}"/>
                 </a:ext>
               </a:extLst>
             </p:cNvPr>
@@ -6502,7 +6502,7 @@
             <p:cNvPr id="5" name="Freeform 10" descr="5%">
               <a:extLst>
                 <a:ext uri="{FF2B5EF4-FFF2-40B4-BE49-F238E27FC236}">
-                  <a16:creationId xmlns:a16="http://schemas.microsoft.com/office/drawing/2014/main" xmlns="" id="{5ED24D02-9BC2-E545-95E6-3CCD22CF78BA}"/>
+                  <a16:creationId xmlns="" xmlns:a16="http://schemas.microsoft.com/office/drawing/2014/main" id="{5ED24D02-9BC2-E545-95E6-3CCD22CF78BA}"/>
                 </a:ext>
               </a:extLst>
             </p:cNvPr>
@@ -6621,7 +6621,7 @@
             <p:cNvPr id="6" name="Freeform 11" descr="5%">
               <a:extLst>
                 <a:ext uri="{FF2B5EF4-FFF2-40B4-BE49-F238E27FC236}">
-                  <a16:creationId xmlns:a16="http://schemas.microsoft.com/office/drawing/2014/main" xmlns="" id="{2F614782-A419-8043-BC6F-187E134A38CF}"/>
+                  <a16:creationId xmlns="" xmlns:a16="http://schemas.microsoft.com/office/drawing/2014/main" id="{2F614782-A419-8043-BC6F-187E134A38CF}"/>
                 </a:ext>
               </a:extLst>
             </p:cNvPr>
@@ -6740,7 +6740,7 @@
             <p:cNvPr id="7" name="Freeform 12" descr="5%">
               <a:extLst>
                 <a:ext uri="{FF2B5EF4-FFF2-40B4-BE49-F238E27FC236}">
-                  <a16:creationId xmlns:a16="http://schemas.microsoft.com/office/drawing/2014/main" xmlns="" id="{B9D19167-1DB4-3C41-9039-944BB5EED427}"/>
+                  <a16:creationId xmlns="" xmlns:a16="http://schemas.microsoft.com/office/drawing/2014/main" id="{B9D19167-1DB4-3C41-9039-944BB5EED427}"/>
                 </a:ext>
               </a:extLst>
             </p:cNvPr>
@@ -6859,7 +6859,7 @@
             <p:cNvPr id="8" name="Freeform 13" descr="5%">
               <a:extLst>
                 <a:ext uri="{FF2B5EF4-FFF2-40B4-BE49-F238E27FC236}">
-                  <a16:creationId xmlns:a16="http://schemas.microsoft.com/office/drawing/2014/main" xmlns="" id="{B2EAC2A2-D222-CA42-8295-561B5CD74721}"/>
+                  <a16:creationId xmlns="" xmlns:a16="http://schemas.microsoft.com/office/drawing/2014/main" id="{B2EAC2A2-D222-CA42-8295-561B5CD74721}"/>
                 </a:ext>
               </a:extLst>
             </p:cNvPr>
@@ -6979,7 +6979,7 @@
           <p:cNvPr id="9" name="Freeform 17">
             <a:extLst>
               <a:ext uri="{FF2B5EF4-FFF2-40B4-BE49-F238E27FC236}">
-                <a16:creationId xmlns:a16="http://schemas.microsoft.com/office/drawing/2014/main" xmlns="" id="{ADE1301C-82E7-B44E-8823-4ABD8E4996E1}"/>
+                <a16:creationId xmlns="" xmlns:a16="http://schemas.microsoft.com/office/drawing/2014/main" id="{ADE1301C-82E7-B44E-8823-4ABD8E4996E1}"/>
               </a:ext>
             </a:extLst>
           </p:cNvPr>
@@ -7094,7 +7094,7 @@
           <p:cNvPr id="12" name="Rectangle 6">
             <a:extLst>
               <a:ext uri="{FF2B5EF4-FFF2-40B4-BE49-F238E27FC236}">
-                <a16:creationId xmlns:a16="http://schemas.microsoft.com/office/drawing/2014/main" xmlns="" id="{07FA309B-90CD-D54E-AA02-3C668A6BFB51}"/>
+                <a16:creationId xmlns="" xmlns:a16="http://schemas.microsoft.com/office/drawing/2014/main" id="{07FA309B-90CD-D54E-AA02-3C668A6BFB51}"/>
               </a:ext>
             </a:extLst>
           </p:cNvPr>
@@ -7343,7 +7343,7 @@
           <p:cNvPr id="5" name="Rectangle 4">
             <a:extLst>
               <a:ext uri="{FF2B5EF4-FFF2-40B4-BE49-F238E27FC236}">
-                <a16:creationId xmlns:a16="http://schemas.microsoft.com/office/drawing/2014/main" xmlns="" id="{C7C8B1DD-4DA0-EF4D-B9CF-6AFFB6F0D393}"/>
+                <a16:creationId xmlns="" xmlns:a16="http://schemas.microsoft.com/office/drawing/2014/main" id="{C7C8B1DD-4DA0-EF4D-B9CF-6AFFB6F0D393}"/>
               </a:ext>
             </a:extLst>
           </p:cNvPr>
@@ -7377,7 +7377,7 @@
           <p:cNvPr id="6" name="Rectangle 5">
             <a:extLst>
               <a:ext uri="{FF2B5EF4-FFF2-40B4-BE49-F238E27FC236}">
-                <a16:creationId xmlns:a16="http://schemas.microsoft.com/office/drawing/2014/main" xmlns="" id="{9E79C3ED-79BC-0248-88E9-6470BD781F40}"/>
+                <a16:creationId xmlns="" xmlns:a16="http://schemas.microsoft.com/office/drawing/2014/main" id="{9E79C3ED-79BC-0248-88E9-6470BD781F40}"/>
               </a:ext>
             </a:extLst>
           </p:cNvPr>
@@ -7411,7 +7411,7 @@
           <p:cNvPr id="7" name="Rectangle 6">
             <a:extLst>
               <a:ext uri="{FF2B5EF4-FFF2-40B4-BE49-F238E27FC236}">
-                <a16:creationId xmlns:a16="http://schemas.microsoft.com/office/drawing/2014/main" xmlns="" id="{3AB662F9-6380-3041-AD2B-E570902EE19D}"/>
+                <a16:creationId xmlns="" xmlns:a16="http://schemas.microsoft.com/office/drawing/2014/main" id="{3AB662F9-6380-3041-AD2B-E570902EE19D}"/>
               </a:ext>
             </a:extLst>
           </p:cNvPr>
@@ -7640,7 +7640,7 @@
           <p:cNvPr id="5" name="Rectangle 4">
             <a:extLst>
               <a:ext uri="{FF2B5EF4-FFF2-40B4-BE49-F238E27FC236}">
-                <a16:creationId xmlns:a16="http://schemas.microsoft.com/office/drawing/2014/main" xmlns="" id="{CBA21871-7A5D-B443-93D6-F8A17F2DCF85}"/>
+                <a16:creationId xmlns="" xmlns:a16="http://schemas.microsoft.com/office/drawing/2014/main" id="{CBA21871-7A5D-B443-93D6-F8A17F2DCF85}"/>
               </a:ext>
             </a:extLst>
           </p:cNvPr>
@@ -7674,7 +7674,7 @@
           <p:cNvPr id="6" name="Rectangle 5">
             <a:extLst>
               <a:ext uri="{FF2B5EF4-FFF2-40B4-BE49-F238E27FC236}">
-                <a16:creationId xmlns:a16="http://schemas.microsoft.com/office/drawing/2014/main" xmlns="" id="{E76AB48A-FB00-AB41-A25D-494327B102EA}"/>
+                <a16:creationId xmlns="" xmlns:a16="http://schemas.microsoft.com/office/drawing/2014/main" id="{E76AB48A-FB00-AB41-A25D-494327B102EA}"/>
               </a:ext>
             </a:extLst>
           </p:cNvPr>
@@ -7708,7 +7708,7 @@
           <p:cNvPr id="7" name="Rectangle 6">
             <a:extLst>
               <a:ext uri="{FF2B5EF4-FFF2-40B4-BE49-F238E27FC236}">
-                <a16:creationId xmlns:a16="http://schemas.microsoft.com/office/drawing/2014/main" xmlns="" id="{1C28FCBD-BF2C-6841-B4D8-8DC16AE75B6E}"/>
+                <a16:creationId xmlns="" xmlns:a16="http://schemas.microsoft.com/office/drawing/2014/main" id="{1C28FCBD-BF2C-6841-B4D8-8DC16AE75B6E}"/>
               </a:ext>
             </a:extLst>
           </p:cNvPr>
@@ -7787,7 +7787,7 @@
           <p:cNvPr id="1026" name="Rectangle 2">
             <a:extLst>
               <a:ext uri="{FF2B5EF4-FFF2-40B4-BE49-F238E27FC236}">
-                <a16:creationId xmlns:a16="http://schemas.microsoft.com/office/drawing/2014/main" xmlns="" id="{BB0E7CB5-3395-0646-A20A-7249B9974431}"/>
+                <a16:creationId xmlns="" xmlns:a16="http://schemas.microsoft.com/office/drawing/2014/main" id="{BB0E7CB5-3395-0646-A20A-7249B9974431}"/>
               </a:ext>
             </a:extLst>
           </p:cNvPr>
@@ -7861,7 +7861,7 @@
           <p:cNvPr id="1027" name="Rectangle 3">
             <a:extLst>
               <a:ext uri="{FF2B5EF4-FFF2-40B4-BE49-F238E27FC236}">
-                <a16:creationId xmlns:a16="http://schemas.microsoft.com/office/drawing/2014/main" xmlns="" id="{8CB37737-6579-404E-A639-D817E15EE378}"/>
+                <a16:creationId xmlns="" xmlns:a16="http://schemas.microsoft.com/office/drawing/2014/main" id="{8CB37737-6579-404E-A639-D817E15EE378}"/>
               </a:ext>
             </a:extLst>
           </p:cNvPr>
@@ -7963,7 +7963,7 @@
           <p:cNvPr id="1028" name="Rectangle 4">
             <a:extLst>
               <a:ext uri="{FF2B5EF4-FFF2-40B4-BE49-F238E27FC236}">
-                <a16:creationId xmlns:a16="http://schemas.microsoft.com/office/drawing/2014/main" xmlns="" id="{3036F1C7-8DCE-6243-BF4D-A7EF32222206}"/>
+                <a16:creationId xmlns="" xmlns:a16="http://schemas.microsoft.com/office/drawing/2014/main" id="{3036F1C7-8DCE-6243-BF4D-A7EF32222206}"/>
               </a:ext>
             </a:extLst>
           </p:cNvPr>
@@ -8042,7 +8042,7 @@
           <p:cNvPr id="1029" name="Rectangle 5">
             <a:extLst>
               <a:ext uri="{FF2B5EF4-FFF2-40B4-BE49-F238E27FC236}">
-                <a16:creationId xmlns:a16="http://schemas.microsoft.com/office/drawing/2014/main" xmlns="" id="{C1624EBC-F7C4-C049-B404-364BB8BD761F}"/>
+                <a16:creationId xmlns="" xmlns:a16="http://schemas.microsoft.com/office/drawing/2014/main" id="{C1624EBC-F7C4-C049-B404-364BB8BD761F}"/>
               </a:ext>
             </a:extLst>
           </p:cNvPr>
@@ -8121,7 +8121,7 @@
           <p:cNvPr id="1030" name="Rectangle 6">
             <a:extLst>
               <a:ext uri="{FF2B5EF4-FFF2-40B4-BE49-F238E27FC236}">
-                <a16:creationId xmlns:a16="http://schemas.microsoft.com/office/drawing/2014/main" xmlns="" id="{BC9DBA90-5BB7-B54B-B0AC-6480000D6EAF}"/>
+                <a16:creationId xmlns="" xmlns:a16="http://schemas.microsoft.com/office/drawing/2014/main" id="{BC9DBA90-5BB7-B54B-B0AC-6480000D6EAF}"/>
               </a:ext>
             </a:extLst>
           </p:cNvPr>
@@ -8607,7 +8607,7 @@
           <p:cNvPr id="14337" name="Imagen 1">
             <a:extLst>
               <a:ext uri="{FF2B5EF4-FFF2-40B4-BE49-F238E27FC236}">
-                <a16:creationId xmlns:a16="http://schemas.microsoft.com/office/drawing/2014/main" xmlns="" id="{7F1D6CA4-5F4D-1444-9762-9C39BCC5CA71}"/>
+                <a16:creationId xmlns="" xmlns:a16="http://schemas.microsoft.com/office/drawing/2014/main" id="{7F1D6CA4-5F4D-1444-9762-9C39BCC5CA71}"/>
               </a:ext>
             </a:extLst>
           </p:cNvPr>
@@ -8667,7 +8667,7 @@
           <p:cNvPr id="14338" name="Group 45">
             <a:extLst>
               <a:ext uri="{FF2B5EF4-FFF2-40B4-BE49-F238E27FC236}">
-                <a16:creationId xmlns:a16="http://schemas.microsoft.com/office/drawing/2014/main" xmlns="" id="{9ADAEC38-7FE8-5746-854B-6203008C9A28}"/>
+                <a16:creationId xmlns="" xmlns:a16="http://schemas.microsoft.com/office/drawing/2014/main" id="{9ADAEC38-7FE8-5746-854B-6203008C9A28}"/>
               </a:ext>
             </a:extLst>
           </p:cNvPr>
@@ -8689,7 +8689,7 @@
             <p:cNvPr id="14342" name="Text Box 29">
               <a:extLst>
                 <a:ext uri="{FF2B5EF4-FFF2-40B4-BE49-F238E27FC236}">
-                  <a16:creationId xmlns:a16="http://schemas.microsoft.com/office/drawing/2014/main" xmlns="" id="{352F96A7-3C2B-B24B-BB36-7D18C1762A93}"/>
+                  <a16:creationId xmlns="" xmlns:a16="http://schemas.microsoft.com/office/drawing/2014/main" id="{352F96A7-3C2B-B24B-BB36-7D18C1762A93}"/>
                 </a:ext>
               </a:extLst>
             </p:cNvPr>
@@ -8969,7 +8969,7 @@
             <p:cNvPr id="14343" name="Text Box 30">
               <a:extLst>
                 <a:ext uri="{FF2B5EF4-FFF2-40B4-BE49-F238E27FC236}">
-                  <a16:creationId xmlns:a16="http://schemas.microsoft.com/office/drawing/2014/main" xmlns="" id="{52C5A348-D146-7F4A-8486-2FE817DDABBD}"/>
+                  <a16:creationId xmlns="" xmlns:a16="http://schemas.microsoft.com/office/drawing/2014/main" id="{52C5A348-D146-7F4A-8486-2FE817DDABBD}"/>
                 </a:ext>
               </a:extLst>
             </p:cNvPr>
@@ -9183,7 +9183,7 @@
           <p:cNvPr id="14339" name="Rectangle 27">
             <a:extLst>
               <a:ext uri="{FF2B5EF4-FFF2-40B4-BE49-F238E27FC236}">
-                <a16:creationId xmlns:a16="http://schemas.microsoft.com/office/drawing/2014/main" xmlns="" id="{A611ED07-CD3C-C643-B9D5-232B736777DB}"/>
+                <a16:creationId xmlns="" xmlns:a16="http://schemas.microsoft.com/office/drawing/2014/main" id="{A611ED07-CD3C-C643-B9D5-232B736777DB}"/>
               </a:ext>
             </a:extLst>
           </p:cNvPr>
@@ -9451,7 +9451,7 @@
           <p:cNvPr id="14340" name="Rectangle 26">
             <a:extLst>
               <a:ext uri="{FF2B5EF4-FFF2-40B4-BE49-F238E27FC236}">
-                <a16:creationId xmlns:a16="http://schemas.microsoft.com/office/drawing/2014/main" xmlns="" id="{D35E3657-506F-BB4C-8EB8-A849B3BD478C}"/>
+                <a16:creationId xmlns="" xmlns:a16="http://schemas.microsoft.com/office/drawing/2014/main" id="{D35E3657-506F-BB4C-8EB8-A849B3BD478C}"/>
               </a:ext>
             </a:extLst>
           </p:cNvPr>
@@ -9687,7 +9687,7 @@
           <p:cNvPr id="16385" name="Rectangle 14">
             <a:extLst>
               <a:ext uri="{FF2B5EF4-FFF2-40B4-BE49-F238E27FC236}">
-                <a16:creationId xmlns:a16="http://schemas.microsoft.com/office/drawing/2014/main" xmlns="" id="{3665E0D4-68DF-7A4B-92E0-B652D965824C}"/>
+                <a16:creationId xmlns="" xmlns:a16="http://schemas.microsoft.com/office/drawing/2014/main" id="{3665E0D4-68DF-7A4B-92E0-B652D965824C}"/>
               </a:ext>
             </a:extLst>
           </p:cNvPr>
@@ -9982,7 +9982,7 @@
           <p:cNvPr id="16385" name="Rectangle 14">
             <a:extLst>
               <a:ext uri="{FF2B5EF4-FFF2-40B4-BE49-F238E27FC236}">
-                <a16:creationId xmlns:a16="http://schemas.microsoft.com/office/drawing/2014/main" xmlns="" id="{3665E0D4-68DF-7A4B-92E0-B652D965824C}"/>
+                <a16:creationId xmlns="" xmlns:a16="http://schemas.microsoft.com/office/drawing/2014/main" id="{3665E0D4-68DF-7A4B-92E0-B652D965824C}"/>
               </a:ext>
             </a:extLst>
           </p:cNvPr>
@@ -10277,7 +10277,7 @@
           <p:cNvPr id="16385" name="Rectangle 14">
             <a:extLst>
               <a:ext uri="{FF2B5EF4-FFF2-40B4-BE49-F238E27FC236}">
-                <a16:creationId xmlns:a16="http://schemas.microsoft.com/office/drawing/2014/main" xmlns="" id="{3665E0D4-68DF-7A4B-92E0-B652D965824C}"/>
+                <a16:creationId xmlns="" xmlns:a16="http://schemas.microsoft.com/office/drawing/2014/main" id="{3665E0D4-68DF-7A4B-92E0-B652D965824C}"/>
               </a:ext>
             </a:extLst>
           </p:cNvPr>
@@ -10590,7 +10590,7 @@
           <p:cNvPr id="16385" name="Rectangle 14">
             <a:extLst>
               <a:ext uri="{FF2B5EF4-FFF2-40B4-BE49-F238E27FC236}">
-                <a16:creationId xmlns:a16="http://schemas.microsoft.com/office/drawing/2014/main" xmlns="" id="{3665E0D4-68DF-7A4B-92E0-B652D965824C}"/>
+                <a16:creationId xmlns="" xmlns:a16="http://schemas.microsoft.com/office/drawing/2014/main" id="{3665E0D4-68DF-7A4B-92E0-B652D965824C}"/>
               </a:ext>
             </a:extLst>
           </p:cNvPr>
@@ -10909,7 +10909,7 @@
           <p:cNvPr id="16385" name="Rectangle 14">
             <a:extLst>
               <a:ext uri="{FF2B5EF4-FFF2-40B4-BE49-F238E27FC236}">
-                <a16:creationId xmlns:a16="http://schemas.microsoft.com/office/drawing/2014/main" xmlns="" id="{3665E0D4-68DF-7A4B-92E0-B652D965824C}"/>
+                <a16:creationId xmlns="" xmlns:a16="http://schemas.microsoft.com/office/drawing/2014/main" id="{3665E0D4-68DF-7A4B-92E0-B652D965824C}"/>
               </a:ext>
             </a:extLst>
           </p:cNvPr>
@@ -11228,7 +11228,7 @@
           <p:cNvPr id="16385" name="Rectangle 14">
             <a:extLst>
               <a:ext uri="{FF2B5EF4-FFF2-40B4-BE49-F238E27FC236}">
-                <a16:creationId xmlns:a16="http://schemas.microsoft.com/office/drawing/2014/main" xmlns="" id="{3665E0D4-68DF-7A4B-92E0-B652D965824C}"/>
+                <a16:creationId xmlns="" xmlns:a16="http://schemas.microsoft.com/office/drawing/2014/main" id="{3665E0D4-68DF-7A4B-92E0-B652D965824C}"/>
               </a:ext>
             </a:extLst>
           </p:cNvPr>
@@ -11547,7 +11547,7 @@
           <p:cNvPr id="16385" name="Rectangle 14">
             <a:extLst>
               <a:ext uri="{FF2B5EF4-FFF2-40B4-BE49-F238E27FC236}">
-                <a16:creationId xmlns:a16="http://schemas.microsoft.com/office/drawing/2014/main" xmlns="" id="{3665E0D4-68DF-7A4B-92E0-B652D965824C}"/>
+                <a16:creationId xmlns="" xmlns:a16="http://schemas.microsoft.com/office/drawing/2014/main" id="{3665E0D4-68DF-7A4B-92E0-B652D965824C}"/>
               </a:ext>
             </a:extLst>
           </p:cNvPr>
@@ -11896,7 +11896,7 @@
           <p:cNvPr id="4" name="Rectangle 14">
             <a:extLst>
               <a:ext uri="{FF2B5EF4-FFF2-40B4-BE49-F238E27FC236}">
-                <a16:creationId xmlns:a16="http://schemas.microsoft.com/office/drawing/2014/main" xmlns="" id="{3665E0D4-68DF-7A4B-92E0-B652D965824C}"/>
+                <a16:creationId xmlns="" xmlns:a16="http://schemas.microsoft.com/office/drawing/2014/main" id="{3665E0D4-68DF-7A4B-92E0-B652D965824C}"/>
               </a:ext>
             </a:extLst>
           </p:cNvPr>
@@ -12215,7 +12215,7 @@
           <p:cNvPr id="5" name="Rectangle 14">
             <a:extLst>
               <a:ext uri="{FF2B5EF4-FFF2-40B4-BE49-F238E27FC236}">
-                <a16:creationId xmlns:a16="http://schemas.microsoft.com/office/drawing/2014/main" xmlns="" id="{3665E0D4-68DF-7A4B-92E0-B652D965824C}"/>
+                <a16:creationId xmlns="" xmlns:a16="http://schemas.microsoft.com/office/drawing/2014/main" id="{3665E0D4-68DF-7A4B-92E0-B652D965824C}"/>
               </a:ext>
             </a:extLst>
           </p:cNvPr>
@@ -12534,7 +12534,7 @@
           <p:cNvPr id="5" name="Rectangle 14">
             <a:extLst>
               <a:ext uri="{FF2B5EF4-FFF2-40B4-BE49-F238E27FC236}">
-                <a16:creationId xmlns:a16="http://schemas.microsoft.com/office/drawing/2014/main" xmlns="" id="{3665E0D4-68DF-7A4B-92E0-B652D965824C}"/>
+                <a16:creationId xmlns="" xmlns:a16="http://schemas.microsoft.com/office/drawing/2014/main" id="{3665E0D4-68DF-7A4B-92E0-B652D965824C}"/>
               </a:ext>
             </a:extLst>
           </p:cNvPr>
@@ -12823,7 +12823,7 @@
           <p:cNvPr id="15361" name="Group 22">
             <a:extLst>
               <a:ext uri="{FF2B5EF4-FFF2-40B4-BE49-F238E27FC236}">
-                <a16:creationId xmlns:a16="http://schemas.microsoft.com/office/drawing/2014/main" xmlns="" id="{6B6EABA4-F252-6746-8ED0-EF684C8CADED}"/>
+                <a16:creationId xmlns="" xmlns:a16="http://schemas.microsoft.com/office/drawing/2014/main" id="{6B6EABA4-F252-6746-8ED0-EF684C8CADED}"/>
               </a:ext>
             </a:extLst>
           </p:cNvPr>
@@ -12845,7 +12845,7 @@
             <p:cNvPr id="15366" name="Freeform 8" descr="5%">
               <a:extLst>
                 <a:ext uri="{FF2B5EF4-FFF2-40B4-BE49-F238E27FC236}">
-                  <a16:creationId xmlns:a16="http://schemas.microsoft.com/office/drawing/2014/main" xmlns="" id="{58D4CBDD-1133-A449-943D-DD62EB429140}"/>
+                  <a16:creationId xmlns="" xmlns:a16="http://schemas.microsoft.com/office/drawing/2014/main" id="{58D4CBDD-1133-A449-943D-DD62EB429140}"/>
                 </a:ext>
               </a:extLst>
             </p:cNvPr>
@@ -12964,7 +12964,7 @@
             <p:cNvPr id="15367" name="Freeform 9" descr="5%">
               <a:extLst>
                 <a:ext uri="{FF2B5EF4-FFF2-40B4-BE49-F238E27FC236}">
-                  <a16:creationId xmlns:a16="http://schemas.microsoft.com/office/drawing/2014/main" xmlns="" id="{8C6EC880-9B1D-F447-9A6B-3F9B0AE3929D}"/>
+                  <a16:creationId xmlns="" xmlns:a16="http://schemas.microsoft.com/office/drawing/2014/main" id="{8C6EC880-9B1D-F447-9A6B-3F9B0AE3929D}"/>
                 </a:ext>
               </a:extLst>
             </p:cNvPr>
@@ -13083,7 +13083,7 @@
             <p:cNvPr id="15368" name="Freeform 10" descr="5%">
               <a:extLst>
                 <a:ext uri="{FF2B5EF4-FFF2-40B4-BE49-F238E27FC236}">
-                  <a16:creationId xmlns:a16="http://schemas.microsoft.com/office/drawing/2014/main" xmlns="" id="{1085577F-A61A-C647-B1BB-3EC24D1EF570}"/>
+                  <a16:creationId xmlns="" xmlns:a16="http://schemas.microsoft.com/office/drawing/2014/main" id="{1085577F-A61A-C647-B1BB-3EC24D1EF570}"/>
                 </a:ext>
               </a:extLst>
             </p:cNvPr>
@@ -13202,7 +13202,7 @@
             <p:cNvPr id="15369" name="Freeform 11" descr="5%">
               <a:extLst>
                 <a:ext uri="{FF2B5EF4-FFF2-40B4-BE49-F238E27FC236}">
-                  <a16:creationId xmlns:a16="http://schemas.microsoft.com/office/drawing/2014/main" xmlns="" id="{42171880-3EF9-BD46-B394-72256EDB9F85}"/>
+                  <a16:creationId xmlns="" xmlns:a16="http://schemas.microsoft.com/office/drawing/2014/main" id="{42171880-3EF9-BD46-B394-72256EDB9F85}"/>
                 </a:ext>
               </a:extLst>
             </p:cNvPr>
@@ -13321,7 +13321,7 @@
             <p:cNvPr id="15370" name="Freeform 12" descr="5%">
               <a:extLst>
                 <a:ext uri="{FF2B5EF4-FFF2-40B4-BE49-F238E27FC236}">
-                  <a16:creationId xmlns:a16="http://schemas.microsoft.com/office/drawing/2014/main" xmlns="" id="{4F9B3D7C-E1D0-FB44-B206-F2BECC14B1CD}"/>
+                  <a16:creationId xmlns="" xmlns:a16="http://schemas.microsoft.com/office/drawing/2014/main" id="{4F9B3D7C-E1D0-FB44-B206-F2BECC14B1CD}"/>
                 </a:ext>
               </a:extLst>
             </p:cNvPr>
@@ -13440,7 +13440,7 @@
             <p:cNvPr id="15371" name="Freeform 13" descr="5%">
               <a:extLst>
                 <a:ext uri="{FF2B5EF4-FFF2-40B4-BE49-F238E27FC236}">
-                  <a16:creationId xmlns:a16="http://schemas.microsoft.com/office/drawing/2014/main" xmlns="" id="{A24C0792-FA25-B748-886A-35F5ACA408AE}"/>
+                  <a16:creationId xmlns="" xmlns:a16="http://schemas.microsoft.com/office/drawing/2014/main" id="{A24C0792-FA25-B748-886A-35F5ACA408AE}"/>
                 </a:ext>
               </a:extLst>
             </p:cNvPr>
@@ -13560,7 +13560,7 @@
           <p:cNvPr id="15362" name="Rectangle 14">
             <a:extLst>
               <a:ext uri="{FF2B5EF4-FFF2-40B4-BE49-F238E27FC236}">
-                <a16:creationId xmlns:a16="http://schemas.microsoft.com/office/drawing/2014/main" xmlns="" id="{C44CDA25-06B2-4046-B1AC-A83281A09170}"/>
+                <a16:creationId xmlns="" xmlns:a16="http://schemas.microsoft.com/office/drawing/2014/main" id="{C44CDA25-06B2-4046-B1AC-A83281A09170}"/>
               </a:ext>
             </a:extLst>
           </p:cNvPr>
@@ -13759,7 +13759,7 @@
           <p:cNvPr id="15363" name="Rectangle 15">
             <a:extLst>
               <a:ext uri="{FF2B5EF4-FFF2-40B4-BE49-F238E27FC236}">
-                <a16:creationId xmlns:a16="http://schemas.microsoft.com/office/drawing/2014/main" xmlns="" id="{68AF690E-04A9-5542-820D-442B8473CB9D}"/>
+                <a16:creationId xmlns="" xmlns:a16="http://schemas.microsoft.com/office/drawing/2014/main" id="{68AF690E-04A9-5542-820D-442B8473CB9D}"/>
               </a:ext>
             </a:extLst>
           </p:cNvPr>
@@ -14030,7 +14030,7 @@
           <p:cNvPr id="15364" name="Freeform 17">
             <a:extLst>
               <a:ext uri="{FF2B5EF4-FFF2-40B4-BE49-F238E27FC236}">
-                <a16:creationId xmlns:a16="http://schemas.microsoft.com/office/drawing/2014/main" xmlns="" id="{ACB45F95-1541-4E4A-A55E-D838EEDC1698}"/>
+                <a16:creationId xmlns="" xmlns:a16="http://schemas.microsoft.com/office/drawing/2014/main" id="{ACB45F95-1541-4E4A-A55E-D838EEDC1698}"/>
               </a:ext>
             </a:extLst>
           </p:cNvPr>
@@ -14145,7 +14145,7 @@
           <p:cNvPr id="15365" name="17 Imagen">
             <a:extLst>
               <a:ext uri="{FF2B5EF4-FFF2-40B4-BE49-F238E27FC236}">
-                <a16:creationId xmlns:a16="http://schemas.microsoft.com/office/drawing/2014/main" xmlns="" id="{794BF391-464F-5548-8F2D-BF964DF6B303}"/>
+                <a16:creationId xmlns="" xmlns:a16="http://schemas.microsoft.com/office/drawing/2014/main" id="{794BF391-464F-5548-8F2D-BF964DF6B303}"/>
               </a:ext>
             </a:extLst>
           </p:cNvPr>
@@ -14267,7 +14267,7 @@
           <p:cNvPr id="5" name="Rectangle 14">
             <a:extLst>
               <a:ext uri="{FF2B5EF4-FFF2-40B4-BE49-F238E27FC236}">
-                <a16:creationId xmlns:a16="http://schemas.microsoft.com/office/drawing/2014/main" xmlns="" id="{3665E0D4-68DF-7A4B-92E0-B652D965824C}"/>
+                <a16:creationId xmlns="" xmlns:a16="http://schemas.microsoft.com/office/drawing/2014/main" id="{3665E0D4-68DF-7A4B-92E0-B652D965824C}"/>
               </a:ext>
             </a:extLst>
           </p:cNvPr>
@@ -14556,7 +14556,7 @@
           <p:cNvPr id="5" name="Rectangle 14">
             <a:extLst>
               <a:ext uri="{FF2B5EF4-FFF2-40B4-BE49-F238E27FC236}">
-                <a16:creationId xmlns:a16="http://schemas.microsoft.com/office/drawing/2014/main" xmlns="" id="{3665E0D4-68DF-7A4B-92E0-B652D965824C}"/>
+                <a16:creationId xmlns="" xmlns:a16="http://schemas.microsoft.com/office/drawing/2014/main" id="{3665E0D4-68DF-7A4B-92E0-B652D965824C}"/>
               </a:ext>
             </a:extLst>
           </p:cNvPr>
@@ -14875,7 +14875,7 @@
           <p:cNvPr id="16385" name="Rectangle 14">
             <a:extLst>
               <a:ext uri="{FF2B5EF4-FFF2-40B4-BE49-F238E27FC236}">
-                <a16:creationId xmlns:a16="http://schemas.microsoft.com/office/drawing/2014/main" xmlns="" id="{3665E0D4-68DF-7A4B-92E0-B652D965824C}"/>
+                <a16:creationId xmlns="" xmlns:a16="http://schemas.microsoft.com/office/drawing/2014/main" id="{3665E0D4-68DF-7A4B-92E0-B652D965824C}"/>
               </a:ext>
             </a:extLst>
           </p:cNvPr>
@@ -15074,6 +15074,30 @@
           </a:p>
         </p:txBody>
       </p:sp>
+      <p:pic>
+        <p:nvPicPr>
+          <p:cNvPr id="2" name="Imagen 1"/>
+          <p:cNvPicPr>
+            <a:picLocks noChangeAspect="1"/>
+          </p:cNvPicPr>
+          <p:nvPr/>
+        </p:nvPicPr>
+        <p:blipFill>
+          <a:blip r:embed="rId3"/>
+          <a:stretch>
+            <a:fillRect/>
+          </a:stretch>
+        </p:blipFill>
+        <p:spPr>
+          <a:xfrm>
+            <a:off x="0" y="682638"/>
+            <a:ext cx="9144000" cy="5492723"/>
+          </a:xfrm>
+          <a:prstGeom prst="rect">
+            <a:avLst/>
+          </a:prstGeom>
+        </p:spPr>
+      </p:pic>
     </p:spTree>
     <p:extLst>
       <p:ext uri="{BB962C8B-B14F-4D97-AF65-F5344CB8AC3E}">
@@ -15116,7 +15140,7 @@
           <p:cNvPr id="31745" name="Picture 2" descr="Estrategias de marketing digital a través de preguntas clave">
             <a:extLst>
               <a:ext uri="{FF2B5EF4-FFF2-40B4-BE49-F238E27FC236}">
-                <a16:creationId xmlns:a16="http://schemas.microsoft.com/office/drawing/2014/main" xmlns="" id="{66CEA66D-E15C-C847-9B2A-032EF58E0B53}"/>
+                <a16:creationId xmlns="" xmlns:a16="http://schemas.microsoft.com/office/drawing/2014/main" id="{66CEA66D-E15C-C847-9B2A-032EF58E0B53}"/>
               </a:ext>
             </a:extLst>
           </p:cNvPr>
@@ -15176,7 +15200,7 @@
           <p:cNvPr id="31746" name="CuadroTexto 1">
             <a:extLst>
               <a:ext uri="{FF2B5EF4-FFF2-40B4-BE49-F238E27FC236}">
-                <a16:creationId xmlns:a16="http://schemas.microsoft.com/office/drawing/2014/main" xmlns="" id="{FD239F26-72A2-444A-9FA1-740091578B02}"/>
+                <a16:creationId xmlns="" xmlns:a16="http://schemas.microsoft.com/office/drawing/2014/main" id="{FD239F26-72A2-444A-9FA1-740091578B02}"/>
               </a:ext>
             </a:extLst>
           </p:cNvPr>
@@ -15332,7 +15356,7 @@
           <p:cNvPr id="31747" name="Group 22">
             <a:extLst>
               <a:ext uri="{FF2B5EF4-FFF2-40B4-BE49-F238E27FC236}">
-                <a16:creationId xmlns:a16="http://schemas.microsoft.com/office/drawing/2014/main" xmlns="" id="{A3D2F5D2-D269-504A-B84C-C6061FCA57AD}"/>
+                <a16:creationId xmlns="" xmlns:a16="http://schemas.microsoft.com/office/drawing/2014/main" id="{A3D2F5D2-D269-504A-B84C-C6061FCA57AD}"/>
               </a:ext>
             </a:extLst>
           </p:cNvPr>
@@ -15354,7 +15378,7 @@
             <p:cNvPr id="31751" name="Freeform 8" descr="5%">
               <a:extLst>
                 <a:ext uri="{FF2B5EF4-FFF2-40B4-BE49-F238E27FC236}">
-                  <a16:creationId xmlns:a16="http://schemas.microsoft.com/office/drawing/2014/main" xmlns="" id="{949389A0-7C35-D440-A511-E8043CC49841}"/>
+                  <a16:creationId xmlns="" xmlns:a16="http://schemas.microsoft.com/office/drawing/2014/main" id="{949389A0-7C35-D440-A511-E8043CC49841}"/>
                 </a:ext>
               </a:extLst>
             </p:cNvPr>
@@ -15473,7 +15497,7 @@
             <p:cNvPr id="31752" name="Freeform 9" descr="5%">
               <a:extLst>
                 <a:ext uri="{FF2B5EF4-FFF2-40B4-BE49-F238E27FC236}">
-                  <a16:creationId xmlns:a16="http://schemas.microsoft.com/office/drawing/2014/main" xmlns="" id="{06CE39B2-5F93-C74A-AAF4-A1377571A4EA}"/>
+                  <a16:creationId xmlns="" xmlns:a16="http://schemas.microsoft.com/office/drawing/2014/main" id="{06CE39B2-5F93-C74A-AAF4-A1377571A4EA}"/>
                 </a:ext>
               </a:extLst>
             </p:cNvPr>
@@ -15592,7 +15616,7 @@
             <p:cNvPr id="31753" name="Freeform 10" descr="5%">
               <a:extLst>
                 <a:ext uri="{FF2B5EF4-FFF2-40B4-BE49-F238E27FC236}">
-                  <a16:creationId xmlns:a16="http://schemas.microsoft.com/office/drawing/2014/main" xmlns="" id="{C97A05CA-BA23-5B43-BB1D-598E35F33716}"/>
+                  <a16:creationId xmlns="" xmlns:a16="http://schemas.microsoft.com/office/drawing/2014/main" id="{C97A05CA-BA23-5B43-BB1D-598E35F33716}"/>
                 </a:ext>
               </a:extLst>
             </p:cNvPr>
@@ -15711,7 +15735,7 @@
             <p:cNvPr id="31754" name="Freeform 11" descr="5%">
               <a:extLst>
                 <a:ext uri="{FF2B5EF4-FFF2-40B4-BE49-F238E27FC236}">
-                  <a16:creationId xmlns:a16="http://schemas.microsoft.com/office/drawing/2014/main" xmlns="" id="{2B84887D-7D31-644A-9461-B0EF770AB71C}"/>
+                  <a16:creationId xmlns="" xmlns:a16="http://schemas.microsoft.com/office/drawing/2014/main" id="{2B84887D-7D31-644A-9461-B0EF770AB71C}"/>
                 </a:ext>
               </a:extLst>
             </p:cNvPr>
@@ -15830,7 +15854,7 @@
             <p:cNvPr id="31755" name="Freeform 12" descr="5%">
               <a:extLst>
                 <a:ext uri="{FF2B5EF4-FFF2-40B4-BE49-F238E27FC236}">
-                  <a16:creationId xmlns:a16="http://schemas.microsoft.com/office/drawing/2014/main" xmlns="" id="{66D9D94A-DB3D-9246-8945-18F31C431B30}"/>
+                  <a16:creationId xmlns="" xmlns:a16="http://schemas.microsoft.com/office/drawing/2014/main" id="{66D9D94A-DB3D-9246-8945-18F31C431B30}"/>
                 </a:ext>
               </a:extLst>
             </p:cNvPr>
@@ -15949,7 +15973,7 @@
             <p:cNvPr id="31756" name="Freeform 13" descr="5%">
               <a:extLst>
                 <a:ext uri="{FF2B5EF4-FFF2-40B4-BE49-F238E27FC236}">
-                  <a16:creationId xmlns:a16="http://schemas.microsoft.com/office/drawing/2014/main" xmlns="" id="{EAD71A5A-2B41-2E4C-B00A-6C190547D1ED}"/>
+                  <a16:creationId xmlns="" xmlns:a16="http://schemas.microsoft.com/office/drawing/2014/main" id="{EAD71A5A-2B41-2E4C-B00A-6C190547D1ED}"/>
                 </a:ext>
               </a:extLst>
             </p:cNvPr>
@@ -16069,7 +16093,7 @@
           <p:cNvPr id="31748" name="Freeform 17">
             <a:extLst>
               <a:ext uri="{FF2B5EF4-FFF2-40B4-BE49-F238E27FC236}">
-                <a16:creationId xmlns:a16="http://schemas.microsoft.com/office/drawing/2014/main" xmlns="" id="{7F1EC75B-5B06-4F42-A007-2C7CE755ABBE}"/>
+                <a16:creationId xmlns="" xmlns:a16="http://schemas.microsoft.com/office/drawing/2014/main" id="{7F1EC75B-5B06-4F42-A007-2C7CE755ABBE}"/>
               </a:ext>
             </a:extLst>
           </p:cNvPr>
@@ -16184,7 +16208,7 @@
           <p:cNvPr id="31749" name="17 Imagen">
             <a:extLst>
               <a:ext uri="{FF2B5EF4-FFF2-40B4-BE49-F238E27FC236}">
-                <a16:creationId xmlns:a16="http://schemas.microsoft.com/office/drawing/2014/main" xmlns="" id="{F3812B2B-ED5E-D14C-803D-3858F435CB5E}"/>
+                <a16:creationId xmlns="" xmlns:a16="http://schemas.microsoft.com/office/drawing/2014/main" id="{F3812B2B-ED5E-D14C-803D-3858F435CB5E}"/>
               </a:ext>
             </a:extLst>
           </p:cNvPr>
@@ -16244,7 +16268,7 @@
           <p:cNvPr id="31750" name="Imagen 15">
             <a:extLst>
               <a:ext uri="{FF2B5EF4-FFF2-40B4-BE49-F238E27FC236}">
-                <a16:creationId xmlns:a16="http://schemas.microsoft.com/office/drawing/2014/main" xmlns="" id="{41854531-9AB6-5240-8FAD-0DA24A1221E5}"/>
+                <a16:creationId xmlns="" xmlns:a16="http://schemas.microsoft.com/office/drawing/2014/main" id="{41854531-9AB6-5240-8FAD-0DA24A1221E5}"/>
               </a:ext>
             </a:extLst>
           </p:cNvPr>
@@ -16336,7 +16360,7 @@
           <p:cNvPr id="16385" name="Rectangle 14">
             <a:extLst>
               <a:ext uri="{FF2B5EF4-FFF2-40B4-BE49-F238E27FC236}">
-                <a16:creationId xmlns:a16="http://schemas.microsoft.com/office/drawing/2014/main" xmlns="" id="{3665E0D4-68DF-7A4B-92E0-B652D965824C}"/>
+                <a16:creationId xmlns="" xmlns:a16="http://schemas.microsoft.com/office/drawing/2014/main" id="{3665E0D4-68DF-7A4B-92E0-B652D965824C}"/>
               </a:ext>
             </a:extLst>
           </p:cNvPr>
@@ -16601,7 +16625,7 @@
           <p:cNvPr id="16385" name="Rectangle 14">
             <a:extLst>
               <a:ext uri="{FF2B5EF4-FFF2-40B4-BE49-F238E27FC236}">
-                <a16:creationId xmlns:a16="http://schemas.microsoft.com/office/drawing/2014/main" xmlns="" id="{3665E0D4-68DF-7A4B-92E0-B652D965824C}"/>
+                <a16:creationId xmlns="" xmlns:a16="http://schemas.microsoft.com/office/drawing/2014/main" id="{3665E0D4-68DF-7A4B-92E0-B652D965824C}"/>
               </a:ext>
             </a:extLst>
           </p:cNvPr>
@@ -16923,7 +16947,7 @@
           <p:cNvPr id="16385" name="Rectangle 14">
             <a:extLst>
               <a:ext uri="{FF2B5EF4-FFF2-40B4-BE49-F238E27FC236}">
-                <a16:creationId xmlns:a16="http://schemas.microsoft.com/office/drawing/2014/main" xmlns="" id="{3665E0D4-68DF-7A4B-92E0-B652D965824C}"/>
+                <a16:creationId xmlns="" xmlns:a16="http://schemas.microsoft.com/office/drawing/2014/main" id="{3665E0D4-68DF-7A4B-92E0-B652D965824C}"/>
               </a:ext>
             </a:extLst>
           </p:cNvPr>
@@ -17188,7 +17212,7 @@
           <p:cNvPr id="16385" name="Rectangle 14">
             <a:extLst>
               <a:ext uri="{FF2B5EF4-FFF2-40B4-BE49-F238E27FC236}">
-                <a16:creationId xmlns:a16="http://schemas.microsoft.com/office/drawing/2014/main" xmlns="" id="{3665E0D4-68DF-7A4B-92E0-B652D965824C}"/>
+                <a16:creationId xmlns="" xmlns:a16="http://schemas.microsoft.com/office/drawing/2014/main" id="{3665E0D4-68DF-7A4B-92E0-B652D965824C}"/>
               </a:ext>
             </a:extLst>
           </p:cNvPr>
@@ -17469,7 +17493,7 @@
           <p:cNvPr id="16385" name="Rectangle 14">
             <a:extLst>
               <a:ext uri="{FF2B5EF4-FFF2-40B4-BE49-F238E27FC236}">
-                <a16:creationId xmlns:a16="http://schemas.microsoft.com/office/drawing/2014/main" xmlns="" id="{3665E0D4-68DF-7A4B-92E0-B652D965824C}"/>
+                <a16:creationId xmlns="" xmlns:a16="http://schemas.microsoft.com/office/drawing/2014/main" id="{3665E0D4-68DF-7A4B-92E0-B652D965824C}"/>
               </a:ext>
             </a:extLst>
           </p:cNvPr>
@@ -17750,7 +17774,7 @@
           <p:cNvPr id="16385" name="Rectangle 14">
             <a:extLst>
               <a:ext uri="{FF2B5EF4-FFF2-40B4-BE49-F238E27FC236}">
-                <a16:creationId xmlns:a16="http://schemas.microsoft.com/office/drawing/2014/main" xmlns="" id="{3665E0D4-68DF-7A4B-92E0-B652D965824C}"/>
+                <a16:creationId xmlns="" xmlns:a16="http://schemas.microsoft.com/office/drawing/2014/main" id="{3665E0D4-68DF-7A4B-92E0-B652D965824C}"/>
               </a:ext>
             </a:extLst>
           </p:cNvPr>
@@ -18031,7 +18055,7 @@
           <p:cNvPr id="16385" name="Rectangle 14">
             <a:extLst>
               <a:ext uri="{FF2B5EF4-FFF2-40B4-BE49-F238E27FC236}">
-                <a16:creationId xmlns:a16="http://schemas.microsoft.com/office/drawing/2014/main" xmlns="" id="{3665E0D4-68DF-7A4B-92E0-B652D965824C}"/>
+                <a16:creationId xmlns="" xmlns:a16="http://schemas.microsoft.com/office/drawing/2014/main" id="{3665E0D4-68DF-7A4B-92E0-B652D965824C}"/>
               </a:ext>
             </a:extLst>
           </p:cNvPr>

</xml_diff>

<commit_message>
Presentación ERS AGNEX actualizado el 17/05/2019
</commit_message>
<xml_diff>
--- a/ERS/Presentación_ERS_AGNEX.pptx
+++ b/ERS/Presentación_ERS_AGNEX.pptx
@@ -14,8 +14,8 @@
     <p:sldId id="257" r:id="rId2"/>
     <p:sldId id="256" r:id="rId3"/>
     <p:sldId id="275" r:id="rId4"/>
-    <p:sldId id="289" r:id="rId5"/>
-    <p:sldId id="274" r:id="rId6"/>
+    <p:sldId id="274" r:id="rId5"/>
+    <p:sldId id="289" r:id="rId6"/>
     <p:sldId id="276" r:id="rId7"/>
     <p:sldId id="290" r:id="rId8"/>
     <p:sldId id="291" r:id="rId9"/>
@@ -221,6 +221,7 @@
           </a:p>
         </c:rich>
       </c:tx>
+      <c:layout/>
       <c:overlay val="0"/>
       <c:spPr>
         <a:noFill/>
@@ -465,6 +466,7 @@
               <c:showBubbleSize val="0"/>
               <c:extLst>
                 <c:ext xmlns:c15="http://schemas.microsoft.com/office/drawing/2012/chart" uri="{CE6537A1-D6FC-4f65-9D91-7224C49458BB}">
+                  <c15:layout/>
                   <c15:dlblFieldTable/>
                   <c15:showDataLabelsRange val="0"/>
                 </c:ext>
@@ -572,6 +574,7 @@
               <c:showBubbleSize val="0"/>
               <c:extLst>
                 <c:ext xmlns:c15="http://schemas.microsoft.com/office/drawing/2012/chart" uri="{CE6537A1-D6FC-4f65-9D91-7224C49458BB}">
+                  <c15:layout/>
                   <c15:dlblFieldTable/>
                   <c15:showDataLabelsRange val="0"/>
                 </c:ext>
@@ -1318,7 +1321,7 @@
           <p:cNvPr id="4098" name="Rectangle 2">
             <a:extLst>
               <a:ext uri="{FF2B5EF4-FFF2-40B4-BE49-F238E27FC236}">
-                <a16:creationId xmlns="" xmlns:a16="http://schemas.microsoft.com/office/drawing/2014/main" id="{7301BB8C-2DAA-A145-A2E1-B3649391EB9D}"/>
+                <a16:creationId xmlns:a16="http://schemas.microsoft.com/office/drawing/2014/main" xmlns="" id="{7301BB8C-2DAA-A145-A2E1-B3649391EB9D}"/>
               </a:ext>
             </a:extLst>
           </p:cNvPr>
@@ -1397,7 +1400,7 @@
           <p:cNvPr id="4099" name="Rectangle 3">
             <a:extLst>
               <a:ext uri="{FF2B5EF4-FFF2-40B4-BE49-F238E27FC236}">
-                <a16:creationId xmlns="" xmlns:a16="http://schemas.microsoft.com/office/drawing/2014/main" id="{72CDE936-7795-C144-AA9F-F05C2D88ED26}"/>
+                <a16:creationId xmlns:a16="http://schemas.microsoft.com/office/drawing/2014/main" xmlns="" id="{72CDE936-7795-C144-AA9F-F05C2D88ED26}"/>
               </a:ext>
             </a:extLst>
           </p:cNvPr>
@@ -1476,7 +1479,7 @@
           <p:cNvPr id="4100" name="Rectangle 4">
             <a:extLst>
               <a:ext uri="{FF2B5EF4-FFF2-40B4-BE49-F238E27FC236}">
-                <a16:creationId xmlns="" xmlns:a16="http://schemas.microsoft.com/office/drawing/2014/main" id="{9AB55F1A-30B5-BC47-9796-90A499593F42}"/>
+                <a16:creationId xmlns:a16="http://schemas.microsoft.com/office/drawing/2014/main" xmlns="" id="{9AB55F1A-30B5-BC47-9796-90A499593F42}"/>
               </a:ext>
             </a:extLst>
           </p:cNvPr>
@@ -1555,7 +1558,7 @@
           <p:cNvPr id="4101" name="Rectangle 5">
             <a:extLst>
               <a:ext uri="{FF2B5EF4-FFF2-40B4-BE49-F238E27FC236}">
-                <a16:creationId xmlns="" xmlns:a16="http://schemas.microsoft.com/office/drawing/2014/main" id="{80B3278C-0CD4-4444-96FD-21D07B4629DB}"/>
+                <a16:creationId xmlns:a16="http://schemas.microsoft.com/office/drawing/2014/main" xmlns="" id="{80B3278C-0CD4-4444-96FD-21D07B4629DB}"/>
               </a:ext>
             </a:extLst>
           </p:cNvPr>
@@ -1675,7 +1678,7 @@
           <p:cNvPr id="2" name="Marcador de encabezado 1">
             <a:extLst>
               <a:ext uri="{FF2B5EF4-FFF2-40B4-BE49-F238E27FC236}">
-                <a16:creationId xmlns="" xmlns:a16="http://schemas.microsoft.com/office/drawing/2014/main" id="{190B05B0-4CD7-8548-B284-31056CA4D3C6}"/>
+                <a16:creationId xmlns:a16="http://schemas.microsoft.com/office/drawing/2014/main" xmlns="" id="{190B05B0-4CD7-8548-B284-31056CA4D3C6}"/>
               </a:ext>
             </a:extLst>
           </p:cNvPr>
@@ -1715,7 +1718,7 @@
           <p:cNvPr id="3" name="Marcador de fecha 2">
             <a:extLst>
               <a:ext uri="{FF2B5EF4-FFF2-40B4-BE49-F238E27FC236}">
-                <a16:creationId xmlns="" xmlns:a16="http://schemas.microsoft.com/office/drawing/2014/main" id="{7A4EB724-2211-3A4B-939D-AE5040DB6E11}"/>
+                <a16:creationId xmlns:a16="http://schemas.microsoft.com/office/drawing/2014/main" xmlns="" id="{7A4EB724-2211-3A4B-939D-AE5040DB6E11}"/>
               </a:ext>
             </a:extLst>
           </p:cNvPr>
@@ -1751,7 +1754,7 @@
               <a:pPr>
                 <a:defRPr/>
               </a:pPr>
-              <a:t>16/05/2019</a:t>
+              <a:t>17/05/2019</a:t>
             </a:fld>
             <a:endParaRPr lang="es-ES"/>
           </a:p>
@@ -1762,7 +1765,7 @@
           <p:cNvPr id="4" name="Marcador de imagen de diapositiva 3">
             <a:extLst>
               <a:ext uri="{FF2B5EF4-FFF2-40B4-BE49-F238E27FC236}">
-                <a16:creationId xmlns="" xmlns:a16="http://schemas.microsoft.com/office/drawing/2014/main" id="{22BB66D7-F3E6-C442-94E8-C510FB352E0F}"/>
+                <a16:creationId xmlns:a16="http://schemas.microsoft.com/office/drawing/2014/main" xmlns="" id="{22BB66D7-F3E6-C442-94E8-C510FB352E0F}"/>
               </a:ext>
             </a:extLst>
           </p:cNvPr>
@@ -1802,7 +1805,7 @@
           <p:cNvPr id="5" name="Marcador de notas 4">
             <a:extLst>
               <a:ext uri="{FF2B5EF4-FFF2-40B4-BE49-F238E27FC236}">
-                <a16:creationId xmlns="" xmlns:a16="http://schemas.microsoft.com/office/drawing/2014/main" id="{A351D1A5-7E45-9F4C-B5F9-050AF4E79E01}"/>
+                <a16:creationId xmlns:a16="http://schemas.microsoft.com/office/drawing/2014/main" xmlns="" id="{A351D1A5-7E45-9F4C-B5F9-050AF4E79E01}"/>
               </a:ext>
             </a:extLst>
           </p:cNvPr>
@@ -1867,7 +1870,7 @@
           <p:cNvPr id="6" name="Marcador de pie de página 5">
             <a:extLst>
               <a:ext uri="{FF2B5EF4-FFF2-40B4-BE49-F238E27FC236}">
-                <a16:creationId xmlns="" xmlns:a16="http://schemas.microsoft.com/office/drawing/2014/main" id="{CDDA647B-9900-A042-837C-C5F3F92D9812}"/>
+                <a16:creationId xmlns:a16="http://schemas.microsoft.com/office/drawing/2014/main" xmlns="" id="{CDDA647B-9900-A042-837C-C5F3F92D9812}"/>
               </a:ext>
             </a:extLst>
           </p:cNvPr>
@@ -1907,7 +1910,7 @@
           <p:cNvPr id="7" name="Marcador de número de diapositiva 6">
             <a:extLst>
               <a:ext uri="{FF2B5EF4-FFF2-40B4-BE49-F238E27FC236}">
-                <a16:creationId xmlns="" xmlns:a16="http://schemas.microsoft.com/office/drawing/2014/main" id="{0038CB9D-584B-684A-BCE7-8A280ECEC657}"/>
+                <a16:creationId xmlns:a16="http://schemas.microsoft.com/office/drawing/2014/main" xmlns="" id="{0038CB9D-584B-684A-BCE7-8A280ECEC657}"/>
               </a:ext>
             </a:extLst>
           </p:cNvPr>
@@ -2104,7 +2107,7 @@
           <p:cNvPr id="34817" name="Marcador de imagen de diapositiva 1">
             <a:extLst>
               <a:ext uri="{FF2B5EF4-FFF2-40B4-BE49-F238E27FC236}">
-                <a16:creationId xmlns="" xmlns:a16="http://schemas.microsoft.com/office/drawing/2014/main" id="{88E98E05-8FFB-EB42-9121-DD91BA564333}"/>
+                <a16:creationId xmlns:a16="http://schemas.microsoft.com/office/drawing/2014/main" xmlns="" id="{88E98E05-8FFB-EB42-9121-DD91BA564333}"/>
               </a:ext>
             </a:extLst>
           </p:cNvPr>
@@ -2141,7 +2144,7 @@
           <p:cNvPr id="34818" name="Marcador de notas 2">
             <a:extLst>
               <a:ext uri="{FF2B5EF4-FFF2-40B4-BE49-F238E27FC236}">
-                <a16:creationId xmlns="" xmlns:a16="http://schemas.microsoft.com/office/drawing/2014/main" id="{55AB1F2A-96D9-5D4E-BB02-59C8DC05CBE4}"/>
+                <a16:creationId xmlns:a16="http://schemas.microsoft.com/office/drawing/2014/main" xmlns="" id="{55AB1F2A-96D9-5D4E-BB02-59C8DC05CBE4}"/>
               </a:ext>
             </a:extLst>
           </p:cNvPr>
@@ -2196,7 +2199,7 @@
           <p:cNvPr id="34819" name="Marcador de número de diapositiva 3">
             <a:extLst>
               <a:ext uri="{FF2B5EF4-FFF2-40B4-BE49-F238E27FC236}">
-                <a16:creationId xmlns="" xmlns:a16="http://schemas.microsoft.com/office/drawing/2014/main" id="{157EE0C8-B05F-AA41-A446-5E3DE14108EB}"/>
+                <a16:creationId xmlns:a16="http://schemas.microsoft.com/office/drawing/2014/main" xmlns="" id="{157EE0C8-B05F-AA41-A446-5E3DE14108EB}"/>
               </a:ext>
             </a:extLst>
           </p:cNvPr>
@@ -3606,7 +3609,7 @@
     </p:spTree>
     <p:extLst>
       <p:ext uri="{BB962C8B-B14F-4D97-AF65-F5344CB8AC3E}">
-        <p14:creationId xmlns:p14="http://schemas.microsoft.com/office/powerpoint/2010/main" val="1644037106"/>
+        <p14:creationId xmlns:p14="http://schemas.microsoft.com/office/powerpoint/2010/main" val="547142110"/>
       </p:ext>
     </p:extLst>
   </p:cSld>
@@ -3696,7 +3699,7 @@
     </p:spTree>
     <p:extLst>
       <p:ext uri="{BB962C8B-B14F-4D97-AF65-F5344CB8AC3E}">
-        <p14:creationId xmlns:p14="http://schemas.microsoft.com/office/powerpoint/2010/main" val="547142110"/>
+        <p14:creationId xmlns:p14="http://schemas.microsoft.com/office/powerpoint/2010/main" val="1644037106"/>
       </p:ext>
     </p:extLst>
   </p:cSld>
@@ -4269,7 +4272,7 @@
           <p:cNvPr id="4" name="Rectangle 4">
             <a:extLst>
               <a:ext uri="{FF2B5EF4-FFF2-40B4-BE49-F238E27FC236}">
-                <a16:creationId xmlns="" xmlns:a16="http://schemas.microsoft.com/office/drawing/2014/main" id="{CBFFC4FF-25B6-2F41-87F3-D1F3AFF4FBEB}"/>
+                <a16:creationId xmlns:a16="http://schemas.microsoft.com/office/drawing/2014/main" xmlns="" id="{CBFFC4FF-25B6-2F41-87F3-D1F3AFF4FBEB}"/>
               </a:ext>
             </a:extLst>
           </p:cNvPr>
@@ -4303,7 +4306,7 @@
           <p:cNvPr id="5" name="Rectangle 5">
             <a:extLst>
               <a:ext uri="{FF2B5EF4-FFF2-40B4-BE49-F238E27FC236}">
-                <a16:creationId xmlns="" xmlns:a16="http://schemas.microsoft.com/office/drawing/2014/main" id="{4C096F85-2FFD-E94B-89F6-2FAB4BAEEE87}"/>
+                <a16:creationId xmlns:a16="http://schemas.microsoft.com/office/drawing/2014/main" xmlns="" id="{4C096F85-2FFD-E94B-89F6-2FAB4BAEEE87}"/>
               </a:ext>
             </a:extLst>
           </p:cNvPr>
@@ -4337,7 +4340,7 @@
           <p:cNvPr id="6" name="Rectangle 6">
             <a:extLst>
               <a:ext uri="{FF2B5EF4-FFF2-40B4-BE49-F238E27FC236}">
-                <a16:creationId xmlns="" xmlns:a16="http://schemas.microsoft.com/office/drawing/2014/main" id="{2796106F-EEB2-E64A-9116-AAFF62318609}"/>
+                <a16:creationId xmlns:a16="http://schemas.microsoft.com/office/drawing/2014/main" xmlns="" id="{2796106F-EEB2-E64A-9116-AAFF62318609}"/>
               </a:ext>
             </a:extLst>
           </p:cNvPr>
@@ -4481,7 +4484,7 @@
           <p:cNvPr id="4" name="Rectangle 4">
             <a:extLst>
               <a:ext uri="{FF2B5EF4-FFF2-40B4-BE49-F238E27FC236}">
-                <a16:creationId xmlns="" xmlns:a16="http://schemas.microsoft.com/office/drawing/2014/main" id="{6A32BADE-F659-5046-B660-D70E5FD5A453}"/>
+                <a16:creationId xmlns:a16="http://schemas.microsoft.com/office/drawing/2014/main" xmlns="" id="{6A32BADE-F659-5046-B660-D70E5FD5A453}"/>
               </a:ext>
             </a:extLst>
           </p:cNvPr>
@@ -4515,7 +4518,7 @@
           <p:cNvPr id="5" name="Rectangle 5">
             <a:extLst>
               <a:ext uri="{FF2B5EF4-FFF2-40B4-BE49-F238E27FC236}">
-                <a16:creationId xmlns="" xmlns:a16="http://schemas.microsoft.com/office/drawing/2014/main" id="{C6C00947-C3E3-7C43-8F5C-5E0C4CED7300}"/>
+                <a16:creationId xmlns:a16="http://schemas.microsoft.com/office/drawing/2014/main" xmlns="" id="{C6C00947-C3E3-7C43-8F5C-5E0C4CED7300}"/>
               </a:ext>
             </a:extLst>
           </p:cNvPr>
@@ -4549,7 +4552,7 @@
           <p:cNvPr id="6" name="Rectangle 6">
             <a:extLst>
               <a:ext uri="{FF2B5EF4-FFF2-40B4-BE49-F238E27FC236}">
-                <a16:creationId xmlns="" xmlns:a16="http://schemas.microsoft.com/office/drawing/2014/main" id="{9E78E138-D322-AA42-82D7-FC195069F600}"/>
+                <a16:creationId xmlns:a16="http://schemas.microsoft.com/office/drawing/2014/main" xmlns="" id="{9E78E138-D322-AA42-82D7-FC195069F600}"/>
               </a:ext>
             </a:extLst>
           </p:cNvPr>
@@ -4703,7 +4706,7 @@
           <p:cNvPr id="4" name="Rectangle 4">
             <a:extLst>
               <a:ext uri="{FF2B5EF4-FFF2-40B4-BE49-F238E27FC236}">
-                <a16:creationId xmlns="" xmlns:a16="http://schemas.microsoft.com/office/drawing/2014/main" id="{2606C2FE-DFA7-A346-9F08-F601AFC337E9}"/>
+                <a16:creationId xmlns:a16="http://schemas.microsoft.com/office/drawing/2014/main" xmlns="" id="{2606C2FE-DFA7-A346-9F08-F601AFC337E9}"/>
               </a:ext>
             </a:extLst>
           </p:cNvPr>
@@ -4737,7 +4740,7 @@
           <p:cNvPr id="5" name="Rectangle 5">
             <a:extLst>
               <a:ext uri="{FF2B5EF4-FFF2-40B4-BE49-F238E27FC236}">
-                <a16:creationId xmlns="" xmlns:a16="http://schemas.microsoft.com/office/drawing/2014/main" id="{68BD24F8-D24B-B142-862C-4F4ED088CAE0}"/>
+                <a16:creationId xmlns:a16="http://schemas.microsoft.com/office/drawing/2014/main" xmlns="" id="{68BD24F8-D24B-B142-862C-4F4ED088CAE0}"/>
               </a:ext>
             </a:extLst>
           </p:cNvPr>
@@ -4771,7 +4774,7 @@
           <p:cNvPr id="6" name="Rectangle 6">
             <a:extLst>
               <a:ext uri="{FF2B5EF4-FFF2-40B4-BE49-F238E27FC236}">
-                <a16:creationId xmlns="" xmlns:a16="http://schemas.microsoft.com/office/drawing/2014/main" id="{DCFFF4C2-EBEB-D74F-9371-02B5A65CD036}"/>
+                <a16:creationId xmlns:a16="http://schemas.microsoft.com/office/drawing/2014/main" xmlns="" id="{DCFFF4C2-EBEB-D74F-9371-02B5A65CD036}"/>
               </a:ext>
             </a:extLst>
           </p:cNvPr>
@@ -4915,7 +4918,7 @@
           <p:cNvPr id="4" name="Rectangle 4">
             <a:extLst>
               <a:ext uri="{FF2B5EF4-FFF2-40B4-BE49-F238E27FC236}">
-                <a16:creationId xmlns="" xmlns:a16="http://schemas.microsoft.com/office/drawing/2014/main" id="{4F77C46A-12C9-8F4B-B36B-A58EA1012DC9}"/>
+                <a16:creationId xmlns:a16="http://schemas.microsoft.com/office/drawing/2014/main" xmlns="" id="{4F77C46A-12C9-8F4B-B36B-A58EA1012DC9}"/>
               </a:ext>
             </a:extLst>
           </p:cNvPr>
@@ -4949,7 +4952,7 @@
           <p:cNvPr id="5" name="Rectangle 5">
             <a:extLst>
               <a:ext uri="{FF2B5EF4-FFF2-40B4-BE49-F238E27FC236}">
-                <a16:creationId xmlns="" xmlns:a16="http://schemas.microsoft.com/office/drawing/2014/main" id="{204124B9-9C00-EF48-B916-2993DE755BBC}"/>
+                <a16:creationId xmlns:a16="http://schemas.microsoft.com/office/drawing/2014/main" xmlns="" id="{204124B9-9C00-EF48-B916-2993DE755BBC}"/>
               </a:ext>
             </a:extLst>
           </p:cNvPr>
@@ -4983,7 +4986,7 @@
           <p:cNvPr id="6" name="Rectangle 6">
             <a:extLst>
               <a:ext uri="{FF2B5EF4-FFF2-40B4-BE49-F238E27FC236}">
-                <a16:creationId xmlns="" xmlns:a16="http://schemas.microsoft.com/office/drawing/2014/main" id="{41557751-8E1D-244A-BE57-51574A96609F}"/>
+                <a16:creationId xmlns:a16="http://schemas.microsoft.com/office/drawing/2014/main" xmlns="" id="{41557751-8E1D-244A-BE57-51574A96609F}"/>
               </a:ext>
             </a:extLst>
           </p:cNvPr>
@@ -5150,7 +5153,7 @@
           <p:cNvPr id="4" name="Rectangle 4">
             <a:extLst>
               <a:ext uri="{FF2B5EF4-FFF2-40B4-BE49-F238E27FC236}">
-                <a16:creationId xmlns="" xmlns:a16="http://schemas.microsoft.com/office/drawing/2014/main" id="{16D5654B-BF22-544B-8EDB-DF8E226254B8}"/>
+                <a16:creationId xmlns:a16="http://schemas.microsoft.com/office/drawing/2014/main" xmlns="" id="{16D5654B-BF22-544B-8EDB-DF8E226254B8}"/>
               </a:ext>
             </a:extLst>
           </p:cNvPr>
@@ -5184,7 +5187,7 @@
           <p:cNvPr id="5" name="Rectangle 5">
             <a:extLst>
               <a:ext uri="{FF2B5EF4-FFF2-40B4-BE49-F238E27FC236}">
-                <a16:creationId xmlns="" xmlns:a16="http://schemas.microsoft.com/office/drawing/2014/main" id="{3F604BB5-E7A1-454E-83DD-045E2E5708A4}"/>
+                <a16:creationId xmlns:a16="http://schemas.microsoft.com/office/drawing/2014/main" xmlns="" id="{3F604BB5-E7A1-454E-83DD-045E2E5708A4}"/>
               </a:ext>
             </a:extLst>
           </p:cNvPr>
@@ -5218,7 +5221,7 @@
           <p:cNvPr id="6" name="Rectangle 6">
             <a:extLst>
               <a:ext uri="{FF2B5EF4-FFF2-40B4-BE49-F238E27FC236}">
-                <a16:creationId xmlns="" xmlns:a16="http://schemas.microsoft.com/office/drawing/2014/main" id="{EE8833F8-39E2-A946-A2E8-E1684A2E68BC}"/>
+                <a16:creationId xmlns:a16="http://schemas.microsoft.com/office/drawing/2014/main" xmlns="" id="{EE8833F8-39E2-A946-A2E8-E1684A2E68BC}"/>
               </a:ext>
             </a:extLst>
           </p:cNvPr>
@@ -5479,7 +5482,7 @@
           <p:cNvPr id="5" name="Rectangle 4">
             <a:extLst>
               <a:ext uri="{FF2B5EF4-FFF2-40B4-BE49-F238E27FC236}">
-                <a16:creationId xmlns="" xmlns:a16="http://schemas.microsoft.com/office/drawing/2014/main" id="{939112DA-065D-444A-B3DF-04650F72011D}"/>
+                <a16:creationId xmlns:a16="http://schemas.microsoft.com/office/drawing/2014/main" xmlns="" id="{939112DA-065D-444A-B3DF-04650F72011D}"/>
               </a:ext>
             </a:extLst>
           </p:cNvPr>
@@ -5513,7 +5516,7 @@
           <p:cNvPr id="6" name="Rectangle 5">
             <a:extLst>
               <a:ext uri="{FF2B5EF4-FFF2-40B4-BE49-F238E27FC236}">
-                <a16:creationId xmlns="" xmlns:a16="http://schemas.microsoft.com/office/drawing/2014/main" id="{290B047B-8D59-A14E-8B66-9459A41AA2F3}"/>
+                <a16:creationId xmlns:a16="http://schemas.microsoft.com/office/drawing/2014/main" xmlns="" id="{290B047B-8D59-A14E-8B66-9459A41AA2F3}"/>
               </a:ext>
             </a:extLst>
           </p:cNvPr>
@@ -5547,7 +5550,7 @@
           <p:cNvPr id="7" name="Rectangle 6">
             <a:extLst>
               <a:ext uri="{FF2B5EF4-FFF2-40B4-BE49-F238E27FC236}">
-                <a16:creationId xmlns="" xmlns:a16="http://schemas.microsoft.com/office/drawing/2014/main" id="{E126F9E9-9A18-884B-9A8E-31F84B8639C6}"/>
+                <a16:creationId xmlns:a16="http://schemas.microsoft.com/office/drawing/2014/main" xmlns="" id="{E126F9E9-9A18-884B-9A8E-31F84B8639C6}"/>
               </a:ext>
             </a:extLst>
           </p:cNvPr>
@@ -5942,7 +5945,7 @@
           <p:cNvPr id="7" name="Rectangle 4">
             <a:extLst>
               <a:ext uri="{FF2B5EF4-FFF2-40B4-BE49-F238E27FC236}">
-                <a16:creationId xmlns="" xmlns:a16="http://schemas.microsoft.com/office/drawing/2014/main" id="{95C4813C-4E1A-F043-B218-C7959682FFE9}"/>
+                <a16:creationId xmlns:a16="http://schemas.microsoft.com/office/drawing/2014/main" xmlns="" id="{95C4813C-4E1A-F043-B218-C7959682FFE9}"/>
               </a:ext>
             </a:extLst>
           </p:cNvPr>
@@ -5976,7 +5979,7 @@
           <p:cNvPr id="8" name="Rectangle 5">
             <a:extLst>
               <a:ext uri="{FF2B5EF4-FFF2-40B4-BE49-F238E27FC236}">
-                <a16:creationId xmlns="" xmlns:a16="http://schemas.microsoft.com/office/drawing/2014/main" id="{E34CED14-F450-6840-BF80-ECBF681228EA}"/>
+                <a16:creationId xmlns:a16="http://schemas.microsoft.com/office/drawing/2014/main" xmlns="" id="{E34CED14-F450-6840-BF80-ECBF681228EA}"/>
               </a:ext>
             </a:extLst>
           </p:cNvPr>
@@ -6010,7 +6013,7 @@
           <p:cNvPr id="9" name="Rectangle 6">
             <a:extLst>
               <a:ext uri="{FF2B5EF4-FFF2-40B4-BE49-F238E27FC236}">
-                <a16:creationId xmlns="" xmlns:a16="http://schemas.microsoft.com/office/drawing/2014/main" id="{7B65E33D-F19F-084E-8228-4BBA25779346}"/>
+                <a16:creationId xmlns:a16="http://schemas.microsoft.com/office/drawing/2014/main" xmlns="" id="{7B65E33D-F19F-084E-8228-4BBA25779346}"/>
               </a:ext>
             </a:extLst>
           </p:cNvPr>
@@ -6103,7 +6106,7 @@
           <p:cNvPr id="3" name="Rectangle 4">
             <a:extLst>
               <a:ext uri="{FF2B5EF4-FFF2-40B4-BE49-F238E27FC236}">
-                <a16:creationId xmlns="" xmlns:a16="http://schemas.microsoft.com/office/drawing/2014/main" id="{F4BC7895-DFEB-4F44-8BC9-BDFF081AF1DD}"/>
+                <a16:creationId xmlns:a16="http://schemas.microsoft.com/office/drawing/2014/main" xmlns="" id="{F4BC7895-DFEB-4F44-8BC9-BDFF081AF1DD}"/>
               </a:ext>
             </a:extLst>
           </p:cNvPr>
@@ -6137,7 +6140,7 @@
           <p:cNvPr id="4" name="Rectangle 5">
             <a:extLst>
               <a:ext uri="{FF2B5EF4-FFF2-40B4-BE49-F238E27FC236}">
-                <a16:creationId xmlns="" xmlns:a16="http://schemas.microsoft.com/office/drawing/2014/main" id="{D39CDA88-E4EE-534A-AA5B-C6D2E7BBC062}"/>
+                <a16:creationId xmlns:a16="http://schemas.microsoft.com/office/drawing/2014/main" xmlns="" id="{D39CDA88-E4EE-534A-AA5B-C6D2E7BBC062}"/>
               </a:ext>
             </a:extLst>
           </p:cNvPr>
@@ -6171,7 +6174,7 @@
           <p:cNvPr id="5" name="Rectangle 6">
             <a:extLst>
               <a:ext uri="{FF2B5EF4-FFF2-40B4-BE49-F238E27FC236}">
-                <a16:creationId xmlns="" xmlns:a16="http://schemas.microsoft.com/office/drawing/2014/main" id="{C9051539-E274-CE43-BB74-3FEEF9E9ADA1}"/>
+                <a16:creationId xmlns:a16="http://schemas.microsoft.com/office/drawing/2014/main" xmlns="" id="{C9051539-E274-CE43-BB74-3FEEF9E9ADA1}"/>
               </a:ext>
             </a:extLst>
           </p:cNvPr>
@@ -6242,7 +6245,7 @@
           <p:cNvPr id="2" name="Group 22">
             <a:extLst>
               <a:ext uri="{FF2B5EF4-FFF2-40B4-BE49-F238E27FC236}">
-                <a16:creationId xmlns="" xmlns:a16="http://schemas.microsoft.com/office/drawing/2014/main" id="{8E84F22A-9706-1E48-B2F1-46BDBDC069B0}"/>
+                <a16:creationId xmlns:a16="http://schemas.microsoft.com/office/drawing/2014/main" xmlns="" id="{8E84F22A-9706-1E48-B2F1-46BDBDC069B0}"/>
               </a:ext>
             </a:extLst>
           </p:cNvPr>
@@ -6264,7 +6267,7 @@
             <p:cNvPr id="3" name="Freeform 8" descr="5%">
               <a:extLst>
                 <a:ext uri="{FF2B5EF4-FFF2-40B4-BE49-F238E27FC236}">
-                  <a16:creationId xmlns="" xmlns:a16="http://schemas.microsoft.com/office/drawing/2014/main" id="{B7039347-F769-F148-A923-1B0BE0ECB77E}"/>
+                  <a16:creationId xmlns:a16="http://schemas.microsoft.com/office/drawing/2014/main" xmlns="" id="{B7039347-F769-F148-A923-1B0BE0ECB77E}"/>
                 </a:ext>
               </a:extLst>
             </p:cNvPr>
@@ -6383,7 +6386,7 @@
             <p:cNvPr id="4" name="Freeform 9" descr="5%">
               <a:extLst>
                 <a:ext uri="{FF2B5EF4-FFF2-40B4-BE49-F238E27FC236}">
-                  <a16:creationId xmlns="" xmlns:a16="http://schemas.microsoft.com/office/drawing/2014/main" id="{6F999DAB-C9D8-8C48-88BC-EB0ACC950367}"/>
+                  <a16:creationId xmlns:a16="http://schemas.microsoft.com/office/drawing/2014/main" xmlns="" id="{6F999DAB-C9D8-8C48-88BC-EB0ACC950367}"/>
                 </a:ext>
               </a:extLst>
             </p:cNvPr>
@@ -6502,7 +6505,7 @@
             <p:cNvPr id="5" name="Freeform 10" descr="5%">
               <a:extLst>
                 <a:ext uri="{FF2B5EF4-FFF2-40B4-BE49-F238E27FC236}">
-                  <a16:creationId xmlns="" xmlns:a16="http://schemas.microsoft.com/office/drawing/2014/main" id="{5ED24D02-9BC2-E545-95E6-3CCD22CF78BA}"/>
+                  <a16:creationId xmlns:a16="http://schemas.microsoft.com/office/drawing/2014/main" xmlns="" id="{5ED24D02-9BC2-E545-95E6-3CCD22CF78BA}"/>
                 </a:ext>
               </a:extLst>
             </p:cNvPr>
@@ -6621,7 +6624,7 @@
             <p:cNvPr id="6" name="Freeform 11" descr="5%">
               <a:extLst>
                 <a:ext uri="{FF2B5EF4-FFF2-40B4-BE49-F238E27FC236}">
-                  <a16:creationId xmlns="" xmlns:a16="http://schemas.microsoft.com/office/drawing/2014/main" id="{2F614782-A419-8043-BC6F-187E134A38CF}"/>
+                  <a16:creationId xmlns:a16="http://schemas.microsoft.com/office/drawing/2014/main" xmlns="" id="{2F614782-A419-8043-BC6F-187E134A38CF}"/>
                 </a:ext>
               </a:extLst>
             </p:cNvPr>
@@ -6740,7 +6743,7 @@
             <p:cNvPr id="7" name="Freeform 12" descr="5%">
               <a:extLst>
                 <a:ext uri="{FF2B5EF4-FFF2-40B4-BE49-F238E27FC236}">
-                  <a16:creationId xmlns="" xmlns:a16="http://schemas.microsoft.com/office/drawing/2014/main" id="{B9D19167-1DB4-3C41-9039-944BB5EED427}"/>
+                  <a16:creationId xmlns:a16="http://schemas.microsoft.com/office/drawing/2014/main" xmlns="" id="{B9D19167-1DB4-3C41-9039-944BB5EED427}"/>
                 </a:ext>
               </a:extLst>
             </p:cNvPr>
@@ -6859,7 +6862,7 @@
             <p:cNvPr id="8" name="Freeform 13" descr="5%">
               <a:extLst>
                 <a:ext uri="{FF2B5EF4-FFF2-40B4-BE49-F238E27FC236}">
-                  <a16:creationId xmlns="" xmlns:a16="http://schemas.microsoft.com/office/drawing/2014/main" id="{B2EAC2A2-D222-CA42-8295-561B5CD74721}"/>
+                  <a16:creationId xmlns:a16="http://schemas.microsoft.com/office/drawing/2014/main" xmlns="" id="{B2EAC2A2-D222-CA42-8295-561B5CD74721}"/>
                 </a:ext>
               </a:extLst>
             </p:cNvPr>
@@ -6979,7 +6982,7 @@
           <p:cNvPr id="9" name="Freeform 17">
             <a:extLst>
               <a:ext uri="{FF2B5EF4-FFF2-40B4-BE49-F238E27FC236}">
-                <a16:creationId xmlns="" xmlns:a16="http://schemas.microsoft.com/office/drawing/2014/main" id="{ADE1301C-82E7-B44E-8823-4ABD8E4996E1}"/>
+                <a16:creationId xmlns:a16="http://schemas.microsoft.com/office/drawing/2014/main" xmlns="" id="{ADE1301C-82E7-B44E-8823-4ABD8E4996E1}"/>
               </a:ext>
             </a:extLst>
           </p:cNvPr>
@@ -7094,7 +7097,7 @@
           <p:cNvPr id="12" name="Rectangle 6">
             <a:extLst>
               <a:ext uri="{FF2B5EF4-FFF2-40B4-BE49-F238E27FC236}">
-                <a16:creationId xmlns="" xmlns:a16="http://schemas.microsoft.com/office/drawing/2014/main" id="{07FA309B-90CD-D54E-AA02-3C668A6BFB51}"/>
+                <a16:creationId xmlns:a16="http://schemas.microsoft.com/office/drawing/2014/main" xmlns="" id="{07FA309B-90CD-D54E-AA02-3C668A6BFB51}"/>
               </a:ext>
             </a:extLst>
           </p:cNvPr>
@@ -7343,7 +7346,7 @@
           <p:cNvPr id="5" name="Rectangle 4">
             <a:extLst>
               <a:ext uri="{FF2B5EF4-FFF2-40B4-BE49-F238E27FC236}">
-                <a16:creationId xmlns="" xmlns:a16="http://schemas.microsoft.com/office/drawing/2014/main" id="{C7C8B1DD-4DA0-EF4D-B9CF-6AFFB6F0D393}"/>
+                <a16:creationId xmlns:a16="http://schemas.microsoft.com/office/drawing/2014/main" xmlns="" id="{C7C8B1DD-4DA0-EF4D-B9CF-6AFFB6F0D393}"/>
               </a:ext>
             </a:extLst>
           </p:cNvPr>
@@ -7377,7 +7380,7 @@
           <p:cNvPr id="6" name="Rectangle 5">
             <a:extLst>
               <a:ext uri="{FF2B5EF4-FFF2-40B4-BE49-F238E27FC236}">
-                <a16:creationId xmlns="" xmlns:a16="http://schemas.microsoft.com/office/drawing/2014/main" id="{9E79C3ED-79BC-0248-88E9-6470BD781F40}"/>
+                <a16:creationId xmlns:a16="http://schemas.microsoft.com/office/drawing/2014/main" xmlns="" id="{9E79C3ED-79BC-0248-88E9-6470BD781F40}"/>
               </a:ext>
             </a:extLst>
           </p:cNvPr>
@@ -7411,7 +7414,7 @@
           <p:cNvPr id="7" name="Rectangle 6">
             <a:extLst>
               <a:ext uri="{FF2B5EF4-FFF2-40B4-BE49-F238E27FC236}">
-                <a16:creationId xmlns="" xmlns:a16="http://schemas.microsoft.com/office/drawing/2014/main" id="{3AB662F9-6380-3041-AD2B-E570902EE19D}"/>
+                <a16:creationId xmlns:a16="http://schemas.microsoft.com/office/drawing/2014/main" xmlns="" id="{3AB662F9-6380-3041-AD2B-E570902EE19D}"/>
               </a:ext>
             </a:extLst>
           </p:cNvPr>
@@ -7640,7 +7643,7 @@
           <p:cNvPr id="5" name="Rectangle 4">
             <a:extLst>
               <a:ext uri="{FF2B5EF4-FFF2-40B4-BE49-F238E27FC236}">
-                <a16:creationId xmlns="" xmlns:a16="http://schemas.microsoft.com/office/drawing/2014/main" id="{CBA21871-7A5D-B443-93D6-F8A17F2DCF85}"/>
+                <a16:creationId xmlns:a16="http://schemas.microsoft.com/office/drawing/2014/main" xmlns="" id="{CBA21871-7A5D-B443-93D6-F8A17F2DCF85}"/>
               </a:ext>
             </a:extLst>
           </p:cNvPr>
@@ -7674,7 +7677,7 @@
           <p:cNvPr id="6" name="Rectangle 5">
             <a:extLst>
               <a:ext uri="{FF2B5EF4-FFF2-40B4-BE49-F238E27FC236}">
-                <a16:creationId xmlns="" xmlns:a16="http://schemas.microsoft.com/office/drawing/2014/main" id="{E76AB48A-FB00-AB41-A25D-494327B102EA}"/>
+                <a16:creationId xmlns:a16="http://schemas.microsoft.com/office/drawing/2014/main" xmlns="" id="{E76AB48A-FB00-AB41-A25D-494327B102EA}"/>
               </a:ext>
             </a:extLst>
           </p:cNvPr>
@@ -7708,7 +7711,7 @@
           <p:cNvPr id="7" name="Rectangle 6">
             <a:extLst>
               <a:ext uri="{FF2B5EF4-FFF2-40B4-BE49-F238E27FC236}">
-                <a16:creationId xmlns="" xmlns:a16="http://schemas.microsoft.com/office/drawing/2014/main" id="{1C28FCBD-BF2C-6841-B4D8-8DC16AE75B6E}"/>
+                <a16:creationId xmlns:a16="http://schemas.microsoft.com/office/drawing/2014/main" xmlns="" id="{1C28FCBD-BF2C-6841-B4D8-8DC16AE75B6E}"/>
               </a:ext>
             </a:extLst>
           </p:cNvPr>
@@ -7787,7 +7790,7 @@
           <p:cNvPr id="1026" name="Rectangle 2">
             <a:extLst>
               <a:ext uri="{FF2B5EF4-FFF2-40B4-BE49-F238E27FC236}">
-                <a16:creationId xmlns="" xmlns:a16="http://schemas.microsoft.com/office/drawing/2014/main" id="{BB0E7CB5-3395-0646-A20A-7249B9974431}"/>
+                <a16:creationId xmlns:a16="http://schemas.microsoft.com/office/drawing/2014/main" xmlns="" id="{BB0E7CB5-3395-0646-A20A-7249B9974431}"/>
               </a:ext>
             </a:extLst>
           </p:cNvPr>
@@ -7861,7 +7864,7 @@
           <p:cNvPr id="1027" name="Rectangle 3">
             <a:extLst>
               <a:ext uri="{FF2B5EF4-FFF2-40B4-BE49-F238E27FC236}">
-                <a16:creationId xmlns="" xmlns:a16="http://schemas.microsoft.com/office/drawing/2014/main" id="{8CB37737-6579-404E-A639-D817E15EE378}"/>
+                <a16:creationId xmlns:a16="http://schemas.microsoft.com/office/drawing/2014/main" xmlns="" id="{8CB37737-6579-404E-A639-D817E15EE378}"/>
               </a:ext>
             </a:extLst>
           </p:cNvPr>
@@ -7963,7 +7966,7 @@
           <p:cNvPr id="1028" name="Rectangle 4">
             <a:extLst>
               <a:ext uri="{FF2B5EF4-FFF2-40B4-BE49-F238E27FC236}">
-                <a16:creationId xmlns="" xmlns:a16="http://schemas.microsoft.com/office/drawing/2014/main" id="{3036F1C7-8DCE-6243-BF4D-A7EF32222206}"/>
+                <a16:creationId xmlns:a16="http://schemas.microsoft.com/office/drawing/2014/main" xmlns="" id="{3036F1C7-8DCE-6243-BF4D-A7EF32222206}"/>
               </a:ext>
             </a:extLst>
           </p:cNvPr>
@@ -8042,7 +8045,7 @@
           <p:cNvPr id="1029" name="Rectangle 5">
             <a:extLst>
               <a:ext uri="{FF2B5EF4-FFF2-40B4-BE49-F238E27FC236}">
-                <a16:creationId xmlns="" xmlns:a16="http://schemas.microsoft.com/office/drawing/2014/main" id="{C1624EBC-F7C4-C049-B404-364BB8BD761F}"/>
+                <a16:creationId xmlns:a16="http://schemas.microsoft.com/office/drawing/2014/main" xmlns="" id="{C1624EBC-F7C4-C049-B404-364BB8BD761F}"/>
               </a:ext>
             </a:extLst>
           </p:cNvPr>
@@ -8121,7 +8124,7 @@
           <p:cNvPr id="1030" name="Rectangle 6">
             <a:extLst>
               <a:ext uri="{FF2B5EF4-FFF2-40B4-BE49-F238E27FC236}">
-                <a16:creationId xmlns="" xmlns:a16="http://schemas.microsoft.com/office/drawing/2014/main" id="{BC9DBA90-5BB7-B54B-B0AC-6480000D6EAF}"/>
+                <a16:creationId xmlns:a16="http://schemas.microsoft.com/office/drawing/2014/main" xmlns="" id="{BC9DBA90-5BB7-B54B-B0AC-6480000D6EAF}"/>
               </a:ext>
             </a:extLst>
           </p:cNvPr>
@@ -8607,7 +8610,7 @@
           <p:cNvPr id="14337" name="Imagen 1">
             <a:extLst>
               <a:ext uri="{FF2B5EF4-FFF2-40B4-BE49-F238E27FC236}">
-                <a16:creationId xmlns="" xmlns:a16="http://schemas.microsoft.com/office/drawing/2014/main" id="{7F1D6CA4-5F4D-1444-9762-9C39BCC5CA71}"/>
+                <a16:creationId xmlns:a16="http://schemas.microsoft.com/office/drawing/2014/main" xmlns="" id="{7F1D6CA4-5F4D-1444-9762-9C39BCC5CA71}"/>
               </a:ext>
             </a:extLst>
           </p:cNvPr>
@@ -8667,7 +8670,7 @@
           <p:cNvPr id="14338" name="Group 45">
             <a:extLst>
               <a:ext uri="{FF2B5EF4-FFF2-40B4-BE49-F238E27FC236}">
-                <a16:creationId xmlns="" xmlns:a16="http://schemas.microsoft.com/office/drawing/2014/main" id="{9ADAEC38-7FE8-5746-854B-6203008C9A28}"/>
+                <a16:creationId xmlns:a16="http://schemas.microsoft.com/office/drawing/2014/main" xmlns="" id="{9ADAEC38-7FE8-5746-854B-6203008C9A28}"/>
               </a:ext>
             </a:extLst>
           </p:cNvPr>
@@ -8689,7 +8692,7 @@
             <p:cNvPr id="14342" name="Text Box 29">
               <a:extLst>
                 <a:ext uri="{FF2B5EF4-FFF2-40B4-BE49-F238E27FC236}">
-                  <a16:creationId xmlns="" xmlns:a16="http://schemas.microsoft.com/office/drawing/2014/main" id="{352F96A7-3C2B-B24B-BB36-7D18C1762A93}"/>
+                  <a16:creationId xmlns:a16="http://schemas.microsoft.com/office/drawing/2014/main" xmlns="" id="{352F96A7-3C2B-B24B-BB36-7D18C1762A93}"/>
                 </a:ext>
               </a:extLst>
             </p:cNvPr>
@@ -8969,7 +8972,7 @@
             <p:cNvPr id="14343" name="Text Box 30">
               <a:extLst>
                 <a:ext uri="{FF2B5EF4-FFF2-40B4-BE49-F238E27FC236}">
-                  <a16:creationId xmlns="" xmlns:a16="http://schemas.microsoft.com/office/drawing/2014/main" id="{52C5A348-D146-7F4A-8486-2FE817DDABBD}"/>
+                  <a16:creationId xmlns:a16="http://schemas.microsoft.com/office/drawing/2014/main" xmlns="" id="{52C5A348-D146-7F4A-8486-2FE817DDABBD}"/>
                 </a:ext>
               </a:extLst>
             </p:cNvPr>
@@ -9183,7 +9186,7 @@
           <p:cNvPr id="14339" name="Rectangle 27">
             <a:extLst>
               <a:ext uri="{FF2B5EF4-FFF2-40B4-BE49-F238E27FC236}">
-                <a16:creationId xmlns="" xmlns:a16="http://schemas.microsoft.com/office/drawing/2014/main" id="{A611ED07-CD3C-C643-B9D5-232B736777DB}"/>
+                <a16:creationId xmlns:a16="http://schemas.microsoft.com/office/drawing/2014/main" xmlns="" id="{A611ED07-CD3C-C643-B9D5-232B736777DB}"/>
               </a:ext>
             </a:extLst>
           </p:cNvPr>
@@ -9451,7 +9454,7 @@
           <p:cNvPr id="14340" name="Rectangle 26">
             <a:extLst>
               <a:ext uri="{FF2B5EF4-FFF2-40B4-BE49-F238E27FC236}">
-                <a16:creationId xmlns="" xmlns:a16="http://schemas.microsoft.com/office/drawing/2014/main" id="{D35E3657-506F-BB4C-8EB8-A849B3BD478C}"/>
+                <a16:creationId xmlns:a16="http://schemas.microsoft.com/office/drawing/2014/main" xmlns="" id="{D35E3657-506F-BB4C-8EB8-A849B3BD478C}"/>
               </a:ext>
             </a:extLst>
           </p:cNvPr>
@@ -9687,7 +9690,7 @@
           <p:cNvPr id="16385" name="Rectangle 14">
             <a:extLst>
               <a:ext uri="{FF2B5EF4-FFF2-40B4-BE49-F238E27FC236}">
-                <a16:creationId xmlns="" xmlns:a16="http://schemas.microsoft.com/office/drawing/2014/main" id="{3665E0D4-68DF-7A4B-92E0-B652D965824C}"/>
+                <a16:creationId xmlns:a16="http://schemas.microsoft.com/office/drawing/2014/main" xmlns="" id="{3665E0D4-68DF-7A4B-92E0-B652D965824C}"/>
               </a:ext>
             </a:extLst>
           </p:cNvPr>
@@ -9982,7 +9985,7 @@
           <p:cNvPr id="16385" name="Rectangle 14">
             <a:extLst>
               <a:ext uri="{FF2B5EF4-FFF2-40B4-BE49-F238E27FC236}">
-                <a16:creationId xmlns="" xmlns:a16="http://schemas.microsoft.com/office/drawing/2014/main" id="{3665E0D4-68DF-7A4B-92E0-B652D965824C}"/>
+                <a16:creationId xmlns:a16="http://schemas.microsoft.com/office/drawing/2014/main" xmlns="" id="{3665E0D4-68DF-7A4B-92E0-B652D965824C}"/>
               </a:ext>
             </a:extLst>
           </p:cNvPr>
@@ -10277,7 +10280,7 @@
           <p:cNvPr id="16385" name="Rectangle 14">
             <a:extLst>
               <a:ext uri="{FF2B5EF4-FFF2-40B4-BE49-F238E27FC236}">
-                <a16:creationId xmlns="" xmlns:a16="http://schemas.microsoft.com/office/drawing/2014/main" id="{3665E0D4-68DF-7A4B-92E0-B652D965824C}"/>
+                <a16:creationId xmlns:a16="http://schemas.microsoft.com/office/drawing/2014/main" xmlns="" id="{3665E0D4-68DF-7A4B-92E0-B652D965824C}"/>
               </a:ext>
             </a:extLst>
           </p:cNvPr>
@@ -10590,7 +10593,7 @@
           <p:cNvPr id="16385" name="Rectangle 14">
             <a:extLst>
               <a:ext uri="{FF2B5EF4-FFF2-40B4-BE49-F238E27FC236}">
-                <a16:creationId xmlns="" xmlns:a16="http://schemas.microsoft.com/office/drawing/2014/main" id="{3665E0D4-68DF-7A4B-92E0-B652D965824C}"/>
+                <a16:creationId xmlns:a16="http://schemas.microsoft.com/office/drawing/2014/main" xmlns="" id="{3665E0D4-68DF-7A4B-92E0-B652D965824C}"/>
               </a:ext>
             </a:extLst>
           </p:cNvPr>
@@ -10909,7 +10912,7 @@
           <p:cNvPr id="16385" name="Rectangle 14">
             <a:extLst>
               <a:ext uri="{FF2B5EF4-FFF2-40B4-BE49-F238E27FC236}">
-                <a16:creationId xmlns="" xmlns:a16="http://schemas.microsoft.com/office/drawing/2014/main" id="{3665E0D4-68DF-7A4B-92E0-B652D965824C}"/>
+                <a16:creationId xmlns:a16="http://schemas.microsoft.com/office/drawing/2014/main" xmlns="" id="{3665E0D4-68DF-7A4B-92E0-B652D965824C}"/>
               </a:ext>
             </a:extLst>
           </p:cNvPr>
@@ -11228,7 +11231,7 @@
           <p:cNvPr id="16385" name="Rectangle 14">
             <a:extLst>
               <a:ext uri="{FF2B5EF4-FFF2-40B4-BE49-F238E27FC236}">
-                <a16:creationId xmlns="" xmlns:a16="http://schemas.microsoft.com/office/drawing/2014/main" id="{3665E0D4-68DF-7A4B-92E0-B652D965824C}"/>
+                <a16:creationId xmlns:a16="http://schemas.microsoft.com/office/drawing/2014/main" xmlns="" id="{3665E0D4-68DF-7A4B-92E0-B652D965824C}"/>
               </a:ext>
             </a:extLst>
           </p:cNvPr>
@@ -11547,7 +11550,7 @@
           <p:cNvPr id="16385" name="Rectangle 14">
             <a:extLst>
               <a:ext uri="{FF2B5EF4-FFF2-40B4-BE49-F238E27FC236}">
-                <a16:creationId xmlns="" xmlns:a16="http://schemas.microsoft.com/office/drawing/2014/main" id="{3665E0D4-68DF-7A4B-92E0-B652D965824C}"/>
+                <a16:creationId xmlns:a16="http://schemas.microsoft.com/office/drawing/2014/main" xmlns="" id="{3665E0D4-68DF-7A4B-92E0-B652D965824C}"/>
               </a:ext>
             </a:extLst>
           </p:cNvPr>
@@ -11896,7 +11899,7 @@
           <p:cNvPr id="4" name="Rectangle 14">
             <a:extLst>
               <a:ext uri="{FF2B5EF4-FFF2-40B4-BE49-F238E27FC236}">
-                <a16:creationId xmlns="" xmlns:a16="http://schemas.microsoft.com/office/drawing/2014/main" id="{3665E0D4-68DF-7A4B-92E0-B652D965824C}"/>
+                <a16:creationId xmlns:a16="http://schemas.microsoft.com/office/drawing/2014/main" xmlns="" id="{3665E0D4-68DF-7A4B-92E0-B652D965824C}"/>
               </a:ext>
             </a:extLst>
           </p:cNvPr>
@@ -12215,7 +12218,7 @@
           <p:cNvPr id="5" name="Rectangle 14">
             <a:extLst>
               <a:ext uri="{FF2B5EF4-FFF2-40B4-BE49-F238E27FC236}">
-                <a16:creationId xmlns="" xmlns:a16="http://schemas.microsoft.com/office/drawing/2014/main" id="{3665E0D4-68DF-7A4B-92E0-B652D965824C}"/>
+                <a16:creationId xmlns:a16="http://schemas.microsoft.com/office/drawing/2014/main" xmlns="" id="{3665E0D4-68DF-7A4B-92E0-B652D965824C}"/>
               </a:ext>
             </a:extLst>
           </p:cNvPr>
@@ -12534,7 +12537,7 @@
           <p:cNvPr id="5" name="Rectangle 14">
             <a:extLst>
               <a:ext uri="{FF2B5EF4-FFF2-40B4-BE49-F238E27FC236}">
-                <a16:creationId xmlns="" xmlns:a16="http://schemas.microsoft.com/office/drawing/2014/main" id="{3665E0D4-68DF-7A4B-92E0-B652D965824C}"/>
+                <a16:creationId xmlns:a16="http://schemas.microsoft.com/office/drawing/2014/main" xmlns="" id="{3665E0D4-68DF-7A4B-92E0-B652D965824C}"/>
               </a:ext>
             </a:extLst>
           </p:cNvPr>
@@ -12823,7 +12826,7 @@
           <p:cNvPr id="15361" name="Group 22">
             <a:extLst>
               <a:ext uri="{FF2B5EF4-FFF2-40B4-BE49-F238E27FC236}">
-                <a16:creationId xmlns="" xmlns:a16="http://schemas.microsoft.com/office/drawing/2014/main" id="{6B6EABA4-F252-6746-8ED0-EF684C8CADED}"/>
+                <a16:creationId xmlns:a16="http://schemas.microsoft.com/office/drawing/2014/main" xmlns="" id="{6B6EABA4-F252-6746-8ED0-EF684C8CADED}"/>
               </a:ext>
             </a:extLst>
           </p:cNvPr>
@@ -12845,7 +12848,7 @@
             <p:cNvPr id="15366" name="Freeform 8" descr="5%">
               <a:extLst>
                 <a:ext uri="{FF2B5EF4-FFF2-40B4-BE49-F238E27FC236}">
-                  <a16:creationId xmlns="" xmlns:a16="http://schemas.microsoft.com/office/drawing/2014/main" id="{58D4CBDD-1133-A449-943D-DD62EB429140}"/>
+                  <a16:creationId xmlns:a16="http://schemas.microsoft.com/office/drawing/2014/main" xmlns="" id="{58D4CBDD-1133-A449-943D-DD62EB429140}"/>
                 </a:ext>
               </a:extLst>
             </p:cNvPr>
@@ -12964,7 +12967,7 @@
             <p:cNvPr id="15367" name="Freeform 9" descr="5%">
               <a:extLst>
                 <a:ext uri="{FF2B5EF4-FFF2-40B4-BE49-F238E27FC236}">
-                  <a16:creationId xmlns="" xmlns:a16="http://schemas.microsoft.com/office/drawing/2014/main" id="{8C6EC880-9B1D-F447-9A6B-3F9B0AE3929D}"/>
+                  <a16:creationId xmlns:a16="http://schemas.microsoft.com/office/drawing/2014/main" xmlns="" id="{8C6EC880-9B1D-F447-9A6B-3F9B0AE3929D}"/>
                 </a:ext>
               </a:extLst>
             </p:cNvPr>
@@ -13083,7 +13086,7 @@
             <p:cNvPr id="15368" name="Freeform 10" descr="5%">
               <a:extLst>
                 <a:ext uri="{FF2B5EF4-FFF2-40B4-BE49-F238E27FC236}">
-                  <a16:creationId xmlns="" xmlns:a16="http://schemas.microsoft.com/office/drawing/2014/main" id="{1085577F-A61A-C647-B1BB-3EC24D1EF570}"/>
+                  <a16:creationId xmlns:a16="http://schemas.microsoft.com/office/drawing/2014/main" xmlns="" id="{1085577F-A61A-C647-B1BB-3EC24D1EF570}"/>
                 </a:ext>
               </a:extLst>
             </p:cNvPr>
@@ -13202,7 +13205,7 @@
             <p:cNvPr id="15369" name="Freeform 11" descr="5%">
               <a:extLst>
                 <a:ext uri="{FF2B5EF4-FFF2-40B4-BE49-F238E27FC236}">
-                  <a16:creationId xmlns="" xmlns:a16="http://schemas.microsoft.com/office/drawing/2014/main" id="{42171880-3EF9-BD46-B394-72256EDB9F85}"/>
+                  <a16:creationId xmlns:a16="http://schemas.microsoft.com/office/drawing/2014/main" xmlns="" id="{42171880-3EF9-BD46-B394-72256EDB9F85}"/>
                 </a:ext>
               </a:extLst>
             </p:cNvPr>
@@ -13321,7 +13324,7 @@
             <p:cNvPr id="15370" name="Freeform 12" descr="5%">
               <a:extLst>
                 <a:ext uri="{FF2B5EF4-FFF2-40B4-BE49-F238E27FC236}">
-                  <a16:creationId xmlns="" xmlns:a16="http://schemas.microsoft.com/office/drawing/2014/main" id="{4F9B3D7C-E1D0-FB44-B206-F2BECC14B1CD}"/>
+                  <a16:creationId xmlns:a16="http://schemas.microsoft.com/office/drawing/2014/main" xmlns="" id="{4F9B3D7C-E1D0-FB44-B206-F2BECC14B1CD}"/>
                 </a:ext>
               </a:extLst>
             </p:cNvPr>
@@ -13440,7 +13443,7 @@
             <p:cNvPr id="15371" name="Freeform 13" descr="5%">
               <a:extLst>
                 <a:ext uri="{FF2B5EF4-FFF2-40B4-BE49-F238E27FC236}">
-                  <a16:creationId xmlns="" xmlns:a16="http://schemas.microsoft.com/office/drawing/2014/main" id="{A24C0792-FA25-B748-886A-35F5ACA408AE}"/>
+                  <a16:creationId xmlns:a16="http://schemas.microsoft.com/office/drawing/2014/main" xmlns="" id="{A24C0792-FA25-B748-886A-35F5ACA408AE}"/>
                 </a:ext>
               </a:extLst>
             </p:cNvPr>
@@ -13560,7 +13563,7 @@
           <p:cNvPr id="15362" name="Rectangle 14">
             <a:extLst>
               <a:ext uri="{FF2B5EF4-FFF2-40B4-BE49-F238E27FC236}">
-                <a16:creationId xmlns="" xmlns:a16="http://schemas.microsoft.com/office/drawing/2014/main" id="{C44CDA25-06B2-4046-B1AC-A83281A09170}"/>
+                <a16:creationId xmlns:a16="http://schemas.microsoft.com/office/drawing/2014/main" xmlns="" id="{C44CDA25-06B2-4046-B1AC-A83281A09170}"/>
               </a:ext>
             </a:extLst>
           </p:cNvPr>
@@ -13759,7 +13762,7 @@
           <p:cNvPr id="15363" name="Rectangle 15">
             <a:extLst>
               <a:ext uri="{FF2B5EF4-FFF2-40B4-BE49-F238E27FC236}">
-                <a16:creationId xmlns="" xmlns:a16="http://schemas.microsoft.com/office/drawing/2014/main" id="{68AF690E-04A9-5542-820D-442B8473CB9D}"/>
+                <a16:creationId xmlns:a16="http://schemas.microsoft.com/office/drawing/2014/main" xmlns="" id="{68AF690E-04A9-5542-820D-442B8473CB9D}"/>
               </a:ext>
             </a:extLst>
           </p:cNvPr>
@@ -13772,8 +13775,8 @@
         </p:nvSpPr>
         <p:spPr>
           <a:xfrm>
-            <a:off x="931863" y="765174"/>
-            <a:ext cx="7381875" cy="5463339"/>
+            <a:off x="954381" y="549275"/>
+            <a:ext cx="7381875" cy="5345863"/>
           </a:xfrm>
           <a:extLst>
             <a:ext uri="{909E8E84-426E-40DD-AFC4-6F175D3DCCD1}">
@@ -13822,7 +13825,7 @@
               <a:buChar char=""/>
             </a:pPr>
             <a:r>
-              <a:rPr lang="es-ES" altLang="es-ES" sz="2400" dirty="0" smtClean="0">
+              <a:rPr lang="es-ES" altLang="es-ES" sz="2000" dirty="0" smtClean="0">
                 <a:cs typeface="Arial" panose="020B0604020202020204" pitchFamily="34" charset="0"/>
               </a:rPr>
               <a:t>Modelo de Negocio. </a:t>
@@ -13843,18 +13846,39 @@
               <a:buChar char=""/>
             </a:pPr>
             <a:r>
-              <a:rPr lang="es-ES" altLang="es-ES" sz="2400" dirty="0">
+              <a:rPr lang="es-ES" altLang="es-ES" sz="2000" dirty="0">
                 <a:cs typeface="Arial" panose="020B0604020202020204" pitchFamily="34" charset="0"/>
               </a:rPr>
               <a:t>Catálogo de Requisitos</a:t>
             </a:r>
             <a:r>
-              <a:rPr lang="es-ES" altLang="es-ES" sz="2400" dirty="0" smtClean="0">
+              <a:rPr lang="es-ES" altLang="es-ES" sz="2000" dirty="0" smtClean="0">
                 <a:cs typeface="Arial" panose="020B0604020202020204" pitchFamily="34" charset="0"/>
               </a:rPr>
               <a:t>.</a:t>
             </a:r>
-            <a:endParaRPr lang="es-ES" altLang="es-ES" sz="2400" dirty="0">
+          </a:p>
+          <a:p>
+            <a:pPr marL="441325" indent="-285750" defTabSz="457200" eaLnBrk="1" hangingPunct="1">
+              <a:lnSpc>
+                <a:spcPct val="200000"/>
+              </a:lnSpc>
+              <a:spcBef>
+                <a:spcPts val="1000"/>
+              </a:spcBef>
+              <a:buClr>
+                <a:schemeClr val="accent1"/>
+              </a:buClr>
+              <a:buFont typeface="Wingdings 3" pitchFamily="2" charset="2"/>
+              <a:buChar char=""/>
+            </a:pPr>
+            <a:r>
+              <a:rPr lang="es-ES" altLang="es-ES" sz="2000" dirty="0" smtClean="0">
+                <a:cs typeface="Arial" panose="020B0604020202020204" pitchFamily="34" charset="0"/>
+              </a:rPr>
+              <a:t>Matriz de Cumplimiento de Requisitos.</a:t>
+            </a:r>
+            <a:endParaRPr lang="es-ES" altLang="es-ES" sz="2000" dirty="0">
               <a:cs typeface="Arial" panose="020B0604020202020204" pitchFamily="34" charset="0"/>
             </a:endParaRPr>
           </a:p>
@@ -13873,12 +13897,39 @@
               <a:buChar char=""/>
             </a:pPr>
             <a:r>
-              <a:rPr lang="es-ES" altLang="es-ES" sz="2400" dirty="0" smtClean="0">
+              <a:rPr lang="es-ES" altLang="es-ES" sz="2000" dirty="0" smtClean="0">
                 <a:cs typeface="Arial" panose="020B0604020202020204" pitchFamily="34" charset="0"/>
               </a:rPr>
-              <a:t>Modelo de Dominio.</a:t>
+              <a:t>Modelo de Dominio</a:t>
             </a:r>
-            <a:endParaRPr lang="es-ES" altLang="es-ES" sz="2400" dirty="0">
+            <a:r>
+              <a:rPr lang="es-ES" altLang="es-ES" sz="2000" dirty="0" smtClean="0">
+                <a:cs typeface="Arial" panose="020B0604020202020204" pitchFamily="34" charset="0"/>
+              </a:rPr>
+              <a:t>.</a:t>
+            </a:r>
+          </a:p>
+          <a:p>
+            <a:pPr marL="441325" indent="-285750" defTabSz="457200" eaLnBrk="1" hangingPunct="1">
+              <a:lnSpc>
+                <a:spcPct val="200000"/>
+              </a:lnSpc>
+              <a:spcBef>
+                <a:spcPts val="1000"/>
+              </a:spcBef>
+              <a:buClr>
+                <a:schemeClr val="accent1"/>
+              </a:buClr>
+              <a:buFont typeface="Wingdings 3" pitchFamily="2" charset="2"/>
+              <a:buChar char=""/>
+            </a:pPr>
+            <a:r>
+              <a:rPr lang="es-ES" altLang="es-ES" sz="2000" dirty="0" smtClean="0">
+                <a:cs typeface="Arial" panose="020B0604020202020204" pitchFamily="34" charset="0"/>
+              </a:rPr>
+              <a:t>Diseño lógico y físico de BBDD.</a:t>
+            </a:r>
+            <a:endParaRPr lang="es-ES" altLang="es-ES" sz="2000" dirty="0">
               <a:cs typeface="Arial" panose="020B0604020202020204" pitchFamily="34" charset="0"/>
             </a:endParaRPr>
           </a:p>
@@ -13897,12 +13948,12 @@
               <a:buChar char=""/>
             </a:pPr>
             <a:r>
-              <a:rPr lang="es-ES" altLang="es-ES" sz="2400" dirty="0" smtClean="0">
+              <a:rPr lang="es-ES" altLang="es-ES" sz="2000" dirty="0" smtClean="0">
                 <a:cs typeface="Arial" panose="020B0604020202020204" pitchFamily="34" charset="0"/>
               </a:rPr>
               <a:t>Diagrama de Casos de Uso.</a:t>
             </a:r>
-            <a:endParaRPr lang="es-ES" altLang="es-ES" sz="2400" dirty="0">
+            <a:endParaRPr lang="es-ES" altLang="es-ES" sz="2000" dirty="0">
               <a:cs typeface="Arial" panose="020B0604020202020204" pitchFamily="34" charset="0"/>
             </a:endParaRPr>
           </a:p>
@@ -13921,7 +13972,7 @@
               <a:buChar char=""/>
             </a:pPr>
             <a:r>
-              <a:rPr lang="es-ES" altLang="es-ES" sz="2400" dirty="0" smtClean="0">
+              <a:rPr lang="es-ES" altLang="es-ES" sz="2000" dirty="0" smtClean="0">
                 <a:cs typeface="Arial" panose="020B0604020202020204" pitchFamily="34" charset="0"/>
               </a:rPr>
               <a:t>Prototipo de Interfaz de Usuario.</a:t>
@@ -13942,30 +13993,30 @@
               <a:buChar char=""/>
             </a:pPr>
             <a:r>
-              <a:rPr lang="es-ES" altLang="es-ES" sz="2400" dirty="0" err="1" smtClean="0">
+              <a:rPr lang="es-ES" altLang="es-ES" sz="2000" dirty="0" err="1" smtClean="0">
                 <a:cs typeface="Arial" panose="020B0604020202020204" pitchFamily="34" charset="0"/>
               </a:rPr>
               <a:t>Impact</a:t>
             </a:r>
             <a:r>
-              <a:rPr lang="es-ES" altLang="es-ES" sz="2400" dirty="0" smtClean="0">
+              <a:rPr lang="es-ES" altLang="es-ES" sz="2000" dirty="0" smtClean="0">
                 <a:cs typeface="Arial" panose="020B0604020202020204" pitchFamily="34" charset="0"/>
               </a:rPr>
               <a:t> </a:t>
             </a:r>
             <a:r>
-              <a:rPr lang="es-ES" altLang="es-ES" sz="2400" dirty="0" err="1" smtClean="0">
+              <a:rPr lang="es-ES" altLang="es-ES" sz="2000" dirty="0" err="1" smtClean="0">
                 <a:cs typeface="Arial" panose="020B0604020202020204" pitchFamily="34" charset="0"/>
               </a:rPr>
               <a:t>Mapping</a:t>
             </a:r>
             <a:r>
-              <a:rPr lang="es-ES" altLang="es-ES" sz="2400" dirty="0" smtClean="0">
+              <a:rPr lang="es-ES" altLang="es-ES" sz="2000" dirty="0" smtClean="0">
                 <a:cs typeface="Arial" panose="020B0604020202020204" pitchFamily="34" charset="0"/>
               </a:rPr>
               <a:t>.</a:t>
             </a:r>
-            <a:endParaRPr lang="es-ES" altLang="es-ES" sz="2400" dirty="0">
+            <a:endParaRPr lang="es-ES" altLang="es-ES" sz="2000" dirty="0">
               <a:cs typeface="Arial" panose="020B0604020202020204" pitchFamily="34" charset="0"/>
             </a:endParaRPr>
           </a:p>
@@ -14030,7 +14081,7 @@
           <p:cNvPr id="15364" name="Freeform 17">
             <a:extLst>
               <a:ext uri="{FF2B5EF4-FFF2-40B4-BE49-F238E27FC236}">
-                <a16:creationId xmlns="" xmlns:a16="http://schemas.microsoft.com/office/drawing/2014/main" id="{ACB45F95-1541-4E4A-A55E-D838EEDC1698}"/>
+                <a16:creationId xmlns:a16="http://schemas.microsoft.com/office/drawing/2014/main" xmlns="" id="{ACB45F95-1541-4E4A-A55E-D838EEDC1698}"/>
               </a:ext>
             </a:extLst>
           </p:cNvPr>
@@ -14145,7 +14196,7 @@
           <p:cNvPr id="15365" name="17 Imagen">
             <a:extLst>
               <a:ext uri="{FF2B5EF4-FFF2-40B4-BE49-F238E27FC236}">
-                <a16:creationId xmlns="" xmlns:a16="http://schemas.microsoft.com/office/drawing/2014/main" id="{794BF391-464F-5548-8F2D-BF964DF6B303}"/>
+                <a16:creationId xmlns:a16="http://schemas.microsoft.com/office/drawing/2014/main" xmlns="" id="{794BF391-464F-5548-8F2D-BF964DF6B303}"/>
               </a:ext>
             </a:extLst>
           </p:cNvPr>
@@ -14267,7 +14318,7 @@
           <p:cNvPr id="5" name="Rectangle 14">
             <a:extLst>
               <a:ext uri="{FF2B5EF4-FFF2-40B4-BE49-F238E27FC236}">
-                <a16:creationId xmlns="" xmlns:a16="http://schemas.microsoft.com/office/drawing/2014/main" id="{3665E0D4-68DF-7A4B-92E0-B652D965824C}"/>
+                <a16:creationId xmlns:a16="http://schemas.microsoft.com/office/drawing/2014/main" xmlns="" id="{3665E0D4-68DF-7A4B-92E0-B652D965824C}"/>
               </a:ext>
             </a:extLst>
           </p:cNvPr>
@@ -14556,7 +14607,7 @@
           <p:cNvPr id="5" name="Rectangle 14">
             <a:extLst>
               <a:ext uri="{FF2B5EF4-FFF2-40B4-BE49-F238E27FC236}">
-                <a16:creationId xmlns="" xmlns:a16="http://schemas.microsoft.com/office/drawing/2014/main" id="{3665E0D4-68DF-7A4B-92E0-B652D965824C}"/>
+                <a16:creationId xmlns:a16="http://schemas.microsoft.com/office/drawing/2014/main" xmlns="" id="{3665E0D4-68DF-7A4B-92E0-B652D965824C}"/>
               </a:ext>
             </a:extLst>
           </p:cNvPr>
@@ -14875,7 +14926,7 @@
           <p:cNvPr id="16385" name="Rectangle 14">
             <a:extLst>
               <a:ext uri="{FF2B5EF4-FFF2-40B4-BE49-F238E27FC236}">
-                <a16:creationId xmlns="" xmlns:a16="http://schemas.microsoft.com/office/drawing/2014/main" id="{3665E0D4-68DF-7A4B-92E0-B652D965824C}"/>
+                <a16:creationId xmlns:a16="http://schemas.microsoft.com/office/drawing/2014/main" xmlns="" id="{3665E0D4-68DF-7A4B-92E0-B652D965824C}"/>
               </a:ext>
             </a:extLst>
           </p:cNvPr>
@@ -15140,7 +15191,7 @@
           <p:cNvPr id="31745" name="Picture 2" descr="Estrategias de marketing digital a través de preguntas clave">
             <a:extLst>
               <a:ext uri="{FF2B5EF4-FFF2-40B4-BE49-F238E27FC236}">
-                <a16:creationId xmlns="" xmlns:a16="http://schemas.microsoft.com/office/drawing/2014/main" id="{66CEA66D-E15C-C847-9B2A-032EF58E0B53}"/>
+                <a16:creationId xmlns:a16="http://schemas.microsoft.com/office/drawing/2014/main" xmlns="" id="{66CEA66D-E15C-C847-9B2A-032EF58E0B53}"/>
               </a:ext>
             </a:extLst>
           </p:cNvPr>
@@ -15200,7 +15251,7 @@
           <p:cNvPr id="31746" name="CuadroTexto 1">
             <a:extLst>
               <a:ext uri="{FF2B5EF4-FFF2-40B4-BE49-F238E27FC236}">
-                <a16:creationId xmlns="" xmlns:a16="http://schemas.microsoft.com/office/drawing/2014/main" id="{FD239F26-72A2-444A-9FA1-740091578B02}"/>
+                <a16:creationId xmlns:a16="http://schemas.microsoft.com/office/drawing/2014/main" xmlns="" id="{FD239F26-72A2-444A-9FA1-740091578B02}"/>
               </a:ext>
             </a:extLst>
           </p:cNvPr>
@@ -15356,7 +15407,7 @@
           <p:cNvPr id="31747" name="Group 22">
             <a:extLst>
               <a:ext uri="{FF2B5EF4-FFF2-40B4-BE49-F238E27FC236}">
-                <a16:creationId xmlns="" xmlns:a16="http://schemas.microsoft.com/office/drawing/2014/main" id="{A3D2F5D2-D269-504A-B84C-C6061FCA57AD}"/>
+                <a16:creationId xmlns:a16="http://schemas.microsoft.com/office/drawing/2014/main" xmlns="" id="{A3D2F5D2-D269-504A-B84C-C6061FCA57AD}"/>
               </a:ext>
             </a:extLst>
           </p:cNvPr>
@@ -15378,7 +15429,7 @@
             <p:cNvPr id="31751" name="Freeform 8" descr="5%">
               <a:extLst>
                 <a:ext uri="{FF2B5EF4-FFF2-40B4-BE49-F238E27FC236}">
-                  <a16:creationId xmlns="" xmlns:a16="http://schemas.microsoft.com/office/drawing/2014/main" id="{949389A0-7C35-D440-A511-E8043CC49841}"/>
+                  <a16:creationId xmlns:a16="http://schemas.microsoft.com/office/drawing/2014/main" xmlns="" id="{949389A0-7C35-D440-A511-E8043CC49841}"/>
                 </a:ext>
               </a:extLst>
             </p:cNvPr>
@@ -15497,7 +15548,7 @@
             <p:cNvPr id="31752" name="Freeform 9" descr="5%">
               <a:extLst>
                 <a:ext uri="{FF2B5EF4-FFF2-40B4-BE49-F238E27FC236}">
-                  <a16:creationId xmlns="" xmlns:a16="http://schemas.microsoft.com/office/drawing/2014/main" id="{06CE39B2-5F93-C74A-AAF4-A1377571A4EA}"/>
+                  <a16:creationId xmlns:a16="http://schemas.microsoft.com/office/drawing/2014/main" xmlns="" id="{06CE39B2-5F93-C74A-AAF4-A1377571A4EA}"/>
                 </a:ext>
               </a:extLst>
             </p:cNvPr>
@@ -15616,7 +15667,7 @@
             <p:cNvPr id="31753" name="Freeform 10" descr="5%">
               <a:extLst>
                 <a:ext uri="{FF2B5EF4-FFF2-40B4-BE49-F238E27FC236}">
-                  <a16:creationId xmlns="" xmlns:a16="http://schemas.microsoft.com/office/drawing/2014/main" id="{C97A05CA-BA23-5B43-BB1D-598E35F33716}"/>
+                  <a16:creationId xmlns:a16="http://schemas.microsoft.com/office/drawing/2014/main" xmlns="" id="{C97A05CA-BA23-5B43-BB1D-598E35F33716}"/>
                 </a:ext>
               </a:extLst>
             </p:cNvPr>
@@ -15735,7 +15786,7 @@
             <p:cNvPr id="31754" name="Freeform 11" descr="5%">
               <a:extLst>
                 <a:ext uri="{FF2B5EF4-FFF2-40B4-BE49-F238E27FC236}">
-                  <a16:creationId xmlns="" xmlns:a16="http://schemas.microsoft.com/office/drawing/2014/main" id="{2B84887D-7D31-644A-9461-B0EF770AB71C}"/>
+                  <a16:creationId xmlns:a16="http://schemas.microsoft.com/office/drawing/2014/main" xmlns="" id="{2B84887D-7D31-644A-9461-B0EF770AB71C}"/>
                 </a:ext>
               </a:extLst>
             </p:cNvPr>
@@ -15854,7 +15905,7 @@
             <p:cNvPr id="31755" name="Freeform 12" descr="5%">
               <a:extLst>
                 <a:ext uri="{FF2B5EF4-FFF2-40B4-BE49-F238E27FC236}">
-                  <a16:creationId xmlns="" xmlns:a16="http://schemas.microsoft.com/office/drawing/2014/main" id="{66D9D94A-DB3D-9246-8945-18F31C431B30}"/>
+                  <a16:creationId xmlns:a16="http://schemas.microsoft.com/office/drawing/2014/main" xmlns="" id="{66D9D94A-DB3D-9246-8945-18F31C431B30}"/>
                 </a:ext>
               </a:extLst>
             </p:cNvPr>
@@ -15973,7 +16024,7 @@
             <p:cNvPr id="31756" name="Freeform 13" descr="5%">
               <a:extLst>
                 <a:ext uri="{FF2B5EF4-FFF2-40B4-BE49-F238E27FC236}">
-                  <a16:creationId xmlns="" xmlns:a16="http://schemas.microsoft.com/office/drawing/2014/main" id="{EAD71A5A-2B41-2E4C-B00A-6C190547D1ED}"/>
+                  <a16:creationId xmlns:a16="http://schemas.microsoft.com/office/drawing/2014/main" xmlns="" id="{EAD71A5A-2B41-2E4C-B00A-6C190547D1ED}"/>
                 </a:ext>
               </a:extLst>
             </p:cNvPr>
@@ -16093,7 +16144,7 @@
           <p:cNvPr id="31748" name="Freeform 17">
             <a:extLst>
               <a:ext uri="{FF2B5EF4-FFF2-40B4-BE49-F238E27FC236}">
-                <a16:creationId xmlns="" xmlns:a16="http://schemas.microsoft.com/office/drawing/2014/main" id="{7F1EC75B-5B06-4F42-A007-2C7CE755ABBE}"/>
+                <a16:creationId xmlns:a16="http://schemas.microsoft.com/office/drawing/2014/main" xmlns="" id="{7F1EC75B-5B06-4F42-A007-2C7CE755ABBE}"/>
               </a:ext>
             </a:extLst>
           </p:cNvPr>
@@ -16208,7 +16259,7 @@
           <p:cNvPr id="31749" name="17 Imagen">
             <a:extLst>
               <a:ext uri="{FF2B5EF4-FFF2-40B4-BE49-F238E27FC236}">
-                <a16:creationId xmlns="" xmlns:a16="http://schemas.microsoft.com/office/drawing/2014/main" id="{F3812B2B-ED5E-D14C-803D-3858F435CB5E}"/>
+                <a16:creationId xmlns:a16="http://schemas.microsoft.com/office/drawing/2014/main" xmlns="" id="{F3812B2B-ED5E-D14C-803D-3858F435CB5E}"/>
               </a:ext>
             </a:extLst>
           </p:cNvPr>
@@ -16268,7 +16319,7 @@
           <p:cNvPr id="31750" name="Imagen 15">
             <a:extLst>
               <a:ext uri="{FF2B5EF4-FFF2-40B4-BE49-F238E27FC236}">
-                <a16:creationId xmlns="" xmlns:a16="http://schemas.microsoft.com/office/drawing/2014/main" id="{41854531-9AB6-5240-8FAD-0DA24A1221E5}"/>
+                <a16:creationId xmlns:a16="http://schemas.microsoft.com/office/drawing/2014/main" xmlns="" id="{41854531-9AB6-5240-8FAD-0DA24A1221E5}"/>
               </a:ext>
             </a:extLst>
           </p:cNvPr>
@@ -16360,7 +16411,7 @@
           <p:cNvPr id="16385" name="Rectangle 14">
             <a:extLst>
               <a:ext uri="{FF2B5EF4-FFF2-40B4-BE49-F238E27FC236}">
-                <a16:creationId xmlns="" xmlns:a16="http://schemas.microsoft.com/office/drawing/2014/main" id="{3665E0D4-68DF-7A4B-92E0-B652D965824C}"/>
+                <a16:creationId xmlns:a16="http://schemas.microsoft.com/office/drawing/2014/main" xmlns="" id="{3665E0D4-68DF-7A4B-92E0-B652D965824C}"/>
               </a:ext>
             </a:extLst>
           </p:cNvPr>
@@ -16625,7 +16676,272 @@
           <p:cNvPr id="16385" name="Rectangle 14">
             <a:extLst>
               <a:ext uri="{FF2B5EF4-FFF2-40B4-BE49-F238E27FC236}">
-                <a16:creationId xmlns="" xmlns:a16="http://schemas.microsoft.com/office/drawing/2014/main" id="{3665E0D4-68DF-7A4B-92E0-B652D965824C}"/>
+                <a16:creationId xmlns:a16="http://schemas.microsoft.com/office/drawing/2014/main" xmlns="" id="{3665E0D4-68DF-7A4B-92E0-B652D965824C}"/>
+              </a:ext>
+            </a:extLst>
+          </p:cNvPr>
+          <p:cNvSpPr>
+            <a:spLocks noChangeArrowheads="1"/>
+          </p:cNvSpPr>
+          <p:nvPr/>
+        </p:nvSpPr>
+        <p:spPr bwMode="auto">
+          <a:xfrm>
+            <a:off x="2627313" y="198438"/>
+            <a:ext cx="5400675" cy="566737"/>
+          </a:xfrm>
+          <a:prstGeom prst="rect">
+            <a:avLst/>
+          </a:prstGeom>
+          <a:noFill/>
+          <a:ln>
+            <a:noFill/>
+          </a:ln>
+          <a:effectLst/>
+          <a:extLst>
+            <a:ext uri="{909E8E84-426E-40DD-AFC4-6F175D3DCCD1}">
+              <a14:hiddenFill xmlns:a14="http://schemas.microsoft.com/office/drawing/2010/main">
+                <a:solidFill>
+                  <a:schemeClr val="bg1"/>
+                </a:solidFill>
+              </a14:hiddenFill>
+            </a:ext>
+            <a:ext uri="{91240B29-F687-4F45-9708-019B960494DF}">
+              <a14:hiddenLine xmlns:a14="http://schemas.microsoft.com/office/drawing/2010/main" w="12700">
+                <a:solidFill>
+                  <a:schemeClr val="tx1"/>
+                </a:solidFill>
+                <a:miter lim="800000"/>
+                <a:headEnd/>
+                <a:tailEnd/>
+              </a14:hiddenLine>
+            </a:ext>
+            <a:ext uri="{AF507438-7753-43E0-B8FC-AC1667EBCBE1}">
+              <a14:hiddenEffects xmlns:a14="http://schemas.microsoft.com/office/drawing/2010/main">
+                <a:effectLst>
+                  <a:outerShdw dist="107763" dir="2700000" algn="ctr" rotWithShape="0">
+                    <a:srgbClr val="DBFFB8"/>
+                  </a:outerShdw>
+                </a:effectLst>
+              </a14:hiddenEffects>
+            </a:ext>
+          </a:extLst>
+        </p:spPr>
+        <p:txBody>
+          <a:bodyPr wrap="none" lIns="45720" tIns="44450" rIns="45720" bIns="44450" anchor="ctr"/>
+          <a:lstStyle>
+            <a:lvl1pPr>
+              <a:spcBef>
+                <a:spcPct val="20000"/>
+              </a:spcBef>
+              <a:buChar char="•"/>
+              <a:defRPr sz="3200">
+                <a:solidFill>
+                  <a:schemeClr val="tx1"/>
+                </a:solidFill>
+                <a:latin typeface="Arial" panose="020B0604020202020204" pitchFamily="34" charset="0"/>
+              </a:defRPr>
+            </a:lvl1pPr>
+            <a:lvl2pPr marL="742950" indent="-285750">
+              <a:spcBef>
+                <a:spcPct val="20000"/>
+              </a:spcBef>
+              <a:buChar char="–"/>
+              <a:defRPr sz="2800">
+                <a:solidFill>
+                  <a:schemeClr val="tx1"/>
+                </a:solidFill>
+                <a:latin typeface="Arial" panose="020B0604020202020204" pitchFamily="34" charset="0"/>
+              </a:defRPr>
+            </a:lvl2pPr>
+            <a:lvl3pPr marL="1143000" indent="-228600">
+              <a:spcBef>
+                <a:spcPct val="20000"/>
+              </a:spcBef>
+              <a:buChar char="•"/>
+              <a:defRPr sz="2400">
+                <a:solidFill>
+                  <a:schemeClr val="tx1"/>
+                </a:solidFill>
+                <a:latin typeface="Arial" panose="020B0604020202020204" pitchFamily="34" charset="0"/>
+              </a:defRPr>
+            </a:lvl3pPr>
+            <a:lvl4pPr marL="1600200" indent="-228600">
+              <a:spcBef>
+                <a:spcPct val="20000"/>
+              </a:spcBef>
+              <a:buChar char="–"/>
+              <a:defRPr sz="2000">
+                <a:solidFill>
+                  <a:schemeClr val="tx1"/>
+                </a:solidFill>
+                <a:latin typeface="Arial" panose="020B0604020202020204" pitchFamily="34" charset="0"/>
+              </a:defRPr>
+            </a:lvl4pPr>
+            <a:lvl5pPr marL="2057400" indent="-228600">
+              <a:spcBef>
+                <a:spcPct val="20000"/>
+              </a:spcBef>
+              <a:buChar char="»"/>
+              <a:defRPr sz="2000">
+                <a:solidFill>
+                  <a:schemeClr val="tx1"/>
+                </a:solidFill>
+                <a:latin typeface="Arial" panose="020B0604020202020204" pitchFamily="34" charset="0"/>
+              </a:defRPr>
+            </a:lvl5pPr>
+            <a:lvl6pPr marL="2514600" indent="-228600" eaLnBrk="0" fontAlgn="base" hangingPunct="0">
+              <a:spcBef>
+                <a:spcPct val="20000"/>
+              </a:spcBef>
+              <a:spcAft>
+                <a:spcPct val="0"/>
+              </a:spcAft>
+              <a:buChar char="»"/>
+              <a:defRPr sz="2000">
+                <a:solidFill>
+                  <a:schemeClr val="tx1"/>
+                </a:solidFill>
+                <a:latin typeface="Arial" panose="020B0604020202020204" pitchFamily="34" charset="0"/>
+              </a:defRPr>
+            </a:lvl6pPr>
+            <a:lvl7pPr marL="2971800" indent="-228600" eaLnBrk="0" fontAlgn="base" hangingPunct="0">
+              <a:spcBef>
+                <a:spcPct val="20000"/>
+              </a:spcBef>
+              <a:spcAft>
+                <a:spcPct val="0"/>
+              </a:spcAft>
+              <a:buChar char="»"/>
+              <a:defRPr sz="2000">
+                <a:solidFill>
+                  <a:schemeClr val="tx1"/>
+                </a:solidFill>
+                <a:latin typeface="Arial" panose="020B0604020202020204" pitchFamily="34" charset="0"/>
+              </a:defRPr>
+            </a:lvl7pPr>
+            <a:lvl8pPr marL="3429000" indent="-228600" eaLnBrk="0" fontAlgn="base" hangingPunct="0">
+              <a:spcBef>
+                <a:spcPct val="20000"/>
+              </a:spcBef>
+              <a:spcAft>
+                <a:spcPct val="0"/>
+              </a:spcAft>
+              <a:buChar char="»"/>
+              <a:defRPr sz="2000">
+                <a:solidFill>
+                  <a:schemeClr val="tx1"/>
+                </a:solidFill>
+                <a:latin typeface="Arial" panose="020B0604020202020204" pitchFamily="34" charset="0"/>
+              </a:defRPr>
+            </a:lvl8pPr>
+            <a:lvl9pPr marL="3886200" indent="-228600" eaLnBrk="0" fontAlgn="base" hangingPunct="0">
+              <a:spcBef>
+                <a:spcPct val="20000"/>
+              </a:spcBef>
+              <a:spcAft>
+                <a:spcPct val="0"/>
+              </a:spcAft>
+              <a:buChar char="»"/>
+              <a:defRPr sz="2000">
+                <a:solidFill>
+                  <a:schemeClr val="tx1"/>
+                </a:solidFill>
+                <a:latin typeface="Arial" panose="020B0604020202020204" pitchFamily="34" charset="0"/>
+              </a:defRPr>
+            </a:lvl9pPr>
+          </a:lstStyle>
+          <a:p>
+            <a:pPr algn="ctr" eaLnBrk="1" hangingPunct="1">
+              <a:spcBef>
+                <a:spcPct val="0"/>
+              </a:spcBef>
+              <a:buFontTx/>
+              <a:buNone/>
+            </a:pPr>
+            <a:r>
+              <a:rPr lang="en-US" altLang="es-ES" sz="2800" b="1" dirty="0" smtClean="0">
+                <a:solidFill>
+                  <a:schemeClr val="tx2"/>
+                </a:solidFill>
+              </a:rPr>
+              <a:t>ERS. Catálogo de Requisitos.</a:t>
+            </a:r>
+            <a:endParaRPr lang="en-US" altLang="es-ES" sz="2800" b="1" dirty="0">
+              <a:solidFill>
+                <a:schemeClr val="tx2"/>
+              </a:solidFill>
+            </a:endParaRPr>
+          </a:p>
+        </p:txBody>
+      </p:sp>
+      <p:graphicFrame>
+        <p:nvGraphicFramePr>
+          <p:cNvPr id="3" name="Gráfico 2"/>
+          <p:cNvGraphicFramePr>
+            <a:graphicFrameLocks/>
+          </p:cNvGraphicFramePr>
+          <p:nvPr>
+            <p:extLst>
+              <p:ext uri="{D42A27DB-BD31-4B8C-83A1-F6EECF244321}">
+                <p14:modId xmlns:p14="http://schemas.microsoft.com/office/powerpoint/2010/main" val="2947063813"/>
+              </p:ext>
+            </p:extLst>
+          </p:nvPr>
+        </p:nvGraphicFramePr>
+        <p:xfrm>
+          <a:off x="683568" y="1052736"/>
+          <a:ext cx="7776864" cy="4968552"/>
+        </p:xfrm>
+        <a:graphic>
+          <a:graphicData uri="http://schemas.openxmlformats.org/drawingml/2006/chart">
+            <c:chart xmlns:c="http://schemas.openxmlformats.org/drawingml/2006/chart" xmlns:r="http://schemas.openxmlformats.org/officeDocument/2006/relationships" r:id="rId3"/>
+          </a:graphicData>
+        </a:graphic>
+      </p:graphicFrame>
+    </p:spTree>
+    <p:extLst>
+      <p:ext uri="{BB962C8B-B14F-4D97-AF65-F5344CB8AC3E}">
+        <p14:creationId xmlns:p14="http://schemas.microsoft.com/office/powerpoint/2010/main" val="3511425358"/>
+      </p:ext>
+    </p:extLst>
+  </p:cSld>
+  <p:clrMapOvr>
+    <a:masterClrMapping/>
+  </p:clrMapOvr>
+  <p:timing>
+    <p:tnLst>
+      <p:par>
+        <p:cTn id="1" dur="indefinite" restart="never" nodeType="tmRoot"/>
+      </p:par>
+    </p:tnLst>
+  </p:timing>
+</p:sld>
+</file>
+
+<file path=ppt/slides/slide5.xml><?xml version="1.0" encoding="utf-8"?>
+<p:sld xmlns:a="http://schemas.openxmlformats.org/drawingml/2006/main" xmlns:r="http://schemas.openxmlformats.org/officeDocument/2006/relationships" xmlns:p="http://schemas.openxmlformats.org/presentationml/2006/main">
+  <p:cSld>
+    <p:spTree>
+      <p:nvGrpSpPr>
+        <p:cNvPr id="1" name=""/>
+        <p:cNvGrpSpPr/>
+        <p:nvPr/>
+      </p:nvGrpSpPr>
+      <p:grpSpPr>
+        <a:xfrm>
+          <a:off x="0" y="0"/>
+          <a:ext cx="0" cy="0"/>
+          <a:chOff x="0" y="0"/>
+          <a:chExt cx="0" cy="0"/>
+        </a:xfrm>
+      </p:grpSpPr>
+      <p:sp>
+        <p:nvSpPr>
+          <p:cNvPr id="16385" name="Rectangle 14">
+            <a:extLst>
+              <a:ext uri="{FF2B5EF4-FFF2-40B4-BE49-F238E27FC236}">
+                <a16:creationId xmlns:a16="http://schemas.microsoft.com/office/drawing/2014/main" xmlns="" id="{3665E0D4-68DF-7A4B-92E0-B652D965824C}"/>
               </a:ext>
             </a:extLst>
           </p:cNvPr>
@@ -16925,271 +17241,6 @@
 </p:sld>
 </file>
 
-<file path=ppt/slides/slide5.xml><?xml version="1.0" encoding="utf-8"?>
-<p:sld xmlns:a="http://schemas.openxmlformats.org/drawingml/2006/main" xmlns:r="http://schemas.openxmlformats.org/officeDocument/2006/relationships" xmlns:p="http://schemas.openxmlformats.org/presentationml/2006/main">
-  <p:cSld>
-    <p:spTree>
-      <p:nvGrpSpPr>
-        <p:cNvPr id="1" name=""/>
-        <p:cNvGrpSpPr/>
-        <p:nvPr/>
-      </p:nvGrpSpPr>
-      <p:grpSpPr>
-        <a:xfrm>
-          <a:off x="0" y="0"/>
-          <a:ext cx="0" cy="0"/>
-          <a:chOff x="0" y="0"/>
-          <a:chExt cx="0" cy="0"/>
-        </a:xfrm>
-      </p:grpSpPr>
-      <p:sp>
-        <p:nvSpPr>
-          <p:cNvPr id="16385" name="Rectangle 14">
-            <a:extLst>
-              <a:ext uri="{FF2B5EF4-FFF2-40B4-BE49-F238E27FC236}">
-                <a16:creationId xmlns="" xmlns:a16="http://schemas.microsoft.com/office/drawing/2014/main" id="{3665E0D4-68DF-7A4B-92E0-B652D965824C}"/>
-              </a:ext>
-            </a:extLst>
-          </p:cNvPr>
-          <p:cNvSpPr>
-            <a:spLocks noChangeArrowheads="1"/>
-          </p:cNvSpPr>
-          <p:nvPr/>
-        </p:nvSpPr>
-        <p:spPr bwMode="auto">
-          <a:xfrm>
-            <a:off x="2627313" y="198438"/>
-            <a:ext cx="5400675" cy="566737"/>
-          </a:xfrm>
-          <a:prstGeom prst="rect">
-            <a:avLst/>
-          </a:prstGeom>
-          <a:noFill/>
-          <a:ln>
-            <a:noFill/>
-          </a:ln>
-          <a:effectLst/>
-          <a:extLst>
-            <a:ext uri="{909E8E84-426E-40DD-AFC4-6F175D3DCCD1}">
-              <a14:hiddenFill xmlns:a14="http://schemas.microsoft.com/office/drawing/2010/main">
-                <a:solidFill>
-                  <a:schemeClr val="bg1"/>
-                </a:solidFill>
-              </a14:hiddenFill>
-            </a:ext>
-            <a:ext uri="{91240B29-F687-4F45-9708-019B960494DF}">
-              <a14:hiddenLine xmlns:a14="http://schemas.microsoft.com/office/drawing/2010/main" w="12700">
-                <a:solidFill>
-                  <a:schemeClr val="tx1"/>
-                </a:solidFill>
-                <a:miter lim="800000"/>
-                <a:headEnd/>
-                <a:tailEnd/>
-              </a14:hiddenLine>
-            </a:ext>
-            <a:ext uri="{AF507438-7753-43E0-B8FC-AC1667EBCBE1}">
-              <a14:hiddenEffects xmlns:a14="http://schemas.microsoft.com/office/drawing/2010/main">
-                <a:effectLst>
-                  <a:outerShdw dist="107763" dir="2700000" algn="ctr" rotWithShape="0">
-                    <a:srgbClr val="DBFFB8"/>
-                  </a:outerShdw>
-                </a:effectLst>
-              </a14:hiddenEffects>
-            </a:ext>
-          </a:extLst>
-        </p:spPr>
-        <p:txBody>
-          <a:bodyPr wrap="none" lIns="45720" tIns="44450" rIns="45720" bIns="44450" anchor="ctr"/>
-          <a:lstStyle>
-            <a:lvl1pPr>
-              <a:spcBef>
-                <a:spcPct val="20000"/>
-              </a:spcBef>
-              <a:buChar char="•"/>
-              <a:defRPr sz="3200">
-                <a:solidFill>
-                  <a:schemeClr val="tx1"/>
-                </a:solidFill>
-                <a:latin typeface="Arial" panose="020B0604020202020204" pitchFamily="34" charset="0"/>
-              </a:defRPr>
-            </a:lvl1pPr>
-            <a:lvl2pPr marL="742950" indent="-285750">
-              <a:spcBef>
-                <a:spcPct val="20000"/>
-              </a:spcBef>
-              <a:buChar char="–"/>
-              <a:defRPr sz="2800">
-                <a:solidFill>
-                  <a:schemeClr val="tx1"/>
-                </a:solidFill>
-                <a:latin typeface="Arial" panose="020B0604020202020204" pitchFamily="34" charset="0"/>
-              </a:defRPr>
-            </a:lvl2pPr>
-            <a:lvl3pPr marL="1143000" indent="-228600">
-              <a:spcBef>
-                <a:spcPct val="20000"/>
-              </a:spcBef>
-              <a:buChar char="•"/>
-              <a:defRPr sz="2400">
-                <a:solidFill>
-                  <a:schemeClr val="tx1"/>
-                </a:solidFill>
-                <a:latin typeface="Arial" panose="020B0604020202020204" pitchFamily="34" charset="0"/>
-              </a:defRPr>
-            </a:lvl3pPr>
-            <a:lvl4pPr marL="1600200" indent="-228600">
-              <a:spcBef>
-                <a:spcPct val="20000"/>
-              </a:spcBef>
-              <a:buChar char="–"/>
-              <a:defRPr sz="2000">
-                <a:solidFill>
-                  <a:schemeClr val="tx1"/>
-                </a:solidFill>
-                <a:latin typeface="Arial" panose="020B0604020202020204" pitchFamily="34" charset="0"/>
-              </a:defRPr>
-            </a:lvl4pPr>
-            <a:lvl5pPr marL="2057400" indent="-228600">
-              <a:spcBef>
-                <a:spcPct val="20000"/>
-              </a:spcBef>
-              <a:buChar char="»"/>
-              <a:defRPr sz="2000">
-                <a:solidFill>
-                  <a:schemeClr val="tx1"/>
-                </a:solidFill>
-                <a:latin typeface="Arial" panose="020B0604020202020204" pitchFamily="34" charset="0"/>
-              </a:defRPr>
-            </a:lvl5pPr>
-            <a:lvl6pPr marL="2514600" indent="-228600" eaLnBrk="0" fontAlgn="base" hangingPunct="0">
-              <a:spcBef>
-                <a:spcPct val="20000"/>
-              </a:spcBef>
-              <a:spcAft>
-                <a:spcPct val="0"/>
-              </a:spcAft>
-              <a:buChar char="»"/>
-              <a:defRPr sz="2000">
-                <a:solidFill>
-                  <a:schemeClr val="tx1"/>
-                </a:solidFill>
-                <a:latin typeface="Arial" panose="020B0604020202020204" pitchFamily="34" charset="0"/>
-              </a:defRPr>
-            </a:lvl6pPr>
-            <a:lvl7pPr marL="2971800" indent="-228600" eaLnBrk="0" fontAlgn="base" hangingPunct="0">
-              <a:spcBef>
-                <a:spcPct val="20000"/>
-              </a:spcBef>
-              <a:spcAft>
-                <a:spcPct val="0"/>
-              </a:spcAft>
-              <a:buChar char="»"/>
-              <a:defRPr sz="2000">
-                <a:solidFill>
-                  <a:schemeClr val="tx1"/>
-                </a:solidFill>
-                <a:latin typeface="Arial" panose="020B0604020202020204" pitchFamily="34" charset="0"/>
-              </a:defRPr>
-            </a:lvl7pPr>
-            <a:lvl8pPr marL="3429000" indent="-228600" eaLnBrk="0" fontAlgn="base" hangingPunct="0">
-              <a:spcBef>
-                <a:spcPct val="20000"/>
-              </a:spcBef>
-              <a:spcAft>
-                <a:spcPct val="0"/>
-              </a:spcAft>
-              <a:buChar char="»"/>
-              <a:defRPr sz="2000">
-                <a:solidFill>
-                  <a:schemeClr val="tx1"/>
-                </a:solidFill>
-                <a:latin typeface="Arial" panose="020B0604020202020204" pitchFamily="34" charset="0"/>
-              </a:defRPr>
-            </a:lvl8pPr>
-            <a:lvl9pPr marL="3886200" indent="-228600" eaLnBrk="0" fontAlgn="base" hangingPunct="0">
-              <a:spcBef>
-                <a:spcPct val="20000"/>
-              </a:spcBef>
-              <a:spcAft>
-                <a:spcPct val="0"/>
-              </a:spcAft>
-              <a:buChar char="»"/>
-              <a:defRPr sz="2000">
-                <a:solidFill>
-                  <a:schemeClr val="tx1"/>
-                </a:solidFill>
-                <a:latin typeface="Arial" panose="020B0604020202020204" pitchFamily="34" charset="0"/>
-              </a:defRPr>
-            </a:lvl9pPr>
-          </a:lstStyle>
-          <a:p>
-            <a:pPr algn="ctr" eaLnBrk="1" hangingPunct="1">
-              <a:spcBef>
-                <a:spcPct val="0"/>
-              </a:spcBef>
-              <a:buFontTx/>
-              <a:buNone/>
-            </a:pPr>
-            <a:r>
-              <a:rPr lang="en-US" altLang="es-ES" sz="2800" b="1" dirty="0" smtClean="0">
-                <a:solidFill>
-                  <a:schemeClr val="tx2"/>
-                </a:solidFill>
-              </a:rPr>
-              <a:t>ERS. Catálogo de Requisitos.</a:t>
-            </a:r>
-            <a:endParaRPr lang="en-US" altLang="es-ES" sz="2800" b="1" dirty="0">
-              <a:solidFill>
-                <a:schemeClr val="tx2"/>
-              </a:solidFill>
-            </a:endParaRPr>
-          </a:p>
-        </p:txBody>
-      </p:sp>
-      <p:graphicFrame>
-        <p:nvGraphicFramePr>
-          <p:cNvPr id="3" name="Gráfico 2"/>
-          <p:cNvGraphicFramePr>
-            <a:graphicFrameLocks/>
-          </p:cNvGraphicFramePr>
-          <p:nvPr>
-            <p:extLst>
-              <p:ext uri="{D42A27DB-BD31-4B8C-83A1-F6EECF244321}">
-                <p14:modId xmlns:p14="http://schemas.microsoft.com/office/powerpoint/2010/main" val="2947063813"/>
-              </p:ext>
-            </p:extLst>
-          </p:nvPr>
-        </p:nvGraphicFramePr>
-        <p:xfrm>
-          <a:off x="683568" y="1052736"/>
-          <a:ext cx="7776864" cy="4968552"/>
-        </p:xfrm>
-        <a:graphic>
-          <a:graphicData uri="http://schemas.openxmlformats.org/drawingml/2006/chart">
-            <c:chart xmlns:c="http://schemas.openxmlformats.org/drawingml/2006/chart" xmlns:r="http://schemas.openxmlformats.org/officeDocument/2006/relationships" r:id="rId3"/>
-          </a:graphicData>
-        </a:graphic>
-      </p:graphicFrame>
-    </p:spTree>
-    <p:extLst>
-      <p:ext uri="{BB962C8B-B14F-4D97-AF65-F5344CB8AC3E}">
-        <p14:creationId xmlns:p14="http://schemas.microsoft.com/office/powerpoint/2010/main" val="3511425358"/>
-      </p:ext>
-    </p:extLst>
-  </p:cSld>
-  <p:clrMapOvr>
-    <a:masterClrMapping/>
-  </p:clrMapOvr>
-  <p:timing>
-    <p:tnLst>
-      <p:par>
-        <p:cTn id="1" dur="indefinite" restart="never" nodeType="tmRoot"/>
-      </p:par>
-    </p:tnLst>
-  </p:timing>
-</p:sld>
-</file>
-
 <file path=ppt/slides/slide6.xml><?xml version="1.0" encoding="utf-8"?>
 <p:sld xmlns:a="http://schemas.openxmlformats.org/drawingml/2006/main" xmlns:r="http://schemas.openxmlformats.org/officeDocument/2006/relationships" xmlns:p="http://schemas.openxmlformats.org/presentationml/2006/main">
   <p:cSld>
@@ -17212,7 +17263,7 @@
           <p:cNvPr id="16385" name="Rectangle 14">
             <a:extLst>
               <a:ext uri="{FF2B5EF4-FFF2-40B4-BE49-F238E27FC236}">
-                <a16:creationId xmlns="" xmlns:a16="http://schemas.microsoft.com/office/drawing/2014/main" id="{3665E0D4-68DF-7A4B-92E0-B652D965824C}"/>
+                <a16:creationId xmlns:a16="http://schemas.microsoft.com/office/drawing/2014/main" xmlns="" id="{3665E0D4-68DF-7A4B-92E0-B652D965824C}"/>
               </a:ext>
             </a:extLst>
           </p:cNvPr>
@@ -17443,8 +17494,8 @@
         </p:blipFill>
         <p:spPr>
           <a:xfrm>
-            <a:off x="2267744" y="605588"/>
-            <a:ext cx="5052218" cy="6190499"/>
+            <a:off x="2267744" y="619873"/>
+            <a:ext cx="5040560" cy="5977479"/>
           </a:xfrm>
           <a:prstGeom prst="rect">
             <a:avLst/>
@@ -17493,7 +17544,7 @@
           <p:cNvPr id="16385" name="Rectangle 14">
             <a:extLst>
               <a:ext uri="{FF2B5EF4-FFF2-40B4-BE49-F238E27FC236}">
-                <a16:creationId xmlns="" xmlns:a16="http://schemas.microsoft.com/office/drawing/2014/main" id="{3665E0D4-68DF-7A4B-92E0-B652D965824C}"/>
+                <a16:creationId xmlns:a16="http://schemas.microsoft.com/office/drawing/2014/main" xmlns="" id="{3665E0D4-68DF-7A4B-92E0-B652D965824C}"/>
               </a:ext>
             </a:extLst>
           </p:cNvPr>
@@ -17774,7 +17825,7 @@
           <p:cNvPr id="16385" name="Rectangle 14">
             <a:extLst>
               <a:ext uri="{FF2B5EF4-FFF2-40B4-BE49-F238E27FC236}">
-                <a16:creationId xmlns="" xmlns:a16="http://schemas.microsoft.com/office/drawing/2014/main" id="{3665E0D4-68DF-7A4B-92E0-B652D965824C}"/>
+                <a16:creationId xmlns:a16="http://schemas.microsoft.com/office/drawing/2014/main" xmlns="" id="{3665E0D4-68DF-7A4B-92E0-B652D965824C}"/>
               </a:ext>
             </a:extLst>
           </p:cNvPr>
@@ -18055,7 +18106,7 @@
           <p:cNvPr id="16385" name="Rectangle 14">
             <a:extLst>
               <a:ext uri="{FF2B5EF4-FFF2-40B4-BE49-F238E27FC236}">
-                <a16:creationId xmlns="" xmlns:a16="http://schemas.microsoft.com/office/drawing/2014/main" id="{3665E0D4-68DF-7A4B-92E0-B652D965824C}"/>
+                <a16:creationId xmlns:a16="http://schemas.microsoft.com/office/drawing/2014/main" xmlns="" id="{3665E0D4-68DF-7A4B-92E0-B652D965824C}"/>
               </a:ext>
             </a:extLst>
           </p:cNvPr>

</xml_diff>

<commit_message>
Presentacion ERS AGNEX actualizado el 17/05/2019
</commit_message>
<xml_diff>
--- a/ERS/Presentación_ERS_AGNEX.pptx
+++ b/ERS/Presentación_ERS_AGNEX.pptx
@@ -221,7 +221,6 @@
           </a:p>
         </c:rich>
       </c:tx>
-      <c:layout/>
       <c:overlay val="0"/>
       <c:spPr>
         <a:noFill/>
@@ -466,7 +465,6 @@
               <c:showBubbleSize val="0"/>
               <c:extLst>
                 <c:ext xmlns:c15="http://schemas.microsoft.com/office/drawing/2012/chart" uri="{CE6537A1-D6FC-4f65-9D91-7224C49458BB}">
-                  <c15:layout/>
                   <c15:dlblFieldTable/>
                   <c15:showDataLabelsRange val="0"/>
                 </c:ext>
@@ -574,7 +572,6 @@
               <c:showBubbleSize val="0"/>
               <c:extLst>
                 <c:ext xmlns:c15="http://schemas.microsoft.com/office/drawing/2012/chart" uri="{CE6537A1-D6FC-4f65-9D91-7224C49458BB}">
-                  <c15:layout/>
                   <c15:dlblFieldTable/>
                   <c15:showDataLabelsRange val="0"/>
                 </c:ext>
@@ -13900,13 +13897,7 @@
               <a:rPr lang="es-ES" altLang="es-ES" sz="2000" dirty="0" smtClean="0">
                 <a:cs typeface="Arial" panose="020B0604020202020204" pitchFamily="34" charset="0"/>
               </a:rPr>
-              <a:t>Modelo de Dominio</a:t>
-            </a:r>
-            <a:r>
-              <a:rPr lang="es-ES" altLang="es-ES" sz="2000" dirty="0" smtClean="0">
-                <a:cs typeface="Arial" panose="020B0604020202020204" pitchFamily="34" charset="0"/>
-              </a:rPr>
-              <a:t>.</a:t>
+              <a:t>Modelo de Dominio.</a:t>
             </a:r>
           </a:p>
           <a:p>
@@ -14008,7 +13999,7 @@
               <a:rPr lang="es-ES" altLang="es-ES" sz="2000" dirty="0" err="1" smtClean="0">
                 <a:cs typeface="Arial" panose="020B0604020202020204" pitchFamily="34" charset="0"/>
               </a:rPr>
-              <a:t>Mapping</a:t>
+              <a:t>Map</a:t>
             </a:r>
             <a:r>
               <a:rPr lang="es-ES" altLang="es-ES" sz="2000" dirty="0" smtClean="0">
@@ -18323,7 +18314,7 @@
       </p:sp>
       <p:pic>
         <p:nvPicPr>
-          <p:cNvPr id="3" name="Imagen 2"/>
+          <p:cNvPr id="2" name="Imagen 1"/>
           <p:cNvPicPr>
             <a:picLocks noChangeAspect="1"/>
           </p:cNvPicPr>
@@ -18337,8 +18328,8 @@
         </p:blipFill>
         <p:spPr>
           <a:xfrm>
-            <a:off x="683568" y="880501"/>
-            <a:ext cx="7843676" cy="5140787"/>
+            <a:off x="750727" y="908720"/>
+            <a:ext cx="7751723" cy="5112567"/>
           </a:xfrm>
           <a:prstGeom prst="rect">
             <a:avLst/>

</xml_diff>

<commit_message>
Presentación AGNEX formato PowerPoint actualizado el 22/05/2019
</commit_message>
<xml_diff>
--- a/ERS/Presentación_ERS_AGNEX.pptx
+++ b/ERS/Presentación_ERS_AGNEX.pptx
@@ -221,6 +221,7 @@
           </a:p>
         </c:rich>
       </c:tx>
+      <c:layout/>
       <c:overlay val="0"/>
       <c:spPr>
         <a:noFill/>
@@ -465,6 +466,7 @@
               <c:showBubbleSize val="0"/>
               <c:extLst>
                 <c:ext xmlns:c15="http://schemas.microsoft.com/office/drawing/2012/chart" uri="{CE6537A1-D6FC-4f65-9D91-7224C49458BB}">
+                  <c15:layout/>
                   <c15:dlblFieldTable/>
                   <c15:showDataLabelsRange val="0"/>
                 </c:ext>
@@ -572,6 +574,7 @@
               <c:showBubbleSize val="0"/>
               <c:extLst>
                 <c:ext xmlns:c15="http://schemas.microsoft.com/office/drawing/2012/chart" uri="{CE6537A1-D6FC-4f65-9D91-7224C49458BB}">
+                  <c15:layout/>
                   <c15:dlblFieldTable/>
                   <c15:showDataLabelsRange val="0"/>
                 </c:ext>
@@ -1318,7 +1321,7 @@
           <p:cNvPr id="4098" name="Rectangle 2">
             <a:extLst>
               <a:ext uri="{FF2B5EF4-FFF2-40B4-BE49-F238E27FC236}">
-                <a16:creationId xmlns:a16="http://schemas.microsoft.com/office/drawing/2014/main" xmlns="" id="{7301BB8C-2DAA-A145-A2E1-B3649391EB9D}"/>
+                <a16:creationId xmlns="" xmlns:a16="http://schemas.microsoft.com/office/drawing/2014/main" id="{7301BB8C-2DAA-A145-A2E1-B3649391EB9D}"/>
               </a:ext>
             </a:extLst>
           </p:cNvPr>
@@ -1397,7 +1400,7 @@
           <p:cNvPr id="4099" name="Rectangle 3">
             <a:extLst>
               <a:ext uri="{FF2B5EF4-FFF2-40B4-BE49-F238E27FC236}">
-                <a16:creationId xmlns:a16="http://schemas.microsoft.com/office/drawing/2014/main" xmlns="" id="{72CDE936-7795-C144-AA9F-F05C2D88ED26}"/>
+                <a16:creationId xmlns="" xmlns:a16="http://schemas.microsoft.com/office/drawing/2014/main" id="{72CDE936-7795-C144-AA9F-F05C2D88ED26}"/>
               </a:ext>
             </a:extLst>
           </p:cNvPr>
@@ -1476,7 +1479,7 @@
           <p:cNvPr id="4100" name="Rectangle 4">
             <a:extLst>
               <a:ext uri="{FF2B5EF4-FFF2-40B4-BE49-F238E27FC236}">
-                <a16:creationId xmlns:a16="http://schemas.microsoft.com/office/drawing/2014/main" xmlns="" id="{9AB55F1A-30B5-BC47-9796-90A499593F42}"/>
+                <a16:creationId xmlns="" xmlns:a16="http://schemas.microsoft.com/office/drawing/2014/main" id="{9AB55F1A-30B5-BC47-9796-90A499593F42}"/>
               </a:ext>
             </a:extLst>
           </p:cNvPr>
@@ -1555,7 +1558,7 @@
           <p:cNvPr id="4101" name="Rectangle 5">
             <a:extLst>
               <a:ext uri="{FF2B5EF4-FFF2-40B4-BE49-F238E27FC236}">
-                <a16:creationId xmlns:a16="http://schemas.microsoft.com/office/drawing/2014/main" xmlns="" id="{80B3278C-0CD4-4444-96FD-21D07B4629DB}"/>
+                <a16:creationId xmlns="" xmlns:a16="http://schemas.microsoft.com/office/drawing/2014/main" id="{80B3278C-0CD4-4444-96FD-21D07B4629DB}"/>
               </a:ext>
             </a:extLst>
           </p:cNvPr>
@@ -1675,7 +1678,7 @@
           <p:cNvPr id="2" name="Marcador de encabezado 1">
             <a:extLst>
               <a:ext uri="{FF2B5EF4-FFF2-40B4-BE49-F238E27FC236}">
-                <a16:creationId xmlns:a16="http://schemas.microsoft.com/office/drawing/2014/main" xmlns="" id="{190B05B0-4CD7-8548-B284-31056CA4D3C6}"/>
+                <a16:creationId xmlns="" xmlns:a16="http://schemas.microsoft.com/office/drawing/2014/main" id="{190B05B0-4CD7-8548-B284-31056CA4D3C6}"/>
               </a:ext>
             </a:extLst>
           </p:cNvPr>
@@ -1715,7 +1718,7 @@
           <p:cNvPr id="3" name="Marcador de fecha 2">
             <a:extLst>
               <a:ext uri="{FF2B5EF4-FFF2-40B4-BE49-F238E27FC236}">
-                <a16:creationId xmlns:a16="http://schemas.microsoft.com/office/drawing/2014/main" xmlns="" id="{7A4EB724-2211-3A4B-939D-AE5040DB6E11}"/>
+                <a16:creationId xmlns="" xmlns:a16="http://schemas.microsoft.com/office/drawing/2014/main" id="{7A4EB724-2211-3A4B-939D-AE5040DB6E11}"/>
               </a:ext>
             </a:extLst>
           </p:cNvPr>
@@ -1751,7 +1754,7 @@
               <a:pPr>
                 <a:defRPr/>
               </a:pPr>
-              <a:t>17/05/2019</a:t>
+              <a:t>22/05/2019</a:t>
             </a:fld>
             <a:endParaRPr lang="es-ES"/>
           </a:p>
@@ -1762,7 +1765,7 @@
           <p:cNvPr id="4" name="Marcador de imagen de diapositiva 3">
             <a:extLst>
               <a:ext uri="{FF2B5EF4-FFF2-40B4-BE49-F238E27FC236}">
-                <a16:creationId xmlns:a16="http://schemas.microsoft.com/office/drawing/2014/main" xmlns="" id="{22BB66D7-F3E6-C442-94E8-C510FB352E0F}"/>
+                <a16:creationId xmlns="" xmlns:a16="http://schemas.microsoft.com/office/drawing/2014/main" id="{22BB66D7-F3E6-C442-94E8-C510FB352E0F}"/>
               </a:ext>
             </a:extLst>
           </p:cNvPr>
@@ -1802,7 +1805,7 @@
           <p:cNvPr id="5" name="Marcador de notas 4">
             <a:extLst>
               <a:ext uri="{FF2B5EF4-FFF2-40B4-BE49-F238E27FC236}">
-                <a16:creationId xmlns:a16="http://schemas.microsoft.com/office/drawing/2014/main" xmlns="" id="{A351D1A5-7E45-9F4C-B5F9-050AF4E79E01}"/>
+                <a16:creationId xmlns="" xmlns:a16="http://schemas.microsoft.com/office/drawing/2014/main" id="{A351D1A5-7E45-9F4C-B5F9-050AF4E79E01}"/>
               </a:ext>
             </a:extLst>
           </p:cNvPr>
@@ -1867,7 +1870,7 @@
           <p:cNvPr id="6" name="Marcador de pie de página 5">
             <a:extLst>
               <a:ext uri="{FF2B5EF4-FFF2-40B4-BE49-F238E27FC236}">
-                <a16:creationId xmlns:a16="http://schemas.microsoft.com/office/drawing/2014/main" xmlns="" id="{CDDA647B-9900-A042-837C-C5F3F92D9812}"/>
+                <a16:creationId xmlns="" xmlns:a16="http://schemas.microsoft.com/office/drawing/2014/main" id="{CDDA647B-9900-A042-837C-C5F3F92D9812}"/>
               </a:ext>
             </a:extLst>
           </p:cNvPr>
@@ -1907,7 +1910,7 @@
           <p:cNvPr id="7" name="Marcador de número de diapositiva 6">
             <a:extLst>
               <a:ext uri="{FF2B5EF4-FFF2-40B4-BE49-F238E27FC236}">
-                <a16:creationId xmlns:a16="http://schemas.microsoft.com/office/drawing/2014/main" xmlns="" id="{0038CB9D-584B-684A-BCE7-8A280ECEC657}"/>
+                <a16:creationId xmlns="" xmlns:a16="http://schemas.microsoft.com/office/drawing/2014/main" id="{0038CB9D-584B-684A-BCE7-8A280ECEC657}"/>
               </a:ext>
             </a:extLst>
           </p:cNvPr>
@@ -2104,7 +2107,7 @@
           <p:cNvPr id="34817" name="Marcador de imagen de diapositiva 1">
             <a:extLst>
               <a:ext uri="{FF2B5EF4-FFF2-40B4-BE49-F238E27FC236}">
-                <a16:creationId xmlns:a16="http://schemas.microsoft.com/office/drawing/2014/main" xmlns="" id="{88E98E05-8FFB-EB42-9121-DD91BA564333}"/>
+                <a16:creationId xmlns="" xmlns:a16="http://schemas.microsoft.com/office/drawing/2014/main" id="{88E98E05-8FFB-EB42-9121-DD91BA564333}"/>
               </a:ext>
             </a:extLst>
           </p:cNvPr>
@@ -2141,7 +2144,7 @@
           <p:cNvPr id="34818" name="Marcador de notas 2">
             <a:extLst>
               <a:ext uri="{FF2B5EF4-FFF2-40B4-BE49-F238E27FC236}">
-                <a16:creationId xmlns:a16="http://schemas.microsoft.com/office/drawing/2014/main" xmlns="" id="{55AB1F2A-96D9-5D4E-BB02-59C8DC05CBE4}"/>
+                <a16:creationId xmlns="" xmlns:a16="http://schemas.microsoft.com/office/drawing/2014/main" id="{55AB1F2A-96D9-5D4E-BB02-59C8DC05CBE4}"/>
               </a:ext>
             </a:extLst>
           </p:cNvPr>
@@ -2196,7 +2199,7 @@
           <p:cNvPr id="34819" name="Marcador de número de diapositiva 3">
             <a:extLst>
               <a:ext uri="{FF2B5EF4-FFF2-40B4-BE49-F238E27FC236}">
-                <a16:creationId xmlns:a16="http://schemas.microsoft.com/office/drawing/2014/main" xmlns="" id="{157EE0C8-B05F-AA41-A446-5E3DE14108EB}"/>
+                <a16:creationId xmlns="" xmlns:a16="http://schemas.microsoft.com/office/drawing/2014/main" id="{157EE0C8-B05F-AA41-A446-5E3DE14108EB}"/>
               </a:ext>
             </a:extLst>
           </p:cNvPr>
@@ -4269,7 +4272,7 @@
           <p:cNvPr id="4" name="Rectangle 4">
             <a:extLst>
               <a:ext uri="{FF2B5EF4-FFF2-40B4-BE49-F238E27FC236}">
-                <a16:creationId xmlns:a16="http://schemas.microsoft.com/office/drawing/2014/main" xmlns="" id="{CBFFC4FF-25B6-2F41-87F3-D1F3AFF4FBEB}"/>
+                <a16:creationId xmlns="" xmlns:a16="http://schemas.microsoft.com/office/drawing/2014/main" id="{CBFFC4FF-25B6-2F41-87F3-D1F3AFF4FBEB}"/>
               </a:ext>
             </a:extLst>
           </p:cNvPr>
@@ -4303,7 +4306,7 @@
           <p:cNvPr id="5" name="Rectangle 5">
             <a:extLst>
               <a:ext uri="{FF2B5EF4-FFF2-40B4-BE49-F238E27FC236}">
-                <a16:creationId xmlns:a16="http://schemas.microsoft.com/office/drawing/2014/main" xmlns="" id="{4C096F85-2FFD-E94B-89F6-2FAB4BAEEE87}"/>
+                <a16:creationId xmlns="" xmlns:a16="http://schemas.microsoft.com/office/drawing/2014/main" id="{4C096F85-2FFD-E94B-89F6-2FAB4BAEEE87}"/>
               </a:ext>
             </a:extLst>
           </p:cNvPr>
@@ -4337,7 +4340,7 @@
           <p:cNvPr id="6" name="Rectangle 6">
             <a:extLst>
               <a:ext uri="{FF2B5EF4-FFF2-40B4-BE49-F238E27FC236}">
-                <a16:creationId xmlns:a16="http://schemas.microsoft.com/office/drawing/2014/main" xmlns="" id="{2796106F-EEB2-E64A-9116-AAFF62318609}"/>
+                <a16:creationId xmlns="" xmlns:a16="http://schemas.microsoft.com/office/drawing/2014/main" id="{2796106F-EEB2-E64A-9116-AAFF62318609}"/>
               </a:ext>
             </a:extLst>
           </p:cNvPr>
@@ -4481,7 +4484,7 @@
           <p:cNvPr id="4" name="Rectangle 4">
             <a:extLst>
               <a:ext uri="{FF2B5EF4-FFF2-40B4-BE49-F238E27FC236}">
-                <a16:creationId xmlns:a16="http://schemas.microsoft.com/office/drawing/2014/main" xmlns="" id="{6A32BADE-F659-5046-B660-D70E5FD5A453}"/>
+                <a16:creationId xmlns="" xmlns:a16="http://schemas.microsoft.com/office/drawing/2014/main" id="{6A32BADE-F659-5046-B660-D70E5FD5A453}"/>
               </a:ext>
             </a:extLst>
           </p:cNvPr>
@@ -4515,7 +4518,7 @@
           <p:cNvPr id="5" name="Rectangle 5">
             <a:extLst>
               <a:ext uri="{FF2B5EF4-FFF2-40B4-BE49-F238E27FC236}">
-                <a16:creationId xmlns:a16="http://schemas.microsoft.com/office/drawing/2014/main" xmlns="" id="{C6C00947-C3E3-7C43-8F5C-5E0C4CED7300}"/>
+                <a16:creationId xmlns="" xmlns:a16="http://schemas.microsoft.com/office/drawing/2014/main" id="{C6C00947-C3E3-7C43-8F5C-5E0C4CED7300}"/>
               </a:ext>
             </a:extLst>
           </p:cNvPr>
@@ -4549,7 +4552,7 @@
           <p:cNvPr id="6" name="Rectangle 6">
             <a:extLst>
               <a:ext uri="{FF2B5EF4-FFF2-40B4-BE49-F238E27FC236}">
-                <a16:creationId xmlns:a16="http://schemas.microsoft.com/office/drawing/2014/main" xmlns="" id="{9E78E138-D322-AA42-82D7-FC195069F600}"/>
+                <a16:creationId xmlns="" xmlns:a16="http://schemas.microsoft.com/office/drawing/2014/main" id="{9E78E138-D322-AA42-82D7-FC195069F600}"/>
               </a:ext>
             </a:extLst>
           </p:cNvPr>
@@ -4703,7 +4706,7 @@
           <p:cNvPr id="4" name="Rectangle 4">
             <a:extLst>
               <a:ext uri="{FF2B5EF4-FFF2-40B4-BE49-F238E27FC236}">
-                <a16:creationId xmlns:a16="http://schemas.microsoft.com/office/drawing/2014/main" xmlns="" id="{2606C2FE-DFA7-A346-9F08-F601AFC337E9}"/>
+                <a16:creationId xmlns="" xmlns:a16="http://schemas.microsoft.com/office/drawing/2014/main" id="{2606C2FE-DFA7-A346-9F08-F601AFC337E9}"/>
               </a:ext>
             </a:extLst>
           </p:cNvPr>
@@ -4737,7 +4740,7 @@
           <p:cNvPr id="5" name="Rectangle 5">
             <a:extLst>
               <a:ext uri="{FF2B5EF4-FFF2-40B4-BE49-F238E27FC236}">
-                <a16:creationId xmlns:a16="http://schemas.microsoft.com/office/drawing/2014/main" xmlns="" id="{68BD24F8-D24B-B142-862C-4F4ED088CAE0}"/>
+                <a16:creationId xmlns="" xmlns:a16="http://schemas.microsoft.com/office/drawing/2014/main" id="{68BD24F8-D24B-B142-862C-4F4ED088CAE0}"/>
               </a:ext>
             </a:extLst>
           </p:cNvPr>
@@ -4771,7 +4774,7 @@
           <p:cNvPr id="6" name="Rectangle 6">
             <a:extLst>
               <a:ext uri="{FF2B5EF4-FFF2-40B4-BE49-F238E27FC236}">
-                <a16:creationId xmlns:a16="http://schemas.microsoft.com/office/drawing/2014/main" xmlns="" id="{DCFFF4C2-EBEB-D74F-9371-02B5A65CD036}"/>
+                <a16:creationId xmlns="" xmlns:a16="http://schemas.microsoft.com/office/drawing/2014/main" id="{DCFFF4C2-EBEB-D74F-9371-02B5A65CD036}"/>
               </a:ext>
             </a:extLst>
           </p:cNvPr>
@@ -4915,7 +4918,7 @@
           <p:cNvPr id="4" name="Rectangle 4">
             <a:extLst>
               <a:ext uri="{FF2B5EF4-FFF2-40B4-BE49-F238E27FC236}">
-                <a16:creationId xmlns:a16="http://schemas.microsoft.com/office/drawing/2014/main" xmlns="" id="{4F77C46A-12C9-8F4B-B36B-A58EA1012DC9}"/>
+                <a16:creationId xmlns="" xmlns:a16="http://schemas.microsoft.com/office/drawing/2014/main" id="{4F77C46A-12C9-8F4B-B36B-A58EA1012DC9}"/>
               </a:ext>
             </a:extLst>
           </p:cNvPr>
@@ -4949,7 +4952,7 @@
           <p:cNvPr id="5" name="Rectangle 5">
             <a:extLst>
               <a:ext uri="{FF2B5EF4-FFF2-40B4-BE49-F238E27FC236}">
-                <a16:creationId xmlns:a16="http://schemas.microsoft.com/office/drawing/2014/main" xmlns="" id="{204124B9-9C00-EF48-B916-2993DE755BBC}"/>
+                <a16:creationId xmlns="" xmlns:a16="http://schemas.microsoft.com/office/drawing/2014/main" id="{204124B9-9C00-EF48-B916-2993DE755BBC}"/>
               </a:ext>
             </a:extLst>
           </p:cNvPr>
@@ -4983,7 +4986,7 @@
           <p:cNvPr id="6" name="Rectangle 6">
             <a:extLst>
               <a:ext uri="{FF2B5EF4-FFF2-40B4-BE49-F238E27FC236}">
-                <a16:creationId xmlns:a16="http://schemas.microsoft.com/office/drawing/2014/main" xmlns="" id="{41557751-8E1D-244A-BE57-51574A96609F}"/>
+                <a16:creationId xmlns="" xmlns:a16="http://schemas.microsoft.com/office/drawing/2014/main" id="{41557751-8E1D-244A-BE57-51574A96609F}"/>
               </a:ext>
             </a:extLst>
           </p:cNvPr>
@@ -5150,7 +5153,7 @@
           <p:cNvPr id="4" name="Rectangle 4">
             <a:extLst>
               <a:ext uri="{FF2B5EF4-FFF2-40B4-BE49-F238E27FC236}">
-                <a16:creationId xmlns:a16="http://schemas.microsoft.com/office/drawing/2014/main" xmlns="" id="{16D5654B-BF22-544B-8EDB-DF8E226254B8}"/>
+                <a16:creationId xmlns="" xmlns:a16="http://schemas.microsoft.com/office/drawing/2014/main" id="{16D5654B-BF22-544B-8EDB-DF8E226254B8}"/>
               </a:ext>
             </a:extLst>
           </p:cNvPr>
@@ -5184,7 +5187,7 @@
           <p:cNvPr id="5" name="Rectangle 5">
             <a:extLst>
               <a:ext uri="{FF2B5EF4-FFF2-40B4-BE49-F238E27FC236}">
-                <a16:creationId xmlns:a16="http://schemas.microsoft.com/office/drawing/2014/main" xmlns="" id="{3F604BB5-E7A1-454E-83DD-045E2E5708A4}"/>
+                <a16:creationId xmlns="" xmlns:a16="http://schemas.microsoft.com/office/drawing/2014/main" id="{3F604BB5-E7A1-454E-83DD-045E2E5708A4}"/>
               </a:ext>
             </a:extLst>
           </p:cNvPr>
@@ -5218,7 +5221,7 @@
           <p:cNvPr id="6" name="Rectangle 6">
             <a:extLst>
               <a:ext uri="{FF2B5EF4-FFF2-40B4-BE49-F238E27FC236}">
-                <a16:creationId xmlns:a16="http://schemas.microsoft.com/office/drawing/2014/main" xmlns="" id="{EE8833F8-39E2-A946-A2E8-E1684A2E68BC}"/>
+                <a16:creationId xmlns="" xmlns:a16="http://schemas.microsoft.com/office/drawing/2014/main" id="{EE8833F8-39E2-A946-A2E8-E1684A2E68BC}"/>
               </a:ext>
             </a:extLst>
           </p:cNvPr>
@@ -5479,7 +5482,7 @@
           <p:cNvPr id="5" name="Rectangle 4">
             <a:extLst>
               <a:ext uri="{FF2B5EF4-FFF2-40B4-BE49-F238E27FC236}">
-                <a16:creationId xmlns:a16="http://schemas.microsoft.com/office/drawing/2014/main" xmlns="" id="{939112DA-065D-444A-B3DF-04650F72011D}"/>
+                <a16:creationId xmlns="" xmlns:a16="http://schemas.microsoft.com/office/drawing/2014/main" id="{939112DA-065D-444A-B3DF-04650F72011D}"/>
               </a:ext>
             </a:extLst>
           </p:cNvPr>
@@ -5513,7 +5516,7 @@
           <p:cNvPr id="6" name="Rectangle 5">
             <a:extLst>
               <a:ext uri="{FF2B5EF4-FFF2-40B4-BE49-F238E27FC236}">
-                <a16:creationId xmlns:a16="http://schemas.microsoft.com/office/drawing/2014/main" xmlns="" id="{290B047B-8D59-A14E-8B66-9459A41AA2F3}"/>
+                <a16:creationId xmlns="" xmlns:a16="http://schemas.microsoft.com/office/drawing/2014/main" id="{290B047B-8D59-A14E-8B66-9459A41AA2F3}"/>
               </a:ext>
             </a:extLst>
           </p:cNvPr>
@@ -5547,7 +5550,7 @@
           <p:cNvPr id="7" name="Rectangle 6">
             <a:extLst>
               <a:ext uri="{FF2B5EF4-FFF2-40B4-BE49-F238E27FC236}">
-                <a16:creationId xmlns:a16="http://schemas.microsoft.com/office/drawing/2014/main" xmlns="" id="{E126F9E9-9A18-884B-9A8E-31F84B8639C6}"/>
+                <a16:creationId xmlns="" xmlns:a16="http://schemas.microsoft.com/office/drawing/2014/main" id="{E126F9E9-9A18-884B-9A8E-31F84B8639C6}"/>
               </a:ext>
             </a:extLst>
           </p:cNvPr>
@@ -5942,7 +5945,7 @@
           <p:cNvPr id="7" name="Rectangle 4">
             <a:extLst>
               <a:ext uri="{FF2B5EF4-FFF2-40B4-BE49-F238E27FC236}">
-                <a16:creationId xmlns:a16="http://schemas.microsoft.com/office/drawing/2014/main" xmlns="" id="{95C4813C-4E1A-F043-B218-C7959682FFE9}"/>
+                <a16:creationId xmlns="" xmlns:a16="http://schemas.microsoft.com/office/drawing/2014/main" id="{95C4813C-4E1A-F043-B218-C7959682FFE9}"/>
               </a:ext>
             </a:extLst>
           </p:cNvPr>
@@ -5976,7 +5979,7 @@
           <p:cNvPr id="8" name="Rectangle 5">
             <a:extLst>
               <a:ext uri="{FF2B5EF4-FFF2-40B4-BE49-F238E27FC236}">
-                <a16:creationId xmlns:a16="http://schemas.microsoft.com/office/drawing/2014/main" xmlns="" id="{E34CED14-F450-6840-BF80-ECBF681228EA}"/>
+                <a16:creationId xmlns="" xmlns:a16="http://schemas.microsoft.com/office/drawing/2014/main" id="{E34CED14-F450-6840-BF80-ECBF681228EA}"/>
               </a:ext>
             </a:extLst>
           </p:cNvPr>
@@ -6010,7 +6013,7 @@
           <p:cNvPr id="9" name="Rectangle 6">
             <a:extLst>
               <a:ext uri="{FF2B5EF4-FFF2-40B4-BE49-F238E27FC236}">
-                <a16:creationId xmlns:a16="http://schemas.microsoft.com/office/drawing/2014/main" xmlns="" id="{7B65E33D-F19F-084E-8228-4BBA25779346}"/>
+                <a16:creationId xmlns="" xmlns:a16="http://schemas.microsoft.com/office/drawing/2014/main" id="{7B65E33D-F19F-084E-8228-4BBA25779346}"/>
               </a:ext>
             </a:extLst>
           </p:cNvPr>
@@ -6103,7 +6106,7 @@
           <p:cNvPr id="3" name="Rectangle 4">
             <a:extLst>
               <a:ext uri="{FF2B5EF4-FFF2-40B4-BE49-F238E27FC236}">
-                <a16:creationId xmlns:a16="http://schemas.microsoft.com/office/drawing/2014/main" xmlns="" id="{F4BC7895-DFEB-4F44-8BC9-BDFF081AF1DD}"/>
+                <a16:creationId xmlns="" xmlns:a16="http://schemas.microsoft.com/office/drawing/2014/main" id="{F4BC7895-DFEB-4F44-8BC9-BDFF081AF1DD}"/>
               </a:ext>
             </a:extLst>
           </p:cNvPr>
@@ -6137,7 +6140,7 @@
           <p:cNvPr id="4" name="Rectangle 5">
             <a:extLst>
               <a:ext uri="{FF2B5EF4-FFF2-40B4-BE49-F238E27FC236}">
-                <a16:creationId xmlns:a16="http://schemas.microsoft.com/office/drawing/2014/main" xmlns="" id="{D39CDA88-E4EE-534A-AA5B-C6D2E7BBC062}"/>
+                <a16:creationId xmlns="" xmlns:a16="http://schemas.microsoft.com/office/drawing/2014/main" id="{D39CDA88-E4EE-534A-AA5B-C6D2E7BBC062}"/>
               </a:ext>
             </a:extLst>
           </p:cNvPr>
@@ -6171,7 +6174,7 @@
           <p:cNvPr id="5" name="Rectangle 6">
             <a:extLst>
               <a:ext uri="{FF2B5EF4-FFF2-40B4-BE49-F238E27FC236}">
-                <a16:creationId xmlns:a16="http://schemas.microsoft.com/office/drawing/2014/main" xmlns="" id="{C9051539-E274-CE43-BB74-3FEEF9E9ADA1}"/>
+                <a16:creationId xmlns="" xmlns:a16="http://schemas.microsoft.com/office/drawing/2014/main" id="{C9051539-E274-CE43-BB74-3FEEF9E9ADA1}"/>
               </a:ext>
             </a:extLst>
           </p:cNvPr>
@@ -6242,7 +6245,7 @@
           <p:cNvPr id="2" name="Group 22">
             <a:extLst>
               <a:ext uri="{FF2B5EF4-FFF2-40B4-BE49-F238E27FC236}">
-                <a16:creationId xmlns:a16="http://schemas.microsoft.com/office/drawing/2014/main" xmlns="" id="{8E84F22A-9706-1E48-B2F1-46BDBDC069B0}"/>
+                <a16:creationId xmlns="" xmlns:a16="http://schemas.microsoft.com/office/drawing/2014/main" id="{8E84F22A-9706-1E48-B2F1-46BDBDC069B0}"/>
               </a:ext>
             </a:extLst>
           </p:cNvPr>
@@ -6264,7 +6267,7 @@
             <p:cNvPr id="3" name="Freeform 8" descr="5%">
               <a:extLst>
                 <a:ext uri="{FF2B5EF4-FFF2-40B4-BE49-F238E27FC236}">
-                  <a16:creationId xmlns:a16="http://schemas.microsoft.com/office/drawing/2014/main" xmlns="" id="{B7039347-F769-F148-A923-1B0BE0ECB77E}"/>
+                  <a16:creationId xmlns="" xmlns:a16="http://schemas.microsoft.com/office/drawing/2014/main" id="{B7039347-F769-F148-A923-1B0BE0ECB77E}"/>
                 </a:ext>
               </a:extLst>
             </p:cNvPr>
@@ -6383,7 +6386,7 @@
             <p:cNvPr id="4" name="Freeform 9" descr="5%">
               <a:extLst>
                 <a:ext uri="{FF2B5EF4-FFF2-40B4-BE49-F238E27FC236}">
-                  <a16:creationId xmlns:a16="http://schemas.microsoft.com/office/drawing/2014/main" xmlns="" id="{6F999DAB-C9D8-8C48-88BC-EB0ACC950367}"/>
+                  <a16:creationId xmlns="" xmlns:a16="http://schemas.microsoft.com/office/drawing/2014/main" id="{6F999DAB-C9D8-8C48-88BC-EB0ACC950367}"/>
                 </a:ext>
               </a:extLst>
             </p:cNvPr>
@@ -6502,7 +6505,7 @@
             <p:cNvPr id="5" name="Freeform 10" descr="5%">
               <a:extLst>
                 <a:ext uri="{FF2B5EF4-FFF2-40B4-BE49-F238E27FC236}">
-                  <a16:creationId xmlns:a16="http://schemas.microsoft.com/office/drawing/2014/main" xmlns="" id="{5ED24D02-9BC2-E545-95E6-3CCD22CF78BA}"/>
+                  <a16:creationId xmlns="" xmlns:a16="http://schemas.microsoft.com/office/drawing/2014/main" id="{5ED24D02-9BC2-E545-95E6-3CCD22CF78BA}"/>
                 </a:ext>
               </a:extLst>
             </p:cNvPr>
@@ -6621,7 +6624,7 @@
             <p:cNvPr id="6" name="Freeform 11" descr="5%">
               <a:extLst>
                 <a:ext uri="{FF2B5EF4-FFF2-40B4-BE49-F238E27FC236}">
-                  <a16:creationId xmlns:a16="http://schemas.microsoft.com/office/drawing/2014/main" xmlns="" id="{2F614782-A419-8043-BC6F-187E134A38CF}"/>
+                  <a16:creationId xmlns="" xmlns:a16="http://schemas.microsoft.com/office/drawing/2014/main" id="{2F614782-A419-8043-BC6F-187E134A38CF}"/>
                 </a:ext>
               </a:extLst>
             </p:cNvPr>
@@ -6740,7 +6743,7 @@
             <p:cNvPr id="7" name="Freeform 12" descr="5%">
               <a:extLst>
                 <a:ext uri="{FF2B5EF4-FFF2-40B4-BE49-F238E27FC236}">
-                  <a16:creationId xmlns:a16="http://schemas.microsoft.com/office/drawing/2014/main" xmlns="" id="{B9D19167-1DB4-3C41-9039-944BB5EED427}"/>
+                  <a16:creationId xmlns="" xmlns:a16="http://schemas.microsoft.com/office/drawing/2014/main" id="{B9D19167-1DB4-3C41-9039-944BB5EED427}"/>
                 </a:ext>
               </a:extLst>
             </p:cNvPr>
@@ -6859,7 +6862,7 @@
             <p:cNvPr id="8" name="Freeform 13" descr="5%">
               <a:extLst>
                 <a:ext uri="{FF2B5EF4-FFF2-40B4-BE49-F238E27FC236}">
-                  <a16:creationId xmlns:a16="http://schemas.microsoft.com/office/drawing/2014/main" xmlns="" id="{B2EAC2A2-D222-CA42-8295-561B5CD74721}"/>
+                  <a16:creationId xmlns="" xmlns:a16="http://schemas.microsoft.com/office/drawing/2014/main" id="{B2EAC2A2-D222-CA42-8295-561B5CD74721}"/>
                 </a:ext>
               </a:extLst>
             </p:cNvPr>
@@ -6979,7 +6982,7 @@
           <p:cNvPr id="9" name="Freeform 17">
             <a:extLst>
               <a:ext uri="{FF2B5EF4-FFF2-40B4-BE49-F238E27FC236}">
-                <a16:creationId xmlns:a16="http://schemas.microsoft.com/office/drawing/2014/main" xmlns="" id="{ADE1301C-82E7-B44E-8823-4ABD8E4996E1}"/>
+                <a16:creationId xmlns="" xmlns:a16="http://schemas.microsoft.com/office/drawing/2014/main" id="{ADE1301C-82E7-B44E-8823-4ABD8E4996E1}"/>
               </a:ext>
             </a:extLst>
           </p:cNvPr>
@@ -7094,7 +7097,7 @@
           <p:cNvPr id="12" name="Rectangle 6">
             <a:extLst>
               <a:ext uri="{FF2B5EF4-FFF2-40B4-BE49-F238E27FC236}">
-                <a16:creationId xmlns:a16="http://schemas.microsoft.com/office/drawing/2014/main" xmlns="" id="{07FA309B-90CD-D54E-AA02-3C668A6BFB51}"/>
+                <a16:creationId xmlns="" xmlns:a16="http://schemas.microsoft.com/office/drawing/2014/main" id="{07FA309B-90CD-D54E-AA02-3C668A6BFB51}"/>
               </a:ext>
             </a:extLst>
           </p:cNvPr>
@@ -7343,7 +7346,7 @@
           <p:cNvPr id="5" name="Rectangle 4">
             <a:extLst>
               <a:ext uri="{FF2B5EF4-FFF2-40B4-BE49-F238E27FC236}">
-                <a16:creationId xmlns:a16="http://schemas.microsoft.com/office/drawing/2014/main" xmlns="" id="{C7C8B1DD-4DA0-EF4D-B9CF-6AFFB6F0D393}"/>
+                <a16:creationId xmlns="" xmlns:a16="http://schemas.microsoft.com/office/drawing/2014/main" id="{C7C8B1DD-4DA0-EF4D-B9CF-6AFFB6F0D393}"/>
               </a:ext>
             </a:extLst>
           </p:cNvPr>
@@ -7377,7 +7380,7 @@
           <p:cNvPr id="6" name="Rectangle 5">
             <a:extLst>
               <a:ext uri="{FF2B5EF4-FFF2-40B4-BE49-F238E27FC236}">
-                <a16:creationId xmlns:a16="http://schemas.microsoft.com/office/drawing/2014/main" xmlns="" id="{9E79C3ED-79BC-0248-88E9-6470BD781F40}"/>
+                <a16:creationId xmlns="" xmlns:a16="http://schemas.microsoft.com/office/drawing/2014/main" id="{9E79C3ED-79BC-0248-88E9-6470BD781F40}"/>
               </a:ext>
             </a:extLst>
           </p:cNvPr>
@@ -7411,7 +7414,7 @@
           <p:cNvPr id="7" name="Rectangle 6">
             <a:extLst>
               <a:ext uri="{FF2B5EF4-FFF2-40B4-BE49-F238E27FC236}">
-                <a16:creationId xmlns:a16="http://schemas.microsoft.com/office/drawing/2014/main" xmlns="" id="{3AB662F9-6380-3041-AD2B-E570902EE19D}"/>
+                <a16:creationId xmlns="" xmlns:a16="http://schemas.microsoft.com/office/drawing/2014/main" id="{3AB662F9-6380-3041-AD2B-E570902EE19D}"/>
               </a:ext>
             </a:extLst>
           </p:cNvPr>
@@ -7640,7 +7643,7 @@
           <p:cNvPr id="5" name="Rectangle 4">
             <a:extLst>
               <a:ext uri="{FF2B5EF4-FFF2-40B4-BE49-F238E27FC236}">
-                <a16:creationId xmlns:a16="http://schemas.microsoft.com/office/drawing/2014/main" xmlns="" id="{CBA21871-7A5D-B443-93D6-F8A17F2DCF85}"/>
+                <a16:creationId xmlns="" xmlns:a16="http://schemas.microsoft.com/office/drawing/2014/main" id="{CBA21871-7A5D-B443-93D6-F8A17F2DCF85}"/>
               </a:ext>
             </a:extLst>
           </p:cNvPr>
@@ -7674,7 +7677,7 @@
           <p:cNvPr id="6" name="Rectangle 5">
             <a:extLst>
               <a:ext uri="{FF2B5EF4-FFF2-40B4-BE49-F238E27FC236}">
-                <a16:creationId xmlns:a16="http://schemas.microsoft.com/office/drawing/2014/main" xmlns="" id="{E76AB48A-FB00-AB41-A25D-494327B102EA}"/>
+                <a16:creationId xmlns="" xmlns:a16="http://schemas.microsoft.com/office/drawing/2014/main" id="{E76AB48A-FB00-AB41-A25D-494327B102EA}"/>
               </a:ext>
             </a:extLst>
           </p:cNvPr>
@@ -7708,7 +7711,7 @@
           <p:cNvPr id="7" name="Rectangle 6">
             <a:extLst>
               <a:ext uri="{FF2B5EF4-FFF2-40B4-BE49-F238E27FC236}">
-                <a16:creationId xmlns:a16="http://schemas.microsoft.com/office/drawing/2014/main" xmlns="" id="{1C28FCBD-BF2C-6841-B4D8-8DC16AE75B6E}"/>
+                <a16:creationId xmlns="" xmlns:a16="http://schemas.microsoft.com/office/drawing/2014/main" id="{1C28FCBD-BF2C-6841-B4D8-8DC16AE75B6E}"/>
               </a:ext>
             </a:extLst>
           </p:cNvPr>
@@ -7787,7 +7790,7 @@
           <p:cNvPr id="1026" name="Rectangle 2">
             <a:extLst>
               <a:ext uri="{FF2B5EF4-FFF2-40B4-BE49-F238E27FC236}">
-                <a16:creationId xmlns:a16="http://schemas.microsoft.com/office/drawing/2014/main" xmlns="" id="{BB0E7CB5-3395-0646-A20A-7249B9974431}"/>
+                <a16:creationId xmlns="" xmlns:a16="http://schemas.microsoft.com/office/drawing/2014/main" id="{BB0E7CB5-3395-0646-A20A-7249B9974431}"/>
               </a:ext>
             </a:extLst>
           </p:cNvPr>
@@ -7861,7 +7864,7 @@
           <p:cNvPr id="1027" name="Rectangle 3">
             <a:extLst>
               <a:ext uri="{FF2B5EF4-FFF2-40B4-BE49-F238E27FC236}">
-                <a16:creationId xmlns:a16="http://schemas.microsoft.com/office/drawing/2014/main" xmlns="" id="{8CB37737-6579-404E-A639-D817E15EE378}"/>
+                <a16:creationId xmlns="" xmlns:a16="http://schemas.microsoft.com/office/drawing/2014/main" id="{8CB37737-6579-404E-A639-D817E15EE378}"/>
               </a:ext>
             </a:extLst>
           </p:cNvPr>
@@ -7963,7 +7966,7 @@
           <p:cNvPr id="1028" name="Rectangle 4">
             <a:extLst>
               <a:ext uri="{FF2B5EF4-FFF2-40B4-BE49-F238E27FC236}">
-                <a16:creationId xmlns:a16="http://schemas.microsoft.com/office/drawing/2014/main" xmlns="" id="{3036F1C7-8DCE-6243-BF4D-A7EF32222206}"/>
+                <a16:creationId xmlns="" xmlns:a16="http://schemas.microsoft.com/office/drawing/2014/main" id="{3036F1C7-8DCE-6243-BF4D-A7EF32222206}"/>
               </a:ext>
             </a:extLst>
           </p:cNvPr>
@@ -8042,7 +8045,7 @@
           <p:cNvPr id="1029" name="Rectangle 5">
             <a:extLst>
               <a:ext uri="{FF2B5EF4-FFF2-40B4-BE49-F238E27FC236}">
-                <a16:creationId xmlns:a16="http://schemas.microsoft.com/office/drawing/2014/main" xmlns="" id="{C1624EBC-F7C4-C049-B404-364BB8BD761F}"/>
+                <a16:creationId xmlns="" xmlns:a16="http://schemas.microsoft.com/office/drawing/2014/main" id="{C1624EBC-F7C4-C049-B404-364BB8BD761F}"/>
               </a:ext>
             </a:extLst>
           </p:cNvPr>
@@ -8121,7 +8124,7 @@
           <p:cNvPr id="1030" name="Rectangle 6">
             <a:extLst>
               <a:ext uri="{FF2B5EF4-FFF2-40B4-BE49-F238E27FC236}">
-                <a16:creationId xmlns:a16="http://schemas.microsoft.com/office/drawing/2014/main" xmlns="" id="{BC9DBA90-5BB7-B54B-B0AC-6480000D6EAF}"/>
+                <a16:creationId xmlns="" xmlns:a16="http://schemas.microsoft.com/office/drawing/2014/main" id="{BC9DBA90-5BB7-B54B-B0AC-6480000D6EAF}"/>
               </a:ext>
             </a:extLst>
           </p:cNvPr>
@@ -8607,7 +8610,7 @@
           <p:cNvPr id="14337" name="Imagen 1">
             <a:extLst>
               <a:ext uri="{FF2B5EF4-FFF2-40B4-BE49-F238E27FC236}">
-                <a16:creationId xmlns:a16="http://schemas.microsoft.com/office/drawing/2014/main" xmlns="" id="{7F1D6CA4-5F4D-1444-9762-9C39BCC5CA71}"/>
+                <a16:creationId xmlns="" xmlns:a16="http://schemas.microsoft.com/office/drawing/2014/main" id="{7F1D6CA4-5F4D-1444-9762-9C39BCC5CA71}"/>
               </a:ext>
             </a:extLst>
           </p:cNvPr>
@@ -8667,7 +8670,7 @@
           <p:cNvPr id="14338" name="Group 45">
             <a:extLst>
               <a:ext uri="{FF2B5EF4-FFF2-40B4-BE49-F238E27FC236}">
-                <a16:creationId xmlns:a16="http://schemas.microsoft.com/office/drawing/2014/main" xmlns="" id="{9ADAEC38-7FE8-5746-854B-6203008C9A28}"/>
+                <a16:creationId xmlns="" xmlns:a16="http://schemas.microsoft.com/office/drawing/2014/main" id="{9ADAEC38-7FE8-5746-854B-6203008C9A28}"/>
               </a:ext>
             </a:extLst>
           </p:cNvPr>
@@ -8689,7 +8692,7 @@
             <p:cNvPr id="14342" name="Text Box 29">
               <a:extLst>
                 <a:ext uri="{FF2B5EF4-FFF2-40B4-BE49-F238E27FC236}">
-                  <a16:creationId xmlns:a16="http://schemas.microsoft.com/office/drawing/2014/main" xmlns="" id="{352F96A7-3C2B-B24B-BB36-7D18C1762A93}"/>
+                  <a16:creationId xmlns="" xmlns:a16="http://schemas.microsoft.com/office/drawing/2014/main" id="{352F96A7-3C2B-B24B-BB36-7D18C1762A93}"/>
                 </a:ext>
               </a:extLst>
             </p:cNvPr>
@@ -8969,7 +8972,7 @@
             <p:cNvPr id="14343" name="Text Box 30">
               <a:extLst>
                 <a:ext uri="{FF2B5EF4-FFF2-40B4-BE49-F238E27FC236}">
-                  <a16:creationId xmlns:a16="http://schemas.microsoft.com/office/drawing/2014/main" xmlns="" id="{52C5A348-D146-7F4A-8486-2FE817DDABBD}"/>
+                  <a16:creationId xmlns="" xmlns:a16="http://schemas.microsoft.com/office/drawing/2014/main" id="{52C5A348-D146-7F4A-8486-2FE817DDABBD}"/>
                 </a:ext>
               </a:extLst>
             </p:cNvPr>
@@ -9183,7 +9186,7 @@
           <p:cNvPr id="14339" name="Rectangle 27">
             <a:extLst>
               <a:ext uri="{FF2B5EF4-FFF2-40B4-BE49-F238E27FC236}">
-                <a16:creationId xmlns:a16="http://schemas.microsoft.com/office/drawing/2014/main" xmlns="" id="{A611ED07-CD3C-C643-B9D5-232B736777DB}"/>
+                <a16:creationId xmlns="" xmlns:a16="http://schemas.microsoft.com/office/drawing/2014/main" id="{A611ED07-CD3C-C643-B9D5-232B736777DB}"/>
               </a:ext>
             </a:extLst>
           </p:cNvPr>
@@ -9451,7 +9454,7 @@
           <p:cNvPr id="14340" name="Rectangle 26">
             <a:extLst>
               <a:ext uri="{FF2B5EF4-FFF2-40B4-BE49-F238E27FC236}">
-                <a16:creationId xmlns:a16="http://schemas.microsoft.com/office/drawing/2014/main" xmlns="" id="{D35E3657-506F-BB4C-8EB8-A849B3BD478C}"/>
+                <a16:creationId xmlns="" xmlns:a16="http://schemas.microsoft.com/office/drawing/2014/main" id="{D35E3657-506F-BB4C-8EB8-A849B3BD478C}"/>
               </a:ext>
             </a:extLst>
           </p:cNvPr>
@@ -9687,7 +9690,7 @@
           <p:cNvPr id="16385" name="Rectangle 14">
             <a:extLst>
               <a:ext uri="{FF2B5EF4-FFF2-40B4-BE49-F238E27FC236}">
-                <a16:creationId xmlns:a16="http://schemas.microsoft.com/office/drawing/2014/main" xmlns="" id="{3665E0D4-68DF-7A4B-92E0-B652D965824C}"/>
+                <a16:creationId xmlns="" xmlns:a16="http://schemas.microsoft.com/office/drawing/2014/main" id="{3665E0D4-68DF-7A4B-92E0-B652D965824C}"/>
               </a:ext>
             </a:extLst>
           </p:cNvPr>
@@ -9982,7 +9985,7 @@
           <p:cNvPr id="16385" name="Rectangle 14">
             <a:extLst>
               <a:ext uri="{FF2B5EF4-FFF2-40B4-BE49-F238E27FC236}">
-                <a16:creationId xmlns:a16="http://schemas.microsoft.com/office/drawing/2014/main" xmlns="" id="{3665E0D4-68DF-7A4B-92E0-B652D965824C}"/>
+                <a16:creationId xmlns="" xmlns:a16="http://schemas.microsoft.com/office/drawing/2014/main" id="{3665E0D4-68DF-7A4B-92E0-B652D965824C}"/>
               </a:ext>
             </a:extLst>
           </p:cNvPr>
@@ -10277,7 +10280,7 @@
           <p:cNvPr id="16385" name="Rectangle 14">
             <a:extLst>
               <a:ext uri="{FF2B5EF4-FFF2-40B4-BE49-F238E27FC236}">
-                <a16:creationId xmlns:a16="http://schemas.microsoft.com/office/drawing/2014/main" xmlns="" id="{3665E0D4-68DF-7A4B-92E0-B652D965824C}"/>
+                <a16:creationId xmlns="" xmlns:a16="http://schemas.microsoft.com/office/drawing/2014/main" id="{3665E0D4-68DF-7A4B-92E0-B652D965824C}"/>
               </a:ext>
             </a:extLst>
           </p:cNvPr>
@@ -10526,7 +10529,7 @@
       </p:sp>
       <p:pic>
         <p:nvPicPr>
-          <p:cNvPr id="2" name="Imagen 1"/>
+          <p:cNvPr id="3" name="Imagen 2"/>
           <p:cNvPicPr>
             <a:picLocks noChangeAspect="1"/>
           </p:cNvPicPr>
@@ -10540,8 +10543,8 @@
         </p:blipFill>
         <p:spPr>
           <a:xfrm>
-            <a:off x="1475657" y="740462"/>
-            <a:ext cx="6696744" cy="5762702"/>
+            <a:off x="2963065" y="765175"/>
+            <a:ext cx="4051007" cy="5688162"/>
           </a:xfrm>
           <a:prstGeom prst="rect">
             <a:avLst/>
@@ -10590,7 +10593,7 @@
           <p:cNvPr id="16385" name="Rectangle 14">
             <a:extLst>
               <a:ext uri="{FF2B5EF4-FFF2-40B4-BE49-F238E27FC236}">
-                <a16:creationId xmlns:a16="http://schemas.microsoft.com/office/drawing/2014/main" xmlns="" id="{3665E0D4-68DF-7A4B-92E0-B652D965824C}"/>
+                <a16:creationId xmlns="" xmlns:a16="http://schemas.microsoft.com/office/drawing/2014/main" id="{3665E0D4-68DF-7A4B-92E0-B652D965824C}"/>
               </a:ext>
             </a:extLst>
           </p:cNvPr>
@@ -10909,7 +10912,7 @@
           <p:cNvPr id="16385" name="Rectangle 14">
             <a:extLst>
               <a:ext uri="{FF2B5EF4-FFF2-40B4-BE49-F238E27FC236}">
-                <a16:creationId xmlns:a16="http://schemas.microsoft.com/office/drawing/2014/main" xmlns="" id="{3665E0D4-68DF-7A4B-92E0-B652D965824C}"/>
+                <a16:creationId xmlns="" xmlns:a16="http://schemas.microsoft.com/office/drawing/2014/main" id="{3665E0D4-68DF-7A4B-92E0-B652D965824C}"/>
               </a:ext>
             </a:extLst>
           </p:cNvPr>
@@ -11228,7 +11231,7 @@
           <p:cNvPr id="16385" name="Rectangle 14">
             <a:extLst>
               <a:ext uri="{FF2B5EF4-FFF2-40B4-BE49-F238E27FC236}">
-                <a16:creationId xmlns:a16="http://schemas.microsoft.com/office/drawing/2014/main" xmlns="" id="{3665E0D4-68DF-7A4B-92E0-B652D965824C}"/>
+                <a16:creationId xmlns="" xmlns:a16="http://schemas.microsoft.com/office/drawing/2014/main" id="{3665E0D4-68DF-7A4B-92E0-B652D965824C}"/>
               </a:ext>
             </a:extLst>
           </p:cNvPr>
@@ -11547,7 +11550,7 @@
           <p:cNvPr id="16385" name="Rectangle 14">
             <a:extLst>
               <a:ext uri="{FF2B5EF4-FFF2-40B4-BE49-F238E27FC236}">
-                <a16:creationId xmlns:a16="http://schemas.microsoft.com/office/drawing/2014/main" xmlns="" id="{3665E0D4-68DF-7A4B-92E0-B652D965824C}"/>
+                <a16:creationId xmlns="" xmlns:a16="http://schemas.microsoft.com/office/drawing/2014/main" id="{3665E0D4-68DF-7A4B-92E0-B652D965824C}"/>
               </a:ext>
             </a:extLst>
           </p:cNvPr>
@@ -11896,7 +11899,7 @@
           <p:cNvPr id="4" name="Rectangle 14">
             <a:extLst>
               <a:ext uri="{FF2B5EF4-FFF2-40B4-BE49-F238E27FC236}">
-                <a16:creationId xmlns:a16="http://schemas.microsoft.com/office/drawing/2014/main" xmlns="" id="{3665E0D4-68DF-7A4B-92E0-B652D965824C}"/>
+                <a16:creationId xmlns="" xmlns:a16="http://schemas.microsoft.com/office/drawing/2014/main" id="{3665E0D4-68DF-7A4B-92E0-B652D965824C}"/>
               </a:ext>
             </a:extLst>
           </p:cNvPr>
@@ -12215,7 +12218,7 @@
           <p:cNvPr id="5" name="Rectangle 14">
             <a:extLst>
               <a:ext uri="{FF2B5EF4-FFF2-40B4-BE49-F238E27FC236}">
-                <a16:creationId xmlns:a16="http://schemas.microsoft.com/office/drawing/2014/main" xmlns="" id="{3665E0D4-68DF-7A4B-92E0-B652D965824C}"/>
+                <a16:creationId xmlns="" xmlns:a16="http://schemas.microsoft.com/office/drawing/2014/main" id="{3665E0D4-68DF-7A4B-92E0-B652D965824C}"/>
               </a:ext>
             </a:extLst>
           </p:cNvPr>
@@ -12534,7 +12537,7 @@
           <p:cNvPr id="5" name="Rectangle 14">
             <a:extLst>
               <a:ext uri="{FF2B5EF4-FFF2-40B4-BE49-F238E27FC236}">
-                <a16:creationId xmlns:a16="http://schemas.microsoft.com/office/drawing/2014/main" xmlns="" id="{3665E0D4-68DF-7A4B-92E0-B652D965824C}"/>
+                <a16:creationId xmlns="" xmlns:a16="http://schemas.microsoft.com/office/drawing/2014/main" id="{3665E0D4-68DF-7A4B-92E0-B652D965824C}"/>
               </a:ext>
             </a:extLst>
           </p:cNvPr>
@@ -12823,7 +12826,7 @@
           <p:cNvPr id="15361" name="Group 22">
             <a:extLst>
               <a:ext uri="{FF2B5EF4-FFF2-40B4-BE49-F238E27FC236}">
-                <a16:creationId xmlns:a16="http://schemas.microsoft.com/office/drawing/2014/main" xmlns="" id="{6B6EABA4-F252-6746-8ED0-EF684C8CADED}"/>
+                <a16:creationId xmlns="" xmlns:a16="http://schemas.microsoft.com/office/drawing/2014/main" id="{6B6EABA4-F252-6746-8ED0-EF684C8CADED}"/>
               </a:ext>
             </a:extLst>
           </p:cNvPr>
@@ -12845,7 +12848,7 @@
             <p:cNvPr id="15366" name="Freeform 8" descr="5%">
               <a:extLst>
                 <a:ext uri="{FF2B5EF4-FFF2-40B4-BE49-F238E27FC236}">
-                  <a16:creationId xmlns:a16="http://schemas.microsoft.com/office/drawing/2014/main" xmlns="" id="{58D4CBDD-1133-A449-943D-DD62EB429140}"/>
+                  <a16:creationId xmlns="" xmlns:a16="http://schemas.microsoft.com/office/drawing/2014/main" id="{58D4CBDD-1133-A449-943D-DD62EB429140}"/>
                 </a:ext>
               </a:extLst>
             </p:cNvPr>
@@ -12964,7 +12967,7 @@
             <p:cNvPr id="15367" name="Freeform 9" descr="5%">
               <a:extLst>
                 <a:ext uri="{FF2B5EF4-FFF2-40B4-BE49-F238E27FC236}">
-                  <a16:creationId xmlns:a16="http://schemas.microsoft.com/office/drawing/2014/main" xmlns="" id="{8C6EC880-9B1D-F447-9A6B-3F9B0AE3929D}"/>
+                  <a16:creationId xmlns="" xmlns:a16="http://schemas.microsoft.com/office/drawing/2014/main" id="{8C6EC880-9B1D-F447-9A6B-3F9B0AE3929D}"/>
                 </a:ext>
               </a:extLst>
             </p:cNvPr>
@@ -13083,7 +13086,7 @@
             <p:cNvPr id="15368" name="Freeform 10" descr="5%">
               <a:extLst>
                 <a:ext uri="{FF2B5EF4-FFF2-40B4-BE49-F238E27FC236}">
-                  <a16:creationId xmlns:a16="http://schemas.microsoft.com/office/drawing/2014/main" xmlns="" id="{1085577F-A61A-C647-B1BB-3EC24D1EF570}"/>
+                  <a16:creationId xmlns="" xmlns:a16="http://schemas.microsoft.com/office/drawing/2014/main" id="{1085577F-A61A-C647-B1BB-3EC24D1EF570}"/>
                 </a:ext>
               </a:extLst>
             </p:cNvPr>
@@ -13202,7 +13205,7 @@
             <p:cNvPr id="15369" name="Freeform 11" descr="5%">
               <a:extLst>
                 <a:ext uri="{FF2B5EF4-FFF2-40B4-BE49-F238E27FC236}">
-                  <a16:creationId xmlns:a16="http://schemas.microsoft.com/office/drawing/2014/main" xmlns="" id="{42171880-3EF9-BD46-B394-72256EDB9F85}"/>
+                  <a16:creationId xmlns="" xmlns:a16="http://schemas.microsoft.com/office/drawing/2014/main" id="{42171880-3EF9-BD46-B394-72256EDB9F85}"/>
                 </a:ext>
               </a:extLst>
             </p:cNvPr>
@@ -13321,7 +13324,7 @@
             <p:cNvPr id="15370" name="Freeform 12" descr="5%">
               <a:extLst>
                 <a:ext uri="{FF2B5EF4-FFF2-40B4-BE49-F238E27FC236}">
-                  <a16:creationId xmlns:a16="http://schemas.microsoft.com/office/drawing/2014/main" xmlns="" id="{4F9B3D7C-E1D0-FB44-B206-F2BECC14B1CD}"/>
+                  <a16:creationId xmlns="" xmlns:a16="http://schemas.microsoft.com/office/drawing/2014/main" id="{4F9B3D7C-E1D0-FB44-B206-F2BECC14B1CD}"/>
                 </a:ext>
               </a:extLst>
             </p:cNvPr>
@@ -13440,7 +13443,7 @@
             <p:cNvPr id="15371" name="Freeform 13" descr="5%">
               <a:extLst>
                 <a:ext uri="{FF2B5EF4-FFF2-40B4-BE49-F238E27FC236}">
-                  <a16:creationId xmlns:a16="http://schemas.microsoft.com/office/drawing/2014/main" xmlns="" id="{A24C0792-FA25-B748-886A-35F5ACA408AE}"/>
+                  <a16:creationId xmlns="" xmlns:a16="http://schemas.microsoft.com/office/drawing/2014/main" id="{A24C0792-FA25-B748-886A-35F5ACA408AE}"/>
                 </a:ext>
               </a:extLst>
             </p:cNvPr>
@@ -13560,7 +13563,7 @@
           <p:cNvPr id="15362" name="Rectangle 14">
             <a:extLst>
               <a:ext uri="{FF2B5EF4-FFF2-40B4-BE49-F238E27FC236}">
-                <a16:creationId xmlns:a16="http://schemas.microsoft.com/office/drawing/2014/main" xmlns="" id="{C44CDA25-06B2-4046-B1AC-A83281A09170}"/>
+                <a16:creationId xmlns="" xmlns:a16="http://schemas.microsoft.com/office/drawing/2014/main" id="{C44CDA25-06B2-4046-B1AC-A83281A09170}"/>
               </a:ext>
             </a:extLst>
           </p:cNvPr>
@@ -13759,7 +13762,7 @@
           <p:cNvPr id="15363" name="Rectangle 15">
             <a:extLst>
               <a:ext uri="{FF2B5EF4-FFF2-40B4-BE49-F238E27FC236}">
-                <a16:creationId xmlns:a16="http://schemas.microsoft.com/office/drawing/2014/main" xmlns="" id="{68AF690E-04A9-5542-820D-442B8473CB9D}"/>
+                <a16:creationId xmlns="" xmlns:a16="http://schemas.microsoft.com/office/drawing/2014/main" id="{68AF690E-04A9-5542-820D-442B8473CB9D}"/>
               </a:ext>
             </a:extLst>
           </p:cNvPr>
@@ -14072,7 +14075,7 @@
           <p:cNvPr id="15364" name="Freeform 17">
             <a:extLst>
               <a:ext uri="{FF2B5EF4-FFF2-40B4-BE49-F238E27FC236}">
-                <a16:creationId xmlns:a16="http://schemas.microsoft.com/office/drawing/2014/main" xmlns="" id="{ACB45F95-1541-4E4A-A55E-D838EEDC1698}"/>
+                <a16:creationId xmlns="" xmlns:a16="http://schemas.microsoft.com/office/drawing/2014/main" id="{ACB45F95-1541-4E4A-A55E-D838EEDC1698}"/>
               </a:ext>
             </a:extLst>
           </p:cNvPr>
@@ -14187,7 +14190,7 @@
           <p:cNvPr id="15365" name="17 Imagen">
             <a:extLst>
               <a:ext uri="{FF2B5EF4-FFF2-40B4-BE49-F238E27FC236}">
-                <a16:creationId xmlns:a16="http://schemas.microsoft.com/office/drawing/2014/main" xmlns="" id="{794BF391-464F-5548-8F2D-BF964DF6B303}"/>
+                <a16:creationId xmlns="" xmlns:a16="http://schemas.microsoft.com/office/drawing/2014/main" id="{794BF391-464F-5548-8F2D-BF964DF6B303}"/>
               </a:ext>
             </a:extLst>
           </p:cNvPr>
@@ -14309,7 +14312,7 @@
           <p:cNvPr id="5" name="Rectangle 14">
             <a:extLst>
               <a:ext uri="{FF2B5EF4-FFF2-40B4-BE49-F238E27FC236}">
-                <a16:creationId xmlns:a16="http://schemas.microsoft.com/office/drawing/2014/main" xmlns="" id="{3665E0D4-68DF-7A4B-92E0-B652D965824C}"/>
+                <a16:creationId xmlns="" xmlns:a16="http://schemas.microsoft.com/office/drawing/2014/main" id="{3665E0D4-68DF-7A4B-92E0-B652D965824C}"/>
               </a:ext>
             </a:extLst>
           </p:cNvPr>
@@ -14598,7 +14601,7 @@
           <p:cNvPr id="5" name="Rectangle 14">
             <a:extLst>
               <a:ext uri="{FF2B5EF4-FFF2-40B4-BE49-F238E27FC236}">
-                <a16:creationId xmlns:a16="http://schemas.microsoft.com/office/drawing/2014/main" xmlns="" id="{3665E0D4-68DF-7A4B-92E0-B652D965824C}"/>
+                <a16:creationId xmlns="" xmlns:a16="http://schemas.microsoft.com/office/drawing/2014/main" id="{3665E0D4-68DF-7A4B-92E0-B652D965824C}"/>
               </a:ext>
             </a:extLst>
           </p:cNvPr>
@@ -14917,7 +14920,7 @@
           <p:cNvPr id="16385" name="Rectangle 14">
             <a:extLst>
               <a:ext uri="{FF2B5EF4-FFF2-40B4-BE49-F238E27FC236}">
-                <a16:creationId xmlns:a16="http://schemas.microsoft.com/office/drawing/2014/main" xmlns="" id="{3665E0D4-68DF-7A4B-92E0-B652D965824C}"/>
+                <a16:creationId xmlns="" xmlns:a16="http://schemas.microsoft.com/office/drawing/2014/main" id="{3665E0D4-68DF-7A4B-92E0-B652D965824C}"/>
               </a:ext>
             </a:extLst>
           </p:cNvPr>
@@ -15182,7 +15185,7 @@
           <p:cNvPr id="31745" name="Picture 2" descr="Estrategias de marketing digital a través de preguntas clave">
             <a:extLst>
               <a:ext uri="{FF2B5EF4-FFF2-40B4-BE49-F238E27FC236}">
-                <a16:creationId xmlns:a16="http://schemas.microsoft.com/office/drawing/2014/main" xmlns="" id="{66CEA66D-E15C-C847-9B2A-032EF58E0B53}"/>
+                <a16:creationId xmlns="" xmlns:a16="http://schemas.microsoft.com/office/drawing/2014/main" id="{66CEA66D-E15C-C847-9B2A-032EF58E0B53}"/>
               </a:ext>
             </a:extLst>
           </p:cNvPr>
@@ -15242,7 +15245,7 @@
           <p:cNvPr id="31746" name="CuadroTexto 1">
             <a:extLst>
               <a:ext uri="{FF2B5EF4-FFF2-40B4-BE49-F238E27FC236}">
-                <a16:creationId xmlns:a16="http://schemas.microsoft.com/office/drawing/2014/main" xmlns="" id="{FD239F26-72A2-444A-9FA1-740091578B02}"/>
+                <a16:creationId xmlns="" xmlns:a16="http://schemas.microsoft.com/office/drawing/2014/main" id="{FD239F26-72A2-444A-9FA1-740091578B02}"/>
               </a:ext>
             </a:extLst>
           </p:cNvPr>
@@ -15398,7 +15401,7 @@
           <p:cNvPr id="31747" name="Group 22">
             <a:extLst>
               <a:ext uri="{FF2B5EF4-FFF2-40B4-BE49-F238E27FC236}">
-                <a16:creationId xmlns:a16="http://schemas.microsoft.com/office/drawing/2014/main" xmlns="" id="{A3D2F5D2-D269-504A-B84C-C6061FCA57AD}"/>
+                <a16:creationId xmlns="" xmlns:a16="http://schemas.microsoft.com/office/drawing/2014/main" id="{A3D2F5D2-D269-504A-B84C-C6061FCA57AD}"/>
               </a:ext>
             </a:extLst>
           </p:cNvPr>
@@ -15420,7 +15423,7 @@
             <p:cNvPr id="31751" name="Freeform 8" descr="5%">
               <a:extLst>
                 <a:ext uri="{FF2B5EF4-FFF2-40B4-BE49-F238E27FC236}">
-                  <a16:creationId xmlns:a16="http://schemas.microsoft.com/office/drawing/2014/main" xmlns="" id="{949389A0-7C35-D440-A511-E8043CC49841}"/>
+                  <a16:creationId xmlns="" xmlns:a16="http://schemas.microsoft.com/office/drawing/2014/main" id="{949389A0-7C35-D440-A511-E8043CC49841}"/>
                 </a:ext>
               </a:extLst>
             </p:cNvPr>
@@ -15539,7 +15542,7 @@
             <p:cNvPr id="31752" name="Freeform 9" descr="5%">
               <a:extLst>
                 <a:ext uri="{FF2B5EF4-FFF2-40B4-BE49-F238E27FC236}">
-                  <a16:creationId xmlns:a16="http://schemas.microsoft.com/office/drawing/2014/main" xmlns="" id="{06CE39B2-5F93-C74A-AAF4-A1377571A4EA}"/>
+                  <a16:creationId xmlns="" xmlns:a16="http://schemas.microsoft.com/office/drawing/2014/main" id="{06CE39B2-5F93-C74A-AAF4-A1377571A4EA}"/>
                 </a:ext>
               </a:extLst>
             </p:cNvPr>
@@ -15658,7 +15661,7 @@
             <p:cNvPr id="31753" name="Freeform 10" descr="5%">
               <a:extLst>
                 <a:ext uri="{FF2B5EF4-FFF2-40B4-BE49-F238E27FC236}">
-                  <a16:creationId xmlns:a16="http://schemas.microsoft.com/office/drawing/2014/main" xmlns="" id="{C97A05CA-BA23-5B43-BB1D-598E35F33716}"/>
+                  <a16:creationId xmlns="" xmlns:a16="http://schemas.microsoft.com/office/drawing/2014/main" id="{C97A05CA-BA23-5B43-BB1D-598E35F33716}"/>
                 </a:ext>
               </a:extLst>
             </p:cNvPr>
@@ -15777,7 +15780,7 @@
             <p:cNvPr id="31754" name="Freeform 11" descr="5%">
               <a:extLst>
                 <a:ext uri="{FF2B5EF4-FFF2-40B4-BE49-F238E27FC236}">
-                  <a16:creationId xmlns:a16="http://schemas.microsoft.com/office/drawing/2014/main" xmlns="" id="{2B84887D-7D31-644A-9461-B0EF770AB71C}"/>
+                  <a16:creationId xmlns="" xmlns:a16="http://schemas.microsoft.com/office/drawing/2014/main" id="{2B84887D-7D31-644A-9461-B0EF770AB71C}"/>
                 </a:ext>
               </a:extLst>
             </p:cNvPr>
@@ -15896,7 +15899,7 @@
             <p:cNvPr id="31755" name="Freeform 12" descr="5%">
               <a:extLst>
                 <a:ext uri="{FF2B5EF4-FFF2-40B4-BE49-F238E27FC236}">
-                  <a16:creationId xmlns:a16="http://schemas.microsoft.com/office/drawing/2014/main" xmlns="" id="{66D9D94A-DB3D-9246-8945-18F31C431B30}"/>
+                  <a16:creationId xmlns="" xmlns:a16="http://schemas.microsoft.com/office/drawing/2014/main" id="{66D9D94A-DB3D-9246-8945-18F31C431B30}"/>
                 </a:ext>
               </a:extLst>
             </p:cNvPr>
@@ -16015,7 +16018,7 @@
             <p:cNvPr id="31756" name="Freeform 13" descr="5%">
               <a:extLst>
                 <a:ext uri="{FF2B5EF4-FFF2-40B4-BE49-F238E27FC236}">
-                  <a16:creationId xmlns:a16="http://schemas.microsoft.com/office/drawing/2014/main" xmlns="" id="{EAD71A5A-2B41-2E4C-B00A-6C190547D1ED}"/>
+                  <a16:creationId xmlns="" xmlns:a16="http://schemas.microsoft.com/office/drawing/2014/main" id="{EAD71A5A-2B41-2E4C-B00A-6C190547D1ED}"/>
                 </a:ext>
               </a:extLst>
             </p:cNvPr>
@@ -16135,7 +16138,7 @@
           <p:cNvPr id="31748" name="Freeform 17">
             <a:extLst>
               <a:ext uri="{FF2B5EF4-FFF2-40B4-BE49-F238E27FC236}">
-                <a16:creationId xmlns:a16="http://schemas.microsoft.com/office/drawing/2014/main" xmlns="" id="{7F1EC75B-5B06-4F42-A007-2C7CE755ABBE}"/>
+                <a16:creationId xmlns="" xmlns:a16="http://schemas.microsoft.com/office/drawing/2014/main" id="{7F1EC75B-5B06-4F42-A007-2C7CE755ABBE}"/>
               </a:ext>
             </a:extLst>
           </p:cNvPr>
@@ -16250,7 +16253,7 @@
           <p:cNvPr id="31749" name="17 Imagen">
             <a:extLst>
               <a:ext uri="{FF2B5EF4-FFF2-40B4-BE49-F238E27FC236}">
-                <a16:creationId xmlns:a16="http://schemas.microsoft.com/office/drawing/2014/main" xmlns="" id="{F3812B2B-ED5E-D14C-803D-3858F435CB5E}"/>
+                <a16:creationId xmlns="" xmlns:a16="http://schemas.microsoft.com/office/drawing/2014/main" id="{F3812B2B-ED5E-D14C-803D-3858F435CB5E}"/>
               </a:ext>
             </a:extLst>
           </p:cNvPr>
@@ -16310,7 +16313,7 @@
           <p:cNvPr id="31750" name="Imagen 15">
             <a:extLst>
               <a:ext uri="{FF2B5EF4-FFF2-40B4-BE49-F238E27FC236}">
-                <a16:creationId xmlns:a16="http://schemas.microsoft.com/office/drawing/2014/main" xmlns="" id="{41854531-9AB6-5240-8FAD-0DA24A1221E5}"/>
+                <a16:creationId xmlns="" xmlns:a16="http://schemas.microsoft.com/office/drawing/2014/main" id="{41854531-9AB6-5240-8FAD-0DA24A1221E5}"/>
               </a:ext>
             </a:extLst>
           </p:cNvPr>
@@ -16402,7 +16405,7 @@
           <p:cNvPr id="16385" name="Rectangle 14">
             <a:extLst>
               <a:ext uri="{FF2B5EF4-FFF2-40B4-BE49-F238E27FC236}">
-                <a16:creationId xmlns:a16="http://schemas.microsoft.com/office/drawing/2014/main" xmlns="" id="{3665E0D4-68DF-7A4B-92E0-B652D965824C}"/>
+                <a16:creationId xmlns="" xmlns:a16="http://schemas.microsoft.com/office/drawing/2014/main" id="{3665E0D4-68DF-7A4B-92E0-B652D965824C}"/>
               </a:ext>
             </a:extLst>
           </p:cNvPr>
@@ -16603,7 +16606,7 @@
       </p:sp>
       <p:pic>
         <p:nvPicPr>
-          <p:cNvPr id="3" name="Imagen 2"/>
+          <p:cNvPr id="2" name="Imagen 1"/>
           <p:cNvPicPr>
             <a:picLocks noChangeAspect="1"/>
           </p:cNvPicPr>
@@ -16617,8 +16620,8 @@
         </p:blipFill>
         <p:spPr>
           <a:xfrm>
-            <a:off x="611560" y="707466"/>
-            <a:ext cx="8424936" cy="5789443"/>
+            <a:off x="1844550" y="714051"/>
+            <a:ext cx="6573067" cy="5883301"/>
           </a:xfrm>
           <a:prstGeom prst="rect">
             <a:avLst/>
@@ -16667,7 +16670,7 @@
           <p:cNvPr id="16385" name="Rectangle 14">
             <a:extLst>
               <a:ext uri="{FF2B5EF4-FFF2-40B4-BE49-F238E27FC236}">
-                <a16:creationId xmlns:a16="http://schemas.microsoft.com/office/drawing/2014/main" xmlns="" id="{3665E0D4-68DF-7A4B-92E0-B652D965824C}"/>
+                <a16:creationId xmlns="" xmlns:a16="http://schemas.microsoft.com/office/drawing/2014/main" id="{3665E0D4-68DF-7A4B-92E0-B652D965824C}"/>
               </a:ext>
             </a:extLst>
           </p:cNvPr>
@@ -16932,7 +16935,7 @@
           <p:cNvPr id="16385" name="Rectangle 14">
             <a:extLst>
               <a:ext uri="{FF2B5EF4-FFF2-40B4-BE49-F238E27FC236}">
-                <a16:creationId xmlns:a16="http://schemas.microsoft.com/office/drawing/2014/main" xmlns="" id="{3665E0D4-68DF-7A4B-92E0-B652D965824C}"/>
+                <a16:creationId xmlns="" xmlns:a16="http://schemas.microsoft.com/office/drawing/2014/main" id="{3665E0D4-68DF-7A4B-92E0-B652D965824C}"/>
               </a:ext>
             </a:extLst>
           </p:cNvPr>
@@ -17254,7 +17257,7 @@
           <p:cNvPr id="16385" name="Rectangle 14">
             <a:extLst>
               <a:ext uri="{FF2B5EF4-FFF2-40B4-BE49-F238E27FC236}">
-                <a16:creationId xmlns:a16="http://schemas.microsoft.com/office/drawing/2014/main" xmlns="" id="{3665E0D4-68DF-7A4B-92E0-B652D965824C}"/>
+                <a16:creationId xmlns="" xmlns:a16="http://schemas.microsoft.com/office/drawing/2014/main" id="{3665E0D4-68DF-7A4B-92E0-B652D965824C}"/>
               </a:ext>
             </a:extLst>
           </p:cNvPr>
@@ -17471,7 +17474,7 @@
       </p:sp>
       <p:pic>
         <p:nvPicPr>
-          <p:cNvPr id="3" name="Imagen 2"/>
+          <p:cNvPr id="2" name="Imagen 1"/>
           <p:cNvPicPr>
             <a:picLocks noChangeAspect="1"/>
           </p:cNvPicPr>
@@ -17485,8 +17488,8 @@
         </p:blipFill>
         <p:spPr>
           <a:xfrm>
-            <a:off x="2267744" y="619873"/>
-            <a:ext cx="5040560" cy="5977479"/>
+            <a:off x="2523067" y="661013"/>
+            <a:ext cx="4787370" cy="5936339"/>
           </a:xfrm>
           <a:prstGeom prst="rect">
             <a:avLst/>
@@ -17535,7 +17538,7 @@
           <p:cNvPr id="16385" name="Rectangle 14">
             <a:extLst>
               <a:ext uri="{FF2B5EF4-FFF2-40B4-BE49-F238E27FC236}">
-                <a16:creationId xmlns:a16="http://schemas.microsoft.com/office/drawing/2014/main" xmlns="" id="{3665E0D4-68DF-7A4B-92E0-B652D965824C}"/>
+                <a16:creationId xmlns="" xmlns:a16="http://schemas.microsoft.com/office/drawing/2014/main" id="{3665E0D4-68DF-7A4B-92E0-B652D965824C}"/>
               </a:ext>
             </a:extLst>
           </p:cNvPr>
@@ -17752,7 +17755,7 @@
       </p:sp>
       <p:pic>
         <p:nvPicPr>
-          <p:cNvPr id="3" name="Imagen 2"/>
+          <p:cNvPr id="2" name="Imagen 1"/>
           <p:cNvPicPr>
             <a:picLocks noChangeAspect="1"/>
           </p:cNvPicPr>
@@ -17766,8 +17769,8 @@
         </p:blipFill>
         <p:spPr>
           <a:xfrm>
-            <a:off x="1043608" y="932496"/>
-            <a:ext cx="7488832" cy="5298702"/>
+            <a:off x="1475656" y="765175"/>
+            <a:ext cx="6648450" cy="5819775"/>
           </a:xfrm>
           <a:prstGeom prst="rect">
             <a:avLst/>
@@ -17816,7 +17819,7 @@
           <p:cNvPr id="16385" name="Rectangle 14">
             <a:extLst>
               <a:ext uri="{FF2B5EF4-FFF2-40B4-BE49-F238E27FC236}">
-                <a16:creationId xmlns:a16="http://schemas.microsoft.com/office/drawing/2014/main" xmlns="" id="{3665E0D4-68DF-7A4B-92E0-B652D965824C}"/>
+                <a16:creationId xmlns="" xmlns:a16="http://schemas.microsoft.com/office/drawing/2014/main" id="{3665E0D4-68DF-7A4B-92E0-B652D965824C}"/>
               </a:ext>
             </a:extLst>
           </p:cNvPr>
@@ -18033,7 +18036,7 @@
       </p:sp>
       <p:pic>
         <p:nvPicPr>
-          <p:cNvPr id="2" name="Imagen 1"/>
+          <p:cNvPr id="3" name="Imagen 2"/>
           <p:cNvPicPr>
             <a:picLocks noChangeAspect="1"/>
           </p:cNvPicPr>
@@ -18047,8 +18050,8 @@
         </p:blipFill>
         <p:spPr>
           <a:xfrm>
-            <a:off x="755576" y="886648"/>
-            <a:ext cx="8140185" cy="5422672"/>
+            <a:off x="1957387" y="948746"/>
+            <a:ext cx="6070601" cy="4356679"/>
           </a:xfrm>
           <a:prstGeom prst="rect">
             <a:avLst/>
@@ -18097,7 +18100,7 @@
           <p:cNvPr id="16385" name="Rectangle 14">
             <a:extLst>
               <a:ext uri="{FF2B5EF4-FFF2-40B4-BE49-F238E27FC236}">
-                <a16:creationId xmlns:a16="http://schemas.microsoft.com/office/drawing/2014/main" xmlns="" id="{3665E0D4-68DF-7A4B-92E0-B652D965824C}"/>
+                <a16:creationId xmlns="" xmlns:a16="http://schemas.microsoft.com/office/drawing/2014/main" id="{3665E0D4-68DF-7A4B-92E0-B652D965824C}"/>
               </a:ext>
             </a:extLst>
           </p:cNvPr>
@@ -18314,7 +18317,7 @@
       </p:sp>
       <p:pic>
         <p:nvPicPr>
-          <p:cNvPr id="2" name="Imagen 1"/>
+          <p:cNvPr id="3" name="Imagen 2"/>
           <p:cNvPicPr>
             <a:picLocks noChangeAspect="1"/>
           </p:cNvPicPr>
@@ -18328,8 +18331,8 @@
         </p:blipFill>
         <p:spPr>
           <a:xfrm>
-            <a:off x="750727" y="908720"/>
-            <a:ext cx="7751723" cy="5112567"/>
+            <a:off x="1331641" y="678606"/>
+            <a:ext cx="6912768" cy="5867508"/>
           </a:xfrm>
           <a:prstGeom prst="rect">
             <a:avLst/>

</xml_diff>

<commit_message>
Presentacion ERS AGNEX formato PowerPoint 28/05/2019
</commit_message>
<xml_diff>
--- a/ERS/Presentación_ERS_AGNEX.pptx
+++ b/ERS/Presentación_ERS_AGNEX.pptx
@@ -221,7 +221,6 @@
           </a:p>
         </c:rich>
       </c:tx>
-      <c:layout/>
       <c:overlay val="0"/>
       <c:spPr>
         <a:noFill/>
@@ -466,7 +465,6 @@
               <c:showBubbleSize val="0"/>
               <c:extLst>
                 <c:ext xmlns:c15="http://schemas.microsoft.com/office/drawing/2012/chart" uri="{CE6537A1-D6FC-4f65-9D91-7224C49458BB}">
-                  <c15:layout/>
                   <c15:dlblFieldTable/>
                   <c15:showDataLabelsRange val="0"/>
                 </c:ext>
@@ -574,7 +572,6 @@
               <c:showBubbleSize val="0"/>
               <c:extLst>
                 <c:ext xmlns:c15="http://schemas.microsoft.com/office/drawing/2012/chart" uri="{CE6537A1-D6FC-4f65-9D91-7224C49458BB}">
-                  <c15:layout/>
                   <c15:dlblFieldTable/>
                   <c15:showDataLabelsRange val="0"/>
                 </c:ext>
@@ -1321,7 +1318,7 @@
           <p:cNvPr id="4098" name="Rectangle 2">
             <a:extLst>
               <a:ext uri="{FF2B5EF4-FFF2-40B4-BE49-F238E27FC236}">
-                <a16:creationId xmlns="" xmlns:a16="http://schemas.microsoft.com/office/drawing/2014/main" id="{7301BB8C-2DAA-A145-A2E1-B3649391EB9D}"/>
+                <a16:creationId xmlns:a16="http://schemas.microsoft.com/office/drawing/2014/main" xmlns="" id="{7301BB8C-2DAA-A145-A2E1-B3649391EB9D}"/>
               </a:ext>
             </a:extLst>
           </p:cNvPr>
@@ -1400,7 +1397,7 @@
           <p:cNvPr id="4099" name="Rectangle 3">
             <a:extLst>
               <a:ext uri="{FF2B5EF4-FFF2-40B4-BE49-F238E27FC236}">
-                <a16:creationId xmlns="" xmlns:a16="http://schemas.microsoft.com/office/drawing/2014/main" id="{72CDE936-7795-C144-AA9F-F05C2D88ED26}"/>
+                <a16:creationId xmlns:a16="http://schemas.microsoft.com/office/drawing/2014/main" xmlns="" id="{72CDE936-7795-C144-AA9F-F05C2D88ED26}"/>
               </a:ext>
             </a:extLst>
           </p:cNvPr>
@@ -1479,7 +1476,7 @@
           <p:cNvPr id="4100" name="Rectangle 4">
             <a:extLst>
               <a:ext uri="{FF2B5EF4-FFF2-40B4-BE49-F238E27FC236}">
-                <a16:creationId xmlns="" xmlns:a16="http://schemas.microsoft.com/office/drawing/2014/main" id="{9AB55F1A-30B5-BC47-9796-90A499593F42}"/>
+                <a16:creationId xmlns:a16="http://schemas.microsoft.com/office/drawing/2014/main" xmlns="" id="{9AB55F1A-30B5-BC47-9796-90A499593F42}"/>
               </a:ext>
             </a:extLst>
           </p:cNvPr>
@@ -1558,7 +1555,7 @@
           <p:cNvPr id="4101" name="Rectangle 5">
             <a:extLst>
               <a:ext uri="{FF2B5EF4-FFF2-40B4-BE49-F238E27FC236}">
-                <a16:creationId xmlns="" xmlns:a16="http://schemas.microsoft.com/office/drawing/2014/main" id="{80B3278C-0CD4-4444-96FD-21D07B4629DB}"/>
+                <a16:creationId xmlns:a16="http://schemas.microsoft.com/office/drawing/2014/main" xmlns="" id="{80B3278C-0CD4-4444-96FD-21D07B4629DB}"/>
               </a:ext>
             </a:extLst>
           </p:cNvPr>
@@ -1678,7 +1675,7 @@
           <p:cNvPr id="2" name="Marcador de encabezado 1">
             <a:extLst>
               <a:ext uri="{FF2B5EF4-FFF2-40B4-BE49-F238E27FC236}">
-                <a16:creationId xmlns="" xmlns:a16="http://schemas.microsoft.com/office/drawing/2014/main" id="{190B05B0-4CD7-8548-B284-31056CA4D3C6}"/>
+                <a16:creationId xmlns:a16="http://schemas.microsoft.com/office/drawing/2014/main" xmlns="" id="{190B05B0-4CD7-8548-B284-31056CA4D3C6}"/>
               </a:ext>
             </a:extLst>
           </p:cNvPr>
@@ -1718,7 +1715,7 @@
           <p:cNvPr id="3" name="Marcador de fecha 2">
             <a:extLst>
               <a:ext uri="{FF2B5EF4-FFF2-40B4-BE49-F238E27FC236}">
-                <a16:creationId xmlns="" xmlns:a16="http://schemas.microsoft.com/office/drawing/2014/main" id="{7A4EB724-2211-3A4B-939D-AE5040DB6E11}"/>
+                <a16:creationId xmlns:a16="http://schemas.microsoft.com/office/drawing/2014/main" xmlns="" id="{7A4EB724-2211-3A4B-939D-AE5040DB6E11}"/>
               </a:ext>
             </a:extLst>
           </p:cNvPr>
@@ -1754,7 +1751,7 @@
               <a:pPr>
                 <a:defRPr/>
               </a:pPr>
-              <a:t>22/05/2019</a:t>
+              <a:t>28/05/2019</a:t>
             </a:fld>
             <a:endParaRPr lang="es-ES"/>
           </a:p>
@@ -1765,7 +1762,7 @@
           <p:cNvPr id="4" name="Marcador de imagen de diapositiva 3">
             <a:extLst>
               <a:ext uri="{FF2B5EF4-FFF2-40B4-BE49-F238E27FC236}">
-                <a16:creationId xmlns="" xmlns:a16="http://schemas.microsoft.com/office/drawing/2014/main" id="{22BB66D7-F3E6-C442-94E8-C510FB352E0F}"/>
+                <a16:creationId xmlns:a16="http://schemas.microsoft.com/office/drawing/2014/main" xmlns="" id="{22BB66D7-F3E6-C442-94E8-C510FB352E0F}"/>
               </a:ext>
             </a:extLst>
           </p:cNvPr>
@@ -1805,7 +1802,7 @@
           <p:cNvPr id="5" name="Marcador de notas 4">
             <a:extLst>
               <a:ext uri="{FF2B5EF4-FFF2-40B4-BE49-F238E27FC236}">
-                <a16:creationId xmlns="" xmlns:a16="http://schemas.microsoft.com/office/drawing/2014/main" id="{A351D1A5-7E45-9F4C-B5F9-050AF4E79E01}"/>
+                <a16:creationId xmlns:a16="http://schemas.microsoft.com/office/drawing/2014/main" xmlns="" id="{A351D1A5-7E45-9F4C-B5F9-050AF4E79E01}"/>
               </a:ext>
             </a:extLst>
           </p:cNvPr>
@@ -1870,7 +1867,7 @@
           <p:cNvPr id="6" name="Marcador de pie de página 5">
             <a:extLst>
               <a:ext uri="{FF2B5EF4-FFF2-40B4-BE49-F238E27FC236}">
-                <a16:creationId xmlns="" xmlns:a16="http://schemas.microsoft.com/office/drawing/2014/main" id="{CDDA647B-9900-A042-837C-C5F3F92D9812}"/>
+                <a16:creationId xmlns:a16="http://schemas.microsoft.com/office/drawing/2014/main" xmlns="" id="{CDDA647B-9900-A042-837C-C5F3F92D9812}"/>
               </a:ext>
             </a:extLst>
           </p:cNvPr>
@@ -1910,7 +1907,7 @@
           <p:cNvPr id="7" name="Marcador de número de diapositiva 6">
             <a:extLst>
               <a:ext uri="{FF2B5EF4-FFF2-40B4-BE49-F238E27FC236}">
-                <a16:creationId xmlns="" xmlns:a16="http://schemas.microsoft.com/office/drawing/2014/main" id="{0038CB9D-584B-684A-BCE7-8A280ECEC657}"/>
+                <a16:creationId xmlns:a16="http://schemas.microsoft.com/office/drawing/2014/main" xmlns="" id="{0038CB9D-584B-684A-BCE7-8A280ECEC657}"/>
               </a:ext>
             </a:extLst>
           </p:cNvPr>
@@ -2107,7 +2104,7 @@
           <p:cNvPr id="34817" name="Marcador de imagen de diapositiva 1">
             <a:extLst>
               <a:ext uri="{FF2B5EF4-FFF2-40B4-BE49-F238E27FC236}">
-                <a16:creationId xmlns="" xmlns:a16="http://schemas.microsoft.com/office/drawing/2014/main" id="{88E98E05-8FFB-EB42-9121-DD91BA564333}"/>
+                <a16:creationId xmlns:a16="http://schemas.microsoft.com/office/drawing/2014/main" xmlns="" id="{88E98E05-8FFB-EB42-9121-DD91BA564333}"/>
               </a:ext>
             </a:extLst>
           </p:cNvPr>
@@ -2144,7 +2141,7 @@
           <p:cNvPr id="34818" name="Marcador de notas 2">
             <a:extLst>
               <a:ext uri="{FF2B5EF4-FFF2-40B4-BE49-F238E27FC236}">
-                <a16:creationId xmlns="" xmlns:a16="http://schemas.microsoft.com/office/drawing/2014/main" id="{55AB1F2A-96D9-5D4E-BB02-59C8DC05CBE4}"/>
+                <a16:creationId xmlns:a16="http://schemas.microsoft.com/office/drawing/2014/main" xmlns="" id="{55AB1F2A-96D9-5D4E-BB02-59C8DC05CBE4}"/>
               </a:ext>
             </a:extLst>
           </p:cNvPr>
@@ -2199,7 +2196,7 @@
           <p:cNvPr id="34819" name="Marcador de número de diapositiva 3">
             <a:extLst>
               <a:ext uri="{FF2B5EF4-FFF2-40B4-BE49-F238E27FC236}">
-                <a16:creationId xmlns="" xmlns:a16="http://schemas.microsoft.com/office/drawing/2014/main" id="{157EE0C8-B05F-AA41-A446-5E3DE14108EB}"/>
+                <a16:creationId xmlns:a16="http://schemas.microsoft.com/office/drawing/2014/main" xmlns="" id="{157EE0C8-B05F-AA41-A446-5E3DE14108EB}"/>
               </a:ext>
             </a:extLst>
           </p:cNvPr>
@@ -4272,7 +4269,7 @@
           <p:cNvPr id="4" name="Rectangle 4">
             <a:extLst>
               <a:ext uri="{FF2B5EF4-FFF2-40B4-BE49-F238E27FC236}">
-                <a16:creationId xmlns="" xmlns:a16="http://schemas.microsoft.com/office/drawing/2014/main" id="{CBFFC4FF-25B6-2F41-87F3-D1F3AFF4FBEB}"/>
+                <a16:creationId xmlns:a16="http://schemas.microsoft.com/office/drawing/2014/main" xmlns="" id="{CBFFC4FF-25B6-2F41-87F3-D1F3AFF4FBEB}"/>
               </a:ext>
             </a:extLst>
           </p:cNvPr>
@@ -4306,7 +4303,7 @@
           <p:cNvPr id="5" name="Rectangle 5">
             <a:extLst>
               <a:ext uri="{FF2B5EF4-FFF2-40B4-BE49-F238E27FC236}">
-                <a16:creationId xmlns="" xmlns:a16="http://schemas.microsoft.com/office/drawing/2014/main" id="{4C096F85-2FFD-E94B-89F6-2FAB4BAEEE87}"/>
+                <a16:creationId xmlns:a16="http://schemas.microsoft.com/office/drawing/2014/main" xmlns="" id="{4C096F85-2FFD-E94B-89F6-2FAB4BAEEE87}"/>
               </a:ext>
             </a:extLst>
           </p:cNvPr>
@@ -4340,7 +4337,7 @@
           <p:cNvPr id="6" name="Rectangle 6">
             <a:extLst>
               <a:ext uri="{FF2B5EF4-FFF2-40B4-BE49-F238E27FC236}">
-                <a16:creationId xmlns="" xmlns:a16="http://schemas.microsoft.com/office/drawing/2014/main" id="{2796106F-EEB2-E64A-9116-AAFF62318609}"/>
+                <a16:creationId xmlns:a16="http://schemas.microsoft.com/office/drawing/2014/main" xmlns="" id="{2796106F-EEB2-E64A-9116-AAFF62318609}"/>
               </a:ext>
             </a:extLst>
           </p:cNvPr>
@@ -4484,7 +4481,7 @@
           <p:cNvPr id="4" name="Rectangle 4">
             <a:extLst>
               <a:ext uri="{FF2B5EF4-FFF2-40B4-BE49-F238E27FC236}">
-                <a16:creationId xmlns="" xmlns:a16="http://schemas.microsoft.com/office/drawing/2014/main" id="{6A32BADE-F659-5046-B660-D70E5FD5A453}"/>
+                <a16:creationId xmlns:a16="http://schemas.microsoft.com/office/drawing/2014/main" xmlns="" id="{6A32BADE-F659-5046-B660-D70E5FD5A453}"/>
               </a:ext>
             </a:extLst>
           </p:cNvPr>
@@ -4518,7 +4515,7 @@
           <p:cNvPr id="5" name="Rectangle 5">
             <a:extLst>
               <a:ext uri="{FF2B5EF4-FFF2-40B4-BE49-F238E27FC236}">
-                <a16:creationId xmlns="" xmlns:a16="http://schemas.microsoft.com/office/drawing/2014/main" id="{C6C00947-C3E3-7C43-8F5C-5E0C4CED7300}"/>
+                <a16:creationId xmlns:a16="http://schemas.microsoft.com/office/drawing/2014/main" xmlns="" id="{C6C00947-C3E3-7C43-8F5C-5E0C4CED7300}"/>
               </a:ext>
             </a:extLst>
           </p:cNvPr>
@@ -4552,7 +4549,7 @@
           <p:cNvPr id="6" name="Rectangle 6">
             <a:extLst>
               <a:ext uri="{FF2B5EF4-FFF2-40B4-BE49-F238E27FC236}">
-                <a16:creationId xmlns="" xmlns:a16="http://schemas.microsoft.com/office/drawing/2014/main" id="{9E78E138-D322-AA42-82D7-FC195069F600}"/>
+                <a16:creationId xmlns:a16="http://schemas.microsoft.com/office/drawing/2014/main" xmlns="" id="{9E78E138-D322-AA42-82D7-FC195069F600}"/>
               </a:ext>
             </a:extLst>
           </p:cNvPr>
@@ -4706,7 +4703,7 @@
           <p:cNvPr id="4" name="Rectangle 4">
             <a:extLst>
               <a:ext uri="{FF2B5EF4-FFF2-40B4-BE49-F238E27FC236}">
-                <a16:creationId xmlns="" xmlns:a16="http://schemas.microsoft.com/office/drawing/2014/main" id="{2606C2FE-DFA7-A346-9F08-F601AFC337E9}"/>
+                <a16:creationId xmlns:a16="http://schemas.microsoft.com/office/drawing/2014/main" xmlns="" id="{2606C2FE-DFA7-A346-9F08-F601AFC337E9}"/>
               </a:ext>
             </a:extLst>
           </p:cNvPr>
@@ -4740,7 +4737,7 @@
           <p:cNvPr id="5" name="Rectangle 5">
             <a:extLst>
               <a:ext uri="{FF2B5EF4-FFF2-40B4-BE49-F238E27FC236}">
-                <a16:creationId xmlns="" xmlns:a16="http://schemas.microsoft.com/office/drawing/2014/main" id="{68BD24F8-D24B-B142-862C-4F4ED088CAE0}"/>
+                <a16:creationId xmlns:a16="http://schemas.microsoft.com/office/drawing/2014/main" xmlns="" id="{68BD24F8-D24B-B142-862C-4F4ED088CAE0}"/>
               </a:ext>
             </a:extLst>
           </p:cNvPr>
@@ -4774,7 +4771,7 @@
           <p:cNvPr id="6" name="Rectangle 6">
             <a:extLst>
               <a:ext uri="{FF2B5EF4-FFF2-40B4-BE49-F238E27FC236}">
-                <a16:creationId xmlns="" xmlns:a16="http://schemas.microsoft.com/office/drawing/2014/main" id="{DCFFF4C2-EBEB-D74F-9371-02B5A65CD036}"/>
+                <a16:creationId xmlns:a16="http://schemas.microsoft.com/office/drawing/2014/main" xmlns="" id="{DCFFF4C2-EBEB-D74F-9371-02B5A65CD036}"/>
               </a:ext>
             </a:extLst>
           </p:cNvPr>
@@ -4918,7 +4915,7 @@
           <p:cNvPr id="4" name="Rectangle 4">
             <a:extLst>
               <a:ext uri="{FF2B5EF4-FFF2-40B4-BE49-F238E27FC236}">
-                <a16:creationId xmlns="" xmlns:a16="http://schemas.microsoft.com/office/drawing/2014/main" id="{4F77C46A-12C9-8F4B-B36B-A58EA1012DC9}"/>
+                <a16:creationId xmlns:a16="http://schemas.microsoft.com/office/drawing/2014/main" xmlns="" id="{4F77C46A-12C9-8F4B-B36B-A58EA1012DC9}"/>
               </a:ext>
             </a:extLst>
           </p:cNvPr>
@@ -4952,7 +4949,7 @@
           <p:cNvPr id="5" name="Rectangle 5">
             <a:extLst>
               <a:ext uri="{FF2B5EF4-FFF2-40B4-BE49-F238E27FC236}">
-                <a16:creationId xmlns="" xmlns:a16="http://schemas.microsoft.com/office/drawing/2014/main" id="{204124B9-9C00-EF48-B916-2993DE755BBC}"/>
+                <a16:creationId xmlns:a16="http://schemas.microsoft.com/office/drawing/2014/main" xmlns="" id="{204124B9-9C00-EF48-B916-2993DE755BBC}"/>
               </a:ext>
             </a:extLst>
           </p:cNvPr>
@@ -4986,7 +4983,7 @@
           <p:cNvPr id="6" name="Rectangle 6">
             <a:extLst>
               <a:ext uri="{FF2B5EF4-FFF2-40B4-BE49-F238E27FC236}">
-                <a16:creationId xmlns="" xmlns:a16="http://schemas.microsoft.com/office/drawing/2014/main" id="{41557751-8E1D-244A-BE57-51574A96609F}"/>
+                <a16:creationId xmlns:a16="http://schemas.microsoft.com/office/drawing/2014/main" xmlns="" id="{41557751-8E1D-244A-BE57-51574A96609F}"/>
               </a:ext>
             </a:extLst>
           </p:cNvPr>
@@ -5153,7 +5150,7 @@
           <p:cNvPr id="4" name="Rectangle 4">
             <a:extLst>
               <a:ext uri="{FF2B5EF4-FFF2-40B4-BE49-F238E27FC236}">
-                <a16:creationId xmlns="" xmlns:a16="http://schemas.microsoft.com/office/drawing/2014/main" id="{16D5654B-BF22-544B-8EDB-DF8E226254B8}"/>
+                <a16:creationId xmlns:a16="http://schemas.microsoft.com/office/drawing/2014/main" xmlns="" id="{16D5654B-BF22-544B-8EDB-DF8E226254B8}"/>
               </a:ext>
             </a:extLst>
           </p:cNvPr>
@@ -5187,7 +5184,7 @@
           <p:cNvPr id="5" name="Rectangle 5">
             <a:extLst>
               <a:ext uri="{FF2B5EF4-FFF2-40B4-BE49-F238E27FC236}">
-                <a16:creationId xmlns="" xmlns:a16="http://schemas.microsoft.com/office/drawing/2014/main" id="{3F604BB5-E7A1-454E-83DD-045E2E5708A4}"/>
+                <a16:creationId xmlns:a16="http://schemas.microsoft.com/office/drawing/2014/main" xmlns="" id="{3F604BB5-E7A1-454E-83DD-045E2E5708A4}"/>
               </a:ext>
             </a:extLst>
           </p:cNvPr>
@@ -5221,7 +5218,7 @@
           <p:cNvPr id="6" name="Rectangle 6">
             <a:extLst>
               <a:ext uri="{FF2B5EF4-FFF2-40B4-BE49-F238E27FC236}">
-                <a16:creationId xmlns="" xmlns:a16="http://schemas.microsoft.com/office/drawing/2014/main" id="{EE8833F8-39E2-A946-A2E8-E1684A2E68BC}"/>
+                <a16:creationId xmlns:a16="http://schemas.microsoft.com/office/drawing/2014/main" xmlns="" id="{EE8833F8-39E2-A946-A2E8-E1684A2E68BC}"/>
               </a:ext>
             </a:extLst>
           </p:cNvPr>
@@ -5482,7 +5479,7 @@
           <p:cNvPr id="5" name="Rectangle 4">
             <a:extLst>
               <a:ext uri="{FF2B5EF4-FFF2-40B4-BE49-F238E27FC236}">
-                <a16:creationId xmlns="" xmlns:a16="http://schemas.microsoft.com/office/drawing/2014/main" id="{939112DA-065D-444A-B3DF-04650F72011D}"/>
+                <a16:creationId xmlns:a16="http://schemas.microsoft.com/office/drawing/2014/main" xmlns="" id="{939112DA-065D-444A-B3DF-04650F72011D}"/>
               </a:ext>
             </a:extLst>
           </p:cNvPr>
@@ -5516,7 +5513,7 @@
           <p:cNvPr id="6" name="Rectangle 5">
             <a:extLst>
               <a:ext uri="{FF2B5EF4-FFF2-40B4-BE49-F238E27FC236}">
-                <a16:creationId xmlns="" xmlns:a16="http://schemas.microsoft.com/office/drawing/2014/main" id="{290B047B-8D59-A14E-8B66-9459A41AA2F3}"/>
+                <a16:creationId xmlns:a16="http://schemas.microsoft.com/office/drawing/2014/main" xmlns="" id="{290B047B-8D59-A14E-8B66-9459A41AA2F3}"/>
               </a:ext>
             </a:extLst>
           </p:cNvPr>
@@ -5550,7 +5547,7 @@
           <p:cNvPr id="7" name="Rectangle 6">
             <a:extLst>
               <a:ext uri="{FF2B5EF4-FFF2-40B4-BE49-F238E27FC236}">
-                <a16:creationId xmlns="" xmlns:a16="http://schemas.microsoft.com/office/drawing/2014/main" id="{E126F9E9-9A18-884B-9A8E-31F84B8639C6}"/>
+                <a16:creationId xmlns:a16="http://schemas.microsoft.com/office/drawing/2014/main" xmlns="" id="{E126F9E9-9A18-884B-9A8E-31F84B8639C6}"/>
               </a:ext>
             </a:extLst>
           </p:cNvPr>
@@ -5945,7 +5942,7 @@
           <p:cNvPr id="7" name="Rectangle 4">
             <a:extLst>
               <a:ext uri="{FF2B5EF4-FFF2-40B4-BE49-F238E27FC236}">
-                <a16:creationId xmlns="" xmlns:a16="http://schemas.microsoft.com/office/drawing/2014/main" id="{95C4813C-4E1A-F043-B218-C7959682FFE9}"/>
+                <a16:creationId xmlns:a16="http://schemas.microsoft.com/office/drawing/2014/main" xmlns="" id="{95C4813C-4E1A-F043-B218-C7959682FFE9}"/>
               </a:ext>
             </a:extLst>
           </p:cNvPr>
@@ -5979,7 +5976,7 @@
           <p:cNvPr id="8" name="Rectangle 5">
             <a:extLst>
               <a:ext uri="{FF2B5EF4-FFF2-40B4-BE49-F238E27FC236}">
-                <a16:creationId xmlns="" xmlns:a16="http://schemas.microsoft.com/office/drawing/2014/main" id="{E34CED14-F450-6840-BF80-ECBF681228EA}"/>
+                <a16:creationId xmlns:a16="http://schemas.microsoft.com/office/drawing/2014/main" xmlns="" id="{E34CED14-F450-6840-BF80-ECBF681228EA}"/>
               </a:ext>
             </a:extLst>
           </p:cNvPr>
@@ -6013,7 +6010,7 @@
           <p:cNvPr id="9" name="Rectangle 6">
             <a:extLst>
               <a:ext uri="{FF2B5EF4-FFF2-40B4-BE49-F238E27FC236}">
-                <a16:creationId xmlns="" xmlns:a16="http://schemas.microsoft.com/office/drawing/2014/main" id="{7B65E33D-F19F-084E-8228-4BBA25779346}"/>
+                <a16:creationId xmlns:a16="http://schemas.microsoft.com/office/drawing/2014/main" xmlns="" id="{7B65E33D-F19F-084E-8228-4BBA25779346}"/>
               </a:ext>
             </a:extLst>
           </p:cNvPr>
@@ -6106,7 +6103,7 @@
           <p:cNvPr id="3" name="Rectangle 4">
             <a:extLst>
               <a:ext uri="{FF2B5EF4-FFF2-40B4-BE49-F238E27FC236}">
-                <a16:creationId xmlns="" xmlns:a16="http://schemas.microsoft.com/office/drawing/2014/main" id="{F4BC7895-DFEB-4F44-8BC9-BDFF081AF1DD}"/>
+                <a16:creationId xmlns:a16="http://schemas.microsoft.com/office/drawing/2014/main" xmlns="" id="{F4BC7895-DFEB-4F44-8BC9-BDFF081AF1DD}"/>
               </a:ext>
             </a:extLst>
           </p:cNvPr>
@@ -6140,7 +6137,7 @@
           <p:cNvPr id="4" name="Rectangle 5">
             <a:extLst>
               <a:ext uri="{FF2B5EF4-FFF2-40B4-BE49-F238E27FC236}">
-                <a16:creationId xmlns="" xmlns:a16="http://schemas.microsoft.com/office/drawing/2014/main" id="{D39CDA88-E4EE-534A-AA5B-C6D2E7BBC062}"/>
+                <a16:creationId xmlns:a16="http://schemas.microsoft.com/office/drawing/2014/main" xmlns="" id="{D39CDA88-E4EE-534A-AA5B-C6D2E7BBC062}"/>
               </a:ext>
             </a:extLst>
           </p:cNvPr>
@@ -6174,7 +6171,7 @@
           <p:cNvPr id="5" name="Rectangle 6">
             <a:extLst>
               <a:ext uri="{FF2B5EF4-FFF2-40B4-BE49-F238E27FC236}">
-                <a16:creationId xmlns="" xmlns:a16="http://schemas.microsoft.com/office/drawing/2014/main" id="{C9051539-E274-CE43-BB74-3FEEF9E9ADA1}"/>
+                <a16:creationId xmlns:a16="http://schemas.microsoft.com/office/drawing/2014/main" xmlns="" id="{C9051539-E274-CE43-BB74-3FEEF9E9ADA1}"/>
               </a:ext>
             </a:extLst>
           </p:cNvPr>
@@ -6245,7 +6242,7 @@
           <p:cNvPr id="2" name="Group 22">
             <a:extLst>
               <a:ext uri="{FF2B5EF4-FFF2-40B4-BE49-F238E27FC236}">
-                <a16:creationId xmlns="" xmlns:a16="http://schemas.microsoft.com/office/drawing/2014/main" id="{8E84F22A-9706-1E48-B2F1-46BDBDC069B0}"/>
+                <a16:creationId xmlns:a16="http://schemas.microsoft.com/office/drawing/2014/main" xmlns="" id="{8E84F22A-9706-1E48-B2F1-46BDBDC069B0}"/>
               </a:ext>
             </a:extLst>
           </p:cNvPr>
@@ -6267,7 +6264,7 @@
             <p:cNvPr id="3" name="Freeform 8" descr="5%">
               <a:extLst>
                 <a:ext uri="{FF2B5EF4-FFF2-40B4-BE49-F238E27FC236}">
-                  <a16:creationId xmlns="" xmlns:a16="http://schemas.microsoft.com/office/drawing/2014/main" id="{B7039347-F769-F148-A923-1B0BE0ECB77E}"/>
+                  <a16:creationId xmlns:a16="http://schemas.microsoft.com/office/drawing/2014/main" xmlns="" id="{B7039347-F769-F148-A923-1B0BE0ECB77E}"/>
                 </a:ext>
               </a:extLst>
             </p:cNvPr>
@@ -6386,7 +6383,7 @@
             <p:cNvPr id="4" name="Freeform 9" descr="5%">
               <a:extLst>
                 <a:ext uri="{FF2B5EF4-FFF2-40B4-BE49-F238E27FC236}">
-                  <a16:creationId xmlns="" xmlns:a16="http://schemas.microsoft.com/office/drawing/2014/main" id="{6F999DAB-C9D8-8C48-88BC-EB0ACC950367}"/>
+                  <a16:creationId xmlns:a16="http://schemas.microsoft.com/office/drawing/2014/main" xmlns="" id="{6F999DAB-C9D8-8C48-88BC-EB0ACC950367}"/>
                 </a:ext>
               </a:extLst>
             </p:cNvPr>
@@ -6505,7 +6502,7 @@
             <p:cNvPr id="5" name="Freeform 10" descr="5%">
               <a:extLst>
                 <a:ext uri="{FF2B5EF4-FFF2-40B4-BE49-F238E27FC236}">
-                  <a16:creationId xmlns="" xmlns:a16="http://schemas.microsoft.com/office/drawing/2014/main" id="{5ED24D02-9BC2-E545-95E6-3CCD22CF78BA}"/>
+                  <a16:creationId xmlns:a16="http://schemas.microsoft.com/office/drawing/2014/main" xmlns="" id="{5ED24D02-9BC2-E545-95E6-3CCD22CF78BA}"/>
                 </a:ext>
               </a:extLst>
             </p:cNvPr>
@@ -6624,7 +6621,7 @@
             <p:cNvPr id="6" name="Freeform 11" descr="5%">
               <a:extLst>
                 <a:ext uri="{FF2B5EF4-FFF2-40B4-BE49-F238E27FC236}">
-                  <a16:creationId xmlns="" xmlns:a16="http://schemas.microsoft.com/office/drawing/2014/main" id="{2F614782-A419-8043-BC6F-187E134A38CF}"/>
+                  <a16:creationId xmlns:a16="http://schemas.microsoft.com/office/drawing/2014/main" xmlns="" id="{2F614782-A419-8043-BC6F-187E134A38CF}"/>
                 </a:ext>
               </a:extLst>
             </p:cNvPr>
@@ -6743,7 +6740,7 @@
             <p:cNvPr id="7" name="Freeform 12" descr="5%">
               <a:extLst>
                 <a:ext uri="{FF2B5EF4-FFF2-40B4-BE49-F238E27FC236}">
-                  <a16:creationId xmlns="" xmlns:a16="http://schemas.microsoft.com/office/drawing/2014/main" id="{B9D19167-1DB4-3C41-9039-944BB5EED427}"/>
+                  <a16:creationId xmlns:a16="http://schemas.microsoft.com/office/drawing/2014/main" xmlns="" id="{B9D19167-1DB4-3C41-9039-944BB5EED427}"/>
                 </a:ext>
               </a:extLst>
             </p:cNvPr>
@@ -6862,7 +6859,7 @@
             <p:cNvPr id="8" name="Freeform 13" descr="5%">
               <a:extLst>
                 <a:ext uri="{FF2B5EF4-FFF2-40B4-BE49-F238E27FC236}">
-                  <a16:creationId xmlns="" xmlns:a16="http://schemas.microsoft.com/office/drawing/2014/main" id="{B2EAC2A2-D222-CA42-8295-561B5CD74721}"/>
+                  <a16:creationId xmlns:a16="http://schemas.microsoft.com/office/drawing/2014/main" xmlns="" id="{B2EAC2A2-D222-CA42-8295-561B5CD74721}"/>
                 </a:ext>
               </a:extLst>
             </p:cNvPr>
@@ -6982,7 +6979,7 @@
           <p:cNvPr id="9" name="Freeform 17">
             <a:extLst>
               <a:ext uri="{FF2B5EF4-FFF2-40B4-BE49-F238E27FC236}">
-                <a16:creationId xmlns="" xmlns:a16="http://schemas.microsoft.com/office/drawing/2014/main" id="{ADE1301C-82E7-B44E-8823-4ABD8E4996E1}"/>
+                <a16:creationId xmlns:a16="http://schemas.microsoft.com/office/drawing/2014/main" xmlns="" id="{ADE1301C-82E7-B44E-8823-4ABD8E4996E1}"/>
               </a:ext>
             </a:extLst>
           </p:cNvPr>
@@ -7097,7 +7094,7 @@
           <p:cNvPr id="12" name="Rectangle 6">
             <a:extLst>
               <a:ext uri="{FF2B5EF4-FFF2-40B4-BE49-F238E27FC236}">
-                <a16:creationId xmlns="" xmlns:a16="http://schemas.microsoft.com/office/drawing/2014/main" id="{07FA309B-90CD-D54E-AA02-3C668A6BFB51}"/>
+                <a16:creationId xmlns:a16="http://schemas.microsoft.com/office/drawing/2014/main" xmlns="" id="{07FA309B-90CD-D54E-AA02-3C668A6BFB51}"/>
               </a:ext>
             </a:extLst>
           </p:cNvPr>
@@ -7346,7 +7343,7 @@
           <p:cNvPr id="5" name="Rectangle 4">
             <a:extLst>
               <a:ext uri="{FF2B5EF4-FFF2-40B4-BE49-F238E27FC236}">
-                <a16:creationId xmlns="" xmlns:a16="http://schemas.microsoft.com/office/drawing/2014/main" id="{C7C8B1DD-4DA0-EF4D-B9CF-6AFFB6F0D393}"/>
+                <a16:creationId xmlns:a16="http://schemas.microsoft.com/office/drawing/2014/main" xmlns="" id="{C7C8B1DD-4DA0-EF4D-B9CF-6AFFB6F0D393}"/>
               </a:ext>
             </a:extLst>
           </p:cNvPr>
@@ -7380,7 +7377,7 @@
           <p:cNvPr id="6" name="Rectangle 5">
             <a:extLst>
               <a:ext uri="{FF2B5EF4-FFF2-40B4-BE49-F238E27FC236}">
-                <a16:creationId xmlns="" xmlns:a16="http://schemas.microsoft.com/office/drawing/2014/main" id="{9E79C3ED-79BC-0248-88E9-6470BD781F40}"/>
+                <a16:creationId xmlns:a16="http://schemas.microsoft.com/office/drawing/2014/main" xmlns="" id="{9E79C3ED-79BC-0248-88E9-6470BD781F40}"/>
               </a:ext>
             </a:extLst>
           </p:cNvPr>
@@ -7414,7 +7411,7 @@
           <p:cNvPr id="7" name="Rectangle 6">
             <a:extLst>
               <a:ext uri="{FF2B5EF4-FFF2-40B4-BE49-F238E27FC236}">
-                <a16:creationId xmlns="" xmlns:a16="http://schemas.microsoft.com/office/drawing/2014/main" id="{3AB662F9-6380-3041-AD2B-E570902EE19D}"/>
+                <a16:creationId xmlns:a16="http://schemas.microsoft.com/office/drawing/2014/main" xmlns="" id="{3AB662F9-6380-3041-AD2B-E570902EE19D}"/>
               </a:ext>
             </a:extLst>
           </p:cNvPr>
@@ -7643,7 +7640,7 @@
           <p:cNvPr id="5" name="Rectangle 4">
             <a:extLst>
               <a:ext uri="{FF2B5EF4-FFF2-40B4-BE49-F238E27FC236}">
-                <a16:creationId xmlns="" xmlns:a16="http://schemas.microsoft.com/office/drawing/2014/main" id="{CBA21871-7A5D-B443-93D6-F8A17F2DCF85}"/>
+                <a16:creationId xmlns:a16="http://schemas.microsoft.com/office/drawing/2014/main" xmlns="" id="{CBA21871-7A5D-B443-93D6-F8A17F2DCF85}"/>
               </a:ext>
             </a:extLst>
           </p:cNvPr>
@@ -7677,7 +7674,7 @@
           <p:cNvPr id="6" name="Rectangle 5">
             <a:extLst>
               <a:ext uri="{FF2B5EF4-FFF2-40B4-BE49-F238E27FC236}">
-                <a16:creationId xmlns="" xmlns:a16="http://schemas.microsoft.com/office/drawing/2014/main" id="{E76AB48A-FB00-AB41-A25D-494327B102EA}"/>
+                <a16:creationId xmlns:a16="http://schemas.microsoft.com/office/drawing/2014/main" xmlns="" id="{E76AB48A-FB00-AB41-A25D-494327B102EA}"/>
               </a:ext>
             </a:extLst>
           </p:cNvPr>
@@ -7711,7 +7708,7 @@
           <p:cNvPr id="7" name="Rectangle 6">
             <a:extLst>
               <a:ext uri="{FF2B5EF4-FFF2-40B4-BE49-F238E27FC236}">
-                <a16:creationId xmlns="" xmlns:a16="http://schemas.microsoft.com/office/drawing/2014/main" id="{1C28FCBD-BF2C-6841-B4D8-8DC16AE75B6E}"/>
+                <a16:creationId xmlns:a16="http://schemas.microsoft.com/office/drawing/2014/main" xmlns="" id="{1C28FCBD-BF2C-6841-B4D8-8DC16AE75B6E}"/>
               </a:ext>
             </a:extLst>
           </p:cNvPr>
@@ -7790,7 +7787,7 @@
           <p:cNvPr id="1026" name="Rectangle 2">
             <a:extLst>
               <a:ext uri="{FF2B5EF4-FFF2-40B4-BE49-F238E27FC236}">
-                <a16:creationId xmlns="" xmlns:a16="http://schemas.microsoft.com/office/drawing/2014/main" id="{BB0E7CB5-3395-0646-A20A-7249B9974431}"/>
+                <a16:creationId xmlns:a16="http://schemas.microsoft.com/office/drawing/2014/main" xmlns="" id="{BB0E7CB5-3395-0646-A20A-7249B9974431}"/>
               </a:ext>
             </a:extLst>
           </p:cNvPr>
@@ -7864,7 +7861,7 @@
           <p:cNvPr id="1027" name="Rectangle 3">
             <a:extLst>
               <a:ext uri="{FF2B5EF4-FFF2-40B4-BE49-F238E27FC236}">
-                <a16:creationId xmlns="" xmlns:a16="http://schemas.microsoft.com/office/drawing/2014/main" id="{8CB37737-6579-404E-A639-D817E15EE378}"/>
+                <a16:creationId xmlns:a16="http://schemas.microsoft.com/office/drawing/2014/main" xmlns="" id="{8CB37737-6579-404E-A639-D817E15EE378}"/>
               </a:ext>
             </a:extLst>
           </p:cNvPr>
@@ -7966,7 +7963,7 @@
           <p:cNvPr id="1028" name="Rectangle 4">
             <a:extLst>
               <a:ext uri="{FF2B5EF4-FFF2-40B4-BE49-F238E27FC236}">
-                <a16:creationId xmlns="" xmlns:a16="http://schemas.microsoft.com/office/drawing/2014/main" id="{3036F1C7-8DCE-6243-BF4D-A7EF32222206}"/>
+                <a16:creationId xmlns:a16="http://schemas.microsoft.com/office/drawing/2014/main" xmlns="" id="{3036F1C7-8DCE-6243-BF4D-A7EF32222206}"/>
               </a:ext>
             </a:extLst>
           </p:cNvPr>
@@ -8045,7 +8042,7 @@
           <p:cNvPr id="1029" name="Rectangle 5">
             <a:extLst>
               <a:ext uri="{FF2B5EF4-FFF2-40B4-BE49-F238E27FC236}">
-                <a16:creationId xmlns="" xmlns:a16="http://schemas.microsoft.com/office/drawing/2014/main" id="{C1624EBC-F7C4-C049-B404-364BB8BD761F}"/>
+                <a16:creationId xmlns:a16="http://schemas.microsoft.com/office/drawing/2014/main" xmlns="" id="{C1624EBC-F7C4-C049-B404-364BB8BD761F}"/>
               </a:ext>
             </a:extLst>
           </p:cNvPr>
@@ -8124,7 +8121,7 @@
           <p:cNvPr id="1030" name="Rectangle 6">
             <a:extLst>
               <a:ext uri="{FF2B5EF4-FFF2-40B4-BE49-F238E27FC236}">
-                <a16:creationId xmlns="" xmlns:a16="http://schemas.microsoft.com/office/drawing/2014/main" id="{BC9DBA90-5BB7-B54B-B0AC-6480000D6EAF}"/>
+                <a16:creationId xmlns:a16="http://schemas.microsoft.com/office/drawing/2014/main" xmlns="" id="{BC9DBA90-5BB7-B54B-B0AC-6480000D6EAF}"/>
               </a:ext>
             </a:extLst>
           </p:cNvPr>
@@ -8610,7 +8607,7 @@
           <p:cNvPr id="14337" name="Imagen 1">
             <a:extLst>
               <a:ext uri="{FF2B5EF4-FFF2-40B4-BE49-F238E27FC236}">
-                <a16:creationId xmlns="" xmlns:a16="http://schemas.microsoft.com/office/drawing/2014/main" id="{7F1D6CA4-5F4D-1444-9762-9C39BCC5CA71}"/>
+                <a16:creationId xmlns:a16="http://schemas.microsoft.com/office/drawing/2014/main" xmlns="" id="{7F1D6CA4-5F4D-1444-9762-9C39BCC5CA71}"/>
               </a:ext>
             </a:extLst>
           </p:cNvPr>
@@ -8670,7 +8667,7 @@
           <p:cNvPr id="14338" name="Group 45">
             <a:extLst>
               <a:ext uri="{FF2B5EF4-FFF2-40B4-BE49-F238E27FC236}">
-                <a16:creationId xmlns="" xmlns:a16="http://schemas.microsoft.com/office/drawing/2014/main" id="{9ADAEC38-7FE8-5746-854B-6203008C9A28}"/>
+                <a16:creationId xmlns:a16="http://schemas.microsoft.com/office/drawing/2014/main" xmlns="" id="{9ADAEC38-7FE8-5746-854B-6203008C9A28}"/>
               </a:ext>
             </a:extLst>
           </p:cNvPr>
@@ -8692,7 +8689,7 @@
             <p:cNvPr id="14342" name="Text Box 29">
               <a:extLst>
                 <a:ext uri="{FF2B5EF4-FFF2-40B4-BE49-F238E27FC236}">
-                  <a16:creationId xmlns="" xmlns:a16="http://schemas.microsoft.com/office/drawing/2014/main" id="{352F96A7-3C2B-B24B-BB36-7D18C1762A93}"/>
+                  <a16:creationId xmlns:a16="http://schemas.microsoft.com/office/drawing/2014/main" xmlns="" id="{352F96A7-3C2B-B24B-BB36-7D18C1762A93}"/>
                 </a:ext>
               </a:extLst>
             </p:cNvPr>
@@ -8972,7 +8969,7 @@
             <p:cNvPr id="14343" name="Text Box 30">
               <a:extLst>
                 <a:ext uri="{FF2B5EF4-FFF2-40B4-BE49-F238E27FC236}">
-                  <a16:creationId xmlns="" xmlns:a16="http://schemas.microsoft.com/office/drawing/2014/main" id="{52C5A348-D146-7F4A-8486-2FE817DDABBD}"/>
+                  <a16:creationId xmlns:a16="http://schemas.microsoft.com/office/drawing/2014/main" xmlns="" id="{52C5A348-D146-7F4A-8486-2FE817DDABBD}"/>
                 </a:ext>
               </a:extLst>
             </p:cNvPr>
@@ -9186,7 +9183,7 @@
           <p:cNvPr id="14339" name="Rectangle 27">
             <a:extLst>
               <a:ext uri="{FF2B5EF4-FFF2-40B4-BE49-F238E27FC236}">
-                <a16:creationId xmlns="" xmlns:a16="http://schemas.microsoft.com/office/drawing/2014/main" id="{A611ED07-CD3C-C643-B9D5-232B736777DB}"/>
+                <a16:creationId xmlns:a16="http://schemas.microsoft.com/office/drawing/2014/main" xmlns="" id="{A611ED07-CD3C-C643-B9D5-232B736777DB}"/>
               </a:ext>
             </a:extLst>
           </p:cNvPr>
@@ -9454,7 +9451,7 @@
           <p:cNvPr id="14340" name="Rectangle 26">
             <a:extLst>
               <a:ext uri="{FF2B5EF4-FFF2-40B4-BE49-F238E27FC236}">
-                <a16:creationId xmlns="" xmlns:a16="http://schemas.microsoft.com/office/drawing/2014/main" id="{D35E3657-506F-BB4C-8EB8-A849B3BD478C}"/>
+                <a16:creationId xmlns:a16="http://schemas.microsoft.com/office/drawing/2014/main" xmlns="" id="{D35E3657-506F-BB4C-8EB8-A849B3BD478C}"/>
               </a:ext>
             </a:extLst>
           </p:cNvPr>
@@ -9690,7 +9687,7 @@
           <p:cNvPr id="16385" name="Rectangle 14">
             <a:extLst>
               <a:ext uri="{FF2B5EF4-FFF2-40B4-BE49-F238E27FC236}">
-                <a16:creationId xmlns="" xmlns:a16="http://schemas.microsoft.com/office/drawing/2014/main" id="{3665E0D4-68DF-7A4B-92E0-B652D965824C}"/>
+                <a16:creationId xmlns:a16="http://schemas.microsoft.com/office/drawing/2014/main" xmlns="" id="{3665E0D4-68DF-7A4B-92E0-B652D965824C}"/>
               </a:ext>
             </a:extLst>
           </p:cNvPr>
@@ -9985,7 +9982,7 @@
           <p:cNvPr id="16385" name="Rectangle 14">
             <a:extLst>
               <a:ext uri="{FF2B5EF4-FFF2-40B4-BE49-F238E27FC236}">
-                <a16:creationId xmlns="" xmlns:a16="http://schemas.microsoft.com/office/drawing/2014/main" id="{3665E0D4-68DF-7A4B-92E0-B652D965824C}"/>
+                <a16:creationId xmlns:a16="http://schemas.microsoft.com/office/drawing/2014/main" xmlns="" id="{3665E0D4-68DF-7A4B-92E0-B652D965824C}"/>
               </a:ext>
             </a:extLst>
           </p:cNvPr>
@@ -10280,7 +10277,7 @@
           <p:cNvPr id="16385" name="Rectangle 14">
             <a:extLst>
               <a:ext uri="{FF2B5EF4-FFF2-40B4-BE49-F238E27FC236}">
-                <a16:creationId xmlns="" xmlns:a16="http://schemas.microsoft.com/office/drawing/2014/main" id="{3665E0D4-68DF-7A4B-92E0-B652D965824C}"/>
+                <a16:creationId xmlns:a16="http://schemas.microsoft.com/office/drawing/2014/main" xmlns="" id="{3665E0D4-68DF-7A4B-92E0-B652D965824C}"/>
               </a:ext>
             </a:extLst>
           </p:cNvPr>
@@ -10593,7 +10590,7 @@
           <p:cNvPr id="16385" name="Rectangle 14">
             <a:extLst>
               <a:ext uri="{FF2B5EF4-FFF2-40B4-BE49-F238E27FC236}">
-                <a16:creationId xmlns="" xmlns:a16="http://schemas.microsoft.com/office/drawing/2014/main" id="{3665E0D4-68DF-7A4B-92E0-B652D965824C}"/>
+                <a16:creationId xmlns:a16="http://schemas.microsoft.com/office/drawing/2014/main" xmlns="" id="{3665E0D4-68DF-7A4B-92E0-B652D965824C}"/>
               </a:ext>
             </a:extLst>
           </p:cNvPr>
@@ -10912,7 +10909,7 @@
           <p:cNvPr id="16385" name="Rectangle 14">
             <a:extLst>
               <a:ext uri="{FF2B5EF4-FFF2-40B4-BE49-F238E27FC236}">
-                <a16:creationId xmlns="" xmlns:a16="http://schemas.microsoft.com/office/drawing/2014/main" id="{3665E0D4-68DF-7A4B-92E0-B652D965824C}"/>
+                <a16:creationId xmlns:a16="http://schemas.microsoft.com/office/drawing/2014/main" xmlns="" id="{3665E0D4-68DF-7A4B-92E0-B652D965824C}"/>
               </a:ext>
             </a:extLst>
           </p:cNvPr>
@@ -11231,7 +11228,7 @@
           <p:cNvPr id="16385" name="Rectangle 14">
             <a:extLst>
               <a:ext uri="{FF2B5EF4-FFF2-40B4-BE49-F238E27FC236}">
-                <a16:creationId xmlns="" xmlns:a16="http://schemas.microsoft.com/office/drawing/2014/main" id="{3665E0D4-68DF-7A4B-92E0-B652D965824C}"/>
+                <a16:creationId xmlns:a16="http://schemas.microsoft.com/office/drawing/2014/main" xmlns="" id="{3665E0D4-68DF-7A4B-92E0-B652D965824C}"/>
               </a:ext>
             </a:extLst>
           </p:cNvPr>
@@ -11550,7 +11547,7 @@
           <p:cNvPr id="16385" name="Rectangle 14">
             <a:extLst>
               <a:ext uri="{FF2B5EF4-FFF2-40B4-BE49-F238E27FC236}">
-                <a16:creationId xmlns="" xmlns:a16="http://schemas.microsoft.com/office/drawing/2014/main" id="{3665E0D4-68DF-7A4B-92E0-B652D965824C}"/>
+                <a16:creationId xmlns:a16="http://schemas.microsoft.com/office/drawing/2014/main" xmlns="" id="{3665E0D4-68DF-7A4B-92E0-B652D965824C}"/>
               </a:ext>
             </a:extLst>
           </p:cNvPr>
@@ -11899,7 +11896,7 @@
           <p:cNvPr id="4" name="Rectangle 14">
             <a:extLst>
               <a:ext uri="{FF2B5EF4-FFF2-40B4-BE49-F238E27FC236}">
-                <a16:creationId xmlns="" xmlns:a16="http://schemas.microsoft.com/office/drawing/2014/main" id="{3665E0D4-68DF-7A4B-92E0-B652D965824C}"/>
+                <a16:creationId xmlns:a16="http://schemas.microsoft.com/office/drawing/2014/main" xmlns="" id="{3665E0D4-68DF-7A4B-92E0-B652D965824C}"/>
               </a:ext>
             </a:extLst>
           </p:cNvPr>
@@ -12218,7 +12215,7 @@
           <p:cNvPr id="5" name="Rectangle 14">
             <a:extLst>
               <a:ext uri="{FF2B5EF4-FFF2-40B4-BE49-F238E27FC236}">
-                <a16:creationId xmlns="" xmlns:a16="http://schemas.microsoft.com/office/drawing/2014/main" id="{3665E0D4-68DF-7A4B-92E0-B652D965824C}"/>
+                <a16:creationId xmlns:a16="http://schemas.microsoft.com/office/drawing/2014/main" xmlns="" id="{3665E0D4-68DF-7A4B-92E0-B652D965824C}"/>
               </a:ext>
             </a:extLst>
           </p:cNvPr>
@@ -12537,7 +12534,7 @@
           <p:cNvPr id="5" name="Rectangle 14">
             <a:extLst>
               <a:ext uri="{FF2B5EF4-FFF2-40B4-BE49-F238E27FC236}">
-                <a16:creationId xmlns="" xmlns:a16="http://schemas.microsoft.com/office/drawing/2014/main" id="{3665E0D4-68DF-7A4B-92E0-B652D965824C}"/>
+                <a16:creationId xmlns:a16="http://schemas.microsoft.com/office/drawing/2014/main" xmlns="" id="{3665E0D4-68DF-7A4B-92E0-B652D965824C}"/>
               </a:ext>
             </a:extLst>
           </p:cNvPr>
@@ -12826,7 +12823,7 @@
           <p:cNvPr id="15361" name="Group 22">
             <a:extLst>
               <a:ext uri="{FF2B5EF4-FFF2-40B4-BE49-F238E27FC236}">
-                <a16:creationId xmlns="" xmlns:a16="http://schemas.microsoft.com/office/drawing/2014/main" id="{6B6EABA4-F252-6746-8ED0-EF684C8CADED}"/>
+                <a16:creationId xmlns:a16="http://schemas.microsoft.com/office/drawing/2014/main" xmlns="" id="{6B6EABA4-F252-6746-8ED0-EF684C8CADED}"/>
               </a:ext>
             </a:extLst>
           </p:cNvPr>
@@ -12848,7 +12845,7 @@
             <p:cNvPr id="15366" name="Freeform 8" descr="5%">
               <a:extLst>
                 <a:ext uri="{FF2B5EF4-FFF2-40B4-BE49-F238E27FC236}">
-                  <a16:creationId xmlns="" xmlns:a16="http://schemas.microsoft.com/office/drawing/2014/main" id="{58D4CBDD-1133-A449-943D-DD62EB429140}"/>
+                  <a16:creationId xmlns:a16="http://schemas.microsoft.com/office/drawing/2014/main" xmlns="" id="{58D4CBDD-1133-A449-943D-DD62EB429140}"/>
                 </a:ext>
               </a:extLst>
             </p:cNvPr>
@@ -12967,7 +12964,7 @@
             <p:cNvPr id="15367" name="Freeform 9" descr="5%">
               <a:extLst>
                 <a:ext uri="{FF2B5EF4-FFF2-40B4-BE49-F238E27FC236}">
-                  <a16:creationId xmlns="" xmlns:a16="http://schemas.microsoft.com/office/drawing/2014/main" id="{8C6EC880-9B1D-F447-9A6B-3F9B0AE3929D}"/>
+                  <a16:creationId xmlns:a16="http://schemas.microsoft.com/office/drawing/2014/main" xmlns="" id="{8C6EC880-9B1D-F447-9A6B-3F9B0AE3929D}"/>
                 </a:ext>
               </a:extLst>
             </p:cNvPr>
@@ -13086,7 +13083,7 @@
             <p:cNvPr id="15368" name="Freeform 10" descr="5%">
               <a:extLst>
                 <a:ext uri="{FF2B5EF4-FFF2-40B4-BE49-F238E27FC236}">
-                  <a16:creationId xmlns="" xmlns:a16="http://schemas.microsoft.com/office/drawing/2014/main" id="{1085577F-A61A-C647-B1BB-3EC24D1EF570}"/>
+                  <a16:creationId xmlns:a16="http://schemas.microsoft.com/office/drawing/2014/main" xmlns="" id="{1085577F-A61A-C647-B1BB-3EC24D1EF570}"/>
                 </a:ext>
               </a:extLst>
             </p:cNvPr>
@@ -13205,7 +13202,7 @@
             <p:cNvPr id="15369" name="Freeform 11" descr="5%">
               <a:extLst>
                 <a:ext uri="{FF2B5EF4-FFF2-40B4-BE49-F238E27FC236}">
-                  <a16:creationId xmlns="" xmlns:a16="http://schemas.microsoft.com/office/drawing/2014/main" id="{42171880-3EF9-BD46-B394-72256EDB9F85}"/>
+                  <a16:creationId xmlns:a16="http://schemas.microsoft.com/office/drawing/2014/main" xmlns="" id="{42171880-3EF9-BD46-B394-72256EDB9F85}"/>
                 </a:ext>
               </a:extLst>
             </p:cNvPr>
@@ -13324,7 +13321,7 @@
             <p:cNvPr id="15370" name="Freeform 12" descr="5%">
               <a:extLst>
                 <a:ext uri="{FF2B5EF4-FFF2-40B4-BE49-F238E27FC236}">
-                  <a16:creationId xmlns="" xmlns:a16="http://schemas.microsoft.com/office/drawing/2014/main" id="{4F9B3D7C-E1D0-FB44-B206-F2BECC14B1CD}"/>
+                  <a16:creationId xmlns:a16="http://schemas.microsoft.com/office/drawing/2014/main" xmlns="" id="{4F9B3D7C-E1D0-FB44-B206-F2BECC14B1CD}"/>
                 </a:ext>
               </a:extLst>
             </p:cNvPr>
@@ -13443,7 +13440,7 @@
             <p:cNvPr id="15371" name="Freeform 13" descr="5%">
               <a:extLst>
                 <a:ext uri="{FF2B5EF4-FFF2-40B4-BE49-F238E27FC236}">
-                  <a16:creationId xmlns="" xmlns:a16="http://schemas.microsoft.com/office/drawing/2014/main" id="{A24C0792-FA25-B748-886A-35F5ACA408AE}"/>
+                  <a16:creationId xmlns:a16="http://schemas.microsoft.com/office/drawing/2014/main" xmlns="" id="{A24C0792-FA25-B748-886A-35F5ACA408AE}"/>
                 </a:ext>
               </a:extLst>
             </p:cNvPr>
@@ -13563,7 +13560,7 @@
           <p:cNvPr id="15362" name="Rectangle 14">
             <a:extLst>
               <a:ext uri="{FF2B5EF4-FFF2-40B4-BE49-F238E27FC236}">
-                <a16:creationId xmlns="" xmlns:a16="http://schemas.microsoft.com/office/drawing/2014/main" id="{C44CDA25-06B2-4046-B1AC-A83281A09170}"/>
+                <a16:creationId xmlns:a16="http://schemas.microsoft.com/office/drawing/2014/main" xmlns="" id="{C44CDA25-06B2-4046-B1AC-A83281A09170}"/>
               </a:ext>
             </a:extLst>
           </p:cNvPr>
@@ -13762,7 +13759,7 @@
           <p:cNvPr id="15363" name="Rectangle 15">
             <a:extLst>
               <a:ext uri="{FF2B5EF4-FFF2-40B4-BE49-F238E27FC236}">
-                <a16:creationId xmlns="" xmlns:a16="http://schemas.microsoft.com/office/drawing/2014/main" id="{68AF690E-04A9-5542-820D-442B8473CB9D}"/>
+                <a16:creationId xmlns:a16="http://schemas.microsoft.com/office/drawing/2014/main" xmlns="" id="{68AF690E-04A9-5542-820D-442B8473CB9D}"/>
               </a:ext>
             </a:extLst>
           </p:cNvPr>
@@ -14075,7 +14072,7 @@
           <p:cNvPr id="15364" name="Freeform 17">
             <a:extLst>
               <a:ext uri="{FF2B5EF4-FFF2-40B4-BE49-F238E27FC236}">
-                <a16:creationId xmlns="" xmlns:a16="http://schemas.microsoft.com/office/drawing/2014/main" id="{ACB45F95-1541-4E4A-A55E-D838EEDC1698}"/>
+                <a16:creationId xmlns:a16="http://schemas.microsoft.com/office/drawing/2014/main" xmlns="" id="{ACB45F95-1541-4E4A-A55E-D838EEDC1698}"/>
               </a:ext>
             </a:extLst>
           </p:cNvPr>
@@ -14190,7 +14187,7 @@
           <p:cNvPr id="15365" name="17 Imagen">
             <a:extLst>
               <a:ext uri="{FF2B5EF4-FFF2-40B4-BE49-F238E27FC236}">
-                <a16:creationId xmlns="" xmlns:a16="http://schemas.microsoft.com/office/drawing/2014/main" id="{794BF391-464F-5548-8F2D-BF964DF6B303}"/>
+                <a16:creationId xmlns:a16="http://schemas.microsoft.com/office/drawing/2014/main" xmlns="" id="{794BF391-464F-5548-8F2D-BF964DF6B303}"/>
               </a:ext>
             </a:extLst>
           </p:cNvPr>
@@ -14312,7 +14309,7 @@
           <p:cNvPr id="5" name="Rectangle 14">
             <a:extLst>
               <a:ext uri="{FF2B5EF4-FFF2-40B4-BE49-F238E27FC236}">
-                <a16:creationId xmlns="" xmlns:a16="http://schemas.microsoft.com/office/drawing/2014/main" id="{3665E0D4-68DF-7A4B-92E0-B652D965824C}"/>
+                <a16:creationId xmlns:a16="http://schemas.microsoft.com/office/drawing/2014/main" xmlns="" id="{3665E0D4-68DF-7A4B-92E0-B652D965824C}"/>
               </a:ext>
             </a:extLst>
           </p:cNvPr>
@@ -14601,7 +14598,7 @@
           <p:cNvPr id="5" name="Rectangle 14">
             <a:extLst>
               <a:ext uri="{FF2B5EF4-FFF2-40B4-BE49-F238E27FC236}">
-                <a16:creationId xmlns="" xmlns:a16="http://schemas.microsoft.com/office/drawing/2014/main" id="{3665E0D4-68DF-7A4B-92E0-B652D965824C}"/>
+                <a16:creationId xmlns:a16="http://schemas.microsoft.com/office/drawing/2014/main" xmlns="" id="{3665E0D4-68DF-7A4B-92E0-B652D965824C}"/>
               </a:ext>
             </a:extLst>
           </p:cNvPr>
@@ -14920,7 +14917,7 @@
           <p:cNvPr id="16385" name="Rectangle 14">
             <a:extLst>
               <a:ext uri="{FF2B5EF4-FFF2-40B4-BE49-F238E27FC236}">
-                <a16:creationId xmlns="" xmlns:a16="http://schemas.microsoft.com/office/drawing/2014/main" id="{3665E0D4-68DF-7A4B-92E0-B652D965824C}"/>
+                <a16:creationId xmlns:a16="http://schemas.microsoft.com/office/drawing/2014/main" xmlns="" id="{3665E0D4-68DF-7A4B-92E0-B652D965824C}"/>
               </a:ext>
             </a:extLst>
           </p:cNvPr>
@@ -15121,7 +15118,7 @@
       </p:sp>
       <p:pic>
         <p:nvPicPr>
-          <p:cNvPr id="2" name="Imagen 1"/>
+          <p:cNvPr id="3" name="Imagen 2"/>
           <p:cNvPicPr>
             <a:picLocks noChangeAspect="1"/>
           </p:cNvPicPr>
@@ -15135,8 +15132,8 @@
         </p:blipFill>
         <p:spPr>
           <a:xfrm>
-            <a:off x="0" y="682638"/>
-            <a:ext cx="9144000" cy="5492723"/>
+            <a:off x="0" y="680687"/>
+            <a:ext cx="9144000" cy="5496626"/>
           </a:xfrm>
           <a:prstGeom prst="rect">
             <a:avLst/>
@@ -15185,7 +15182,7 @@
           <p:cNvPr id="31745" name="Picture 2" descr="Estrategias de marketing digital a través de preguntas clave">
             <a:extLst>
               <a:ext uri="{FF2B5EF4-FFF2-40B4-BE49-F238E27FC236}">
-                <a16:creationId xmlns="" xmlns:a16="http://schemas.microsoft.com/office/drawing/2014/main" id="{66CEA66D-E15C-C847-9B2A-032EF58E0B53}"/>
+                <a16:creationId xmlns:a16="http://schemas.microsoft.com/office/drawing/2014/main" xmlns="" id="{66CEA66D-E15C-C847-9B2A-032EF58E0B53}"/>
               </a:ext>
             </a:extLst>
           </p:cNvPr>
@@ -15245,7 +15242,7 @@
           <p:cNvPr id="31746" name="CuadroTexto 1">
             <a:extLst>
               <a:ext uri="{FF2B5EF4-FFF2-40B4-BE49-F238E27FC236}">
-                <a16:creationId xmlns="" xmlns:a16="http://schemas.microsoft.com/office/drawing/2014/main" id="{FD239F26-72A2-444A-9FA1-740091578B02}"/>
+                <a16:creationId xmlns:a16="http://schemas.microsoft.com/office/drawing/2014/main" xmlns="" id="{FD239F26-72A2-444A-9FA1-740091578B02}"/>
               </a:ext>
             </a:extLst>
           </p:cNvPr>
@@ -15401,7 +15398,7 @@
           <p:cNvPr id="31747" name="Group 22">
             <a:extLst>
               <a:ext uri="{FF2B5EF4-FFF2-40B4-BE49-F238E27FC236}">
-                <a16:creationId xmlns="" xmlns:a16="http://schemas.microsoft.com/office/drawing/2014/main" id="{A3D2F5D2-D269-504A-B84C-C6061FCA57AD}"/>
+                <a16:creationId xmlns:a16="http://schemas.microsoft.com/office/drawing/2014/main" xmlns="" id="{A3D2F5D2-D269-504A-B84C-C6061FCA57AD}"/>
               </a:ext>
             </a:extLst>
           </p:cNvPr>
@@ -15423,7 +15420,7 @@
             <p:cNvPr id="31751" name="Freeform 8" descr="5%">
               <a:extLst>
                 <a:ext uri="{FF2B5EF4-FFF2-40B4-BE49-F238E27FC236}">
-                  <a16:creationId xmlns="" xmlns:a16="http://schemas.microsoft.com/office/drawing/2014/main" id="{949389A0-7C35-D440-A511-E8043CC49841}"/>
+                  <a16:creationId xmlns:a16="http://schemas.microsoft.com/office/drawing/2014/main" xmlns="" id="{949389A0-7C35-D440-A511-E8043CC49841}"/>
                 </a:ext>
               </a:extLst>
             </p:cNvPr>
@@ -15542,7 +15539,7 @@
             <p:cNvPr id="31752" name="Freeform 9" descr="5%">
               <a:extLst>
                 <a:ext uri="{FF2B5EF4-FFF2-40B4-BE49-F238E27FC236}">
-                  <a16:creationId xmlns="" xmlns:a16="http://schemas.microsoft.com/office/drawing/2014/main" id="{06CE39B2-5F93-C74A-AAF4-A1377571A4EA}"/>
+                  <a16:creationId xmlns:a16="http://schemas.microsoft.com/office/drawing/2014/main" xmlns="" id="{06CE39B2-5F93-C74A-AAF4-A1377571A4EA}"/>
                 </a:ext>
               </a:extLst>
             </p:cNvPr>
@@ -15661,7 +15658,7 @@
             <p:cNvPr id="31753" name="Freeform 10" descr="5%">
               <a:extLst>
                 <a:ext uri="{FF2B5EF4-FFF2-40B4-BE49-F238E27FC236}">
-                  <a16:creationId xmlns="" xmlns:a16="http://schemas.microsoft.com/office/drawing/2014/main" id="{C97A05CA-BA23-5B43-BB1D-598E35F33716}"/>
+                  <a16:creationId xmlns:a16="http://schemas.microsoft.com/office/drawing/2014/main" xmlns="" id="{C97A05CA-BA23-5B43-BB1D-598E35F33716}"/>
                 </a:ext>
               </a:extLst>
             </p:cNvPr>
@@ -15780,7 +15777,7 @@
             <p:cNvPr id="31754" name="Freeform 11" descr="5%">
               <a:extLst>
                 <a:ext uri="{FF2B5EF4-FFF2-40B4-BE49-F238E27FC236}">
-                  <a16:creationId xmlns="" xmlns:a16="http://schemas.microsoft.com/office/drawing/2014/main" id="{2B84887D-7D31-644A-9461-B0EF770AB71C}"/>
+                  <a16:creationId xmlns:a16="http://schemas.microsoft.com/office/drawing/2014/main" xmlns="" id="{2B84887D-7D31-644A-9461-B0EF770AB71C}"/>
                 </a:ext>
               </a:extLst>
             </p:cNvPr>
@@ -15899,7 +15896,7 @@
             <p:cNvPr id="31755" name="Freeform 12" descr="5%">
               <a:extLst>
                 <a:ext uri="{FF2B5EF4-FFF2-40B4-BE49-F238E27FC236}">
-                  <a16:creationId xmlns="" xmlns:a16="http://schemas.microsoft.com/office/drawing/2014/main" id="{66D9D94A-DB3D-9246-8945-18F31C431B30}"/>
+                  <a16:creationId xmlns:a16="http://schemas.microsoft.com/office/drawing/2014/main" xmlns="" id="{66D9D94A-DB3D-9246-8945-18F31C431B30}"/>
                 </a:ext>
               </a:extLst>
             </p:cNvPr>
@@ -16018,7 +16015,7 @@
             <p:cNvPr id="31756" name="Freeform 13" descr="5%">
               <a:extLst>
                 <a:ext uri="{FF2B5EF4-FFF2-40B4-BE49-F238E27FC236}">
-                  <a16:creationId xmlns="" xmlns:a16="http://schemas.microsoft.com/office/drawing/2014/main" id="{EAD71A5A-2B41-2E4C-B00A-6C190547D1ED}"/>
+                  <a16:creationId xmlns:a16="http://schemas.microsoft.com/office/drawing/2014/main" xmlns="" id="{EAD71A5A-2B41-2E4C-B00A-6C190547D1ED}"/>
                 </a:ext>
               </a:extLst>
             </p:cNvPr>
@@ -16138,7 +16135,7 @@
           <p:cNvPr id="31748" name="Freeform 17">
             <a:extLst>
               <a:ext uri="{FF2B5EF4-FFF2-40B4-BE49-F238E27FC236}">
-                <a16:creationId xmlns="" xmlns:a16="http://schemas.microsoft.com/office/drawing/2014/main" id="{7F1EC75B-5B06-4F42-A007-2C7CE755ABBE}"/>
+                <a16:creationId xmlns:a16="http://schemas.microsoft.com/office/drawing/2014/main" xmlns="" id="{7F1EC75B-5B06-4F42-A007-2C7CE755ABBE}"/>
               </a:ext>
             </a:extLst>
           </p:cNvPr>
@@ -16253,7 +16250,7 @@
           <p:cNvPr id="31749" name="17 Imagen">
             <a:extLst>
               <a:ext uri="{FF2B5EF4-FFF2-40B4-BE49-F238E27FC236}">
-                <a16:creationId xmlns="" xmlns:a16="http://schemas.microsoft.com/office/drawing/2014/main" id="{F3812B2B-ED5E-D14C-803D-3858F435CB5E}"/>
+                <a16:creationId xmlns:a16="http://schemas.microsoft.com/office/drawing/2014/main" xmlns="" id="{F3812B2B-ED5E-D14C-803D-3858F435CB5E}"/>
               </a:ext>
             </a:extLst>
           </p:cNvPr>
@@ -16313,7 +16310,7 @@
           <p:cNvPr id="31750" name="Imagen 15">
             <a:extLst>
               <a:ext uri="{FF2B5EF4-FFF2-40B4-BE49-F238E27FC236}">
-                <a16:creationId xmlns="" xmlns:a16="http://schemas.microsoft.com/office/drawing/2014/main" id="{41854531-9AB6-5240-8FAD-0DA24A1221E5}"/>
+                <a16:creationId xmlns:a16="http://schemas.microsoft.com/office/drawing/2014/main" xmlns="" id="{41854531-9AB6-5240-8FAD-0DA24A1221E5}"/>
               </a:ext>
             </a:extLst>
           </p:cNvPr>
@@ -16405,7 +16402,7 @@
           <p:cNvPr id="16385" name="Rectangle 14">
             <a:extLst>
               <a:ext uri="{FF2B5EF4-FFF2-40B4-BE49-F238E27FC236}">
-                <a16:creationId xmlns="" xmlns:a16="http://schemas.microsoft.com/office/drawing/2014/main" id="{3665E0D4-68DF-7A4B-92E0-B652D965824C}"/>
+                <a16:creationId xmlns:a16="http://schemas.microsoft.com/office/drawing/2014/main" xmlns="" id="{3665E0D4-68DF-7A4B-92E0-B652D965824C}"/>
               </a:ext>
             </a:extLst>
           </p:cNvPr>
@@ -16670,7 +16667,7 @@
           <p:cNvPr id="16385" name="Rectangle 14">
             <a:extLst>
               <a:ext uri="{FF2B5EF4-FFF2-40B4-BE49-F238E27FC236}">
-                <a16:creationId xmlns="" xmlns:a16="http://schemas.microsoft.com/office/drawing/2014/main" id="{3665E0D4-68DF-7A4B-92E0-B652D965824C}"/>
+                <a16:creationId xmlns:a16="http://schemas.microsoft.com/office/drawing/2014/main" xmlns="" id="{3665E0D4-68DF-7A4B-92E0-B652D965824C}"/>
               </a:ext>
             </a:extLst>
           </p:cNvPr>
@@ -16935,7 +16932,7 @@
           <p:cNvPr id="16385" name="Rectangle 14">
             <a:extLst>
               <a:ext uri="{FF2B5EF4-FFF2-40B4-BE49-F238E27FC236}">
-                <a16:creationId xmlns="" xmlns:a16="http://schemas.microsoft.com/office/drawing/2014/main" id="{3665E0D4-68DF-7A4B-92E0-B652D965824C}"/>
+                <a16:creationId xmlns:a16="http://schemas.microsoft.com/office/drawing/2014/main" xmlns="" id="{3665E0D4-68DF-7A4B-92E0-B652D965824C}"/>
               </a:ext>
             </a:extLst>
           </p:cNvPr>
@@ -17257,7 +17254,7 @@
           <p:cNvPr id="16385" name="Rectangle 14">
             <a:extLst>
               <a:ext uri="{FF2B5EF4-FFF2-40B4-BE49-F238E27FC236}">
-                <a16:creationId xmlns="" xmlns:a16="http://schemas.microsoft.com/office/drawing/2014/main" id="{3665E0D4-68DF-7A4B-92E0-B652D965824C}"/>
+                <a16:creationId xmlns:a16="http://schemas.microsoft.com/office/drawing/2014/main" xmlns="" id="{3665E0D4-68DF-7A4B-92E0-B652D965824C}"/>
               </a:ext>
             </a:extLst>
           </p:cNvPr>
@@ -17538,7 +17535,7 @@
           <p:cNvPr id="16385" name="Rectangle 14">
             <a:extLst>
               <a:ext uri="{FF2B5EF4-FFF2-40B4-BE49-F238E27FC236}">
-                <a16:creationId xmlns="" xmlns:a16="http://schemas.microsoft.com/office/drawing/2014/main" id="{3665E0D4-68DF-7A4B-92E0-B652D965824C}"/>
+                <a16:creationId xmlns:a16="http://schemas.microsoft.com/office/drawing/2014/main" xmlns="" id="{3665E0D4-68DF-7A4B-92E0-B652D965824C}"/>
               </a:ext>
             </a:extLst>
           </p:cNvPr>
@@ -17819,7 +17816,7 @@
           <p:cNvPr id="16385" name="Rectangle 14">
             <a:extLst>
               <a:ext uri="{FF2B5EF4-FFF2-40B4-BE49-F238E27FC236}">
-                <a16:creationId xmlns="" xmlns:a16="http://schemas.microsoft.com/office/drawing/2014/main" id="{3665E0D4-68DF-7A4B-92E0-B652D965824C}"/>
+                <a16:creationId xmlns:a16="http://schemas.microsoft.com/office/drawing/2014/main" xmlns="" id="{3665E0D4-68DF-7A4B-92E0-B652D965824C}"/>
               </a:ext>
             </a:extLst>
           </p:cNvPr>
@@ -18100,7 +18097,7 @@
           <p:cNvPr id="16385" name="Rectangle 14">
             <a:extLst>
               <a:ext uri="{FF2B5EF4-FFF2-40B4-BE49-F238E27FC236}">
-                <a16:creationId xmlns="" xmlns:a16="http://schemas.microsoft.com/office/drawing/2014/main" id="{3665E0D4-68DF-7A4B-92E0-B652D965824C}"/>
+                <a16:creationId xmlns:a16="http://schemas.microsoft.com/office/drawing/2014/main" xmlns="" id="{3665E0D4-68DF-7A4B-92E0-B652D965824C}"/>
               </a:ext>
             </a:extLst>
           </p:cNvPr>

</xml_diff>